<commit_message>
Few pictures and explanations in the presentation. Splitting the signals to the signals before and after the stimulation.
</commit_message>
<xml_diff>
--- a/Project_Midterm_Presentation.pptx
+++ b/Project_Midterm_Presentation.pptx
@@ -5,22 +5,26 @@
     <p:sldMasterId id="2147483708" r:id="rId1"/>
   </p:sldMasterIdLst>
   <p:notesMasterIdLst>
-    <p:notesMasterId r:id="rId12"/>
+    <p:notesMasterId r:id="rId16"/>
   </p:notesMasterIdLst>
   <p:handoutMasterIdLst>
-    <p:handoutMasterId r:id="rId13"/>
+    <p:handoutMasterId r:id="rId17"/>
   </p:handoutMasterIdLst>
   <p:sldIdLst>
     <p:sldId id="288" r:id="rId2"/>
     <p:sldId id="291" r:id="rId3"/>
-    <p:sldId id="290" r:id="rId4"/>
-    <p:sldId id="289" r:id="rId5"/>
-    <p:sldId id="292" r:id="rId6"/>
-    <p:sldId id="293" r:id="rId7"/>
-    <p:sldId id="295" r:id="rId8"/>
-    <p:sldId id="296" r:id="rId9"/>
-    <p:sldId id="299" r:id="rId10"/>
-    <p:sldId id="298" r:id="rId11"/>
+    <p:sldId id="289" r:id="rId4"/>
+    <p:sldId id="300" r:id="rId5"/>
+    <p:sldId id="290" r:id="rId6"/>
+    <p:sldId id="292" r:id="rId7"/>
+    <p:sldId id="293" r:id="rId8"/>
+    <p:sldId id="295" r:id="rId9"/>
+    <p:sldId id="303" r:id="rId10"/>
+    <p:sldId id="301" r:id="rId11"/>
+    <p:sldId id="302" r:id="rId12"/>
+    <p:sldId id="296" r:id="rId13"/>
+    <p:sldId id="299" r:id="rId14"/>
+    <p:sldId id="298" r:id="rId15"/>
   </p:sldIdLst>
   <p:sldSz cx="9144000" cy="6858000" type="screen4x3"/>
   <p:notesSz cx="7010400" cy="9296400"/>
@@ -170,6 +174,20 @@
 
 <file path=ppt/comments/comment2.xml><?xml version="1.0" encoding="utf-8"?>
 <p:cmLst xmlns:a="http://schemas.openxmlformats.org/drawingml/2006/main" xmlns:r="http://schemas.openxmlformats.org/officeDocument/2006/relationships" xmlns:p="http://schemas.openxmlformats.org/presentationml/2006/main">
+  <p:cm authorId="1" dt="2016-08-31T15:04:18.308" idx="1">
+    <p:pos x="10" y="10"/>
+    <p:text>Background slides may appear before the project goal slide if it's not poossible to understand the project goal without the background.</p:text>
+    <p:extLst>
+      <p:ext uri="{C676402C-5697-4E1C-873F-D02D1690AC5C}">
+        <p15:threadingInfo xmlns:p15="http://schemas.microsoft.com/office/powerpoint/2012/main" timeZoneBias="-180"/>
+      </p:ext>
+    </p:extLst>
+  </p:cm>
+</p:cmLst>
+</file>
+
+<file path=ppt/comments/comment3.xml><?xml version="1.0" encoding="utf-8"?>
+<p:cmLst xmlns:a="http://schemas.openxmlformats.org/drawingml/2006/main" xmlns:r="http://schemas.openxmlformats.org/officeDocument/2006/relationships" xmlns:p="http://schemas.openxmlformats.org/presentationml/2006/main">
   <p:cm authorId="1" dt="2016-08-31T15:07:40.279" idx="2">
     <p:pos x="10" y="10"/>
     <p:text>In these slides don't forget to give references to previous works, for example: [Cohen &amp; Levi, 2010] or [Cohen et al, 2013]</p:text>
@@ -182,7 +200,7 @@
 </p:cmLst>
 </file>
 
-<file path=ppt/comments/comment3.xml><?xml version="1.0" encoding="utf-8"?>
+<file path=ppt/comments/comment4.xml><?xml version="1.0" encoding="utf-8"?>
 <p:cmLst xmlns:a="http://schemas.openxmlformats.org/drawingml/2006/main" xmlns:r="http://schemas.openxmlformats.org/officeDocument/2006/relationships" xmlns:p="http://schemas.openxmlformats.org/presentationml/2006/main">
   <p:cm authorId="1" dt="2016-08-31T15:15:47.508" idx="3">
     <p:pos x="2550" y="313"/>
@@ -196,7 +214,7 @@
 </p:cmLst>
 </file>
 
-<file path=ppt/comments/comment4.xml><?xml version="1.0" encoding="utf-8"?>
+<file path=ppt/comments/comment5.xml><?xml version="1.0" encoding="utf-8"?>
 <p:cmLst xmlns:a="http://schemas.openxmlformats.org/drawingml/2006/main" xmlns:r="http://schemas.openxmlformats.org/officeDocument/2006/relationships" xmlns:p="http://schemas.openxmlformats.org/presentationml/2006/main">
   <p:cm authorId="1" dt="2016-08-31T15:19:26.336" idx="4">
     <p:pos x="10" y="10"/>
@@ -2539,67 +2557,6 @@
           </a:p>
         </p:txBody>
       </p:sp>
-      <p:sp>
-        <p:nvSpPr>
-          <p:cNvPr id="5" name="TextBox 4"/>
-          <p:cNvSpPr txBox="1"/>
-          <p:nvPr/>
-        </p:nvSpPr>
-        <p:spPr>
-          <a:xfrm>
-            <a:off x="5715000" y="3124200"/>
-            <a:ext cx="2667000" cy="2308324"/>
-          </a:xfrm>
-          <a:prstGeom prst="rect">
-            <a:avLst/>
-          </a:prstGeom>
-          <a:noFill/>
-          <a:ln w="12700">
-            <a:noFill/>
-          </a:ln>
-        </p:spPr>
-        <p:txBody>
-          <a:bodyPr wrap="square" rtlCol="1">
-            <a:spAutoFit/>
-          </a:bodyPr>
-          <a:lstStyle/>
-          <a:p>
-            <a:endParaRPr lang="en-US" dirty="0"/>
-          </a:p>
-          <a:p>
-            <a:endParaRPr lang="en-US" dirty="0"/>
-          </a:p>
-          <a:p>
-            <a:endParaRPr lang="en-US" dirty="0"/>
-          </a:p>
-          <a:p>
-            <a:r>
-              <a:rPr lang="en-US" dirty="0"/>
-              <a:t>      </a:t>
-            </a:r>
-            <a:r>
-              <a:rPr lang="en-US" dirty="0">
-                <a:solidFill>
-                  <a:srgbClr val="002060"/>
-                </a:solidFill>
-              </a:rPr>
-              <a:t>[Optional Picture]</a:t>
-            </a:r>
-          </a:p>
-          <a:p>
-            <a:endParaRPr lang="en-US" dirty="0"/>
-          </a:p>
-          <a:p>
-            <a:endParaRPr lang="en-US" dirty="0"/>
-          </a:p>
-          <a:p>
-            <a:endParaRPr lang="en-US" dirty="0"/>
-          </a:p>
-          <a:p>
-            <a:endParaRPr lang="he-IL" dirty="0"/>
-          </a:p>
-        </p:txBody>
-      </p:sp>
       <p:pic>
         <p:nvPicPr>
           <p:cNvPr id="6" name="Picture 5">
@@ -2668,6 +2625,495 @@
       </p:grpSpPr>
       <p:sp>
         <p:nvSpPr>
+          <p:cNvPr id="2" name="Title 1">
+            <a:extLst>
+              <a:ext uri="{FF2B5EF4-FFF2-40B4-BE49-F238E27FC236}">
+                <a16:creationId xmlns:a16="http://schemas.microsoft.com/office/drawing/2014/main" id="{E2AE121A-5D27-4EE4-9D30-EE2E576CAB80}"/>
+              </a:ext>
+            </a:extLst>
+          </p:cNvPr>
+          <p:cNvSpPr>
+            <a:spLocks noGrp="1"/>
+          </p:cNvSpPr>
+          <p:nvPr>
+            <p:ph type="title"/>
+          </p:nvPr>
+        </p:nvSpPr>
+        <p:spPr/>
+        <p:txBody>
+          <a:bodyPr/>
+          <a:lstStyle/>
+          <a:p>
+            <a:r>
+              <a:rPr lang="en-US" dirty="0"/>
+              <a:t>Singularity of Covariance</a:t>
+            </a:r>
+          </a:p>
+        </p:txBody>
+      </p:sp>
+      <p:sp>
+        <p:nvSpPr>
+          <p:cNvPr id="4" name="Slide Number Placeholder 3">
+            <a:extLst>
+              <a:ext uri="{FF2B5EF4-FFF2-40B4-BE49-F238E27FC236}">
+                <a16:creationId xmlns:a16="http://schemas.microsoft.com/office/drawing/2014/main" id="{D07F5E9E-5807-4398-9671-F2A3329705CA}"/>
+              </a:ext>
+            </a:extLst>
+          </p:cNvPr>
+          <p:cNvSpPr>
+            <a:spLocks noGrp="1"/>
+          </p:cNvSpPr>
+          <p:nvPr>
+            <p:ph type="sldNum" sz="quarter" idx="12"/>
+          </p:nvPr>
+        </p:nvSpPr>
+        <p:spPr/>
+        <p:txBody>
+          <a:bodyPr/>
+          <a:lstStyle/>
+          <a:p>
+            <a:fld id="{B01D9778-10B4-40FB-B4E4-44FA89A86639}" type="slidenum">
+              <a:rPr lang="en-US" smtClean="0"/>
+              <a:pPr/>
+              <a:t>10</a:t>
+            </a:fld>
+            <a:endParaRPr lang="en-US"/>
+          </a:p>
+        </p:txBody>
+      </p:sp>
+      <p:sp>
+        <p:nvSpPr>
+          <p:cNvPr id="8" name="Content Placeholder 7">
+            <a:extLst>
+              <a:ext uri="{FF2B5EF4-FFF2-40B4-BE49-F238E27FC236}">
+                <a16:creationId xmlns:a16="http://schemas.microsoft.com/office/drawing/2014/main" id="{0DED2841-0C91-4900-9D60-F735935D1CEE}"/>
+              </a:ext>
+            </a:extLst>
+          </p:cNvPr>
+          <p:cNvSpPr>
+            <a:spLocks noGrp="1"/>
+          </p:cNvSpPr>
+          <p:nvPr>
+            <p:ph idx="1"/>
+          </p:nvPr>
+        </p:nvSpPr>
+        <p:spPr/>
+        <p:txBody>
+          <a:bodyPr/>
+          <a:lstStyle/>
+          <a:p>
+            <a:endParaRPr lang="en-US" dirty="0"/>
+          </a:p>
+        </p:txBody>
+      </p:sp>
+    </p:spTree>
+    <p:extLst>
+      <p:ext uri="{BB962C8B-B14F-4D97-AF65-F5344CB8AC3E}">
+        <p14:creationId xmlns:p14="http://schemas.microsoft.com/office/powerpoint/2010/main" val="4278445696"/>
+      </p:ext>
+    </p:extLst>
+  </p:cSld>
+  <p:clrMapOvr>
+    <a:masterClrMapping/>
+  </p:clrMapOvr>
+</p:sld>
+</file>
+
+<file path=ppt/slides/slide11.xml><?xml version="1.0" encoding="utf-8"?>
+<p:sld xmlns:a="http://schemas.openxmlformats.org/drawingml/2006/main" xmlns:r="http://schemas.openxmlformats.org/officeDocument/2006/relationships" xmlns:p="http://schemas.openxmlformats.org/presentationml/2006/main">
+  <p:cSld>
+    <p:spTree>
+      <p:nvGrpSpPr>
+        <p:cNvPr id="1" name=""/>
+        <p:cNvGrpSpPr/>
+        <p:nvPr/>
+      </p:nvGrpSpPr>
+      <p:grpSpPr>
+        <a:xfrm>
+          <a:off x="0" y="0"/>
+          <a:ext cx="0" cy="0"/>
+          <a:chOff x="0" y="0"/>
+          <a:chExt cx="0" cy="0"/>
+        </a:xfrm>
+      </p:grpSpPr>
+      <p:sp>
+        <p:nvSpPr>
+          <p:cNvPr id="2" name="Title 1">
+            <a:extLst>
+              <a:ext uri="{FF2B5EF4-FFF2-40B4-BE49-F238E27FC236}">
+                <a16:creationId xmlns:a16="http://schemas.microsoft.com/office/drawing/2014/main" id="{6F847B57-CB94-4091-8771-B55DFD5F71FF}"/>
+              </a:ext>
+            </a:extLst>
+          </p:cNvPr>
+          <p:cNvSpPr>
+            <a:spLocks noGrp="1"/>
+          </p:cNvSpPr>
+          <p:nvPr>
+            <p:ph type="title"/>
+          </p:nvPr>
+        </p:nvSpPr>
+        <p:spPr/>
+        <p:txBody>
+          <a:bodyPr/>
+          <a:lstStyle/>
+          <a:p>
+            <a:r>
+              <a:rPr lang="en-US" dirty="0"/>
+              <a:t>Dominant Electrodes</a:t>
+            </a:r>
+          </a:p>
+        </p:txBody>
+      </p:sp>
+      <p:sp>
+        <p:nvSpPr>
+          <p:cNvPr id="4" name="Slide Number Placeholder 3">
+            <a:extLst>
+              <a:ext uri="{FF2B5EF4-FFF2-40B4-BE49-F238E27FC236}">
+                <a16:creationId xmlns:a16="http://schemas.microsoft.com/office/drawing/2014/main" id="{2588F7C1-5C39-4DA7-89C2-5ADD824897FE}"/>
+              </a:ext>
+            </a:extLst>
+          </p:cNvPr>
+          <p:cNvSpPr>
+            <a:spLocks noGrp="1"/>
+          </p:cNvSpPr>
+          <p:nvPr>
+            <p:ph type="sldNum" sz="quarter" idx="12"/>
+          </p:nvPr>
+        </p:nvSpPr>
+        <p:spPr/>
+        <p:txBody>
+          <a:bodyPr/>
+          <a:lstStyle/>
+          <a:p>
+            <a:fld id="{B01D9778-10B4-40FB-B4E4-44FA89A86639}" type="slidenum">
+              <a:rPr lang="en-US" smtClean="0"/>
+              <a:pPr/>
+              <a:t>11</a:t>
+            </a:fld>
+            <a:endParaRPr lang="en-US"/>
+          </a:p>
+        </p:txBody>
+      </p:sp>
+      <p:pic>
+        <p:nvPicPr>
+          <p:cNvPr id="9" name="Content Placeholder 5" descr="A screenshot of a computer&#10;&#10;Description generated with high confidence">
+            <a:extLst>
+              <a:ext uri="{FF2B5EF4-FFF2-40B4-BE49-F238E27FC236}">
+                <a16:creationId xmlns:a16="http://schemas.microsoft.com/office/drawing/2014/main" id="{F6C78D37-6813-445B-88F4-A721F763BAB2}"/>
+              </a:ext>
+            </a:extLst>
+          </p:cNvPr>
+          <p:cNvPicPr>
+            <a:picLocks noGrp="1" noChangeAspect="1"/>
+          </p:cNvPicPr>
+          <p:nvPr>
+            <p:ph idx="1"/>
+          </p:nvPr>
+        </p:nvPicPr>
+        <p:blipFill>
+          <a:blip r:embed="rId2">
+            <a:extLst>
+              <a:ext uri="{28A0092B-C50C-407E-A947-70E740481C1C}">
+                <a14:useLocalDpi xmlns:a14="http://schemas.microsoft.com/office/drawing/2010/main" val="0"/>
+              </a:ext>
+            </a:extLst>
+          </a:blip>
+          <a:stretch>
+            <a:fillRect/>
+          </a:stretch>
+        </p:blipFill>
+        <p:spPr>
+          <a:xfrm>
+            <a:off x="457200" y="1910795"/>
+            <a:ext cx="8229600" cy="3904773"/>
+          </a:xfrm>
+        </p:spPr>
+      </p:pic>
+    </p:spTree>
+    <p:extLst>
+      <p:ext uri="{BB962C8B-B14F-4D97-AF65-F5344CB8AC3E}">
+        <p14:creationId xmlns:p14="http://schemas.microsoft.com/office/powerpoint/2010/main" val="2719028190"/>
+      </p:ext>
+    </p:extLst>
+  </p:cSld>
+  <p:clrMapOvr>
+    <a:masterClrMapping/>
+  </p:clrMapOvr>
+</p:sld>
+</file>
+
+<file path=ppt/slides/slide12.xml><?xml version="1.0" encoding="utf-8"?>
+<p:sld xmlns:a="http://schemas.openxmlformats.org/drawingml/2006/main" xmlns:r="http://schemas.openxmlformats.org/officeDocument/2006/relationships" xmlns:p="http://schemas.openxmlformats.org/presentationml/2006/main">
+  <p:cSld>
+    <p:spTree>
+      <p:nvGrpSpPr>
+        <p:cNvPr id="1" name=""/>
+        <p:cNvGrpSpPr/>
+        <p:nvPr/>
+      </p:nvGrpSpPr>
+      <p:grpSpPr>
+        <a:xfrm>
+          <a:off x="0" y="0"/>
+          <a:ext cx="0" cy="0"/>
+          <a:chOff x="0" y="0"/>
+          <a:chExt cx="0" cy="0"/>
+        </a:xfrm>
+      </p:grpSpPr>
+      <p:sp>
+        <p:nvSpPr>
+          <p:cNvPr id="2" name="Title 1"/>
+          <p:cNvSpPr>
+            <a:spLocks noGrp="1"/>
+          </p:cNvSpPr>
+          <p:nvPr>
+            <p:ph type="title"/>
+          </p:nvPr>
+        </p:nvSpPr>
+        <p:spPr/>
+        <p:txBody>
+          <a:bodyPr/>
+          <a:lstStyle/>
+          <a:p>
+            <a:r>
+              <a:rPr lang="en-US" dirty="0">
+                <a:solidFill>
+                  <a:srgbClr val="002060"/>
+                </a:solidFill>
+              </a:rPr>
+              <a:t>Conclusion</a:t>
+            </a:r>
+            <a:endParaRPr lang="he-IL" dirty="0">
+              <a:solidFill>
+                <a:srgbClr val="002060"/>
+              </a:solidFill>
+            </a:endParaRPr>
+          </a:p>
+        </p:txBody>
+      </p:sp>
+      <p:sp>
+        <p:nvSpPr>
+          <p:cNvPr id="3" name="Content Placeholder 2"/>
+          <p:cNvSpPr>
+            <a:spLocks noGrp="1"/>
+          </p:cNvSpPr>
+          <p:nvPr>
+            <p:ph idx="1"/>
+          </p:nvPr>
+        </p:nvSpPr>
+        <p:spPr/>
+        <p:txBody>
+          <a:bodyPr/>
+          <a:lstStyle/>
+          <a:p>
+            <a:r>
+              <a:rPr lang="en-US" dirty="0">
+                <a:solidFill>
+                  <a:srgbClr val="002060"/>
+                </a:solidFill>
+              </a:rPr>
+              <a:t>Repeat the project goal in other words</a:t>
+            </a:r>
+          </a:p>
+          <a:p>
+            <a:pPr lvl="1"/>
+            <a:r>
+              <a:rPr lang="en-US" dirty="0">
+                <a:solidFill>
+                  <a:srgbClr val="002060"/>
+                </a:solidFill>
+              </a:rPr>
+              <a:t>Have you achieved the goal? (if not, this is ok and you have to explain why)</a:t>
+            </a:r>
+          </a:p>
+          <a:p>
+            <a:r>
+              <a:rPr lang="en-US" dirty="0">
+                <a:solidFill>
+                  <a:srgbClr val="002060"/>
+                </a:solidFill>
+              </a:rPr>
+              <a:t>Summarize your results</a:t>
+            </a:r>
+          </a:p>
+          <a:p>
+            <a:r>
+              <a:rPr lang="en-US" dirty="0">
+                <a:solidFill>
+                  <a:srgbClr val="002060"/>
+                </a:solidFill>
+              </a:rPr>
+              <a:t>Emphasize original contribution</a:t>
+            </a:r>
+          </a:p>
+        </p:txBody>
+      </p:sp>
+      <p:sp>
+        <p:nvSpPr>
+          <p:cNvPr id="5" name="Slide Number Placeholder 4"/>
+          <p:cNvSpPr>
+            <a:spLocks noGrp="1"/>
+          </p:cNvSpPr>
+          <p:nvPr>
+            <p:ph type="sldNum" sz="quarter" idx="12"/>
+          </p:nvPr>
+        </p:nvSpPr>
+        <p:spPr/>
+        <p:txBody>
+          <a:bodyPr/>
+          <a:lstStyle/>
+          <a:p>
+            <a:fld id="{B01D9778-10B4-40FB-B4E4-44FA89A86639}" type="slidenum">
+              <a:rPr lang="en-US" smtClean="0"/>
+              <a:pPr/>
+              <a:t>12</a:t>
+            </a:fld>
+            <a:endParaRPr lang="en-US"/>
+          </a:p>
+        </p:txBody>
+      </p:sp>
+    </p:spTree>
+    <p:extLst>
+      <p:ext uri="{BB962C8B-B14F-4D97-AF65-F5344CB8AC3E}">
+        <p14:creationId xmlns:p14="http://schemas.microsoft.com/office/powerpoint/2010/main" val="1669314898"/>
+      </p:ext>
+    </p:extLst>
+  </p:cSld>
+  <p:clrMapOvr>
+    <a:masterClrMapping/>
+  </p:clrMapOvr>
+</p:sld>
+</file>
+
+<file path=ppt/slides/slide13.xml><?xml version="1.0" encoding="utf-8"?>
+<p:sld xmlns:a="http://schemas.openxmlformats.org/drawingml/2006/main" xmlns:r="http://schemas.openxmlformats.org/officeDocument/2006/relationships" xmlns:p="http://schemas.openxmlformats.org/presentationml/2006/main">
+  <p:cSld>
+    <p:spTree>
+      <p:nvGrpSpPr>
+        <p:cNvPr id="1" name=""/>
+        <p:cNvGrpSpPr/>
+        <p:nvPr/>
+      </p:nvGrpSpPr>
+      <p:grpSpPr>
+        <a:xfrm>
+          <a:off x="0" y="0"/>
+          <a:ext cx="0" cy="0"/>
+          <a:chOff x="0" y="0"/>
+          <a:chExt cx="0" cy="0"/>
+        </a:xfrm>
+      </p:grpSpPr>
+      <p:sp>
+        <p:nvSpPr>
+          <p:cNvPr id="2" name="Title 1"/>
+          <p:cNvSpPr>
+            <a:spLocks noGrp="1"/>
+          </p:cNvSpPr>
+          <p:nvPr>
+            <p:ph type="title"/>
+          </p:nvPr>
+        </p:nvSpPr>
+        <p:spPr/>
+        <p:txBody>
+          <a:bodyPr/>
+          <a:lstStyle/>
+          <a:p>
+            <a:r>
+              <a:rPr lang="en-US" dirty="0">
+                <a:solidFill>
+                  <a:srgbClr val="002060"/>
+                </a:solidFill>
+              </a:rPr>
+              <a:t>Future Work</a:t>
+            </a:r>
+            <a:endParaRPr lang="he-IL" dirty="0">
+              <a:solidFill>
+                <a:srgbClr val="002060"/>
+              </a:solidFill>
+            </a:endParaRPr>
+          </a:p>
+        </p:txBody>
+      </p:sp>
+      <p:sp>
+        <p:nvSpPr>
+          <p:cNvPr id="3" name="Content Placeholder 2"/>
+          <p:cNvSpPr>
+            <a:spLocks noGrp="1"/>
+          </p:cNvSpPr>
+          <p:nvPr>
+            <p:ph idx="1"/>
+          </p:nvPr>
+        </p:nvSpPr>
+        <p:spPr/>
+        <p:txBody>
+          <a:bodyPr/>
+          <a:lstStyle/>
+          <a:p>
+            <a:r>
+              <a:rPr lang="en-US" dirty="0">
+                <a:solidFill>
+                  <a:srgbClr val="002060"/>
+                </a:solidFill>
+              </a:rPr>
+              <a:t>Suggestions for continuation of your work</a:t>
+            </a:r>
+          </a:p>
+        </p:txBody>
+      </p:sp>
+      <p:sp>
+        <p:nvSpPr>
+          <p:cNvPr id="5" name="Slide Number Placeholder 4"/>
+          <p:cNvSpPr>
+            <a:spLocks noGrp="1"/>
+          </p:cNvSpPr>
+          <p:nvPr>
+            <p:ph type="sldNum" sz="quarter" idx="12"/>
+          </p:nvPr>
+        </p:nvSpPr>
+        <p:spPr/>
+        <p:txBody>
+          <a:bodyPr/>
+          <a:lstStyle/>
+          <a:p>
+            <a:fld id="{B01D9778-10B4-40FB-B4E4-44FA89A86639}" type="slidenum">
+              <a:rPr lang="en-US" smtClean="0"/>
+              <a:pPr/>
+              <a:t>13</a:t>
+            </a:fld>
+            <a:endParaRPr lang="en-US"/>
+          </a:p>
+        </p:txBody>
+      </p:sp>
+    </p:spTree>
+    <p:extLst>
+      <p:ext uri="{BB962C8B-B14F-4D97-AF65-F5344CB8AC3E}">
+        <p14:creationId xmlns:p14="http://schemas.microsoft.com/office/powerpoint/2010/main" val="194558903"/>
+      </p:ext>
+    </p:extLst>
+  </p:cSld>
+  <p:clrMapOvr>
+    <a:masterClrMapping/>
+  </p:clrMapOvr>
+</p:sld>
+</file>
+
+<file path=ppt/slides/slide14.xml><?xml version="1.0" encoding="utf-8"?>
+<p:sld xmlns:a="http://schemas.openxmlformats.org/drawingml/2006/main" xmlns:r="http://schemas.openxmlformats.org/officeDocument/2006/relationships" xmlns:p="http://schemas.openxmlformats.org/presentationml/2006/main">
+  <p:cSld>
+    <p:spTree>
+      <p:nvGrpSpPr>
+        <p:cNvPr id="1" name=""/>
+        <p:cNvGrpSpPr/>
+        <p:nvPr/>
+      </p:nvGrpSpPr>
+      <p:grpSpPr>
+        <a:xfrm>
+          <a:off x="0" y="0"/>
+          <a:ext cx="0" cy="0"/>
+          <a:chOff x="0" y="0"/>
+          <a:chExt cx="0" cy="0"/>
+        </a:xfrm>
+      </p:grpSpPr>
+      <p:sp>
+        <p:nvSpPr>
           <p:cNvPr id="2" name="Title 1"/>
           <p:cNvSpPr>
             <a:spLocks noGrp="1"/>
@@ -2798,7 +3244,7 @@
             <a:fld id="{B01D9778-10B4-40FB-B4E4-44FA89A86639}" type="slidenum">
               <a:rPr lang="en-US" smtClean="0"/>
               <a:pPr/>
-              <a:t>10</a:t>
+              <a:t>14</a:t>
             </a:fld>
             <a:endParaRPr lang="en-US"/>
           </a:p>
@@ -2985,7 +3431,7 @@
                   <a:srgbClr val="002060"/>
                 </a:solidFill>
               </a:rPr>
-              <a:t>Project Goal</a:t>
+              <a:t>Background</a:t>
             </a:r>
             <a:endParaRPr lang="he-IL" dirty="0">
               <a:solidFill>
@@ -3016,7 +3462,81 @@
                   <a:srgbClr val="002060"/>
                 </a:solidFill>
               </a:rPr>
-              <a:t>Describe the goal of the project: What is the problem you face and what you want to achieve</a:t>
+              <a:t>TMS (Transcranial magnetic stimulation) – EM pulses through the skull.</a:t>
+            </a:r>
+          </a:p>
+          <a:p>
+            <a:r>
+              <a:rPr lang="en-US" dirty="0">
+                <a:solidFill>
+                  <a:srgbClr val="002060"/>
+                </a:solidFill>
+              </a:rPr>
+              <a:t>TMS therapy on the  left prefrontal cortex (</a:t>
+            </a:r>
+            <a:r>
+              <a:rPr lang="en-US" dirty="0" err="1">
+                <a:solidFill>
+                  <a:srgbClr val="002060"/>
+                </a:solidFill>
+              </a:rPr>
+              <a:t>lPFC</a:t>
+            </a:r>
+            <a:r>
+              <a:rPr lang="en-US" dirty="0">
+                <a:solidFill>
+                  <a:srgbClr val="002060"/>
+                </a:solidFill>
+              </a:rPr>
+              <a:t>), the right prefrontal cortex (</a:t>
+            </a:r>
+            <a:r>
+              <a:rPr lang="en-US" dirty="0" err="1">
+                <a:solidFill>
+                  <a:srgbClr val="002060"/>
+                </a:solidFill>
+              </a:rPr>
+              <a:t>rPFC</a:t>
+            </a:r>
+            <a:r>
+              <a:rPr lang="en-US" dirty="0">
+                <a:solidFill>
+                  <a:srgbClr val="002060"/>
+                </a:solidFill>
+              </a:rPr>
+              <a:t>), the right parietal cortex (</a:t>
+            </a:r>
+            <a:r>
+              <a:rPr lang="en-US" dirty="0" err="1">
+                <a:solidFill>
+                  <a:srgbClr val="002060"/>
+                </a:solidFill>
+              </a:rPr>
+              <a:t>rPC</a:t>
+            </a:r>
+            <a:r>
+              <a:rPr lang="en-US" dirty="0">
+                <a:solidFill>
+                  <a:srgbClr val="002060"/>
+                </a:solidFill>
+              </a:rPr>
+              <a:t>) and the cerebellum (</a:t>
+            </a:r>
+            <a:r>
+              <a:rPr lang="en-US" dirty="0" err="1">
+                <a:solidFill>
+                  <a:srgbClr val="002060"/>
+                </a:solidFill>
+              </a:rPr>
+              <a:t>Crbllm</a:t>
+            </a:r>
+            <a:r>
+              <a:rPr lang="en-US" dirty="0">
+                <a:solidFill>
+                  <a:srgbClr val="002060"/>
+                </a:solidFill>
+              </a:rPr>
+              <a:t>) showed evidences of ease of depression.</a:t>
             </a:r>
             <a:endParaRPr lang="he-IL" dirty="0">
               <a:solidFill>
@@ -3050,10 +3570,46 @@
           </a:p>
         </p:txBody>
       </p:sp>
+      <p:pic>
+        <p:nvPicPr>
+          <p:cNvPr id="6" name="Picture 5" descr="A close up of text on a white background&#10;&#10;Description generated with high confidence">
+            <a:extLst>
+              <a:ext uri="{FF2B5EF4-FFF2-40B4-BE49-F238E27FC236}">
+                <a16:creationId xmlns:a16="http://schemas.microsoft.com/office/drawing/2014/main" id="{CE9F9D2E-2D1C-4CCB-A892-9385BCE497EF}"/>
+              </a:ext>
+            </a:extLst>
+          </p:cNvPr>
+          <p:cNvPicPr>
+            <a:picLocks noChangeAspect="1"/>
+          </p:cNvPicPr>
+          <p:nvPr/>
+        </p:nvPicPr>
+        <p:blipFill>
+          <a:blip r:embed="rId2">
+            <a:extLst>
+              <a:ext uri="{28A0092B-C50C-407E-A947-70E740481C1C}">
+                <a14:useLocalDpi xmlns:a14="http://schemas.microsoft.com/office/drawing/2010/main" val="0"/>
+              </a:ext>
+            </a:extLst>
+          </a:blip>
+          <a:stretch>
+            <a:fillRect/>
+          </a:stretch>
+        </p:blipFill>
+        <p:spPr>
+          <a:xfrm>
+            <a:off x="6019800" y="4692650"/>
+            <a:ext cx="2286000" cy="2028825"/>
+          </a:xfrm>
+          <a:prstGeom prst="rect">
+            <a:avLst/>
+          </a:prstGeom>
+        </p:spPr>
+      </p:pic>
     </p:spTree>
     <p:extLst>
       <p:ext uri="{BB962C8B-B14F-4D97-AF65-F5344CB8AC3E}">
-        <p14:creationId xmlns:p14="http://schemas.microsoft.com/office/powerpoint/2010/main" val="334877885"/>
+        <p14:creationId xmlns:p14="http://schemas.microsoft.com/office/powerpoint/2010/main" val="746629022"/>
       </p:ext>
     </p:extLst>
   </p:cSld>
@@ -3127,18 +3683,57 @@
           <a:lstStyle/>
           <a:p>
             <a:r>
+              <a:rPr lang="en-US" dirty="0" err="1">
+                <a:solidFill>
+                  <a:srgbClr val="002060"/>
+                </a:solidFill>
+              </a:rPr>
+              <a:t>BrainSways</a:t>
+            </a:r>
+            <a:r>
               <a:rPr lang="en-US" dirty="0">
                 <a:solidFill>
                   <a:srgbClr val="002060"/>
                 </a:solidFill>
               </a:rPr>
-              <a:t>A general description of background, e.g. the motivation, environment, existing systems</a:t>
-            </a:r>
-            <a:endParaRPr lang="he-IL" dirty="0">
-              <a:solidFill>
-                <a:srgbClr val="002060"/>
-              </a:solidFill>
-            </a:endParaRPr>
+              <a:t>® treated by TMS and measured EEG of subjects during the treatment.</a:t>
+            </a:r>
+          </a:p>
+          <a:p>
+            <a:r>
+              <a:rPr lang="en-US" dirty="0">
+                <a:solidFill>
+                  <a:srgbClr val="002060"/>
+                </a:solidFill>
+              </a:rPr>
+              <a:t>A psychiatrist graded the “depression level” during 5 sessions.</a:t>
+            </a:r>
+          </a:p>
+          <a:p>
+            <a:r>
+              <a:rPr lang="en-US" dirty="0">
+                <a:solidFill>
+                  <a:srgbClr val="002060"/>
+                </a:solidFill>
+              </a:rPr>
+              <a:t> Each session contains around 45 trials made by  (</a:t>
+            </a:r>
+            <a:r>
+              <a:rPr lang="en-US" dirty="0">
+                <a:solidFill>
+                  <a:srgbClr val="FF0000"/>
+                </a:solidFill>
+              </a:rPr>
+              <a:t>an arbitrary process</a:t>
+            </a:r>
+            <a:r>
+              <a:rPr lang="en-US" dirty="0">
+                <a:solidFill>
+                  <a:srgbClr val="002060"/>
+                </a:solidFill>
+              </a:rPr>
+              <a:t>).</a:t>
+            </a:r>
           </a:p>
         </p:txBody>
       </p:sp>
@@ -3169,7 +3764,7 @@
     </p:spTree>
     <p:extLst>
       <p:ext uri="{BB962C8B-B14F-4D97-AF65-F5344CB8AC3E}">
-        <p14:creationId xmlns:p14="http://schemas.microsoft.com/office/powerpoint/2010/main" val="746629022"/>
+        <p14:creationId xmlns:p14="http://schemas.microsoft.com/office/powerpoint/2010/main" val="4108033711"/>
       </p:ext>
     </p:extLst>
   </p:cSld>
@@ -3208,9 +3803,7 @@
         </p:nvSpPr>
         <p:spPr/>
         <p:txBody>
-          <a:bodyPr>
-            <a:normAutofit/>
-          </a:bodyPr>
+          <a:bodyPr/>
           <a:lstStyle/>
           <a:p>
             <a:r>
@@ -3219,7 +3812,7 @@
                   <a:srgbClr val="002060"/>
                 </a:solidFill>
               </a:rPr>
-              <a:t>Literature Survey</a:t>
+              <a:t>Project Goal</a:t>
             </a:r>
             <a:endParaRPr lang="he-IL" dirty="0">
               <a:solidFill>
@@ -3250,7 +3843,7 @@
                   <a:srgbClr val="002060"/>
                 </a:solidFill>
               </a:rPr>
-              <a:t>Describe existing solutions for the problem that you’ve found in the literature survey</a:t>
+              <a:t>EEG signals are hard to analyze and different for each subject.</a:t>
             </a:r>
           </a:p>
           <a:p>
@@ -3260,22 +3853,11 @@
                   <a:srgbClr val="002060"/>
                 </a:solidFill>
               </a:rPr>
-              <a:t>For each solution, give a general description, some details, pros and cons (quality,  complexity, cost, …)</a:t>
-            </a:r>
-          </a:p>
-          <a:p>
-            <a:pPr marL="0" indent="0">
-              <a:buNone/>
-            </a:pPr>
-            <a:r>
-              <a:rPr lang="en-US" dirty="0">
-                <a:solidFill>
-                  <a:srgbClr val="002060"/>
-                </a:solidFill>
-              </a:rPr>
-              <a:t>  </a:t>
-            </a:r>
-            <a:endParaRPr lang="he-IL" dirty="0">
+              <a:t>Finding a regression algorithm to estimate depression and the therapy efficiency.</a:t>
+            </a:r>
+          </a:p>
+          <a:p>
+            <a:endParaRPr lang="en-US" dirty="0">
               <a:solidFill>
                 <a:srgbClr val="002060"/>
               </a:solidFill>
@@ -3310,7 +3892,7 @@
     </p:spTree>
     <p:extLst>
       <p:ext uri="{BB962C8B-B14F-4D97-AF65-F5344CB8AC3E}">
-        <p14:creationId xmlns:p14="http://schemas.microsoft.com/office/powerpoint/2010/main" val="1202081205"/>
+        <p14:creationId xmlns:p14="http://schemas.microsoft.com/office/powerpoint/2010/main" val="334877885"/>
       </p:ext>
     </p:extLst>
   </p:cSld>
@@ -3349,7 +3931,9 @@
         </p:nvSpPr>
         <p:spPr/>
         <p:txBody>
-          <a:bodyPr/>
+          <a:bodyPr>
+            <a:normAutofit/>
+          </a:bodyPr>
           <a:lstStyle/>
           <a:p>
             <a:r>
@@ -3358,7 +3942,7 @@
                   <a:srgbClr val="002060"/>
                 </a:solidFill>
               </a:rPr>
-              <a:t>Chosen Solution</a:t>
+              <a:t>Literature Survey</a:t>
             </a:r>
             <a:endParaRPr lang="he-IL" dirty="0">
               <a:solidFill>
@@ -3389,7 +3973,7 @@
                   <a:srgbClr val="002060"/>
                 </a:solidFill>
               </a:rPr>
-              <a:t>A detailed explanation about the chosen solution</a:t>
+              <a:t>Describe existing solutions for the problem that you’ve found in the literature survey</a:t>
             </a:r>
           </a:p>
           <a:p>
@@ -3399,7 +3983,20 @@
                   <a:srgbClr val="002060"/>
                 </a:solidFill>
               </a:rPr>
-              <a:t>Usually you start with a slide of a block diagram followed by few more slides describing each block in the diagram in details</a:t>
+              <a:t>For each solution, give a general description, some details, pros and cons (quality,  complexity, cost, …)</a:t>
+            </a:r>
+          </a:p>
+          <a:p>
+            <a:pPr marL="0" indent="0">
+              <a:buNone/>
+            </a:pPr>
+            <a:r>
+              <a:rPr lang="en-US" dirty="0">
+                <a:solidFill>
+                  <a:srgbClr val="002060"/>
+                </a:solidFill>
+              </a:rPr>
+              <a:t>  </a:t>
             </a:r>
             <a:endParaRPr lang="he-IL" dirty="0">
               <a:solidFill>
@@ -3436,7 +4033,7 @@
     </p:spTree>
     <p:extLst>
       <p:ext uri="{BB962C8B-B14F-4D97-AF65-F5344CB8AC3E}">
-        <p14:creationId xmlns:p14="http://schemas.microsoft.com/office/powerpoint/2010/main" val="3476935719"/>
+        <p14:creationId xmlns:p14="http://schemas.microsoft.com/office/powerpoint/2010/main" val="1202081205"/>
       </p:ext>
     </p:extLst>
   </p:cSld>
@@ -3484,7 +4081,7 @@
                   <a:srgbClr val="002060"/>
                 </a:solidFill>
               </a:rPr>
-              <a:t>Intermediate Results</a:t>
+              <a:t>Chosen Solution</a:t>
             </a:r>
             <a:endParaRPr lang="he-IL" dirty="0">
               <a:solidFill>
@@ -3515,13 +4112,41 @@
                   <a:srgbClr val="002060"/>
                 </a:solidFill>
               </a:rPr>
-              <a:t>Present your results compared with other solutions and emphasize the advantages (and disadvantages) of your solution</a:t>
-            </a:r>
-            <a:endParaRPr lang="he-IL" dirty="0">
+              <a:t>Riemannian tools for dimension reduction.</a:t>
+            </a:r>
+          </a:p>
+          <a:p>
+            <a:r>
+              <a:rPr lang="en-US" dirty="0">
+                <a:solidFill>
+                  <a:srgbClr val="002060"/>
+                </a:solidFill>
+              </a:rPr>
+              <a:t>Diffusion maps and </a:t>
+            </a:r>
+            <a:r>
+              <a:rPr lang="en-US" dirty="0" err="1">
+                <a:solidFill>
+                  <a:srgbClr val="002060"/>
+                </a:solidFill>
+              </a:rPr>
+              <a:t>tSNE</a:t>
+            </a:r>
+            <a:endParaRPr lang="en-US" dirty="0">
               <a:solidFill>
                 <a:srgbClr val="002060"/>
               </a:solidFill>
             </a:endParaRPr>
+          </a:p>
+          <a:p>
+            <a:r>
+              <a:rPr lang="en-US" dirty="0">
+                <a:solidFill>
+                  <a:srgbClr val="FF0000"/>
+                </a:solidFill>
+              </a:rPr>
+              <a:t>?</a:t>
+            </a:r>
           </a:p>
         </p:txBody>
       </p:sp>
@@ -3549,10 +4174,583 @@
           </a:p>
         </p:txBody>
       </p:sp>
+      <p:grpSp>
+        <p:nvGrpSpPr>
+          <p:cNvPr id="4" name="Group 3">
+            <a:extLst>
+              <a:ext uri="{FF2B5EF4-FFF2-40B4-BE49-F238E27FC236}">
+                <a16:creationId xmlns:a16="http://schemas.microsoft.com/office/drawing/2014/main" id="{DEC38AD8-454D-4B7A-9018-AE21E1EF5DCD}"/>
+              </a:ext>
+            </a:extLst>
+          </p:cNvPr>
+          <p:cNvGrpSpPr/>
+          <p:nvPr/>
+        </p:nvGrpSpPr>
+        <p:grpSpPr>
+          <a:xfrm>
+            <a:off x="855978" y="3749675"/>
+            <a:ext cx="7830822" cy="2971800"/>
+            <a:chOff x="2858135" y="1905000"/>
+            <a:chExt cx="5582287" cy="1664335"/>
+          </a:xfrm>
+        </p:grpSpPr>
+        <p:grpSp>
+          <p:nvGrpSpPr>
+            <p:cNvPr id="6" name="Group 5">
+              <a:extLst>
+                <a:ext uri="{FF2B5EF4-FFF2-40B4-BE49-F238E27FC236}">
+                  <a16:creationId xmlns:a16="http://schemas.microsoft.com/office/drawing/2014/main" id="{C59F4070-01D5-4DEA-BF57-E0D878EA1942}"/>
+                </a:ext>
+              </a:extLst>
+            </p:cNvPr>
+            <p:cNvGrpSpPr/>
+            <p:nvPr/>
+          </p:nvGrpSpPr>
+          <p:grpSpPr>
+            <a:xfrm>
+              <a:off x="3505200" y="1905000"/>
+              <a:ext cx="4935222" cy="1026795"/>
+              <a:chOff x="878566" y="-59761"/>
+              <a:chExt cx="4936540" cy="1027426"/>
+            </a:xfrm>
+          </p:grpSpPr>
+          <p:sp>
+            <p:nvSpPr>
+              <p:cNvPr id="10" name="Flowchart: Process 9">
+                <a:extLst>
+                  <a:ext uri="{FF2B5EF4-FFF2-40B4-BE49-F238E27FC236}">
+                    <a16:creationId xmlns:a16="http://schemas.microsoft.com/office/drawing/2014/main" id="{084F8D78-7A7B-4200-A048-DD0AB5128384}"/>
+                  </a:ext>
+                </a:extLst>
+              </p:cNvPr>
+              <p:cNvSpPr/>
+              <p:nvPr/>
+            </p:nvSpPr>
+            <p:spPr>
+              <a:xfrm>
+                <a:off x="1141531" y="-54050"/>
+                <a:ext cx="980440" cy="1021715"/>
+              </a:xfrm>
+              <a:prstGeom prst="flowChartProcess">
+                <a:avLst/>
+              </a:prstGeom>
+            </p:spPr>
+            <p:style>
+              <a:lnRef idx="2">
+                <a:schemeClr val="accent6"/>
+              </a:lnRef>
+              <a:fillRef idx="1">
+                <a:schemeClr val="lt1"/>
+              </a:fillRef>
+              <a:effectRef idx="0">
+                <a:schemeClr val="accent6"/>
+              </a:effectRef>
+              <a:fontRef idx="minor">
+                <a:schemeClr val="dk1"/>
+              </a:fontRef>
+            </p:style>
+            <p:txBody>
+              <a:bodyPr rot="0" spcFirstLastPara="0" vert="horz" wrap="square" lIns="91440" tIns="45720" rIns="91440" bIns="45720" numCol="1" spcCol="0" rtlCol="0" fromWordArt="0" anchor="ctr" anchorCtr="0" forceAA="0" compatLnSpc="1">
+                <a:prstTxWarp prst="textNoShape">
+                  <a:avLst/>
+                </a:prstTxWarp>
+                <a:noAutofit/>
+              </a:bodyPr>
+              <a:lstStyle/>
+              <a:p>
+                <a:pPr marL="0" marR="0" algn="ctr">
+                  <a:lnSpc>
+                    <a:spcPct val="107000"/>
+                  </a:lnSpc>
+                  <a:spcBef>
+                    <a:spcPts val="0"/>
+                  </a:spcBef>
+                  <a:spcAft>
+                    <a:spcPts val="800"/>
+                  </a:spcAft>
+                </a:pPr>
+                <a:r>
+                  <a:rPr lang="en-US" sz="1500" b="1" dirty="0">
+                    <a:effectLst/>
+                    <a:ea typeface="Calibri" panose="020F0502020204030204" pitchFamily="34" charset="0"/>
+                    <a:cs typeface="Arial" panose="020B0604020202020204" pitchFamily="34" charset="0"/>
+                  </a:rPr>
+                  <a:t>Coefficients selection</a:t>
+                </a:r>
+              </a:p>
+            </p:txBody>
+          </p:sp>
+          <p:sp>
+            <p:nvSpPr>
+              <p:cNvPr id="11" name="Flowchart: Process 10">
+                <a:extLst>
+                  <a:ext uri="{FF2B5EF4-FFF2-40B4-BE49-F238E27FC236}">
+                    <a16:creationId xmlns:a16="http://schemas.microsoft.com/office/drawing/2014/main" id="{B0CE8777-5E9C-4812-9DC3-6A9D5F11F975}"/>
+                  </a:ext>
+                </a:extLst>
+              </p:cNvPr>
+              <p:cNvSpPr/>
+              <p:nvPr/>
+            </p:nvSpPr>
+            <p:spPr>
+              <a:xfrm>
+                <a:off x="2366707" y="-54050"/>
+                <a:ext cx="980440" cy="1009650"/>
+              </a:xfrm>
+              <a:prstGeom prst="flowChartProcess">
+                <a:avLst/>
+              </a:prstGeom>
+            </p:spPr>
+            <p:style>
+              <a:lnRef idx="2">
+                <a:schemeClr val="accent6"/>
+              </a:lnRef>
+              <a:fillRef idx="1">
+                <a:schemeClr val="lt1"/>
+              </a:fillRef>
+              <a:effectRef idx="0">
+                <a:schemeClr val="accent6"/>
+              </a:effectRef>
+              <a:fontRef idx="minor">
+                <a:schemeClr val="dk1"/>
+              </a:fontRef>
+            </p:style>
+            <p:txBody>
+              <a:bodyPr rot="0" spcFirstLastPara="0" vert="horz" wrap="square" lIns="91440" tIns="45720" rIns="91440" bIns="45720" numCol="1" spcCol="0" rtlCol="0" fromWordArt="0" anchor="ctr" anchorCtr="0" forceAA="0" compatLnSpc="1">
+                <a:prstTxWarp prst="textNoShape">
+                  <a:avLst/>
+                </a:prstTxWarp>
+                <a:noAutofit/>
+              </a:bodyPr>
+              <a:lstStyle/>
+              <a:p>
+                <a:pPr marL="0" marR="0" algn="ctr">
+                  <a:lnSpc>
+                    <a:spcPct val="107000"/>
+                  </a:lnSpc>
+                  <a:spcBef>
+                    <a:spcPts val="0"/>
+                  </a:spcBef>
+                  <a:spcAft>
+                    <a:spcPts val="800"/>
+                  </a:spcAft>
+                </a:pPr>
+                <a:r>
+                  <a:rPr lang="en-US" sz="1500" b="1" dirty="0">
+                    <a:effectLst/>
+                    <a:ea typeface="Calibri" panose="020F0502020204030204" pitchFamily="34" charset="0"/>
+                    <a:cs typeface="Arial" panose="020B0604020202020204" pitchFamily="34" charset="0"/>
+                  </a:rPr>
+                  <a:t>Non-linear dimension reduction</a:t>
+                </a:r>
+              </a:p>
+            </p:txBody>
+          </p:sp>
+          <p:sp>
+            <p:nvSpPr>
+              <p:cNvPr id="12" name="Flowchart: Process 11">
+                <a:extLst>
+                  <a:ext uri="{FF2B5EF4-FFF2-40B4-BE49-F238E27FC236}">
+                    <a16:creationId xmlns:a16="http://schemas.microsoft.com/office/drawing/2014/main" id="{112959DA-D344-471E-9856-72D8BFAFC5FF}"/>
+                  </a:ext>
+                </a:extLst>
+              </p:cNvPr>
+              <p:cNvSpPr/>
+              <p:nvPr/>
+            </p:nvSpPr>
+            <p:spPr>
+              <a:xfrm>
+                <a:off x="4010211" y="-59761"/>
+                <a:ext cx="980440" cy="997585"/>
+              </a:xfrm>
+              <a:prstGeom prst="flowChartProcess">
+                <a:avLst/>
+              </a:prstGeom>
+            </p:spPr>
+            <p:style>
+              <a:lnRef idx="2">
+                <a:schemeClr val="accent6"/>
+              </a:lnRef>
+              <a:fillRef idx="1">
+                <a:schemeClr val="lt1"/>
+              </a:fillRef>
+              <a:effectRef idx="0">
+                <a:schemeClr val="accent6"/>
+              </a:effectRef>
+              <a:fontRef idx="minor">
+                <a:schemeClr val="dk1"/>
+              </a:fontRef>
+            </p:style>
+            <p:txBody>
+              <a:bodyPr rot="0" spcFirstLastPara="0" vert="horz" wrap="square" lIns="91440" tIns="45720" rIns="91440" bIns="45720" numCol="1" spcCol="0" rtlCol="0" fromWordArt="0" anchor="ctr" anchorCtr="0" forceAA="0" compatLnSpc="1">
+                <a:prstTxWarp prst="textNoShape">
+                  <a:avLst/>
+                </a:prstTxWarp>
+                <a:noAutofit/>
+              </a:bodyPr>
+              <a:lstStyle/>
+              <a:p>
+                <a:pPr marL="0" marR="0" algn="ctr">
+                  <a:lnSpc>
+                    <a:spcPct val="107000"/>
+                  </a:lnSpc>
+                  <a:spcBef>
+                    <a:spcPts val="0"/>
+                  </a:spcBef>
+                  <a:spcAft>
+                    <a:spcPts val="800"/>
+                  </a:spcAft>
+                </a:pPr>
+                <a:r>
+                  <a:rPr lang="en-US" sz="1500" b="1" dirty="0">
+                    <a:effectLst/>
+                    <a:ea typeface="Calibri" panose="020F0502020204030204" pitchFamily="34" charset="0"/>
+                    <a:cs typeface="Arial" panose="020B0604020202020204" pitchFamily="34" charset="0"/>
+                  </a:rPr>
+                  <a:t>Regression algorithm  to estimate efficiency </a:t>
+                </a:r>
+              </a:p>
+            </p:txBody>
+          </p:sp>
+          <p:cxnSp>
+            <p:nvCxnSpPr>
+              <p:cNvPr id="13" name="Straight Arrow Connector 12">
+                <a:extLst>
+                  <a:ext uri="{FF2B5EF4-FFF2-40B4-BE49-F238E27FC236}">
+                    <a16:creationId xmlns:a16="http://schemas.microsoft.com/office/drawing/2014/main" id="{4CC95F26-3636-4B30-9C1D-DD33C5F80B86}"/>
+                  </a:ext>
+                </a:extLst>
+              </p:cNvPr>
+              <p:cNvCxnSpPr/>
+              <p:nvPr/>
+            </p:nvCxnSpPr>
+            <p:spPr>
+              <a:xfrm flipV="1">
+                <a:off x="878566" y="173057"/>
+                <a:ext cx="259080" cy="0"/>
+              </a:xfrm>
+              <a:prstGeom prst="straightConnector1">
+                <a:avLst/>
+              </a:prstGeom>
+              <a:ln>
+                <a:tailEnd type="triangle"/>
+              </a:ln>
+            </p:spPr>
+            <p:style>
+              <a:lnRef idx="1">
+                <a:schemeClr val="accent1"/>
+              </a:lnRef>
+              <a:fillRef idx="0">
+                <a:schemeClr val="accent1"/>
+              </a:fillRef>
+              <a:effectRef idx="0">
+                <a:schemeClr val="accent1"/>
+              </a:effectRef>
+              <a:fontRef idx="minor">
+                <a:schemeClr val="tx1"/>
+              </a:fontRef>
+            </p:style>
+          </p:cxnSp>
+          <p:cxnSp>
+            <p:nvCxnSpPr>
+              <p:cNvPr id="14" name="Straight Arrow Connector 13">
+                <a:extLst>
+                  <a:ext uri="{FF2B5EF4-FFF2-40B4-BE49-F238E27FC236}">
+                    <a16:creationId xmlns:a16="http://schemas.microsoft.com/office/drawing/2014/main" id="{995C687C-4208-412B-8D27-B6350C7E0AD9}"/>
+                  </a:ext>
+                </a:extLst>
+              </p:cNvPr>
+              <p:cNvCxnSpPr/>
+              <p:nvPr/>
+            </p:nvCxnSpPr>
+            <p:spPr>
+              <a:xfrm flipV="1">
+                <a:off x="2115695" y="185008"/>
+                <a:ext cx="259080" cy="0"/>
+              </a:xfrm>
+              <a:prstGeom prst="straightConnector1">
+                <a:avLst/>
+              </a:prstGeom>
+              <a:ln>
+                <a:tailEnd type="triangle"/>
+              </a:ln>
+            </p:spPr>
+            <p:style>
+              <a:lnRef idx="1">
+                <a:schemeClr val="accent1"/>
+              </a:lnRef>
+              <a:fillRef idx="0">
+                <a:schemeClr val="accent1"/>
+              </a:fillRef>
+              <a:effectRef idx="0">
+                <a:schemeClr val="accent1"/>
+              </a:effectRef>
+              <a:fontRef idx="minor">
+                <a:schemeClr val="tx1"/>
+              </a:fontRef>
+            </p:style>
+          </p:cxnSp>
+          <p:cxnSp>
+            <p:nvCxnSpPr>
+              <p:cNvPr id="15" name="Straight Arrow Connector 14">
+                <a:extLst>
+                  <a:ext uri="{FF2B5EF4-FFF2-40B4-BE49-F238E27FC236}">
+                    <a16:creationId xmlns:a16="http://schemas.microsoft.com/office/drawing/2014/main" id="{CD05653A-3A45-48E7-9E5F-69A3B4731311}"/>
+                  </a:ext>
+                </a:extLst>
+              </p:cNvPr>
+              <p:cNvCxnSpPr/>
+              <p:nvPr/>
+            </p:nvCxnSpPr>
+            <p:spPr>
+              <a:xfrm flipV="1">
+                <a:off x="3350822" y="202948"/>
+                <a:ext cx="669969" cy="0"/>
+              </a:xfrm>
+              <a:prstGeom prst="straightConnector1">
+                <a:avLst/>
+              </a:prstGeom>
+              <a:ln>
+                <a:tailEnd type="triangle"/>
+              </a:ln>
+            </p:spPr>
+            <p:style>
+              <a:lnRef idx="1">
+                <a:schemeClr val="accent1"/>
+              </a:lnRef>
+              <a:fillRef idx="0">
+                <a:schemeClr val="accent1"/>
+              </a:fillRef>
+              <a:effectRef idx="0">
+                <a:schemeClr val="accent1"/>
+              </a:effectRef>
+              <a:fontRef idx="minor">
+                <a:schemeClr val="tx1"/>
+              </a:fontRef>
+            </p:style>
+          </p:cxnSp>
+          <p:cxnSp>
+            <p:nvCxnSpPr>
+              <p:cNvPr id="16" name="Straight Arrow Connector 15">
+                <a:extLst>
+                  <a:ext uri="{FF2B5EF4-FFF2-40B4-BE49-F238E27FC236}">
+                    <a16:creationId xmlns:a16="http://schemas.microsoft.com/office/drawing/2014/main" id="{714B04B2-795B-4329-BA1C-418214272BF4}"/>
+                  </a:ext>
+                </a:extLst>
+              </p:cNvPr>
+              <p:cNvCxnSpPr/>
+              <p:nvPr/>
+            </p:nvCxnSpPr>
+            <p:spPr>
+              <a:xfrm>
+                <a:off x="4984376" y="233083"/>
+                <a:ext cx="830730" cy="0"/>
+              </a:xfrm>
+              <a:prstGeom prst="straightConnector1">
+                <a:avLst/>
+              </a:prstGeom>
+              <a:ln>
+                <a:tailEnd type="triangle"/>
+              </a:ln>
+            </p:spPr>
+            <p:style>
+              <a:lnRef idx="1">
+                <a:schemeClr val="accent1"/>
+              </a:lnRef>
+              <a:fillRef idx="0">
+                <a:schemeClr val="accent1"/>
+              </a:fillRef>
+              <a:effectRef idx="0">
+                <a:schemeClr val="accent1"/>
+              </a:effectRef>
+              <a:fontRef idx="minor">
+                <a:schemeClr val="tx1"/>
+              </a:fontRef>
+            </p:style>
+          </p:cxnSp>
+        </p:grpSp>
+        <p:cxnSp>
+          <p:nvCxnSpPr>
+            <p:cNvPr id="7" name="Straight Arrow Connector 25">
+              <a:extLst>
+                <a:ext uri="{FF2B5EF4-FFF2-40B4-BE49-F238E27FC236}">
+                  <a16:creationId xmlns:a16="http://schemas.microsoft.com/office/drawing/2014/main" id="{98504067-C35D-4A3A-915F-915F64891F68}"/>
+                </a:ext>
+              </a:extLst>
+            </p:cNvPr>
+            <p:cNvCxnSpPr/>
+            <p:nvPr/>
+          </p:nvCxnSpPr>
+          <p:spPr>
+            <a:xfrm flipV="1">
+              <a:off x="5596255" y="2694940"/>
+              <a:ext cx="1027430" cy="632460"/>
+            </a:xfrm>
+            <a:prstGeom prst="bentConnector3">
+              <a:avLst>
+                <a:gd name="adj1" fmla="val 50000"/>
+              </a:avLst>
+            </a:prstGeom>
+            <a:ln>
+              <a:tailEnd type="triangle"/>
+            </a:ln>
+          </p:spPr>
+          <p:style>
+            <a:lnRef idx="1">
+              <a:schemeClr val="accent1"/>
+            </a:lnRef>
+            <a:fillRef idx="0">
+              <a:schemeClr val="accent1"/>
+            </a:fillRef>
+            <a:effectRef idx="0">
+              <a:schemeClr val="accent1"/>
+            </a:effectRef>
+            <a:fontRef idx="minor">
+              <a:schemeClr val="tx1"/>
+            </a:fontRef>
+          </p:style>
+        </p:cxnSp>
+        <p:sp>
+          <p:nvSpPr>
+            <p:cNvPr id="8" name="Text Box 15">
+              <a:extLst>
+                <a:ext uri="{FF2B5EF4-FFF2-40B4-BE49-F238E27FC236}">
+                  <a16:creationId xmlns:a16="http://schemas.microsoft.com/office/drawing/2014/main" id="{769896ED-0EA6-4D00-972C-CD0270585DFB}"/>
+                </a:ext>
+              </a:extLst>
+            </p:cNvPr>
+            <p:cNvSpPr txBox="1"/>
+            <p:nvPr/>
+          </p:nvSpPr>
+          <p:spPr>
+            <a:xfrm>
+              <a:off x="2858135" y="2063750"/>
+              <a:ext cx="573405" cy="447675"/>
+            </a:xfrm>
+            <a:prstGeom prst="rect">
+              <a:avLst/>
+            </a:prstGeom>
+            <a:solidFill>
+              <a:schemeClr val="lt1"/>
+            </a:solidFill>
+            <a:ln w="6350">
+              <a:noFill/>
+            </a:ln>
+          </p:spPr>
+          <p:txBody>
+            <a:bodyPr rot="0" spcFirstLastPara="0" vert="horz" wrap="square" lIns="91440" tIns="45720" rIns="91440" bIns="45720" numCol="1" spcCol="0" rtlCol="0" fromWordArt="0" anchor="t" anchorCtr="0" forceAA="0" compatLnSpc="1">
+              <a:prstTxWarp prst="textNoShape">
+                <a:avLst/>
+              </a:prstTxWarp>
+              <a:noAutofit/>
+            </a:bodyPr>
+            <a:lstStyle/>
+            <a:p>
+              <a:pPr marL="0" marR="0" algn="ctr" rtl="1">
+                <a:lnSpc>
+                  <a:spcPct val="107000"/>
+                </a:lnSpc>
+                <a:spcBef>
+                  <a:spcPts val="0"/>
+                </a:spcBef>
+                <a:spcAft>
+                  <a:spcPts val="800"/>
+                </a:spcAft>
+              </a:pPr>
+              <a:r>
+                <a:rPr lang="en-US" sz="1500" b="1" dirty="0">
+                  <a:effectLst/>
+                  <a:latin typeface="Calibri" panose="020F0502020204030204" pitchFamily="34" charset="0"/>
+                  <a:ea typeface="Calibri" panose="020F0502020204030204" pitchFamily="34" charset="0"/>
+                  <a:cs typeface="Arial" panose="020B0604020202020204" pitchFamily="34" charset="0"/>
+                </a:rPr>
+                <a:t>signals</a:t>
+              </a:r>
+              <a:r>
+                <a:rPr lang="he-IL" sz="1500" b="1" dirty="0">
+                  <a:effectLst/>
+                  <a:latin typeface="Calibri" panose="020F0502020204030204" pitchFamily="34" charset="0"/>
+                  <a:ea typeface="Calibri" panose="020F0502020204030204" pitchFamily="34" charset="0"/>
+                  <a:cs typeface="Arial" panose="020B0604020202020204" pitchFamily="34" charset="0"/>
+                </a:rPr>
+                <a:t> </a:t>
+              </a:r>
+              <a:r>
+                <a:rPr lang="en-US" sz="1500" b="1" dirty="0">
+                  <a:effectLst/>
+                  <a:latin typeface="Calibri" panose="020F0502020204030204" pitchFamily="34" charset="0"/>
+                  <a:ea typeface="Calibri" panose="020F0502020204030204" pitchFamily="34" charset="0"/>
+                  <a:cs typeface="Arial" panose="020B0604020202020204" pitchFamily="34" charset="0"/>
+                </a:rPr>
+                <a:t>EEG</a:t>
+              </a:r>
+            </a:p>
+          </p:txBody>
+        </p:sp>
+        <p:sp>
+          <p:nvSpPr>
+            <p:cNvPr id="9" name="Text Box 16">
+              <a:extLst>
+                <a:ext uri="{FF2B5EF4-FFF2-40B4-BE49-F238E27FC236}">
+                  <a16:creationId xmlns:a16="http://schemas.microsoft.com/office/drawing/2014/main" id="{757EA946-40C6-48EE-BA46-786C1338947C}"/>
+                </a:ext>
+              </a:extLst>
+            </p:cNvPr>
+            <p:cNvSpPr txBox="1"/>
+            <p:nvPr/>
+          </p:nvSpPr>
+          <p:spPr>
+            <a:xfrm>
+              <a:off x="4855302" y="3121660"/>
+              <a:ext cx="806993" cy="447675"/>
+            </a:xfrm>
+            <a:prstGeom prst="rect">
+              <a:avLst/>
+            </a:prstGeom>
+            <a:solidFill>
+              <a:schemeClr val="lt1"/>
+            </a:solidFill>
+            <a:ln w="6350">
+              <a:noFill/>
+            </a:ln>
+          </p:spPr>
+          <p:txBody>
+            <a:bodyPr rot="0" spcFirstLastPara="0" vert="horz" wrap="square" lIns="91440" tIns="45720" rIns="91440" bIns="45720" numCol="1" spcCol="0" rtlCol="0" fromWordArt="0" anchor="t" anchorCtr="0" forceAA="0" compatLnSpc="1">
+              <a:prstTxWarp prst="textNoShape">
+                <a:avLst/>
+              </a:prstTxWarp>
+              <a:noAutofit/>
+            </a:bodyPr>
+            <a:lstStyle/>
+            <a:p>
+              <a:pPr marL="0" marR="0" algn="ctr">
+                <a:lnSpc>
+                  <a:spcPct val="107000"/>
+                </a:lnSpc>
+                <a:spcBef>
+                  <a:spcPts val="0"/>
+                </a:spcBef>
+                <a:spcAft>
+                  <a:spcPts val="800"/>
+                </a:spcAft>
+              </a:pPr>
+              <a:r>
+                <a:rPr lang="en-US" sz="1500" b="1" dirty="0">
+                  <a:effectLst/>
+                  <a:latin typeface="Calibri" panose="020F0502020204030204" pitchFamily="34" charset="0"/>
+                  <a:ea typeface="Calibri" panose="020F0502020204030204" pitchFamily="34" charset="0"/>
+                  <a:cs typeface="Arial" panose="020B0604020202020204" pitchFamily="34" charset="0"/>
+                </a:rPr>
+                <a:t>Psychiatrist evaluation</a:t>
+              </a:r>
+            </a:p>
+          </p:txBody>
+        </p:sp>
+      </p:grpSp>
     </p:spTree>
     <p:extLst>
       <p:ext uri="{BB962C8B-B14F-4D97-AF65-F5344CB8AC3E}">
-        <p14:creationId xmlns:p14="http://schemas.microsoft.com/office/powerpoint/2010/main" val="2145876422"/>
+        <p14:creationId xmlns:p14="http://schemas.microsoft.com/office/powerpoint/2010/main" val="3476935719"/>
       </p:ext>
     </p:extLst>
   </p:cSld>
@@ -3600,7 +4798,7 @@
                   <a:srgbClr val="002060"/>
                 </a:solidFill>
               </a:rPr>
-              <a:t>Conclusion</a:t>
+              <a:t>Intermediate Results</a:t>
             </a:r>
             <a:endParaRPr lang="he-IL" dirty="0">
               <a:solidFill>
@@ -3631,39 +4829,13 @@
                   <a:srgbClr val="002060"/>
                 </a:solidFill>
               </a:rPr>
-              <a:t>Repeat the project goal in other words</a:t>
-            </a:r>
-          </a:p>
-          <a:p>
-            <a:pPr lvl="1"/>
-            <a:r>
-              <a:rPr lang="en-US" dirty="0">
-                <a:solidFill>
-                  <a:srgbClr val="002060"/>
-                </a:solidFill>
-              </a:rPr>
-              <a:t>Have you achieved the goal? (if not, this is ok and you have to explain why)</a:t>
-            </a:r>
-          </a:p>
-          <a:p>
-            <a:r>
-              <a:rPr lang="en-US" dirty="0">
-                <a:solidFill>
-                  <a:srgbClr val="002060"/>
-                </a:solidFill>
-              </a:rPr>
-              <a:t>Summarize your results</a:t>
-            </a:r>
-          </a:p>
-          <a:p>
-            <a:r>
-              <a:rPr lang="en-US" dirty="0">
-                <a:solidFill>
-                  <a:srgbClr val="002060"/>
-                </a:solidFill>
-              </a:rPr>
-              <a:t>Emphasize original contribution</a:t>
-            </a:r>
+              <a:t>Present your results compared with other solutions and emphasize the advantages (and disadvantages) of your solution</a:t>
+            </a:r>
+            <a:endParaRPr lang="he-IL" dirty="0">
+              <a:solidFill>
+                <a:srgbClr val="002060"/>
+              </a:solidFill>
+            </a:endParaRPr>
           </a:p>
         </p:txBody>
       </p:sp>
@@ -3694,7 +4866,7 @@
     </p:spTree>
     <p:extLst>
       <p:ext uri="{BB962C8B-B14F-4D97-AF65-F5344CB8AC3E}">
-        <p14:creationId xmlns:p14="http://schemas.microsoft.com/office/powerpoint/2010/main" val="1669314898"/>
+        <p14:creationId xmlns:p14="http://schemas.microsoft.com/office/powerpoint/2010/main" val="2145876422"/>
       </p:ext>
     </p:extLst>
   </p:cSld>
@@ -3723,7 +4895,13 @@
       </p:grpSpPr>
       <p:sp>
         <p:nvSpPr>
-          <p:cNvPr id="2" name="Title 1"/>
+          <p:cNvPr id="2" name="Title 1">
+            <a:extLst>
+              <a:ext uri="{FF2B5EF4-FFF2-40B4-BE49-F238E27FC236}">
+                <a16:creationId xmlns:a16="http://schemas.microsoft.com/office/drawing/2014/main" id="{28E279F3-6F7E-4341-B58F-24B906414911}"/>
+              </a:ext>
+            </a:extLst>
+          </p:cNvPr>
           <p:cNvSpPr>
             <a:spLocks noGrp="1"/>
           </p:cNvSpPr>
@@ -3737,50 +4915,21 @@
           <a:lstStyle/>
           <a:p>
             <a:r>
-              <a:rPr lang="en-US" dirty="0">
-                <a:solidFill>
-                  <a:srgbClr val="002060"/>
-                </a:solidFill>
-              </a:rPr>
-              <a:t>Future Work</a:t>
-            </a:r>
-            <a:endParaRPr lang="he-IL" dirty="0">
-              <a:solidFill>
-                <a:srgbClr val="002060"/>
-              </a:solidFill>
-            </a:endParaRPr>
-          </a:p>
-        </p:txBody>
-      </p:sp>
-      <p:sp>
-        <p:nvSpPr>
-          <p:cNvPr id="3" name="Content Placeholder 2"/>
-          <p:cNvSpPr>
-            <a:spLocks noGrp="1"/>
-          </p:cNvSpPr>
-          <p:nvPr>
-            <p:ph idx="1"/>
-          </p:nvPr>
-        </p:nvSpPr>
-        <p:spPr/>
-        <p:txBody>
-          <a:bodyPr/>
-          <a:lstStyle/>
-          <a:p>
-            <a:r>
-              <a:rPr lang="en-US" dirty="0">
-                <a:solidFill>
-                  <a:srgbClr val="002060"/>
-                </a:solidFill>
-              </a:rPr>
-              <a:t>Suggestions for continuation of your work</a:t>
-            </a:r>
-          </a:p>
-        </p:txBody>
-      </p:sp>
-      <p:sp>
-        <p:nvSpPr>
-          <p:cNvPr id="5" name="Slide Number Placeholder 4"/>
+              <a:rPr lang="en-US" dirty="0"/>
+              <a:t>Stimulation Noise</a:t>
+            </a:r>
+          </a:p>
+        </p:txBody>
+      </p:sp>
+      <p:sp>
+        <p:nvSpPr>
+          <p:cNvPr id="4" name="Slide Number Placeholder 3">
+            <a:extLst>
+              <a:ext uri="{FF2B5EF4-FFF2-40B4-BE49-F238E27FC236}">
+                <a16:creationId xmlns:a16="http://schemas.microsoft.com/office/drawing/2014/main" id="{470A9B96-D26C-4C54-B5BE-7E65E9F5454C}"/>
+              </a:ext>
+            </a:extLst>
+          </p:cNvPr>
           <p:cNvSpPr>
             <a:spLocks noGrp="1"/>
           </p:cNvSpPr>
@@ -3802,10 +4951,45 @@
           </a:p>
         </p:txBody>
       </p:sp>
+      <p:pic>
+        <p:nvPicPr>
+          <p:cNvPr id="9" name="Content Placeholder 8" descr="A close up of a map&#10;&#10;Description generated with high confidence">
+            <a:extLst>
+              <a:ext uri="{FF2B5EF4-FFF2-40B4-BE49-F238E27FC236}">
+                <a16:creationId xmlns:a16="http://schemas.microsoft.com/office/drawing/2014/main" id="{EE6FF860-D88F-428B-8786-C4B0BB12B3A7}"/>
+              </a:ext>
+            </a:extLst>
+          </p:cNvPr>
+          <p:cNvPicPr>
+            <a:picLocks noGrp="1" noChangeAspect="1"/>
+          </p:cNvPicPr>
+          <p:nvPr>
+            <p:ph idx="1"/>
+          </p:nvPr>
+        </p:nvPicPr>
+        <p:blipFill>
+          <a:blip r:embed="rId2">
+            <a:extLst>
+              <a:ext uri="{28A0092B-C50C-407E-A947-70E740481C1C}">
+                <a14:useLocalDpi xmlns:a14="http://schemas.microsoft.com/office/drawing/2010/main" val="0"/>
+              </a:ext>
+            </a:extLst>
+          </a:blip>
+          <a:stretch>
+            <a:fillRect/>
+          </a:stretch>
+        </p:blipFill>
+        <p:spPr>
+          <a:xfrm>
+            <a:off x="457200" y="1143001"/>
+            <a:ext cx="8229600" cy="4672568"/>
+          </a:xfrm>
+        </p:spPr>
+      </p:pic>
     </p:spTree>
     <p:extLst>
       <p:ext uri="{BB962C8B-B14F-4D97-AF65-F5344CB8AC3E}">
-        <p14:creationId xmlns:p14="http://schemas.microsoft.com/office/powerpoint/2010/main" val="194558903"/>
+        <p14:creationId xmlns:p14="http://schemas.microsoft.com/office/powerpoint/2010/main" val="1533726632"/>
       </p:ext>
     </p:extLst>
   </p:cSld>

</xml_diff>

<commit_message>
1. Edit git ignore 2. Add some Matlab code. 3. Edit presentation (during meeting)
</commit_message>
<xml_diff>
--- a/Project_Midterm_Presentation.pptx
+++ b/Project_Midterm_Presentation.pptx
@@ -2601,8 +2601,21 @@
                   <a:srgbClr val="002060"/>
                 </a:solidFill>
               </a:rPr>
-              <a:t>using EEG Signal</a:t>
-            </a:r>
+              <a:t>using EEG </a:t>
+            </a:r>
+            <a:r>
+              <a:rPr lang="en-US" dirty="0" smtClean="0">
+                <a:solidFill>
+                  <a:srgbClr val="002060"/>
+                </a:solidFill>
+              </a:rPr>
+              <a:t>Signals</a:t>
+            </a:r>
+            <a:endParaRPr lang="en-US" dirty="0">
+              <a:solidFill>
+                <a:srgbClr val="002060"/>
+              </a:solidFill>
+            </a:endParaRPr>
           </a:p>
         </p:txBody>
       </p:sp>
@@ -2823,6 +2836,13 @@
   <p:clrMapOvr>
     <a:masterClrMapping/>
   </p:clrMapOvr>
+  <p:timing>
+    <p:tnLst>
+      <p:par>
+        <p:cTn id="1" dur="indefinite" restart="never" nodeType="tmRoot"/>
+      </p:par>
+    </p:tnLst>
+  </p:timing>
 </p:sld>
 </file>
 
@@ -3540,6 +3560,13 @@
   <p:clrMapOvr>
     <a:masterClrMapping/>
   </p:clrMapOvr>
+  <p:timing>
+    <p:tnLst>
+      <p:par>
+        <p:cTn id="1" dur="indefinite" restart="never" nodeType="tmRoot"/>
+      </p:par>
+    </p:tnLst>
+  </p:timing>
 </p:sld>
 </file>
 
@@ -3683,6 +3710,13 @@
   <p:clrMapOvr>
     <a:masterClrMapping/>
   </p:clrMapOvr>
+  <p:timing>
+    <p:tnLst>
+      <p:par>
+        <p:cTn id="1" dur="indefinite" restart="never" nodeType="tmRoot"/>
+      </p:par>
+    </p:tnLst>
+  </p:timing>
 </p:sld>
 </file>
 
@@ -3806,6 +3840,13 @@
   <p:clrMapOvr>
     <a:masterClrMapping/>
   </p:clrMapOvr>
+  <p:timing>
+    <p:tnLst>
+      <p:par>
+        <p:cTn id="1" dur="indefinite" restart="never" nodeType="tmRoot"/>
+      </p:par>
+    </p:tnLst>
+  </p:timing>
 </p:sld>
 </file>
 
@@ -3973,6 +4014,13 @@
   <p:clrMapOvr>
     <a:masterClrMapping/>
   </p:clrMapOvr>
+  <p:timing>
+    <p:tnLst>
+      <p:par>
+        <p:cTn id="1" dur="indefinite" restart="never" nodeType="tmRoot"/>
+      </p:par>
+    </p:tnLst>
+  </p:timing>
 </p:sld>
 </file>
 
@@ -4096,6 +4144,13 @@
   <p:clrMapOvr>
     <a:masterClrMapping/>
   </p:clrMapOvr>
+  <p:timing>
+    <p:tnLst>
+      <p:par>
+        <p:cTn id="1" dur="indefinite" restart="never" nodeType="tmRoot"/>
+      </p:par>
+    </p:tnLst>
+  </p:timing>
 </p:sld>
 </file>
 
@@ -4218,6 +4273,13 @@
   <p:clrMapOvr>
     <a:masterClrMapping/>
   </p:clrMapOvr>
+  <p:timing>
+    <p:tnLst>
+      <p:par>
+        <p:cTn id="1" dur="indefinite" restart="never" nodeType="tmRoot"/>
+      </p:par>
+    </p:tnLst>
+  </p:timing>
 </p:sld>
 </file>
 
@@ -4367,6 +4429,13 @@
   <p:clrMapOvr>
     <a:masterClrMapping/>
   </p:clrMapOvr>
+  <p:timing>
+    <p:tnLst>
+      <p:par>
+        <p:cTn id="1" dur="indefinite" restart="never" nodeType="tmRoot"/>
+      </p:par>
+    </p:tnLst>
+  </p:timing>
 </p:sld>
 </file>
 
@@ -4496,6 +4565,13 @@
   <p:clrMapOvr>
     <a:masterClrMapping/>
   </p:clrMapOvr>
+  <p:timing>
+    <p:tnLst>
+      <p:par>
+        <p:cTn id="1" dur="indefinite" restart="never" nodeType="tmRoot"/>
+      </p:par>
+    </p:tnLst>
+  </p:timing>
 </p:sld>
 </file>
 
@@ -4619,6 +4695,13 @@
   <p:clrMapOvr>
     <a:masterClrMapping/>
   </p:clrMapOvr>
+  <p:timing>
+    <p:tnLst>
+      <p:par>
+        <p:cTn id="1" dur="indefinite" restart="never" nodeType="tmRoot"/>
+      </p:par>
+    </p:tnLst>
+  </p:timing>
 </p:sld>
 </file>
 
@@ -4742,6 +4825,13 @@
   <p:clrMapOvr>
     <a:masterClrMapping/>
   </p:clrMapOvr>
+  <p:timing>
+    <p:tnLst>
+      <p:par>
+        <p:cTn id="1" dur="indefinite" restart="never" nodeType="tmRoot"/>
+      </p:par>
+    </p:tnLst>
+  </p:timing>
 </p:sld>
 </file>
 
@@ -4872,6 +4962,13 @@
   <p:clrMapOvr>
     <a:masterClrMapping/>
   </p:clrMapOvr>
+  <p:timing>
+    <p:tnLst>
+      <p:par>
+        <p:cTn id="1" dur="indefinite" restart="never" nodeType="tmRoot"/>
+      </p:par>
+    </p:tnLst>
+  </p:timing>
 </p:sld>
 </file>
 
@@ -5107,6 +5204,13 @@
   <p:clrMapOvr>
     <a:masterClrMapping/>
   </p:clrMapOvr>
+  <p:timing>
+    <p:tnLst>
+      <p:par>
+        <p:cTn id="1" dur="indefinite" restart="never" nodeType="tmRoot"/>
+      </p:par>
+    </p:tnLst>
+  </p:timing>
 </p:sld>
 </file>
 
@@ -5310,6 +5414,13 @@
   <p:clrMapOvr>
     <a:masterClrMapping/>
   </p:clrMapOvr>
+  <p:timing>
+    <p:tnLst>
+      <p:par>
+        <p:cTn id="1" dur="indefinite" restart="never" nodeType="tmRoot"/>
+      </p:par>
+    </p:tnLst>
+  </p:timing>
 </p:sld>
 </file>
 
@@ -5452,6 +5563,13 @@
   <p:clrMapOvr>
     <a:masterClrMapping/>
   </p:clrMapOvr>
+  <p:timing>
+    <p:tnLst>
+      <p:par>
+        <p:cTn id="1" dur="indefinite" restart="never" nodeType="tmRoot"/>
+      </p:par>
+    </p:tnLst>
+  </p:timing>
 </p:sld>
 </file>
 
@@ -5568,6 +5686,13 @@
   <p:clrMapOvr>
     <a:masterClrMapping/>
   </p:clrMapOvr>
+  <p:timing>
+    <p:tnLst>
+      <p:par>
+        <p:cTn id="1" dur="indefinite" restart="never" nodeType="tmRoot"/>
+      </p:par>
+    </p:tnLst>
+  </p:timing>
 </p:sld>
 </file>
 
@@ -5679,6 +5804,13 @@
   <p:clrMapOvr>
     <a:masterClrMapping/>
   </p:clrMapOvr>
+  <p:timing>
+    <p:tnLst>
+      <p:par>
+        <p:cTn id="1" dur="indefinite" restart="never" nodeType="tmRoot"/>
+      </p:par>
+    </p:tnLst>
+  </p:timing>
 </p:sld>
 </file>
 
@@ -5847,6 +5979,13 @@
   <p:clrMapOvr>
     <a:masterClrMapping/>
   </p:clrMapOvr>
+  <p:timing>
+    <p:tnLst>
+      <p:par>
+        <p:cTn id="1" dur="indefinite" restart="never" nodeType="tmRoot"/>
+      </p:par>
+    </p:tnLst>
+  </p:timing>
 </p:sld>
 </file>
 
@@ -5898,8 +6037,8 @@
           </a:p>
         </p:txBody>
       </p:sp>
-      <mc:AlternateContent xmlns:mc="http://schemas.openxmlformats.org/markup-compatibility/2006" xmlns:a14="http://schemas.microsoft.com/office/drawing/2010/main">
-        <mc:Choice Requires="a14">
+      <mc:AlternateContent xmlns:mc="http://schemas.openxmlformats.org/markup-compatibility/2006">
+        <mc:Choice xmlns:a14="http://schemas.microsoft.com/office/drawing/2010/main" Requires="a14">
           <p:sp>
             <p:nvSpPr>
               <p:cNvPr id="3" name="Content Placeholder 2"/>
@@ -5918,12 +6057,20 @@
               <a:lstStyle/>
               <a:p>
                 <a:r>
+                  <a:rPr lang="en-US" dirty="0" smtClean="0">
+                    <a:solidFill>
+                      <a:srgbClr val="002060"/>
+                    </a:solidFill>
+                  </a:rPr>
+                  <a:t>MDD (TODO) </a:t>
+                </a:r>
+                <a:r>
                   <a:rPr lang="en-US" dirty="0">
                     <a:solidFill>
                       <a:srgbClr val="002060"/>
                     </a:solidFill>
                   </a:rPr>
-                  <a:t>MDD – also known as depression - is estimated to affect </a:t>
+                  <a:t>– also known as depression - is estimated to affect </a:t>
                 </a:r>
                 <a14:m>
                   <m:oMath xmlns:m="http://schemas.openxmlformats.org/officeDocument/2006/math">
@@ -5995,7 +6142,7 @@
             </p:txBody>
           </p:sp>
         </mc:Choice>
-        <mc:Fallback xmlns="">
+        <mc:Fallback>
           <p:sp>
             <p:nvSpPr>
               <p:cNvPr id="3" name="Content Placeholder 2"/>
@@ -6019,7 +6166,7 @@
               <a:lstStyle/>
               <a:p>
                 <a:r>
-                  <a:rPr lang="en-IL">
+                  <a:rPr lang="en-US">
                     <a:noFill/>
                   </a:rPr>
                   <a:t> </a:t>
@@ -6063,6 +6210,13 @@
   <p:clrMapOvr>
     <a:masterClrMapping/>
   </p:clrMapOvr>
+  <p:timing>
+    <p:tnLst>
+      <p:par>
+        <p:cTn id="1" dur="indefinite" restart="never" nodeType="tmRoot"/>
+      </p:par>
+    </p:tnLst>
+  </p:timing>
 </p:sld>
 </file>
 
@@ -6230,6 +6384,13 @@
   <p:clrMapOvr>
     <a:masterClrMapping/>
   </p:clrMapOvr>
+  <p:timing>
+    <p:tnLst>
+      <p:par>
+        <p:cTn id="1" dur="indefinite" restart="never" nodeType="tmRoot"/>
+      </p:par>
+    </p:tnLst>
+  </p:timing>
 </p:sld>
 </file>
 
@@ -6369,6 +6530,13 @@
   <p:clrMapOvr>
     <a:masterClrMapping/>
   </p:clrMapOvr>
+  <p:timing>
+    <p:tnLst>
+      <p:par>
+        <p:cTn id="1" dur="indefinite" restart="never" nodeType="tmRoot"/>
+      </p:par>
+    </p:tnLst>
+  </p:timing>
 </p:sld>
 </file>
 
@@ -7125,6 +7293,13 @@
   <p:clrMapOvr>
     <a:masterClrMapping/>
   </p:clrMapOvr>
+  <p:timing>
+    <p:tnLst>
+      <p:par>
+        <p:cTn id="1" dur="indefinite" restart="never" nodeType="tmRoot"/>
+      </p:par>
+    </p:tnLst>
+  </p:timing>
 </p:sld>
 </file>
 
@@ -7246,6 +7421,13 @@
   <p:clrMapOvr>
     <a:masterClrMapping/>
   </p:clrMapOvr>
+  <p:timing>
+    <p:tnLst>
+      <p:par>
+        <p:cTn id="1" dur="indefinite" restart="never" nodeType="tmRoot"/>
+      </p:par>
+    </p:tnLst>
+  </p:timing>
 </p:sld>
 </file>
 
@@ -7367,6 +7549,13 @@
   <p:clrMapOvr>
     <a:masterClrMapping/>
   </p:clrMapOvr>
+  <p:timing>
+    <p:tnLst>
+      <p:par>
+        <p:cTn id="1" dur="indefinite" restart="never" nodeType="tmRoot"/>
+      </p:par>
+    </p:tnLst>
+  </p:timing>
 </p:sld>
 </file>
 
@@ -7456,7 +7645,15 @@
           <a:p>
             <a:r>
               <a:rPr lang="en-US" dirty="0"/>
-              <a:t>Non linear dimension reduction</a:t>
+              <a:t>Non linear </a:t>
+            </a:r>
+            <a:r>
+              <a:rPr lang="en-US" dirty="0" smtClean="0"/>
+              <a:t>dimensionality </a:t>
+            </a:r>
+            <a:r>
+              <a:rPr lang="en-US" dirty="0"/>
+              <a:t>reduction</a:t>
             </a:r>
           </a:p>
           <a:p>
@@ -7504,6 +7701,13 @@
   <p:clrMapOvr>
     <a:masterClrMapping/>
   </p:clrMapOvr>
+  <p:timing>
+    <p:tnLst>
+      <p:par>
+        <p:cTn id="1" dur="indefinite" restart="never" nodeType="tmRoot"/>
+      </p:par>
+    </p:tnLst>
+  </p:timing>
 </p:sld>
 </file>
 

</xml_diff>

<commit_message>
More updates - added more images throughout slideshow
</commit_message>
<xml_diff>
--- a/Project_Midterm_Presentation.pptx
+++ b/Project_Midterm_Presentation.pptx
@@ -350,7 +350,7 @@
             <a:fld id="{C9B6F397-9295-4C9F-B4B0-31BF9D08FE68}" type="datetimeFigureOut">
               <a:rPr lang="he-IL" smtClean="0"/>
               <a:pPr/>
-              <a:t>א'/שבט/תשע"ח</a:t>
+              <a:t>ה'/שבט/תשע"ח</a:t>
             </a:fld>
             <a:endParaRPr lang="he-IL"/>
           </a:p>
@@ -517,7 +517,7 @@
             <a:fld id="{543B7BDA-9DDC-4E4C-973D-E4A3E66645CD}" type="datetimeFigureOut">
               <a:rPr lang="he-IL" smtClean="0"/>
               <a:pPr/>
-              <a:t>א'/שבט/תשע"ח</a:t>
+              <a:t>ה'/שבט/תשע"ח</a:t>
             </a:fld>
             <a:endParaRPr lang="he-IL"/>
           </a:p>
@@ -1128,6 +1128,91 @@
     <p:extLst>
       <p:ext uri="{BB962C8B-B14F-4D97-AF65-F5344CB8AC3E}">
         <p14:creationId xmlns:p14="http://schemas.microsoft.com/office/powerpoint/2010/main" val="3638374170"/>
+      </p:ext>
+    </p:extLst>
+  </p:cSld>
+  <p:clrMapOvr>
+    <a:masterClrMapping/>
+  </p:clrMapOvr>
+</p:notes>
+</file>
+
+<file path=ppt/notesSlides/notesSlide4.xml><?xml version="1.0" encoding="utf-8"?>
+<p:notes xmlns:a="http://schemas.openxmlformats.org/drawingml/2006/main" xmlns:r="http://schemas.openxmlformats.org/officeDocument/2006/relationships" xmlns:p="http://schemas.openxmlformats.org/presentationml/2006/main">
+  <p:cSld>
+    <p:spTree>
+      <p:nvGrpSpPr>
+        <p:cNvPr id="1" name=""/>
+        <p:cNvGrpSpPr/>
+        <p:nvPr/>
+      </p:nvGrpSpPr>
+      <p:grpSpPr>
+        <a:xfrm>
+          <a:off x="0" y="0"/>
+          <a:ext cx="0" cy="0"/>
+          <a:chOff x="0" y="0"/>
+          <a:chExt cx="0" cy="0"/>
+        </a:xfrm>
+      </p:grpSpPr>
+      <p:sp>
+        <p:nvSpPr>
+          <p:cNvPr id="2" name="Slide Image Placeholder 1"/>
+          <p:cNvSpPr>
+            <a:spLocks noGrp="1" noRot="1" noChangeAspect="1"/>
+          </p:cNvSpPr>
+          <p:nvPr>
+            <p:ph type="sldImg"/>
+          </p:nvPr>
+        </p:nvSpPr>
+        <p:spPr/>
+      </p:sp>
+      <p:sp>
+        <p:nvSpPr>
+          <p:cNvPr id="3" name="Notes Placeholder 2"/>
+          <p:cNvSpPr>
+            <a:spLocks noGrp="1"/>
+          </p:cNvSpPr>
+          <p:nvPr>
+            <p:ph type="body" idx="1"/>
+          </p:nvPr>
+        </p:nvSpPr>
+        <p:spPr/>
+        <p:txBody>
+          <a:bodyPr/>
+          <a:lstStyle/>
+          <a:p>
+            <a:endParaRPr lang="en-IL" dirty="0"/>
+          </a:p>
+        </p:txBody>
+      </p:sp>
+      <p:sp>
+        <p:nvSpPr>
+          <p:cNvPr id="4" name="Slide Number Placeholder 3"/>
+          <p:cNvSpPr>
+            <a:spLocks noGrp="1"/>
+          </p:cNvSpPr>
+          <p:nvPr>
+            <p:ph type="sldNum" sz="quarter" idx="10"/>
+          </p:nvPr>
+        </p:nvSpPr>
+        <p:spPr/>
+        <p:txBody>
+          <a:bodyPr/>
+          <a:lstStyle/>
+          <a:p>
+            <a:fld id="{C8C92D0D-AF30-4211-86C4-A3B87597F349}" type="slidenum">
+              <a:rPr lang="he-IL" smtClean="0"/>
+              <a:pPr/>
+              <a:t>21</a:t>
+            </a:fld>
+            <a:endParaRPr lang="he-IL"/>
+          </a:p>
+        </p:txBody>
+      </p:sp>
+    </p:spTree>
+    <p:extLst>
+      <p:ext uri="{BB962C8B-B14F-4D97-AF65-F5344CB8AC3E}">
+        <p14:creationId xmlns:p14="http://schemas.microsoft.com/office/powerpoint/2010/main" val="3101852105"/>
       </p:ext>
     </p:extLst>
   </p:cSld>
@@ -1930,7 +2015,7 @@
           <a:p>
             <a:fld id="{D7E1C0B7-AB0D-4AF9-9C80-529313F012B2}" type="datetime1">
               <a:rPr lang="en-US" smtClean="0"/>
-              <a:t>1/17/2018</a:t>
+              <a:t>1/21/2018</a:t>
             </a:fld>
             <a:endParaRPr lang="en-US"/>
           </a:p>
@@ -2174,7 +2259,7 @@
           <a:p>
             <a:fld id="{2A982F35-29BF-4127-A4F3-CE8B20D358F7}" type="datetime1">
               <a:rPr lang="en-US" smtClean="0"/>
-              <a:t>1/17/2018</a:t>
+              <a:t>1/21/2018</a:t>
             </a:fld>
             <a:endParaRPr lang="en-US"/>
           </a:p>
@@ -2601,21 +2686,8 @@
                   <a:srgbClr val="002060"/>
                 </a:solidFill>
               </a:rPr>
-              <a:t>using EEG </a:t>
-            </a:r>
-            <a:r>
-              <a:rPr lang="en-US" dirty="0" smtClean="0">
-                <a:solidFill>
-                  <a:srgbClr val="002060"/>
-                </a:solidFill>
-              </a:rPr>
-              <a:t>Signals</a:t>
-            </a:r>
-            <a:endParaRPr lang="en-US" dirty="0">
-              <a:solidFill>
-                <a:srgbClr val="002060"/>
-              </a:solidFill>
-            </a:endParaRPr>
+              <a:t>using EEG Signals</a:t>
+            </a:r>
           </a:p>
         </p:txBody>
       </p:sp>
@@ -2836,13 +2908,6 @@
   <p:clrMapOvr>
     <a:masterClrMapping/>
   </p:clrMapOvr>
-  <p:timing>
-    <p:tnLst>
-      <p:par>
-        <p:cTn id="1" dur="indefinite" restart="never" nodeType="tmRoot"/>
-      </p:par>
-    </p:tnLst>
-  </p:timing>
 </p:sld>
 </file>
 
@@ -3560,13 +3625,6 @@
   <p:clrMapOvr>
     <a:masterClrMapping/>
   </p:clrMapOvr>
-  <p:timing>
-    <p:tnLst>
-      <p:par>
-        <p:cTn id="1" dur="indefinite" restart="never" nodeType="tmRoot"/>
-      </p:par>
-    </p:tnLst>
-  </p:timing>
 </p:sld>
 </file>
 
@@ -3587,6 +3645,42 @@
           <a:chExt cx="0" cy="0"/>
         </a:xfrm>
       </p:grpSpPr>
+      <p:pic>
+        <p:nvPicPr>
+          <p:cNvPr id="6" name="Content Placeholder 5">
+            <a:extLst>
+              <a:ext uri="{FF2B5EF4-FFF2-40B4-BE49-F238E27FC236}">
+                <a16:creationId xmlns:a16="http://schemas.microsoft.com/office/drawing/2014/main" id="{8FA55538-4831-4191-9207-074B0B19DBB6}"/>
+              </a:ext>
+            </a:extLst>
+          </p:cNvPr>
+          <p:cNvPicPr>
+            <a:picLocks noChangeAspect="1"/>
+          </p:cNvPicPr>
+          <p:nvPr/>
+        </p:nvPicPr>
+        <p:blipFill>
+          <a:blip r:embed="rId2">
+            <a:extLst>
+              <a:ext uri="{28A0092B-C50C-407E-A947-70E740481C1C}">
+                <a14:useLocalDpi xmlns:a14="http://schemas.microsoft.com/office/drawing/2010/main" val="0"/>
+              </a:ext>
+            </a:extLst>
+          </a:blip>
+          <a:stretch>
+            <a:fillRect/>
+          </a:stretch>
+        </p:blipFill>
+        <p:spPr>
+          <a:xfrm>
+            <a:off x="4677952" y="914400"/>
+            <a:ext cx="4466048" cy="4191000"/>
+          </a:xfrm>
+          <a:prstGeom prst="rect">
+            <a:avLst/>
+          </a:prstGeom>
+        </p:spPr>
+      </p:pic>
       <p:sp>
         <p:nvSpPr>
           <p:cNvPr id="2" name="Title 1"/>
@@ -3660,7 +3754,9 @@
         </p:nvSpPr>
         <p:spPr/>
         <p:txBody>
-          <a:bodyPr/>
+          <a:bodyPr>
+            <a:normAutofit/>
+          </a:bodyPr>
           <a:lstStyle/>
           <a:p>
             <a:r>
@@ -3683,13 +3779,27 @@
           <a:p>
             <a:r>
               <a:rPr lang="en-US" dirty="0"/>
-              <a:t>35-50 trials for each subject in a session</a:t>
-            </a:r>
-          </a:p>
-          <a:p>
-            <a:r>
+              <a:t>35-50 trials for each </a:t>
+            </a:r>
+            <a:br>
               <a:rPr lang="en-US" dirty="0"/>
-              <a:t>Trial time -  2 sec = 2000 samples at 1000 Hz</a:t>
+            </a:br>
+            <a:r>
+              <a:rPr lang="en-US" dirty="0"/>
+              <a:t>subject in a session</a:t>
+            </a:r>
+          </a:p>
+          <a:p>
+            <a:r>
+              <a:rPr lang="en-US" dirty="0"/>
+              <a:t>Trial time -  2 sec = </a:t>
+            </a:r>
+            <a:br>
+              <a:rPr lang="en-US" dirty="0"/>
+            </a:br>
+            <a:r>
+              <a:rPr lang="en-US" dirty="0"/>
+              <a:t>2000 samples at 1000 Hz</a:t>
             </a:r>
           </a:p>
           <a:p>
@@ -3710,13 +3820,6 @@
   <p:clrMapOvr>
     <a:masterClrMapping/>
   </p:clrMapOvr>
-  <p:timing>
-    <p:tnLst>
-      <p:par>
-        <p:cTn id="1" dur="indefinite" restart="never" nodeType="tmRoot"/>
-      </p:par>
-    </p:tnLst>
-  </p:timing>
 </p:sld>
 </file>
 
@@ -3840,13 +3943,6 @@
   <p:clrMapOvr>
     <a:masterClrMapping/>
   </p:clrMapOvr>
-  <p:timing>
-    <p:tnLst>
-      <p:par>
-        <p:cTn id="1" dur="indefinite" restart="never" nodeType="tmRoot"/>
-      </p:par>
-    </p:tnLst>
-  </p:timing>
 </p:sld>
 </file>
 
@@ -3867,6 +3963,41 @@
           <a:chExt cx="0" cy="0"/>
         </a:xfrm>
       </p:grpSpPr>
+      <p:pic>
+        <p:nvPicPr>
+          <p:cNvPr id="7" name="Picture 6">
+            <a:extLst>
+              <a:ext uri="{FF2B5EF4-FFF2-40B4-BE49-F238E27FC236}">
+                <a16:creationId xmlns:a16="http://schemas.microsoft.com/office/drawing/2014/main" id="{5725D9B2-F14D-4993-93E5-EDA57B6BD75E}"/>
+              </a:ext>
+            </a:extLst>
+          </p:cNvPr>
+          <p:cNvPicPr>
+            <a:picLocks noChangeAspect="1"/>
+          </p:cNvPicPr>
+          <p:nvPr/>
+        </p:nvPicPr>
+        <p:blipFill rotWithShape="1">
+          <a:blip r:embed="rId2">
+            <a:extLst>
+              <a:ext uri="{28A0092B-C50C-407E-A947-70E740481C1C}">
+                <a14:useLocalDpi xmlns:a14="http://schemas.microsoft.com/office/drawing/2010/main" val="0"/>
+              </a:ext>
+            </a:extLst>
+          </a:blip>
+          <a:srcRect r="4525"/>
+          <a:stretch/>
+        </p:blipFill>
+        <p:spPr>
+          <a:xfrm>
+            <a:off x="4908487" y="3394286"/>
+            <a:ext cx="4235513" cy="3327189"/>
+          </a:xfrm>
+          <a:prstGeom prst="rect">
+            <a:avLst/>
+          </a:prstGeom>
+        </p:spPr>
+      </p:pic>
       <p:sp>
         <p:nvSpPr>
           <p:cNvPr id="2" name="Title 1"/>
@@ -3958,7 +4089,22 @@
                   <a:srgbClr val="002060"/>
                 </a:solidFill>
               </a:rPr>
-              <a:t>Electrodes are linearly dependent</a:t>
+              <a:t>Electrodes are linearly </a:t>
+            </a:r>
+            <a:br>
+              <a:rPr lang="en-US" dirty="0">
+                <a:solidFill>
+                  <a:srgbClr val="002060"/>
+                </a:solidFill>
+              </a:rPr>
+            </a:br>
+            <a:r>
+              <a:rPr lang="en-US" dirty="0">
+                <a:solidFill>
+                  <a:srgbClr val="002060"/>
+                </a:solidFill>
+              </a:rPr>
+              <a:t>dependent</a:t>
             </a:r>
           </a:p>
           <a:p>
@@ -4004,6 +4150,42 @@
           </a:p>
         </p:txBody>
       </p:sp>
+      <p:pic>
+        <p:nvPicPr>
+          <p:cNvPr id="6" name="Content Placeholder 8" descr="A close up of a map&#10;&#10;Description generated with high confidence">
+            <a:extLst>
+              <a:ext uri="{FF2B5EF4-FFF2-40B4-BE49-F238E27FC236}">
+                <a16:creationId xmlns:a16="http://schemas.microsoft.com/office/drawing/2014/main" id="{C371200A-96AA-4BE6-A7E7-3C0EB8A6CA9E}"/>
+              </a:ext>
+            </a:extLst>
+          </p:cNvPr>
+          <p:cNvPicPr>
+            <a:picLocks noChangeAspect="1"/>
+          </p:cNvPicPr>
+          <p:nvPr/>
+        </p:nvPicPr>
+        <p:blipFill>
+          <a:blip r:embed="rId3" cstate="print">
+            <a:extLst>
+              <a:ext uri="{28A0092B-C50C-407E-A947-70E740481C1C}">
+                <a14:useLocalDpi xmlns:a14="http://schemas.microsoft.com/office/drawing/2010/main" val="0"/>
+              </a:ext>
+            </a:extLst>
+          </a:blip>
+          <a:stretch>
+            <a:fillRect/>
+          </a:stretch>
+        </p:blipFill>
+        <p:spPr>
+          <a:xfrm>
+            <a:off x="5109227" y="1138153"/>
+            <a:ext cx="4034773" cy="2290847"/>
+          </a:xfrm>
+          <a:prstGeom prst="rect">
+            <a:avLst/>
+          </a:prstGeom>
+        </p:spPr>
+      </p:pic>
     </p:spTree>
     <p:extLst>
       <p:ext uri="{BB962C8B-B14F-4D97-AF65-F5344CB8AC3E}">
@@ -4014,13 +4196,6 @@
   <p:clrMapOvr>
     <a:masterClrMapping/>
   </p:clrMapOvr>
-  <p:timing>
-    <p:tnLst>
-      <p:par>
-        <p:cTn id="1" dur="indefinite" restart="never" nodeType="tmRoot"/>
-      </p:par>
-    </p:tnLst>
-  </p:timing>
 </p:sld>
 </file>
 
@@ -4144,13 +4319,6 @@
   <p:clrMapOvr>
     <a:masterClrMapping/>
   </p:clrMapOvr>
-  <p:timing>
-    <p:tnLst>
-      <p:par>
-        <p:cTn id="1" dur="indefinite" restart="never" nodeType="tmRoot"/>
-      </p:par>
-    </p:tnLst>
-  </p:timing>
 </p:sld>
 </file>
 
@@ -4273,13 +4441,6 @@
   <p:clrMapOvr>
     <a:masterClrMapping/>
   </p:clrMapOvr>
-  <p:timing>
-    <p:tnLst>
-      <p:par>
-        <p:cTn id="1" dur="indefinite" restart="never" nodeType="tmRoot"/>
-      </p:par>
-    </p:tnLst>
-  </p:timing>
 </p:sld>
 </file>
 
@@ -4393,7 +4554,7 @@
           <a:p>
             <a:r>
               <a:rPr lang="en-US" dirty="0"/>
-              <a:t>Muscle movements affect measurement</a:t>
+              <a:t>Muscle movements affect measurement (though removed in processing)</a:t>
             </a:r>
           </a:p>
           <a:p>
@@ -4429,13 +4590,6 @@
   <p:clrMapOvr>
     <a:masterClrMapping/>
   </p:clrMapOvr>
-  <p:timing>
-    <p:tnLst>
-      <p:par>
-        <p:cTn id="1" dur="indefinite" restart="never" nodeType="tmRoot"/>
-      </p:par>
-    </p:tnLst>
-  </p:timing>
 </p:sld>
 </file>
 
@@ -4555,6 +4709,42 @@
           </a:p>
         </p:txBody>
       </p:sp>
+      <p:pic>
+        <p:nvPicPr>
+          <p:cNvPr id="5" name="Content Placeholder 11">
+            <a:extLst>
+              <a:ext uri="{FF2B5EF4-FFF2-40B4-BE49-F238E27FC236}">
+                <a16:creationId xmlns:a16="http://schemas.microsoft.com/office/drawing/2014/main" id="{9DD69B05-BC2C-44A0-A098-AF9D06133CD2}"/>
+              </a:ext>
+            </a:extLst>
+          </p:cNvPr>
+          <p:cNvPicPr>
+            <a:picLocks noChangeAspect="1"/>
+          </p:cNvPicPr>
+          <p:nvPr/>
+        </p:nvPicPr>
+        <p:blipFill>
+          <a:blip r:embed="rId2">
+            <a:extLst>
+              <a:ext uri="{28A0092B-C50C-407E-A947-70E740481C1C}">
+                <a14:useLocalDpi xmlns:a14="http://schemas.microsoft.com/office/drawing/2010/main" val="0"/>
+              </a:ext>
+            </a:extLst>
+          </a:blip>
+          <a:stretch>
+            <a:fillRect/>
+          </a:stretch>
+        </p:blipFill>
+        <p:spPr>
+          <a:xfrm>
+            <a:off x="4876800" y="3810000"/>
+            <a:ext cx="3994784" cy="2996088"/>
+          </a:xfrm>
+          <a:prstGeom prst="rect">
+            <a:avLst/>
+          </a:prstGeom>
+        </p:spPr>
+      </p:pic>
     </p:spTree>
     <p:extLst>
       <p:ext uri="{BB962C8B-B14F-4D97-AF65-F5344CB8AC3E}">
@@ -4565,13 +4755,6 @@
   <p:clrMapOvr>
     <a:masterClrMapping/>
   </p:clrMapOvr>
-  <p:timing>
-    <p:tnLst>
-      <p:par>
-        <p:cTn id="1" dur="indefinite" restart="never" nodeType="tmRoot"/>
-      </p:par>
-    </p:tnLst>
-  </p:timing>
 </p:sld>
 </file>
 
@@ -4695,13 +4878,6 @@
   <p:clrMapOvr>
     <a:masterClrMapping/>
   </p:clrMapOvr>
-  <p:timing>
-    <p:tnLst>
-      <p:par>
-        <p:cTn id="1" dur="indefinite" restart="never" nodeType="tmRoot"/>
-      </p:par>
-    </p:tnLst>
-  </p:timing>
 </p:sld>
 </file>
 
@@ -4825,13 +5001,6 @@
   <p:clrMapOvr>
     <a:masterClrMapping/>
   </p:clrMapOvr>
-  <p:timing>
-    <p:tnLst>
-      <p:par>
-        <p:cTn id="1" dur="indefinite" restart="never" nodeType="tmRoot"/>
-      </p:par>
-    </p:tnLst>
-  </p:timing>
 </p:sld>
 </file>
 
@@ -4962,13 +5131,6 @@
   <p:clrMapOvr>
     <a:masterClrMapping/>
   </p:clrMapOvr>
-  <p:timing>
-    <p:tnLst>
-      <p:par>
-        <p:cTn id="1" dur="indefinite" restart="never" nodeType="tmRoot"/>
-      </p:par>
-    </p:tnLst>
-  </p:timing>
 </p:sld>
 </file>
 
@@ -5033,7 +5195,12 @@
             <p:ph type="sldNum" sz="quarter" idx="12"/>
           </p:nvPr>
         </p:nvSpPr>
-        <p:spPr/>
+        <p:spPr>
+          <a:xfrm>
+            <a:off x="457200" y="6797675"/>
+            <a:ext cx="2133600" cy="365125"/>
+          </a:xfrm>
+        </p:spPr>
         <p:txBody>
           <a:bodyPr/>
           <a:lstStyle/>
@@ -5077,7 +5244,7 @@
         </p:blipFill>
         <p:spPr>
           <a:xfrm>
-            <a:off x="53106" y="1905000"/>
+            <a:off x="53106" y="2363311"/>
             <a:ext cx="4465788" cy="3996373"/>
           </a:xfrm>
         </p:spPr>
@@ -5109,7 +5276,7 @@
         </p:blipFill>
         <p:spPr>
           <a:xfrm>
-            <a:off x="4343400" y="2074386"/>
+            <a:off x="4343400" y="2515711"/>
             <a:ext cx="4644824" cy="3657600"/>
           </a:xfrm>
           <a:prstGeom prst="rect">
@@ -5133,7 +5300,7 @@
         </p:nvCxnSpPr>
         <p:spPr>
           <a:xfrm flipH="1" flipV="1">
-            <a:off x="838200" y="5105400"/>
+            <a:off x="838200" y="5546725"/>
             <a:ext cx="152400" cy="626586"/>
           </a:xfrm>
           <a:prstGeom prst="straightConnector1">
@@ -5172,7 +5339,7 @@
         </p:nvSpPr>
         <p:spPr>
           <a:xfrm>
-            <a:off x="762000" y="5731986"/>
+            <a:off x="762000" y="6173311"/>
             <a:ext cx="1600200" cy="646331"/>
           </a:xfrm>
           <a:prstGeom prst="rect">
@@ -5189,6 +5356,179 @@
             <a:r>
               <a:rPr lang="en-US" dirty="0"/>
               <a:t>Near-zero eigenvalues?</a:t>
+            </a:r>
+            <a:endParaRPr lang="en-IL" dirty="0"/>
+          </a:p>
+        </p:txBody>
+      </p:sp>
+      <p:sp>
+        <p:nvSpPr>
+          <p:cNvPr id="8" name="Content Placeholder 2">
+            <a:extLst>
+              <a:ext uri="{FF2B5EF4-FFF2-40B4-BE49-F238E27FC236}">
+                <a16:creationId xmlns:a16="http://schemas.microsoft.com/office/drawing/2014/main" id="{11598EB6-C25E-40DA-9DE0-3BE60164CFF9}"/>
+              </a:ext>
+            </a:extLst>
+          </p:cNvPr>
+          <p:cNvSpPr txBox="1">
+            <a:spLocks/>
+          </p:cNvSpPr>
+          <p:nvPr/>
+        </p:nvSpPr>
+        <p:spPr>
+          <a:xfrm>
+            <a:off x="457200" y="1512729"/>
+            <a:ext cx="8229600" cy="685800"/>
+          </a:xfrm>
+          <a:prstGeom prst="rect">
+            <a:avLst/>
+          </a:prstGeom>
+        </p:spPr>
+        <p:txBody>
+          <a:bodyPr vert="horz" lIns="91440" tIns="45720" rIns="91440" bIns="45720" rtlCol="1">
+            <a:normAutofit/>
+          </a:bodyPr>
+          <a:lstStyle>
+            <a:lvl1pPr marL="342900" indent="-342900" algn="l" defTabSz="914400" rtl="0" eaLnBrk="1" latinLnBrk="0" hangingPunct="1">
+              <a:spcBef>
+                <a:spcPct val="20000"/>
+              </a:spcBef>
+              <a:buFont typeface="Arial" panose="020B0604020202020204" pitchFamily="34" charset="0"/>
+              <a:buChar char="•"/>
+              <a:defRPr sz="3200" kern="1200">
+                <a:solidFill>
+                  <a:schemeClr val="tx1"/>
+                </a:solidFill>
+                <a:latin typeface="+mn-lt"/>
+                <a:ea typeface="+mn-ea"/>
+                <a:cs typeface="+mn-cs"/>
+              </a:defRPr>
+            </a:lvl1pPr>
+            <a:lvl2pPr marL="742950" indent="-285750" algn="l" defTabSz="914400" rtl="0" eaLnBrk="1" latinLnBrk="0" hangingPunct="1">
+              <a:spcBef>
+                <a:spcPct val="20000"/>
+              </a:spcBef>
+              <a:buFont typeface="Arial" panose="020B0604020202020204" pitchFamily="34" charset="0"/>
+              <a:buChar char="–"/>
+              <a:defRPr sz="2800" kern="1200">
+                <a:solidFill>
+                  <a:schemeClr val="tx1"/>
+                </a:solidFill>
+                <a:latin typeface="+mn-lt"/>
+                <a:ea typeface="+mn-ea"/>
+                <a:cs typeface="+mn-cs"/>
+              </a:defRPr>
+            </a:lvl2pPr>
+            <a:lvl3pPr marL="1143000" indent="-228600" algn="l" defTabSz="914400" rtl="0" eaLnBrk="1" latinLnBrk="0" hangingPunct="1">
+              <a:spcBef>
+                <a:spcPct val="20000"/>
+              </a:spcBef>
+              <a:buFont typeface="Arial" panose="020B0604020202020204" pitchFamily="34" charset="0"/>
+              <a:buChar char="•"/>
+              <a:defRPr sz="2400" kern="1200">
+                <a:solidFill>
+                  <a:schemeClr val="tx1"/>
+                </a:solidFill>
+                <a:latin typeface="+mn-lt"/>
+                <a:ea typeface="+mn-ea"/>
+                <a:cs typeface="+mn-cs"/>
+              </a:defRPr>
+            </a:lvl3pPr>
+            <a:lvl4pPr marL="1600200" indent="-228600" algn="l" defTabSz="914400" rtl="0" eaLnBrk="1" latinLnBrk="0" hangingPunct="1">
+              <a:spcBef>
+                <a:spcPct val="20000"/>
+              </a:spcBef>
+              <a:buFont typeface="Arial" panose="020B0604020202020204" pitchFamily="34" charset="0"/>
+              <a:buChar char="–"/>
+              <a:defRPr sz="2000" kern="1200">
+                <a:solidFill>
+                  <a:schemeClr val="tx1"/>
+                </a:solidFill>
+                <a:latin typeface="+mn-lt"/>
+                <a:ea typeface="+mn-ea"/>
+                <a:cs typeface="+mn-cs"/>
+              </a:defRPr>
+            </a:lvl4pPr>
+            <a:lvl5pPr marL="2057400" indent="-228600" algn="l" defTabSz="914400" rtl="0" eaLnBrk="1" latinLnBrk="0" hangingPunct="1">
+              <a:spcBef>
+                <a:spcPct val="20000"/>
+              </a:spcBef>
+              <a:buFont typeface="Arial" panose="020B0604020202020204" pitchFamily="34" charset="0"/>
+              <a:buChar char="»"/>
+              <a:defRPr sz="2000" kern="1200">
+                <a:solidFill>
+                  <a:schemeClr val="tx1"/>
+                </a:solidFill>
+                <a:latin typeface="+mn-lt"/>
+                <a:ea typeface="+mn-ea"/>
+                <a:cs typeface="+mn-cs"/>
+              </a:defRPr>
+            </a:lvl5pPr>
+            <a:lvl6pPr marL="2514600" indent="-228600" algn="r" defTabSz="914400" rtl="1" eaLnBrk="1" latinLnBrk="0" hangingPunct="1">
+              <a:spcBef>
+                <a:spcPct val="20000"/>
+              </a:spcBef>
+              <a:buFont typeface="Arial" panose="020B0604020202020204" pitchFamily="34" charset="0"/>
+              <a:buChar char="•"/>
+              <a:defRPr sz="2000" kern="1200">
+                <a:solidFill>
+                  <a:schemeClr val="tx1"/>
+                </a:solidFill>
+                <a:latin typeface="+mn-lt"/>
+                <a:ea typeface="+mn-ea"/>
+                <a:cs typeface="+mn-cs"/>
+              </a:defRPr>
+            </a:lvl6pPr>
+            <a:lvl7pPr marL="2971800" indent="-228600" algn="r" defTabSz="914400" rtl="1" eaLnBrk="1" latinLnBrk="0" hangingPunct="1">
+              <a:spcBef>
+                <a:spcPct val="20000"/>
+              </a:spcBef>
+              <a:buFont typeface="Arial" panose="020B0604020202020204" pitchFamily="34" charset="0"/>
+              <a:buChar char="•"/>
+              <a:defRPr sz="2000" kern="1200">
+                <a:solidFill>
+                  <a:schemeClr val="tx1"/>
+                </a:solidFill>
+                <a:latin typeface="+mn-lt"/>
+                <a:ea typeface="+mn-ea"/>
+                <a:cs typeface="+mn-cs"/>
+              </a:defRPr>
+            </a:lvl7pPr>
+            <a:lvl8pPr marL="3429000" indent="-228600" algn="r" defTabSz="914400" rtl="1" eaLnBrk="1" latinLnBrk="0" hangingPunct="1">
+              <a:spcBef>
+                <a:spcPct val="20000"/>
+              </a:spcBef>
+              <a:buFont typeface="Arial" panose="020B0604020202020204" pitchFamily="34" charset="0"/>
+              <a:buChar char="•"/>
+              <a:defRPr sz="2000" kern="1200">
+                <a:solidFill>
+                  <a:schemeClr val="tx1"/>
+                </a:solidFill>
+                <a:latin typeface="+mn-lt"/>
+                <a:ea typeface="+mn-ea"/>
+                <a:cs typeface="+mn-cs"/>
+              </a:defRPr>
+            </a:lvl8pPr>
+            <a:lvl9pPr marL="3886200" indent="-228600" algn="r" defTabSz="914400" rtl="1" eaLnBrk="1" latinLnBrk="0" hangingPunct="1">
+              <a:spcBef>
+                <a:spcPct val="20000"/>
+              </a:spcBef>
+              <a:buFont typeface="Arial" panose="020B0604020202020204" pitchFamily="34" charset="0"/>
+              <a:buChar char="•"/>
+              <a:defRPr sz="2000" kern="1200">
+                <a:solidFill>
+                  <a:schemeClr val="tx1"/>
+                </a:solidFill>
+                <a:latin typeface="+mn-lt"/>
+                <a:ea typeface="+mn-ea"/>
+                <a:cs typeface="+mn-cs"/>
+              </a:defRPr>
+            </a:lvl9pPr>
+          </a:lstStyle>
+          <a:p>
+            <a:r>
+              <a:rPr lang="en-US" dirty="0"/>
+              <a:t>Covariance/Correlation are close to singular</a:t>
             </a:r>
             <a:endParaRPr lang="en-IL" dirty="0"/>
           </a:p>
@@ -5204,13 +5544,6 @@
   <p:clrMapOvr>
     <a:masterClrMapping/>
   </p:clrMapOvr>
-  <p:timing>
-    <p:tnLst>
-      <p:par>
-        <p:cTn id="1" dur="indefinite" restart="never" nodeType="tmRoot"/>
-      </p:par>
-    </p:tnLst>
-  </p:timing>
 </p:sld>
 </file>
 
@@ -5246,7 +5579,7 @@
           <p:nvPr/>
         </p:nvPicPr>
         <p:blipFill>
-          <a:blip r:embed="rId2">
+          <a:blip r:embed="rId3">
             <a:extLst>
               <a:ext uri="{28A0092B-C50C-407E-A947-70E740481C1C}">
                 <a14:useLocalDpi xmlns:a14="http://schemas.microsoft.com/office/drawing/2010/main" val="0"/>
@@ -5314,7 +5647,7 @@
           </p:nvPr>
         </p:nvPicPr>
         <p:blipFill>
-          <a:blip r:embed="rId3">
+          <a:blip r:embed="rId4">
             <a:extLst>
               <a:ext uri="{28A0092B-C50C-407E-A947-70E740481C1C}">
                 <a14:useLocalDpi xmlns:a14="http://schemas.microsoft.com/office/drawing/2010/main" val="0"/>
@@ -5347,7 +5680,7 @@
           <p:nvPr/>
         </p:nvPicPr>
         <p:blipFill>
-          <a:blip r:embed="rId4">
+          <a:blip r:embed="rId5">
             <a:extLst>
               <a:ext uri="{28A0092B-C50C-407E-A947-70E740481C1C}">
                 <a14:useLocalDpi xmlns:a14="http://schemas.microsoft.com/office/drawing/2010/main" val="0"/>
@@ -5383,7 +5716,7 @@
           <p:nvPr/>
         </p:nvPicPr>
         <p:blipFill>
-          <a:blip r:embed="rId5">
+          <a:blip r:embed="rId6">
             <a:extLst>
               <a:ext uri="{28A0092B-C50C-407E-A947-70E740481C1C}">
                 <a14:useLocalDpi xmlns:a14="http://schemas.microsoft.com/office/drawing/2010/main" val="0"/>
@@ -5396,7 +5729,7 @@
         </p:blipFill>
         <p:spPr>
           <a:xfrm>
-            <a:off x="135748" y="3530811"/>
+            <a:off x="166228" y="3579177"/>
             <a:ext cx="4436252" cy="3327189"/>
           </a:xfrm>
           <a:prstGeom prst="rect">
@@ -5404,6 +5737,206 @@
           </a:prstGeom>
         </p:spPr>
       </p:pic>
+      <p:sp>
+        <p:nvSpPr>
+          <p:cNvPr id="7" name="Oval 6">
+            <a:extLst>
+              <a:ext uri="{FF2B5EF4-FFF2-40B4-BE49-F238E27FC236}">
+                <a16:creationId xmlns:a16="http://schemas.microsoft.com/office/drawing/2014/main" id="{E5B2C8FC-181B-4EDF-9D8F-0C8451170570}"/>
+              </a:ext>
+            </a:extLst>
+          </p:cNvPr>
+          <p:cNvSpPr/>
+          <p:nvPr/>
+        </p:nvSpPr>
+        <p:spPr>
+          <a:xfrm>
+            <a:off x="6010768" y="5486400"/>
+            <a:ext cx="1143000" cy="685800"/>
+          </a:xfrm>
+          <a:prstGeom prst="ellipse">
+            <a:avLst/>
+          </a:prstGeom>
+          <a:noFill/>
+          <a:ln>
+            <a:solidFill>
+              <a:schemeClr val="accent2"/>
+            </a:solidFill>
+          </a:ln>
+        </p:spPr>
+        <p:style>
+          <a:lnRef idx="2">
+            <a:schemeClr val="accent6"/>
+          </a:lnRef>
+          <a:fillRef idx="1">
+            <a:schemeClr val="lt1"/>
+          </a:fillRef>
+          <a:effectRef idx="0">
+            <a:schemeClr val="accent6"/>
+          </a:effectRef>
+          <a:fontRef idx="minor">
+            <a:schemeClr val="dk1"/>
+          </a:fontRef>
+        </p:style>
+        <p:txBody>
+          <a:bodyPr rtlCol="0" anchor="ctr"/>
+          <a:lstStyle/>
+          <a:p>
+            <a:pPr algn="ctr"/>
+            <a:endParaRPr lang="en-IL"/>
+          </a:p>
+        </p:txBody>
+      </p:sp>
+      <p:sp>
+        <p:nvSpPr>
+          <p:cNvPr id="10" name="Oval 9">
+            <a:extLst>
+              <a:ext uri="{FF2B5EF4-FFF2-40B4-BE49-F238E27FC236}">
+                <a16:creationId xmlns:a16="http://schemas.microsoft.com/office/drawing/2014/main" id="{B2732763-B375-482F-BD97-1A4FC11CA5B0}"/>
+              </a:ext>
+            </a:extLst>
+          </p:cNvPr>
+          <p:cNvSpPr/>
+          <p:nvPr/>
+        </p:nvSpPr>
+        <p:spPr>
+          <a:xfrm>
+            <a:off x="6025184" y="2286000"/>
+            <a:ext cx="1143000" cy="685800"/>
+          </a:xfrm>
+          <a:prstGeom prst="ellipse">
+            <a:avLst/>
+          </a:prstGeom>
+          <a:noFill/>
+          <a:ln>
+            <a:solidFill>
+              <a:schemeClr val="accent2"/>
+            </a:solidFill>
+          </a:ln>
+        </p:spPr>
+        <p:style>
+          <a:lnRef idx="2">
+            <a:schemeClr val="accent6"/>
+          </a:lnRef>
+          <a:fillRef idx="1">
+            <a:schemeClr val="lt1"/>
+          </a:fillRef>
+          <a:effectRef idx="0">
+            <a:schemeClr val="accent6"/>
+          </a:effectRef>
+          <a:fontRef idx="minor">
+            <a:schemeClr val="dk1"/>
+          </a:fontRef>
+        </p:style>
+        <p:txBody>
+          <a:bodyPr rtlCol="0" anchor="ctr"/>
+          <a:lstStyle/>
+          <a:p>
+            <a:pPr algn="ctr"/>
+            <a:endParaRPr lang="en-IL"/>
+          </a:p>
+        </p:txBody>
+      </p:sp>
+      <p:sp>
+        <p:nvSpPr>
+          <p:cNvPr id="12" name="Oval 11">
+            <a:extLst>
+              <a:ext uri="{FF2B5EF4-FFF2-40B4-BE49-F238E27FC236}">
+                <a16:creationId xmlns:a16="http://schemas.microsoft.com/office/drawing/2014/main" id="{BDBB11A9-F1B7-427C-8217-8D5F31EEE12B}"/>
+              </a:ext>
+            </a:extLst>
+          </p:cNvPr>
+          <p:cNvSpPr/>
+          <p:nvPr/>
+        </p:nvSpPr>
+        <p:spPr>
+          <a:xfrm>
+            <a:off x="1447800" y="1371600"/>
+            <a:ext cx="1143000" cy="1071774"/>
+          </a:xfrm>
+          <a:prstGeom prst="ellipse">
+            <a:avLst/>
+          </a:prstGeom>
+          <a:noFill/>
+          <a:ln>
+            <a:solidFill>
+              <a:schemeClr val="accent2"/>
+            </a:solidFill>
+          </a:ln>
+        </p:spPr>
+        <p:style>
+          <a:lnRef idx="2">
+            <a:schemeClr val="accent6"/>
+          </a:lnRef>
+          <a:fillRef idx="1">
+            <a:schemeClr val="lt1"/>
+          </a:fillRef>
+          <a:effectRef idx="0">
+            <a:schemeClr val="accent6"/>
+          </a:effectRef>
+          <a:fontRef idx="minor">
+            <a:schemeClr val="dk1"/>
+          </a:fontRef>
+        </p:style>
+        <p:txBody>
+          <a:bodyPr rtlCol="0" anchor="ctr"/>
+          <a:lstStyle/>
+          <a:p>
+            <a:pPr algn="ctr"/>
+            <a:endParaRPr lang="en-IL"/>
+          </a:p>
+        </p:txBody>
+      </p:sp>
+      <p:sp>
+        <p:nvSpPr>
+          <p:cNvPr id="18" name="Oval 17">
+            <a:extLst>
+              <a:ext uri="{FF2B5EF4-FFF2-40B4-BE49-F238E27FC236}">
+                <a16:creationId xmlns:a16="http://schemas.microsoft.com/office/drawing/2014/main" id="{C1861897-E81C-4B8A-BE41-1DA5974A7130}"/>
+              </a:ext>
+            </a:extLst>
+          </p:cNvPr>
+          <p:cNvSpPr/>
+          <p:nvPr/>
+        </p:nvSpPr>
+        <p:spPr>
+          <a:xfrm>
+            <a:off x="1219200" y="5562600"/>
+            <a:ext cx="1143000" cy="685800"/>
+          </a:xfrm>
+          <a:prstGeom prst="ellipse">
+            <a:avLst/>
+          </a:prstGeom>
+          <a:noFill/>
+          <a:ln>
+            <a:solidFill>
+              <a:schemeClr val="accent2"/>
+            </a:solidFill>
+          </a:ln>
+        </p:spPr>
+        <p:style>
+          <a:lnRef idx="2">
+            <a:schemeClr val="accent6"/>
+          </a:lnRef>
+          <a:fillRef idx="1">
+            <a:schemeClr val="lt1"/>
+          </a:fillRef>
+          <a:effectRef idx="0">
+            <a:schemeClr val="accent6"/>
+          </a:effectRef>
+          <a:fontRef idx="minor">
+            <a:schemeClr val="dk1"/>
+          </a:fontRef>
+        </p:style>
+        <p:txBody>
+          <a:bodyPr rtlCol="0" anchor="ctr"/>
+          <a:lstStyle/>
+          <a:p>
+            <a:pPr algn="ctr"/>
+            <a:endParaRPr lang="en-IL"/>
+          </a:p>
+        </p:txBody>
+      </p:sp>
     </p:spTree>
     <p:extLst>
       <p:ext uri="{BB962C8B-B14F-4D97-AF65-F5344CB8AC3E}">
@@ -5414,13 +5947,6 @@
   <p:clrMapOvr>
     <a:masterClrMapping/>
   </p:clrMapOvr>
-  <p:timing>
-    <p:tnLst>
-      <p:par>
-        <p:cTn id="1" dur="indefinite" restart="never" nodeType="tmRoot"/>
-      </p:par>
-    </p:tnLst>
-  </p:timing>
 </p:sld>
 </file>
 
@@ -5540,16 +6066,115 @@
             <a:pPr lvl="1"/>
             <a:r>
               <a:rPr lang="en-US" dirty="0"/>
-              <a:t>Select fewer electrodes to work with</a:t>
+              <a:t>Select fewer </a:t>
+            </a:r>
+            <a:br>
+              <a:rPr lang="en-US" dirty="0"/>
+            </a:br>
+            <a:r>
+              <a:rPr lang="en-US" dirty="0"/>
+              <a:t>electrodes to work with</a:t>
             </a:r>
           </a:p>
           <a:p>
             <a:pPr lvl="1"/>
             <a:r>
               <a:rPr lang="en-US" dirty="0"/>
-              <a:t>Cluster electrodes together</a:t>
+              <a:t>Cluster electrodes </a:t>
+            </a:r>
+            <a:br>
+              <a:rPr lang="en-US" dirty="0"/>
+            </a:br>
+            <a:r>
+              <a:rPr lang="en-US" dirty="0"/>
+              <a:t>together</a:t>
             </a:r>
             <a:endParaRPr lang="en-IL" dirty="0"/>
+          </a:p>
+        </p:txBody>
+      </p:sp>
+      <p:pic>
+        <p:nvPicPr>
+          <p:cNvPr id="5" name="Picture 4">
+            <a:extLst>
+              <a:ext uri="{FF2B5EF4-FFF2-40B4-BE49-F238E27FC236}">
+                <a16:creationId xmlns:a16="http://schemas.microsoft.com/office/drawing/2014/main" id="{D92569AB-5D66-49F8-9815-45C7637EDFA2}"/>
+              </a:ext>
+            </a:extLst>
+          </p:cNvPr>
+          <p:cNvPicPr>
+            <a:picLocks noChangeAspect="1"/>
+          </p:cNvPicPr>
+          <p:nvPr/>
+        </p:nvPicPr>
+        <p:blipFill rotWithShape="1">
+          <a:blip r:embed="rId2">
+            <a:extLst>
+              <a:ext uri="{28A0092B-C50C-407E-A947-70E740481C1C}">
+                <a14:useLocalDpi xmlns:a14="http://schemas.microsoft.com/office/drawing/2010/main" val="0"/>
+              </a:ext>
+            </a:extLst>
+          </a:blip>
+          <a:srcRect l="2635" r="6602"/>
+          <a:stretch/>
+        </p:blipFill>
+        <p:spPr>
+          <a:xfrm>
+            <a:off x="4715244" y="2131624"/>
+            <a:ext cx="4428756" cy="3659576"/>
+          </a:xfrm>
+          <a:prstGeom prst="rect">
+            <a:avLst/>
+          </a:prstGeom>
+        </p:spPr>
+      </p:pic>
+      <p:sp>
+        <p:nvSpPr>
+          <p:cNvPr id="3" name="Oval 2">
+            <a:extLst>
+              <a:ext uri="{FF2B5EF4-FFF2-40B4-BE49-F238E27FC236}">
+                <a16:creationId xmlns:a16="http://schemas.microsoft.com/office/drawing/2014/main" id="{CBA095F9-1488-45DC-84FF-AC6CDBD97B43}"/>
+              </a:ext>
+            </a:extLst>
+          </p:cNvPr>
+          <p:cNvSpPr/>
+          <p:nvPr/>
+        </p:nvSpPr>
+        <p:spPr>
+          <a:xfrm>
+            <a:off x="5867400" y="4419600"/>
+            <a:ext cx="1143000" cy="685800"/>
+          </a:xfrm>
+          <a:prstGeom prst="ellipse">
+            <a:avLst/>
+          </a:prstGeom>
+          <a:noFill/>
+          <a:ln>
+            <a:solidFill>
+              <a:schemeClr val="accent2"/>
+            </a:solidFill>
+          </a:ln>
+        </p:spPr>
+        <p:style>
+          <a:lnRef idx="2">
+            <a:schemeClr val="accent6"/>
+          </a:lnRef>
+          <a:fillRef idx="1">
+            <a:schemeClr val="lt1"/>
+          </a:fillRef>
+          <a:effectRef idx="0">
+            <a:schemeClr val="accent6"/>
+          </a:effectRef>
+          <a:fontRef idx="minor">
+            <a:schemeClr val="dk1"/>
+          </a:fontRef>
+        </p:style>
+        <p:txBody>
+          <a:bodyPr rtlCol="0" anchor="ctr"/>
+          <a:lstStyle/>
+          <a:p>
+            <a:pPr algn="ctr"/>
+            <a:endParaRPr lang="en-IL"/>
           </a:p>
         </p:txBody>
       </p:sp>
@@ -5563,13 +6188,6 @@
   <p:clrMapOvr>
     <a:masterClrMapping/>
   </p:clrMapOvr>
-  <p:timing>
-    <p:tnLst>
-      <p:par>
-        <p:cTn id="1" dur="indefinite" restart="never" nodeType="tmRoot"/>
-      </p:par>
-    </p:tnLst>
-  </p:timing>
 </p:sld>
 </file>
 
@@ -5686,13 +6304,6 @@
   <p:clrMapOvr>
     <a:masterClrMapping/>
   </p:clrMapOvr>
-  <p:timing>
-    <p:tnLst>
-      <p:par>
-        <p:cTn id="1" dur="indefinite" restart="never" nodeType="tmRoot"/>
-      </p:par>
-    </p:tnLst>
-  </p:timing>
 </p:sld>
 </file>
 
@@ -5804,13 +6415,6 @@
   <p:clrMapOvr>
     <a:masterClrMapping/>
   </p:clrMapOvr>
-  <p:timing>
-    <p:tnLst>
-      <p:par>
-        <p:cTn id="1" dur="indefinite" restart="never" nodeType="tmRoot"/>
-      </p:par>
-    </p:tnLst>
-  </p:timing>
 </p:sld>
 </file>
 
@@ -5979,13 +6583,6 @@
   <p:clrMapOvr>
     <a:masterClrMapping/>
   </p:clrMapOvr>
-  <p:timing>
-    <p:tnLst>
-      <p:par>
-        <p:cTn id="1" dur="indefinite" restart="never" nodeType="tmRoot"/>
-      </p:par>
-    </p:tnLst>
-  </p:timing>
 </p:sld>
 </file>
 
@@ -6037,8 +6634,8 @@
           </a:p>
         </p:txBody>
       </p:sp>
-      <mc:AlternateContent xmlns:mc="http://schemas.openxmlformats.org/markup-compatibility/2006">
-        <mc:Choice xmlns:a14="http://schemas.microsoft.com/office/drawing/2010/main" Requires="a14">
+      <mc:AlternateContent xmlns:mc="http://schemas.openxmlformats.org/markup-compatibility/2006" xmlns:a14="http://schemas.microsoft.com/office/drawing/2010/main">
+        <mc:Choice Requires="a14">
           <p:sp>
             <p:nvSpPr>
               <p:cNvPr id="3" name="Content Placeholder 2"/>
@@ -6057,20 +6654,12 @@
               <a:lstStyle/>
               <a:p>
                 <a:r>
-                  <a:rPr lang="en-US" dirty="0" smtClean="0">
-                    <a:solidFill>
-                      <a:srgbClr val="002060"/>
-                    </a:solidFill>
-                  </a:rPr>
-                  <a:t>MDD (TODO) </a:t>
-                </a:r>
-                <a:r>
                   <a:rPr lang="en-US" dirty="0">
                     <a:solidFill>
                       <a:srgbClr val="002060"/>
                     </a:solidFill>
                   </a:rPr>
-                  <a:t>– also known as depression - is estimated to affect </a:t>
+                  <a:t>MDD (TODO) – also known as depression - is estimated to affect </a:t>
                 </a:r>
                 <a14:m>
                   <m:oMath xmlns:m="http://schemas.openxmlformats.org/officeDocument/2006/math">
@@ -6142,7 +6731,7 @@
             </p:txBody>
           </p:sp>
         </mc:Choice>
-        <mc:Fallback>
+        <mc:Fallback xmlns="">
           <p:sp>
             <p:nvSpPr>
               <p:cNvPr id="3" name="Content Placeholder 2"/>
@@ -6210,13 +6799,6 @@
   <p:clrMapOvr>
     <a:masterClrMapping/>
   </p:clrMapOvr>
-  <p:timing>
-    <p:tnLst>
-      <p:par>
-        <p:cTn id="1" dur="indefinite" restart="never" nodeType="tmRoot"/>
-      </p:par>
-    </p:tnLst>
-  </p:timing>
 </p:sld>
 </file>
 
@@ -6384,13 +6966,6 @@
   <p:clrMapOvr>
     <a:masterClrMapping/>
   </p:clrMapOvr>
-  <p:timing>
-    <p:tnLst>
-      <p:par>
-        <p:cTn id="1" dur="indefinite" restart="never" nodeType="tmRoot"/>
-      </p:par>
-    </p:tnLst>
-  </p:timing>
 </p:sld>
 </file>
 
@@ -6530,13 +7105,6 @@
   <p:clrMapOvr>
     <a:masterClrMapping/>
   </p:clrMapOvr>
-  <p:timing>
-    <p:tnLst>
-      <p:par>
-        <p:cTn id="1" dur="indefinite" restart="never" nodeType="tmRoot"/>
-      </p:par>
-    </p:tnLst>
-  </p:timing>
 </p:sld>
 </file>
 
@@ -7293,13 +7861,6 @@
   <p:clrMapOvr>
     <a:masterClrMapping/>
   </p:clrMapOvr>
-  <p:timing>
-    <p:tnLst>
-      <p:par>
-        <p:cTn id="1" dur="indefinite" restart="never" nodeType="tmRoot"/>
-      </p:par>
-    </p:tnLst>
-  </p:timing>
 </p:sld>
 </file>
 
@@ -7421,13 +7982,6 @@
   <p:clrMapOvr>
     <a:masterClrMapping/>
   </p:clrMapOvr>
-  <p:timing>
-    <p:tnLst>
-      <p:par>
-        <p:cTn id="1" dur="indefinite" restart="never" nodeType="tmRoot"/>
-      </p:par>
-    </p:tnLst>
-  </p:timing>
 </p:sld>
 </file>
 
@@ -7549,13 +8103,6 @@
   <p:clrMapOvr>
     <a:masterClrMapping/>
   </p:clrMapOvr>
-  <p:timing>
-    <p:tnLst>
-      <p:par>
-        <p:cTn id="1" dur="indefinite" restart="never" nodeType="tmRoot"/>
-      </p:par>
-    </p:tnLst>
-  </p:timing>
 </p:sld>
 </file>
 
@@ -7645,15 +8192,7 @@
           <a:p>
             <a:r>
               <a:rPr lang="en-US" dirty="0"/>
-              <a:t>Non linear </a:t>
-            </a:r>
-            <a:r>
-              <a:rPr lang="en-US" dirty="0" smtClean="0"/>
-              <a:t>dimensionality </a:t>
-            </a:r>
-            <a:r>
-              <a:rPr lang="en-US" dirty="0"/>
-              <a:t>reduction</a:t>
+              <a:t>Non linear dimensionality reduction</a:t>
             </a:r>
           </a:p>
           <a:p>
@@ -7701,13 +8240,6 @@
   <p:clrMapOvr>
     <a:masterClrMapping/>
   </p:clrMapOvr>
-  <p:timing>
-    <p:tnLst>
-      <p:par>
-        <p:cTn id="1" dur="indefinite" restart="never" nodeType="tmRoot"/>
-      </p:par>
-    </p:tnLst>
-  </p:timing>
 </p:sld>
 </file>
 

</xml_diff>

<commit_message>
More updates - Animations
</commit_message>
<xml_diff>
--- a/Project_Midterm_Presentation.pptx
+++ b/Project_Midterm_Presentation.pptx
@@ -2907,6 +2907,18 @@
   <p:clrMapOvr>
     <a:masterClrMapping/>
   </p:clrMapOvr>
+  <mc:AlternateContent xmlns:mc="http://schemas.openxmlformats.org/markup-compatibility/2006">
+    <mc:Choice xmlns:p14="http://schemas.microsoft.com/office/powerpoint/2010/main" Requires="p14">
+      <p:transition spd="slow" p14:dur="2000">
+        <p14:ferris dir="l"/>
+      </p:transition>
+    </mc:Choice>
+    <mc:Fallback>
+      <p:transition spd="slow">
+        <p:fade/>
+      </p:transition>
+    </mc:Fallback>
+  </mc:AlternateContent>
 </p:sld>
 </file>
 
@@ -3063,6 +3075,284 @@
   <p:clrMapOvr>
     <a:masterClrMapping/>
   </p:clrMapOvr>
+  <p:timing>
+    <p:tnLst>
+      <p:par>
+        <p:cTn id="1" dur="indefinite" restart="never" nodeType="tmRoot">
+          <p:childTnLst>
+            <p:seq concurrent="1" nextAc="seek">
+              <p:cTn id="2" dur="indefinite" nodeType="mainSeq">
+                <p:childTnLst>
+                  <p:par>
+                    <p:cTn id="3" fill="hold">
+                      <p:stCondLst>
+                        <p:cond delay="indefinite"/>
+                      </p:stCondLst>
+                      <p:childTnLst>
+                        <p:par>
+                          <p:cTn id="4" fill="hold">
+                            <p:stCondLst>
+                              <p:cond delay="0"/>
+                            </p:stCondLst>
+                            <p:childTnLst>
+                              <p:par>
+                                <p:cTn id="5" presetID="1" presetClass="entr" presetSubtype="0" fill="hold" grpId="0" nodeType="clickEffect">
+                                  <p:stCondLst>
+                                    <p:cond delay="0"/>
+                                  </p:stCondLst>
+                                  <p:childTnLst>
+                                    <p:set>
+                                      <p:cBhvr>
+                                        <p:cTn id="6" dur="1" fill="hold">
+                                          <p:stCondLst>
+                                            <p:cond delay="0"/>
+                                          </p:stCondLst>
+                                        </p:cTn>
+                                        <p:tgtEl>
+                                          <p:spTgt spid="3">
+                                            <p:txEl>
+                                              <p:pRg st="0" end="0"/>
+                                            </p:txEl>
+                                          </p:spTgt>
+                                        </p:tgtEl>
+                                        <p:attrNameLst>
+                                          <p:attrName>style.visibility</p:attrName>
+                                        </p:attrNameLst>
+                                      </p:cBhvr>
+                                      <p:to>
+                                        <p:strVal val="visible"/>
+                                      </p:to>
+                                    </p:set>
+                                  </p:childTnLst>
+                                </p:cTn>
+                              </p:par>
+                            </p:childTnLst>
+                          </p:cTn>
+                        </p:par>
+                      </p:childTnLst>
+                    </p:cTn>
+                  </p:par>
+                  <p:par>
+                    <p:cTn id="7" fill="hold">
+                      <p:stCondLst>
+                        <p:cond delay="indefinite"/>
+                      </p:stCondLst>
+                      <p:childTnLst>
+                        <p:par>
+                          <p:cTn id="8" fill="hold">
+                            <p:stCondLst>
+                              <p:cond delay="0"/>
+                            </p:stCondLst>
+                            <p:childTnLst>
+                              <p:par>
+                                <p:cTn id="9" presetID="1" presetClass="entr" presetSubtype="0" fill="hold" grpId="0" nodeType="clickEffect">
+                                  <p:stCondLst>
+                                    <p:cond delay="0"/>
+                                  </p:stCondLst>
+                                  <p:childTnLst>
+                                    <p:set>
+                                      <p:cBhvr>
+                                        <p:cTn id="10" dur="1" fill="hold">
+                                          <p:stCondLst>
+                                            <p:cond delay="0"/>
+                                          </p:stCondLst>
+                                        </p:cTn>
+                                        <p:tgtEl>
+                                          <p:spTgt spid="3">
+                                            <p:txEl>
+                                              <p:pRg st="1" end="1"/>
+                                            </p:txEl>
+                                          </p:spTgt>
+                                        </p:tgtEl>
+                                        <p:attrNameLst>
+                                          <p:attrName>style.visibility</p:attrName>
+                                        </p:attrNameLst>
+                                      </p:cBhvr>
+                                      <p:to>
+                                        <p:strVal val="visible"/>
+                                      </p:to>
+                                    </p:set>
+                                  </p:childTnLst>
+                                </p:cTn>
+                              </p:par>
+                            </p:childTnLst>
+                          </p:cTn>
+                        </p:par>
+                      </p:childTnLst>
+                    </p:cTn>
+                  </p:par>
+                  <p:par>
+                    <p:cTn id="11" fill="hold">
+                      <p:stCondLst>
+                        <p:cond delay="indefinite"/>
+                      </p:stCondLst>
+                      <p:childTnLst>
+                        <p:par>
+                          <p:cTn id="12" fill="hold">
+                            <p:stCondLst>
+                              <p:cond delay="0"/>
+                            </p:stCondLst>
+                            <p:childTnLst>
+                              <p:par>
+                                <p:cTn id="13" presetID="1" presetClass="entr" presetSubtype="0" fill="hold" grpId="0" nodeType="clickEffect">
+                                  <p:stCondLst>
+                                    <p:cond delay="0"/>
+                                  </p:stCondLst>
+                                  <p:childTnLst>
+                                    <p:set>
+                                      <p:cBhvr>
+                                        <p:cTn id="14" dur="1" fill="hold">
+                                          <p:stCondLst>
+                                            <p:cond delay="0"/>
+                                          </p:stCondLst>
+                                        </p:cTn>
+                                        <p:tgtEl>
+                                          <p:spTgt spid="3">
+                                            <p:txEl>
+                                              <p:pRg st="2" end="2"/>
+                                            </p:txEl>
+                                          </p:spTgt>
+                                        </p:tgtEl>
+                                        <p:attrNameLst>
+                                          <p:attrName>style.visibility</p:attrName>
+                                        </p:attrNameLst>
+                                      </p:cBhvr>
+                                      <p:to>
+                                        <p:strVal val="visible"/>
+                                      </p:to>
+                                    </p:set>
+                                  </p:childTnLst>
+                                </p:cTn>
+                              </p:par>
+                            </p:childTnLst>
+                          </p:cTn>
+                        </p:par>
+                      </p:childTnLst>
+                    </p:cTn>
+                  </p:par>
+                  <p:par>
+                    <p:cTn id="15" fill="hold">
+                      <p:stCondLst>
+                        <p:cond delay="indefinite"/>
+                      </p:stCondLst>
+                      <p:childTnLst>
+                        <p:par>
+                          <p:cTn id="16" fill="hold">
+                            <p:stCondLst>
+                              <p:cond delay="0"/>
+                            </p:stCondLst>
+                            <p:childTnLst>
+                              <p:par>
+                                <p:cTn id="17" presetID="1" presetClass="entr" presetSubtype="0" fill="hold" grpId="0" nodeType="clickEffect">
+                                  <p:stCondLst>
+                                    <p:cond delay="0"/>
+                                  </p:stCondLst>
+                                  <p:childTnLst>
+                                    <p:set>
+                                      <p:cBhvr>
+                                        <p:cTn id="18" dur="1" fill="hold">
+                                          <p:stCondLst>
+                                            <p:cond delay="0"/>
+                                          </p:stCondLst>
+                                        </p:cTn>
+                                        <p:tgtEl>
+                                          <p:spTgt spid="3">
+                                            <p:txEl>
+                                              <p:pRg st="3" end="3"/>
+                                            </p:txEl>
+                                          </p:spTgt>
+                                        </p:tgtEl>
+                                        <p:attrNameLst>
+                                          <p:attrName>style.visibility</p:attrName>
+                                        </p:attrNameLst>
+                                      </p:cBhvr>
+                                      <p:to>
+                                        <p:strVal val="visible"/>
+                                      </p:to>
+                                    </p:set>
+                                  </p:childTnLst>
+                                </p:cTn>
+                              </p:par>
+                            </p:childTnLst>
+                          </p:cTn>
+                        </p:par>
+                      </p:childTnLst>
+                    </p:cTn>
+                  </p:par>
+                  <p:par>
+                    <p:cTn id="19" fill="hold">
+                      <p:stCondLst>
+                        <p:cond delay="indefinite"/>
+                      </p:stCondLst>
+                      <p:childTnLst>
+                        <p:par>
+                          <p:cTn id="20" fill="hold">
+                            <p:stCondLst>
+                              <p:cond delay="0"/>
+                            </p:stCondLst>
+                            <p:childTnLst>
+                              <p:par>
+                                <p:cTn id="21" presetID="1" presetClass="entr" presetSubtype="0" fill="hold" grpId="0" nodeType="clickEffect">
+                                  <p:stCondLst>
+                                    <p:cond delay="0"/>
+                                  </p:stCondLst>
+                                  <p:childTnLst>
+                                    <p:set>
+                                      <p:cBhvr>
+                                        <p:cTn id="22" dur="1" fill="hold">
+                                          <p:stCondLst>
+                                            <p:cond delay="0"/>
+                                          </p:stCondLst>
+                                        </p:cTn>
+                                        <p:tgtEl>
+                                          <p:spTgt spid="3">
+                                            <p:txEl>
+                                              <p:pRg st="4" end="4"/>
+                                            </p:txEl>
+                                          </p:spTgt>
+                                        </p:tgtEl>
+                                        <p:attrNameLst>
+                                          <p:attrName>style.visibility</p:attrName>
+                                        </p:attrNameLst>
+                                      </p:cBhvr>
+                                      <p:to>
+                                        <p:strVal val="visible"/>
+                                      </p:to>
+                                    </p:set>
+                                  </p:childTnLst>
+                                </p:cTn>
+                              </p:par>
+                            </p:childTnLst>
+                          </p:cTn>
+                        </p:par>
+                      </p:childTnLst>
+                    </p:cTn>
+                  </p:par>
+                </p:childTnLst>
+              </p:cTn>
+              <p:prevCondLst>
+                <p:cond evt="onPrev" delay="0">
+                  <p:tgtEl>
+                    <p:sldTgt/>
+                  </p:tgtEl>
+                </p:cond>
+              </p:prevCondLst>
+              <p:nextCondLst>
+                <p:cond evt="onNext" delay="0">
+                  <p:tgtEl>
+                    <p:sldTgt/>
+                  </p:tgtEl>
+                </p:cond>
+              </p:nextCondLst>
+            </p:seq>
+          </p:childTnLst>
+        </p:cTn>
+      </p:par>
+    </p:tnLst>
+    <p:bldLst>
+      <p:bldP spid="3" grpId="0" build="p"/>
+    </p:bldLst>
+  </p:timing>
 </p:sld>
 </file>
 
@@ -3256,6 +3546,378 @@
   <p:clrMapOvr>
     <a:masterClrMapping/>
   </p:clrMapOvr>
+  <p:timing>
+    <p:tnLst>
+      <p:par>
+        <p:cTn id="1" dur="indefinite" restart="never" nodeType="tmRoot">
+          <p:childTnLst>
+            <p:seq concurrent="1" nextAc="seek">
+              <p:cTn id="2" dur="indefinite" nodeType="mainSeq">
+                <p:childTnLst>
+                  <p:par>
+                    <p:cTn id="3" fill="hold">
+                      <p:stCondLst>
+                        <p:cond delay="indefinite"/>
+                      </p:stCondLst>
+                      <p:childTnLst>
+                        <p:par>
+                          <p:cTn id="4" fill="hold">
+                            <p:stCondLst>
+                              <p:cond delay="0"/>
+                            </p:stCondLst>
+                            <p:childTnLst>
+                              <p:par>
+                                <p:cTn id="5" presetID="1" presetClass="entr" presetSubtype="0" fill="hold" grpId="0" nodeType="clickEffect">
+                                  <p:stCondLst>
+                                    <p:cond delay="0"/>
+                                  </p:stCondLst>
+                                  <p:childTnLst>
+                                    <p:set>
+                                      <p:cBhvr>
+                                        <p:cTn id="6" dur="1" fill="hold">
+                                          <p:stCondLst>
+                                            <p:cond delay="0"/>
+                                          </p:stCondLst>
+                                        </p:cTn>
+                                        <p:tgtEl>
+                                          <p:spTgt spid="18">
+                                            <p:txEl>
+                                              <p:pRg st="0" end="0"/>
+                                            </p:txEl>
+                                          </p:spTgt>
+                                        </p:tgtEl>
+                                        <p:attrNameLst>
+                                          <p:attrName>style.visibility</p:attrName>
+                                        </p:attrNameLst>
+                                      </p:cBhvr>
+                                      <p:to>
+                                        <p:strVal val="visible"/>
+                                      </p:to>
+                                    </p:set>
+                                  </p:childTnLst>
+                                </p:cTn>
+                              </p:par>
+                            </p:childTnLst>
+                          </p:cTn>
+                        </p:par>
+                      </p:childTnLst>
+                    </p:cTn>
+                  </p:par>
+                  <p:par>
+                    <p:cTn id="7" fill="hold">
+                      <p:stCondLst>
+                        <p:cond delay="indefinite"/>
+                      </p:stCondLst>
+                      <p:childTnLst>
+                        <p:par>
+                          <p:cTn id="8" fill="hold">
+                            <p:stCondLst>
+                              <p:cond delay="0"/>
+                            </p:stCondLst>
+                            <p:childTnLst>
+                              <p:par>
+                                <p:cTn id="9" presetID="1" presetClass="entr" presetSubtype="0" fill="hold" grpId="0" nodeType="clickEffect">
+                                  <p:stCondLst>
+                                    <p:cond delay="0"/>
+                                  </p:stCondLst>
+                                  <p:childTnLst>
+                                    <p:set>
+                                      <p:cBhvr>
+                                        <p:cTn id="10" dur="1" fill="hold">
+                                          <p:stCondLst>
+                                            <p:cond delay="0"/>
+                                          </p:stCondLst>
+                                        </p:cTn>
+                                        <p:tgtEl>
+                                          <p:spTgt spid="18">
+                                            <p:txEl>
+                                              <p:pRg st="1" end="1"/>
+                                            </p:txEl>
+                                          </p:spTgt>
+                                        </p:tgtEl>
+                                        <p:attrNameLst>
+                                          <p:attrName>style.visibility</p:attrName>
+                                        </p:attrNameLst>
+                                      </p:cBhvr>
+                                      <p:to>
+                                        <p:strVal val="visible"/>
+                                      </p:to>
+                                    </p:set>
+                                  </p:childTnLst>
+                                </p:cTn>
+                              </p:par>
+                            </p:childTnLst>
+                          </p:cTn>
+                        </p:par>
+                      </p:childTnLst>
+                    </p:cTn>
+                  </p:par>
+                  <p:par>
+                    <p:cTn id="11" fill="hold">
+                      <p:stCondLst>
+                        <p:cond delay="indefinite"/>
+                      </p:stCondLst>
+                      <p:childTnLst>
+                        <p:par>
+                          <p:cTn id="12" fill="hold">
+                            <p:stCondLst>
+                              <p:cond delay="0"/>
+                            </p:stCondLst>
+                            <p:childTnLst>
+                              <p:par>
+                                <p:cTn id="13" presetID="1" presetClass="entr" presetSubtype="0" fill="hold" grpId="0" nodeType="clickEffect">
+                                  <p:stCondLst>
+                                    <p:cond delay="0"/>
+                                  </p:stCondLst>
+                                  <p:childTnLst>
+                                    <p:set>
+                                      <p:cBhvr>
+                                        <p:cTn id="14" dur="1" fill="hold">
+                                          <p:stCondLst>
+                                            <p:cond delay="0"/>
+                                          </p:stCondLst>
+                                        </p:cTn>
+                                        <p:tgtEl>
+                                          <p:spTgt spid="18">
+                                            <p:txEl>
+                                              <p:pRg st="2" end="2"/>
+                                            </p:txEl>
+                                          </p:spTgt>
+                                        </p:tgtEl>
+                                        <p:attrNameLst>
+                                          <p:attrName>style.visibility</p:attrName>
+                                        </p:attrNameLst>
+                                      </p:cBhvr>
+                                      <p:to>
+                                        <p:strVal val="visible"/>
+                                      </p:to>
+                                    </p:set>
+                                  </p:childTnLst>
+                                </p:cTn>
+                              </p:par>
+                            </p:childTnLst>
+                          </p:cTn>
+                        </p:par>
+                      </p:childTnLst>
+                    </p:cTn>
+                  </p:par>
+                  <p:par>
+                    <p:cTn id="15" fill="hold">
+                      <p:stCondLst>
+                        <p:cond delay="indefinite"/>
+                      </p:stCondLst>
+                      <p:childTnLst>
+                        <p:par>
+                          <p:cTn id="16" fill="hold">
+                            <p:stCondLst>
+                              <p:cond delay="0"/>
+                            </p:stCondLst>
+                            <p:childTnLst>
+                              <p:par>
+                                <p:cTn id="17" presetID="1" presetClass="entr" presetSubtype="0" fill="hold" grpId="0" nodeType="clickEffect">
+                                  <p:stCondLst>
+                                    <p:cond delay="0"/>
+                                  </p:stCondLst>
+                                  <p:childTnLst>
+                                    <p:set>
+                                      <p:cBhvr>
+                                        <p:cTn id="18" dur="1" fill="hold">
+                                          <p:stCondLst>
+                                            <p:cond delay="0"/>
+                                          </p:stCondLst>
+                                        </p:cTn>
+                                        <p:tgtEl>
+                                          <p:spTgt spid="18">
+                                            <p:txEl>
+                                              <p:pRg st="3" end="3"/>
+                                            </p:txEl>
+                                          </p:spTgt>
+                                        </p:tgtEl>
+                                        <p:attrNameLst>
+                                          <p:attrName>style.visibility</p:attrName>
+                                        </p:attrNameLst>
+                                      </p:cBhvr>
+                                      <p:to>
+                                        <p:strVal val="visible"/>
+                                      </p:to>
+                                    </p:set>
+                                  </p:childTnLst>
+                                </p:cTn>
+                              </p:par>
+                            </p:childTnLst>
+                          </p:cTn>
+                        </p:par>
+                      </p:childTnLst>
+                    </p:cTn>
+                  </p:par>
+                  <p:par>
+                    <p:cTn id="19" fill="hold">
+                      <p:stCondLst>
+                        <p:cond delay="indefinite"/>
+                      </p:stCondLst>
+                      <p:childTnLst>
+                        <p:par>
+                          <p:cTn id="20" fill="hold">
+                            <p:stCondLst>
+                              <p:cond delay="0"/>
+                            </p:stCondLst>
+                            <p:childTnLst>
+                              <p:par>
+                                <p:cTn id="21" presetID="1" presetClass="entr" presetSubtype="0" fill="hold" grpId="0" nodeType="clickEffect">
+                                  <p:stCondLst>
+                                    <p:cond delay="0"/>
+                                  </p:stCondLst>
+                                  <p:childTnLst>
+                                    <p:set>
+                                      <p:cBhvr>
+                                        <p:cTn id="22" dur="1" fill="hold">
+                                          <p:stCondLst>
+                                            <p:cond delay="0"/>
+                                          </p:stCondLst>
+                                        </p:cTn>
+                                        <p:tgtEl>
+                                          <p:spTgt spid="18">
+                                            <p:txEl>
+                                              <p:pRg st="4" end="4"/>
+                                            </p:txEl>
+                                          </p:spTgt>
+                                        </p:tgtEl>
+                                        <p:attrNameLst>
+                                          <p:attrName>style.visibility</p:attrName>
+                                        </p:attrNameLst>
+                                      </p:cBhvr>
+                                      <p:to>
+                                        <p:strVal val="visible"/>
+                                      </p:to>
+                                    </p:set>
+                                  </p:childTnLst>
+                                </p:cTn>
+                              </p:par>
+                            </p:childTnLst>
+                          </p:cTn>
+                        </p:par>
+                      </p:childTnLst>
+                    </p:cTn>
+                  </p:par>
+                  <p:par>
+                    <p:cTn id="23" fill="hold">
+                      <p:stCondLst>
+                        <p:cond delay="indefinite"/>
+                      </p:stCondLst>
+                      <p:childTnLst>
+                        <p:par>
+                          <p:cTn id="24" fill="hold">
+                            <p:stCondLst>
+                              <p:cond delay="0"/>
+                            </p:stCondLst>
+                            <p:childTnLst>
+                              <p:par>
+                                <p:cTn id="25" presetID="1" presetClass="entr" presetSubtype="0" fill="hold" grpId="0" nodeType="clickEffect">
+                                  <p:stCondLst>
+                                    <p:cond delay="0"/>
+                                  </p:stCondLst>
+                                  <p:childTnLst>
+                                    <p:set>
+                                      <p:cBhvr>
+                                        <p:cTn id="26" dur="1" fill="hold">
+                                          <p:stCondLst>
+                                            <p:cond delay="0"/>
+                                          </p:stCondLst>
+                                        </p:cTn>
+                                        <p:tgtEl>
+                                          <p:spTgt spid="18">
+                                            <p:txEl>
+                                              <p:pRg st="5" end="5"/>
+                                            </p:txEl>
+                                          </p:spTgt>
+                                        </p:tgtEl>
+                                        <p:attrNameLst>
+                                          <p:attrName>style.visibility</p:attrName>
+                                        </p:attrNameLst>
+                                      </p:cBhvr>
+                                      <p:to>
+                                        <p:strVal val="visible"/>
+                                      </p:to>
+                                    </p:set>
+                                  </p:childTnLst>
+                                </p:cTn>
+                              </p:par>
+                            </p:childTnLst>
+                          </p:cTn>
+                        </p:par>
+                      </p:childTnLst>
+                    </p:cTn>
+                  </p:par>
+                  <p:par>
+                    <p:cTn id="27" fill="hold">
+                      <p:stCondLst>
+                        <p:cond delay="indefinite"/>
+                      </p:stCondLst>
+                      <p:childTnLst>
+                        <p:par>
+                          <p:cTn id="28" fill="hold">
+                            <p:stCondLst>
+                              <p:cond delay="0"/>
+                            </p:stCondLst>
+                            <p:childTnLst>
+                              <p:par>
+                                <p:cTn id="29" presetID="1" presetClass="entr" presetSubtype="0" fill="hold" nodeType="clickEffect">
+                                  <p:stCondLst>
+                                    <p:cond delay="0"/>
+                                  </p:stCondLst>
+                                  <p:childTnLst>
+                                    <p:set>
+                                      <p:cBhvr>
+                                        <p:cTn id="30" dur="1" fill="hold">
+                                          <p:stCondLst>
+                                            <p:cond delay="0"/>
+                                          </p:stCondLst>
+                                        </p:cTn>
+                                        <p:tgtEl>
+                                          <p:spTgt spid="6"/>
+                                        </p:tgtEl>
+                                        <p:attrNameLst>
+                                          <p:attrName>style.visibility</p:attrName>
+                                        </p:attrNameLst>
+                                      </p:cBhvr>
+                                      <p:to>
+                                        <p:strVal val="visible"/>
+                                      </p:to>
+                                    </p:set>
+                                  </p:childTnLst>
+                                </p:cTn>
+                              </p:par>
+                            </p:childTnLst>
+                          </p:cTn>
+                        </p:par>
+                      </p:childTnLst>
+                    </p:cTn>
+                  </p:par>
+                </p:childTnLst>
+              </p:cTn>
+              <p:prevCondLst>
+                <p:cond evt="onPrev" delay="0">
+                  <p:tgtEl>
+                    <p:sldTgt/>
+                  </p:tgtEl>
+                </p:cond>
+              </p:prevCondLst>
+              <p:nextCondLst>
+                <p:cond evt="onNext" delay="0">
+                  <p:tgtEl>
+                    <p:sldTgt/>
+                  </p:tgtEl>
+                </p:cond>
+              </p:nextCondLst>
+            </p:seq>
+          </p:childTnLst>
+        </p:cTn>
+      </p:par>
+    </p:tnLst>
+    <p:bldLst>
+      <p:bldP spid="18" grpId="0" build="p"/>
+    </p:bldLst>
+  </p:timing>
 </p:sld>
 </file>
 
@@ -3632,6 +4294,374 @@
   <p:clrMapOvr>
     <a:masterClrMapping/>
   </p:clrMapOvr>
+  <p:timing>
+    <p:tnLst>
+      <p:par>
+        <p:cTn id="1" dur="indefinite" restart="never" nodeType="tmRoot">
+          <p:childTnLst>
+            <p:seq concurrent="1" nextAc="seek">
+              <p:cTn id="2" dur="indefinite" nodeType="mainSeq">
+                <p:childTnLst>
+                  <p:par>
+                    <p:cTn id="3" fill="hold">
+                      <p:stCondLst>
+                        <p:cond delay="indefinite"/>
+                      </p:stCondLst>
+                      <p:childTnLst>
+                        <p:par>
+                          <p:cTn id="4" fill="hold">
+                            <p:stCondLst>
+                              <p:cond delay="0"/>
+                            </p:stCondLst>
+                            <p:childTnLst>
+                              <p:par>
+                                <p:cTn id="5" presetID="1" presetClass="entr" presetSubtype="0" fill="hold" grpId="0" nodeType="clickEffect">
+                                  <p:stCondLst>
+                                    <p:cond delay="0"/>
+                                  </p:stCondLst>
+                                  <p:childTnLst>
+                                    <p:set>
+                                      <p:cBhvr>
+                                        <p:cTn id="6" dur="1" fill="hold">
+                                          <p:stCondLst>
+                                            <p:cond delay="0"/>
+                                          </p:stCondLst>
+                                        </p:cTn>
+                                        <p:tgtEl>
+                                          <p:spTgt spid="3">
+                                            <p:txEl>
+                                              <p:pRg st="0" end="0"/>
+                                            </p:txEl>
+                                          </p:spTgt>
+                                        </p:tgtEl>
+                                        <p:attrNameLst>
+                                          <p:attrName>style.visibility</p:attrName>
+                                        </p:attrNameLst>
+                                      </p:cBhvr>
+                                      <p:to>
+                                        <p:strVal val="visible"/>
+                                      </p:to>
+                                    </p:set>
+                                  </p:childTnLst>
+                                </p:cTn>
+                              </p:par>
+                            </p:childTnLst>
+                          </p:cTn>
+                        </p:par>
+                      </p:childTnLst>
+                    </p:cTn>
+                  </p:par>
+                  <p:par>
+                    <p:cTn id="7" fill="hold">
+                      <p:stCondLst>
+                        <p:cond delay="indefinite"/>
+                      </p:stCondLst>
+                      <p:childTnLst>
+                        <p:par>
+                          <p:cTn id="8" fill="hold">
+                            <p:stCondLst>
+                              <p:cond delay="0"/>
+                            </p:stCondLst>
+                            <p:childTnLst>
+                              <p:par>
+                                <p:cTn id="9" presetID="1" presetClass="entr" presetSubtype="0" fill="hold" nodeType="clickEffect">
+                                  <p:stCondLst>
+                                    <p:cond delay="0"/>
+                                  </p:stCondLst>
+                                  <p:childTnLst>
+                                    <p:set>
+                                      <p:cBhvr>
+                                        <p:cTn id="10" dur="1" fill="hold">
+                                          <p:stCondLst>
+                                            <p:cond delay="0"/>
+                                          </p:stCondLst>
+                                        </p:cTn>
+                                        <p:tgtEl>
+                                          <p:spTgt spid="6"/>
+                                        </p:tgtEl>
+                                        <p:attrNameLst>
+                                          <p:attrName>style.visibility</p:attrName>
+                                        </p:attrNameLst>
+                                      </p:cBhvr>
+                                      <p:to>
+                                        <p:strVal val="visible"/>
+                                      </p:to>
+                                    </p:set>
+                                  </p:childTnLst>
+                                </p:cTn>
+                              </p:par>
+                            </p:childTnLst>
+                          </p:cTn>
+                        </p:par>
+                      </p:childTnLst>
+                    </p:cTn>
+                  </p:par>
+                  <p:par>
+                    <p:cTn id="11" fill="hold">
+                      <p:stCondLst>
+                        <p:cond delay="indefinite"/>
+                      </p:stCondLst>
+                      <p:childTnLst>
+                        <p:par>
+                          <p:cTn id="12" fill="hold">
+                            <p:stCondLst>
+                              <p:cond delay="0"/>
+                            </p:stCondLst>
+                            <p:childTnLst>
+                              <p:par>
+                                <p:cTn id="13" presetID="1" presetClass="entr" presetSubtype="0" fill="hold" grpId="0" nodeType="clickEffect">
+                                  <p:stCondLst>
+                                    <p:cond delay="0"/>
+                                  </p:stCondLst>
+                                  <p:childTnLst>
+                                    <p:set>
+                                      <p:cBhvr>
+                                        <p:cTn id="14" dur="1" fill="hold">
+                                          <p:stCondLst>
+                                            <p:cond delay="0"/>
+                                          </p:stCondLst>
+                                        </p:cTn>
+                                        <p:tgtEl>
+                                          <p:spTgt spid="3">
+                                            <p:txEl>
+                                              <p:pRg st="1" end="1"/>
+                                            </p:txEl>
+                                          </p:spTgt>
+                                        </p:tgtEl>
+                                        <p:attrNameLst>
+                                          <p:attrName>style.visibility</p:attrName>
+                                        </p:attrNameLst>
+                                      </p:cBhvr>
+                                      <p:to>
+                                        <p:strVal val="visible"/>
+                                      </p:to>
+                                    </p:set>
+                                  </p:childTnLst>
+                                </p:cTn>
+                              </p:par>
+                            </p:childTnLst>
+                          </p:cTn>
+                        </p:par>
+                      </p:childTnLst>
+                    </p:cTn>
+                  </p:par>
+                  <p:par>
+                    <p:cTn id="15" fill="hold">
+                      <p:stCondLst>
+                        <p:cond delay="indefinite"/>
+                      </p:stCondLst>
+                      <p:childTnLst>
+                        <p:par>
+                          <p:cTn id="16" fill="hold">
+                            <p:stCondLst>
+                              <p:cond delay="0"/>
+                            </p:stCondLst>
+                            <p:childTnLst>
+                              <p:par>
+                                <p:cTn id="17" presetID="1" presetClass="entr" presetSubtype="0" fill="hold" grpId="0" nodeType="clickEffect">
+                                  <p:stCondLst>
+                                    <p:cond delay="0"/>
+                                  </p:stCondLst>
+                                  <p:childTnLst>
+                                    <p:set>
+                                      <p:cBhvr>
+                                        <p:cTn id="18" dur="1" fill="hold">
+                                          <p:stCondLst>
+                                            <p:cond delay="0"/>
+                                          </p:stCondLst>
+                                        </p:cTn>
+                                        <p:tgtEl>
+                                          <p:spTgt spid="3">
+                                            <p:txEl>
+                                              <p:pRg st="2" end="2"/>
+                                            </p:txEl>
+                                          </p:spTgt>
+                                        </p:tgtEl>
+                                        <p:attrNameLst>
+                                          <p:attrName>style.visibility</p:attrName>
+                                        </p:attrNameLst>
+                                      </p:cBhvr>
+                                      <p:to>
+                                        <p:strVal val="visible"/>
+                                      </p:to>
+                                    </p:set>
+                                  </p:childTnLst>
+                                </p:cTn>
+                              </p:par>
+                            </p:childTnLst>
+                          </p:cTn>
+                        </p:par>
+                      </p:childTnLst>
+                    </p:cTn>
+                  </p:par>
+                  <p:par>
+                    <p:cTn id="19" fill="hold">
+                      <p:stCondLst>
+                        <p:cond delay="indefinite"/>
+                      </p:stCondLst>
+                      <p:childTnLst>
+                        <p:par>
+                          <p:cTn id="20" fill="hold">
+                            <p:stCondLst>
+                              <p:cond delay="0"/>
+                            </p:stCondLst>
+                            <p:childTnLst>
+                              <p:par>
+                                <p:cTn id="21" presetID="1" presetClass="entr" presetSubtype="0" fill="hold" grpId="0" nodeType="clickEffect">
+                                  <p:stCondLst>
+                                    <p:cond delay="0"/>
+                                  </p:stCondLst>
+                                  <p:childTnLst>
+                                    <p:set>
+                                      <p:cBhvr>
+                                        <p:cTn id="22" dur="1" fill="hold">
+                                          <p:stCondLst>
+                                            <p:cond delay="0"/>
+                                          </p:stCondLst>
+                                        </p:cTn>
+                                        <p:tgtEl>
+                                          <p:spTgt spid="3">
+                                            <p:txEl>
+                                              <p:pRg st="3" end="3"/>
+                                            </p:txEl>
+                                          </p:spTgt>
+                                        </p:tgtEl>
+                                        <p:attrNameLst>
+                                          <p:attrName>style.visibility</p:attrName>
+                                        </p:attrNameLst>
+                                      </p:cBhvr>
+                                      <p:to>
+                                        <p:strVal val="visible"/>
+                                      </p:to>
+                                    </p:set>
+                                  </p:childTnLst>
+                                </p:cTn>
+                              </p:par>
+                            </p:childTnLst>
+                          </p:cTn>
+                        </p:par>
+                      </p:childTnLst>
+                    </p:cTn>
+                  </p:par>
+                  <p:par>
+                    <p:cTn id="23" fill="hold">
+                      <p:stCondLst>
+                        <p:cond delay="indefinite"/>
+                      </p:stCondLst>
+                      <p:childTnLst>
+                        <p:par>
+                          <p:cTn id="24" fill="hold">
+                            <p:stCondLst>
+                              <p:cond delay="0"/>
+                            </p:stCondLst>
+                            <p:childTnLst>
+                              <p:par>
+                                <p:cTn id="25" presetID="1" presetClass="entr" presetSubtype="0" fill="hold" nodeType="clickEffect">
+                                  <p:stCondLst>
+                                    <p:cond delay="0"/>
+                                  </p:stCondLst>
+                                  <p:childTnLst>
+                                    <p:set>
+                                      <p:cBhvr>
+                                        <p:cTn id="26" dur="1" fill="hold">
+                                          <p:stCondLst>
+                                            <p:cond delay="0"/>
+                                          </p:stCondLst>
+                                        </p:cTn>
+                                        <p:tgtEl>
+                                          <p:spTgt spid="7"/>
+                                        </p:tgtEl>
+                                        <p:attrNameLst>
+                                          <p:attrName>style.visibility</p:attrName>
+                                        </p:attrNameLst>
+                                      </p:cBhvr>
+                                      <p:to>
+                                        <p:strVal val="visible"/>
+                                      </p:to>
+                                    </p:set>
+                                  </p:childTnLst>
+                                </p:cTn>
+                              </p:par>
+                            </p:childTnLst>
+                          </p:cTn>
+                        </p:par>
+                      </p:childTnLst>
+                    </p:cTn>
+                  </p:par>
+                  <p:par>
+                    <p:cTn id="27" fill="hold">
+                      <p:stCondLst>
+                        <p:cond delay="indefinite"/>
+                      </p:stCondLst>
+                      <p:childTnLst>
+                        <p:par>
+                          <p:cTn id="28" fill="hold">
+                            <p:stCondLst>
+                              <p:cond delay="0"/>
+                            </p:stCondLst>
+                            <p:childTnLst>
+                              <p:par>
+                                <p:cTn id="29" presetID="1" presetClass="entr" presetSubtype="0" fill="hold" grpId="0" nodeType="clickEffect">
+                                  <p:stCondLst>
+                                    <p:cond delay="0"/>
+                                  </p:stCondLst>
+                                  <p:childTnLst>
+                                    <p:set>
+                                      <p:cBhvr>
+                                        <p:cTn id="30" dur="1" fill="hold">
+                                          <p:stCondLst>
+                                            <p:cond delay="0"/>
+                                          </p:stCondLst>
+                                        </p:cTn>
+                                        <p:tgtEl>
+                                          <p:spTgt spid="3">
+                                            <p:txEl>
+                                              <p:pRg st="4" end="4"/>
+                                            </p:txEl>
+                                          </p:spTgt>
+                                        </p:tgtEl>
+                                        <p:attrNameLst>
+                                          <p:attrName>style.visibility</p:attrName>
+                                        </p:attrNameLst>
+                                      </p:cBhvr>
+                                      <p:to>
+                                        <p:strVal val="visible"/>
+                                      </p:to>
+                                    </p:set>
+                                  </p:childTnLst>
+                                </p:cTn>
+                              </p:par>
+                            </p:childTnLst>
+                          </p:cTn>
+                        </p:par>
+                      </p:childTnLst>
+                    </p:cTn>
+                  </p:par>
+                </p:childTnLst>
+              </p:cTn>
+              <p:prevCondLst>
+                <p:cond evt="onPrev" delay="0">
+                  <p:tgtEl>
+                    <p:sldTgt/>
+                  </p:tgtEl>
+                </p:cond>
+              </p:prevCondLst>
+              <p:nextCondLst>
+                <p:cond evt="onNext" delay="0">
+                  <p:tgtEl>
+                    <p:sldTgt/>
+                  </p:tgtEl>
+                </p:cond>
+              </p:nextCondLst>
+            </p:seq>
+          </p:childTnLst>
+        </p:cTn>
+      </p:par>
+    </p:tnLst>
+    <p:bldLst>
+      <p:bldP spid="3" grpId="0" uiExpand="1" build="p"/>
+    </p:bldLst>
+  </p:timing>
 </p:sld>
 </file>
 
@@ -4026,6 +5056,284 @@
   <p:clrMapOvr>
     <a:masterClrMapping/>
   </p:clrMapOvr>
+  <p:timing>
+    <p:tnLst>
+      <p:par>
+        <p:cTn id="1" dur="indefinite" restart="never" nodeType="tmRoot">
+          <p:childTnLst>
+            <p:seq concurrent="1" nextAc="seek">
+              <p:cTn id="2" dur="indefinite" nodeType="mainSeq">
+                <p:childTnLst>
+                  <p:par>
+                    <p:cTn id="3" fill="hold">
+                      <p:stCondLst>
+                        <p:cond delay="indefinite"/>
+                      </p:stCondLst>
+                      <p:childTnLst>
+                        <p:par>
+                          <p:cTn id="4" fill="hold">
+                            <p:stCondLst>
+                              <p:cond delay="0"/>
+                            </p:stCondLst>
+                            <p:childTnLst>
+                              <p:par>
+                                <p:cTn id="5" presetID="1" presetClass="entr" presetSubtype="0" fill="hold" grpId="0" nodeType="clickEffect">
+                                  <p:stCondLst>
+                                    <p:cond delay="0"/>
+                                  </p:stCondLst>
+                                  <p:childTnLst>
+                                    <p:set>
+                                      <p:cBhvr>
+                                        <p:cTn id="6" dur="1" fill="hold">
+                                          <p:stCondLst>
+                                            <p:cond delay="0"/>
+                                          </p:stCondLst>
+                                        </p:cTn>
+                                        <p:tgtEl>
+                                          <p:spTgt spid="8">
+                                            <p:txEl>
+                                              <p:pRg st="0" end="0"/>
+                                            </p:txEl>
+                                          </p:spTgt>
+                                        </p:tgtEl>
+                                        <p:attrNameLst>
+                                          <p:attrName>style.visibility</p:attrName>
+                                        </p:attrNameLst>
+                                      </p:cBhvr>
+                                      <p:to>
+                                        <p:strVal val="visible"/>
+                                      </p:to>
+                                    </p:set>
+                                  </p:childTnLst>
+                                </p:cTn>
+                              </p:par>
+                            </p:childTnLst>
+                          </p:cTn>
+                        </p:par>
+                      </p:childTnLst>
+                    </p:cTn>
+                  </p:par>
+                  <p:par>
+                    <p:cTn id="7" fill="hold">
+                      <p:stCondLst>
+                        <p:cond delay="indefinite"/>
+                      </p:stCondLst>
+                      <p:childTnLst>
+                        <p:par>
+                          <p:cTn id="8" fill="hold">
+                            <p:stCondLst>
+                              <p:cond delay="0"/>
+                            </p:stCondLst>
+                            <p:childTnLst>
+                              <p:par>
+                                <p:cTn id="9" presetID="1" presetClass="entr" presetSubtype="0" fill="hold" grpId="0" nodeType="clickEffect">
+                                  <p:stCondLst>
+                                    <p:cond delay="0"/>
+                                  </p:stCondLst>
+                                  <p:childTnLst>
+                                    <p:set>
+                                      <p:cBhvr>
+                                        <p:cTn id="10" dur="1" fill="hold">
+                                          <p:stCondLst>
+                                            <p:cond delay="0"/>
+                                          </p:stCondLst>
+                                        </p:cTn>
+                                        <p:tgtEl>
+                                          <p:spTgt spid="8">
+                                            <p:txEl>
+                                              <p:pRg st="1" end="1"/>
+                                            </p:txEl>
+                                          </p:spTgt>
+                                        </p:tgtEl>
+                                        <p:attrNameLst>
+                                          <p:attrName>style.visibility</p:attrName>
+                                        </p:attrNameLst>
+                                      </p:cBhvr>
+                                      <p:to>
+                                        <p:strVal val="visible"/>
+                                      </p:to>
+                                    </p:set>
+                                  </p:childTnLst>
+                                </p:cTn>
+                              </p:par>
+                            </p:childTnLst>
+                          </p:cTn>
+                        </p:par>
+                      </p:childTnLst>
+                    </p:cTn>
+                  </p:par>
+                  <p:par>
+                    <p:cTn id="11" fill="hold">
+                      <p:stCondLst>
+                        <p:cond delay="indefinite"/>
+                      </p:stCondLst>
+                      <p:childTnLst>
+                        <p:par>
+                          <p:cTn id="12" fill="hold">
+                            <p:stCondLst>
+                              <p:cond delay="0"/>
+                            </p:stCondLst>
+                            <p:childTnLst>
+                              <p:par>
+                                <p:cTn id="13" presetID="1" presetClass="entr" presetSubtype="0" fill="hold" grpId="0" nodeType="clickEffect">
+                                  <p:stCondLst>
+                                    <p:cond delay="0"/>
+                                  </p:stCondLst>
+                                  <p:childTnLst>
+                                    <p:set>
+                                      <p:cBhvr>
+                                        <p:cTn id="14" dur="1" fill="hold">
+                                          <p:stCondLst>
+                                            <p:cond delay="0"/>
+                                          </p:stCondLst>
+                                        </p:cTn>
+                                        <p:tgtEl>
+                                          <p:spTgt spid="8">
+                                            <p:txEl>
+                                              <p:pRg st="2" end="2"/>
+                                            </p:txEl>
+                                          </p:spTgt>
+                                        </p:tgtEl>
+                                        <p:attrNameLst>
+                                          <p:attrName>style.visibility</p:attrName>
+                                        </p:attrNameLst>
+                                      </p:cBhvr>
+                                      <p:to>
+                                        <p:strVal val="visible"/>
+                                      </p:to>
+                                    </p:set>
+                                  </p:childTnLst>
+                                </p:cTn>
+                              </p:par>
+                            </p:childTnLst>
+                          </p:cTn>
+                        </p:par>
+                      </p:childTnLst>
+                    </p:cTn>
+                  </p:par>
+                  <p:par>
+                    <p:cTn id="15" fill="hold">
+                      <p:stCondLst>
+                        <p:cond delay="indefinite"/>
+                      </p:stCondLst>
+                      <p:childTnLst>
+                        <p:par>
+                          <p:cTn id="16" fill="hold">
+                            <p:stCondLst>
+                              <p:cond delay="0"/>
+                            </p:stCondLst>
+                            <p:childTnLst>
+                              <p:par>
+                                <p:cTn id="17" presetID="1" presetClass="entr" presetSubtype="0" fill="hold" nodeType="clickEffect">
+                                  <p:stCondLst>
+                                    <p:cond delay="0"/>
+                                  </p:stCondLst>
+                                  <p:childTnLst>
+                                    <p:set>
+                                      <p:cBhvr>
+                                        <p:cTn id="18" dur="1" fill="hold">
+                                          <p:stCondLst>
+                                            <p:cond delay="0"/>
+                                          </p:stCondLst>
+                                        </p:cTn>
+                                        <p:tgtEl>
+                                          <p:spTgt spid="8">
+                                            <p:txEl>
+                                              <p:pRg st="3" end="3"/>
+                                            </p:txEl>
+                                          </p:spTgt>
+                                        </p:tgtEl>
+                                        <p:attrNameLst>
+                                          <p:attrName>style.visibility</p:attrName>
+                                        </p:attrNameLst>
+                                      </p:cBhvr>
+                                      <p:to>
+                                        <p:strVal val="visible"/>
+                                      </p:to>
+                                    </p:set>
+                                  </p:childTnLst>
+                                </p:cTn>
+                              </p:par>
+                            </p:childTnLst>
+                          </p:cTn>
+                        </p:par>
+                      </p:childTnLst>
+                    </p:cTn>
+                  </p:par>
+                  <p:par>
+                    <p:cTn id="19" fill="hold">
+                      <p:stCondLst>
+                        <p:cond delay="indefinite"/>
+                      </p:stCondLst>
+                      <p:childTnLst>
+                        <p:par>
+                          <p:cTn id="20" fill="hold">
+                            <p:stCondLst>
+                              <p:cond delay="0"/>
+                            </p:stCondLst>
+                            <p:childTnLst>
+                              <p:par>
+                                <p:cTn id="21" presetID="1" presetClass="entr" presetSubtype="0" fill="hold" nodeType="clickEffect">
+                                  <p:stCondLst>
+                                    <p:cond delay="0"/>
+                                  </p:stCondLst>
+                                  <p:childTnLst>
+                                    <p:set>
+                                      <p:cBhvr>
+                                        <p:cTn id="22" dur="1" fill="hold">
+                                          <p:stCondLst>
+                                            <p:cond delay="0"/>
+                                          </p:stCondLst>
+                                        </p:cTn>
+                                        <p:tgtEl>
+                                          <p:spTgt spid="8">
+                                            <p:txEl>
+                                              <p:pRg st="4" end="4"/>
+                                            </p:txEl>
+                                          </p:spTgt>
+                                        </p:tgtEl>
+                                        <p:attrNameLst>
+                                          <p:attrName>style.visibility</p:attrName>
+                                        </p:attrNameLst>
+                                      </p:cBhvr>
+                                      <p:to>
+                                        <p:strVal val="visible"/>
+                                      </p:to>
+                                    </p:set>
+                                  </p:childTnLst>
+                                </p:cTn>
+                              </p:par>
+                            </p:childTnLst>
+                          </p:cTn>
+                        </p:par>
+                      </p:childTnLst>
+                    </p:cTn>
+                  </p:par>
+                </p:childTnLst>
+              </p:cTn>
+              <p:prevCondLst>
+                <p:cond evt="onPrev" delay="0">
+                  <p:tgtEl>
+                    <p:sldTgt/>
+                  </p:tgtEl>
+                </p:cond>
+              </p:prevCondLst>
+              <p:nextCondLst>
+                <p:cond evt="onNext" delay="0">
+                  <p:tgtEl>
+                    <p:sldTgt/>
+                  </p:tgtEl>
+                </p:cond>
+              </p:nextCondLst>
+            </p:seq>
+          </p:childTnLst>
+        </p:cTn>
+      </p:par>
+    </p:tnLst>
+    <p:bldLst>
+      <p:bldP spid="8" grpId="0" uiExpand="1" build="p"/>
+    </p:bldLst>
+  </p:timing>
 </p:sld>
 </file>
 
@@ -4191,6 +5499,231 @@
   <p:clrMapOvr>
     <a:masterClrMapping/>
   </p:clrMapOvr>
+  <p:timing>
+    <p:tnLst>
+      <p:par>
+        <p:cTn id="1" dur="indefinite" restart="never" nodeType="tmRoot">
+          <p:childTnLst>
+            <p:seq concurrent="1" nextAc="seek">
+              <p:cTn id="2" dur="indefinite" nodeType="mainSeq">
+                <p:childTnLst>
+                  <p:par>
+                    <p:cTn id="3" fill="hold">
+                      <p:stCondLst>
+                        <p:cond delay="indefinite"/>
+                      </p:stCondLst>
+                      <p:childTnLst>
+                        <p:par>
+                          <p:cTn id="4" fill="hold">
+                            <p:stCondLst>
+                              <p:cond delay="0"/>
+                            </p:stCondLst>
+                            <p:childTnLst>
+                              <p:par>
+                                <p:cTn id="5" presetID="1" presetClass="entr" presetSubtype="0" fill="hold" grpId="0" nodeType="clickEffect">
+                                  <p:stCondLst>
+                                    <p:cond delay="0"/>
+                                  </p:stCondLst>
+                                  <p:childTnLst>
+                                    <p:set>
+                                      <p:cBhvr>
+                                        <p:cTn id="6" dur="1" fill="hold">
+                                          <p:stCondLst>
+                                            <p:cond delay="0"/>
+                                          </p:stCondLst>
+                                        </p:cTn>
+                                        <p:tgtEl>
+                                          <p:spTgt spid="14">
+                                            <p:txEl>
+                                              <p:pRg st="0" end="0"/>
+                                            </p:txEl>
+                                          </p:spTgt>
+                                        </p:tgtEl>
+                                        <p:attrNameLst>
+                                          <p:attrName>style.visibility</p:attrName>
+                                        </p:attrNameLst>
+                                      </p:cBhvr>
+                                      <p:to>
+                                        <p:strVal val="visible"/>
+                                      </p:to>
+                                    </p:set>
+                                  </p:childTnLst>
+                                </p:cTn>
+                              </p:par>
+                            </p:childTnLst>
+                          </p:cTn>
+                        </p:par>
+                      </p:childTnLst>
+                    </p:cTn>
+                  </p:par>
+                  <p:par>
+                    <p:cTn id="7" fill="hold">
+                      <p:stCondLst>
+                        <p:cond delay="indefinite"/>
+                      </p:stCondLst>
+                      <p:childTnLst>
+                        <p:par>
+                          <p:cTn id="8" fill="hold">
+                            <p:stCondLst>
+                              <p:cond delay="0"/>
+                            </p:stCondLst>
+                            <p:childTnLst>
+                              <p:par>
+                                <p:cTn id="9" presetID="1" presetClass="entr" presetSubtype="0" fill="hold" grpId="0" nodeType="clickEffect">
+                                  <p:stCondLst>
+                                    <p:cond delay="0"/>
+                                  </p:stCondLst>
+                                  <p:childTnLst>
+                                    <p:set>
+                                      <p:cBhvr>
+                                        <p:cTn id="10" dur="1" fill="hold">
+                                          <p:stCondLst>
+                                            <p:cond delay="0"/>
+                                          </p:stCondLst>
+                                        </p:cTn>
+                                        <p:tgtEl>
+                                          <p:spTgt spid="14">
+                                            <p:txEl>
+                                              <p:pRg st="1" end="1"/>
+                                            </p:txEl>
+                                          </p:spTgt>
+                                        </p:tgtEl>
+                                        <p:attrNameLst>
+                                          <p:attrName>style.visibility</p:attrName>
+                                        </p:attrNameLst>
+                                      </p:cBhvr>
+                                      <p:to>
+                                        <p:strVal val="visible"/>
+                                      </p:to>
+                                    </p:set>
+                                  </p:childTnLst>
+                                </p:cTn>
+                              </p:par>
+                            </p:childTnLst>
+                          </p:cTn>
+                        </p:par>
+                      </p:childTnLst>
+                    </p:cTn>
+                  </p:par>
+                  <p:par>
+                    <p:cTn id="11" fill="hold">
+                      <p:stCondLst>
+                        <p:cond delay="indefinite"/>
+                      </p:stCondLst>
+                      <p:childTnLst>
+                        <p:par>
+                          <p:cTn id="12" fill="hold">
+                            <p:stCondLst>
+                              <p:cond delay="0"/>
+                            </p:stCondLst>
+                            <p:childTnLst>
+                              <p:par>
+                                <p:cTn id="13" presetID="1" presetClass="entr" presetSubtype="0" fill="hold" grpId="0" nodeType="clickEffect">
+                                  <p:stCondLst>
+                                    <p:cond delay="0"/>
+                                  </p:stCondLst>
+                                  <p:childTnLst>
+                                    <p:set>
+                                      <p:cBhvr>
+                                        <p:cTn id="14" dur="1" fill="hold">
+                                          <p:stCondLst>
+                                            <p:cond delay="0"/>
+                                          </p:stCondLst>
+                                        </p:cTn>
+                                        <p:tgtEl>
+                                          <p:spTgt spid="14">
+                                            <p:txEl>
+                                              <p:pRg st="2" end="2"/>
+                                            </p:txEl>
+                                          </p:spTgt>
+                                        </p:tgtEl>
+                                        <p:attrNameLst>
+                                          <p:attrName>style.visibility</p:attrName>
+                                        </p:attrNameLst>
+                                      </p:cBhvr>
+                                      <p:to>
+                                        <p:strVal val="visible"/>
+                                      </p:to>
+                                    </p:set>
+                                  </p:childTnLst>
+                                </p:cTn>
+                              </p:par>
+                            </p:childTnLst>
+                          </p:cTn>
+                        </p:par>
+                      </p:childTnLst>
+                    </p:cTn>
+                  </p:par>
+                  <p:par>
+                    <p:cTn id="15" fill="hold">
+                      <p:stCondLst>
+                        <p:cond delay="indefinite"/>
+                      </p:stCondLst>
+                      <p:childTnLst>
+                        <p:par>
+                          <p:cTn id="16" fill="hold">
+                            <p:stCondLst>
+                              <p:cond delay="0"/>
+                            </p:stCondLst>
+                            <p:childTnLst>
+                              <p:par>
+                                <p:cTn id="17" presetID="1" presetClass="entr" presetSubtype="0" fill="hold" nodeType="clickEffect">
+                                  <p:stCondLst>
+                                    <p:cond delay="0"/>
+                                  </p:stCondLst>
+                                  <p:childTnLst>
+                                    <p:set>
+                                      <p:cBhvr>
+                                        <p:cTn id="18" dur="1" fill="hold">
+                                          <p:stCondLst>
+                                            <p:cond delay="0"/>
+                                          </p:stCondLst>
+                                        </p:cTn>
+                                        <p:tgtEl>
+                                          <p:spTgt spid="5"/>
+                                        </p:tgtEl>
+                                        <p:attrNameLst>
+                                          <p:attrName>style.visibility</p:attrName>
+                                        </p:attrNameLst>
+                                      </p:cBhvr>
+                                      <p:to>
+                                        <p:strVal val="visible"/>
+                                      </p:to>
+                                    </p:set>
+                                  </p:childTnLst>
+                                </p:cTn>
+                              </p:par>
+                            </p:childTnLst>
+                          </p:cTn>
+                        </p:par>
+                      </p:childTnLst>
+                    </p:cTn>
+                  </p:par>
+                </p:childTnLst>
+              </p:cTn>
+              <p:prevCondLst>
+                <p:cond evt="onPrev" delay="0">
+                  <p:tgtEl>
+                    <p:sldTgt/>
+                  </p:tgtEl>
+                </p:cond>
+              </p:prevCondLst>
+              <p:nextCondLst>
+                <p:cond evt="onNext" delay="0">
+                  <p:tgtEl>
+                    <p:sldTgt/>
+                  </p:tgtEl>
+                </p:cond>
+              </p:nextCondLst>
+            </p:seq>
+          </p:childTnLst>
+        </p:cTn>
+      </p:par>
+    </p:tnLst>
+    <p:bldLst>
+      <p:bldP spid="14" grpId="0" build="p"/>
+    </p:bldLst>
+  </p:timing>
 </p:sld>
 </file>
 
@@ -4653,6 +6186,183 @@
   <p:clrMapOvr>
     <a:masterClrMapping/>
   </p:clrMapOvr>
+  <p:timing>
+    <p:tnLst>
+      <p:par>
+        <p:cTn id="1" dur="indefinite" restart="never" nodeType="tmRoot">
+          <p:childTnLst>
+            <p:seq concurrent="1" nextAc="seek">
+              <p:cTn id="2" dur="indefinite" nodeType="mainSeq">
+                <p:childTnLst>
+                  <p:par>
+                    <p:cTn id="3" fill="hold">
+                      <p:stCondLst>
+                        <p:cond delay="indefinite"/>
+                      </p:stCondLst>
+                      <p:childTnLst>
+                        <p:par>
+                          <p:cTn id="4" fill="hold">
+                            <p:stCondLst>
+                              <p:cond delay="0"/>
+                            </p:stCondLst>
+                            <p:childTnLst>
+                              <p:par>
+                                <p:cTn id="5" presetID="1" presetClass="entr" presetSubtype="0" fill="hold" nodeType="clickEffect">
+                                  <p:stCondLst>
+                                    <p:cond delay="0"/>
+                                  </p:stCondLst>
+                                  <p:childTnLst>
+                                    <p:set>
+                                      <p:cBhvr>
+                                        <p:cTn id="6" dur="1" fill="hold">
+                                          <p:stCondLst>
+                                            <p:cond delay="0"/>
+                                          </p:stCondLst>
+                                        </p:cTn>
+                                        <p:tgtEl>
+                                          <p:spTgt spid="3">
+                                            <p:txEl>
+                                              <p:pRg st="0" end="0"/>
+                                            </p:txEl>
+                                          </p:spTgt>
+                                        </p:tgtEl>
+                                        <p:attrNameLst>
+                                          <p:attrName>style.visibility</p:attrName>
+                                        </p:attrNameLst>
+                                      </p:cBhvr>
+                                      <p:to>
+                                        <p:strVal val="visible"/>
+                                      </p:to>
+                                    </p:set>
+                                  </p:childTnLst>
+                                </p:cTn>
+                              </p:par>
+                            </p:childTnLst>
+                          </p:cTn>
+                        </p:par>
+                      </p:childTnLst>
+                    </p:cTn>
+                  </p:par>
+                  <p:par>
+                    <p:cTn id="7" fill="hold">
+                      <p:stCondLst>
+                        <p:cond delay="indefinite"/>
+                      </p:stCondLst>
+                      <p:childTnLst>
+                        <p:par>
+                          <p:cTn id="8" fill="hold">
+                            <p:stCondLst>
+                              <p:cond delay="0"/>
+                            </p:stCondLst>
+                            <p:childTnLst>
+                              <p:par>
+                                <p:cTn id="9" presetID="1" presetClass="entr" presetSubtype="0" fill="hold" nodeType="clickEffect">
+                                  <p:stCondLst>
+                                    <p:cond delay="0"/>
+                                  </p:stCondLst>
+                                  <p:childTnLst>
+                                    <p:set>
+                                      <p:cBhvr>
+                                        <p:cTn id="10" dur="1" fill="hold">
+                                          <p:stCondLst>
+                                            <p:cond delay="0"/>
+                                          </p:stCondLst>
+                                        </p:cTn>
+                                        <p:tgtEl>
+                                          <p:spTgt spid="3">
+                                            <p:txEl>
+                                              <p:pRg st="1" end="1"/>
+                                            </p:txEl>
+                                          </p:spTgt>
+                                        </p:tgtEl>
+                                        <p:attrNameLst>
+                                          <p:attrName>style.visibility</p:attrName>
+                                        </p:attrNameLst>
+                                      </p:cBhvr>
+                                      <p:to>
+                                        <p:strVal val="visible"/>
+                                      </p:to>
+                                    </p:set>
+                                  </p:childTnLst>
+                                </p:cTn>
+                              </p:par>
+                            </p:childTnLst>
+                          </p:cTn>
+                        </p:par>
+                      </p:childTnLst>
+                    </p:cTn>
+                  </p:par>
+                  <p:par>
+                    <p:cTn id="11" fill="hold">
+                      <p:stCondLst>
+                        <p:cond delay="indefinite"/>
+                      </p:stCondLst>
+                      <p:childTnLst>
+                        <p:par>
+                          <p:cTn id="12" fill="hold">
+                            <p:stCondLst>
+                              <p:cond delay="0"/>
+                            </p:stCondLst>
+                            <p:childTnLst>
+                              <p:par>
+                                <p:cTn id="13" presetID="1" presetClass="entr" presetSubtype="0" fill="hold" nodeType="clickEffect">
+                                  <p:stCondLst>
+                                    <p:cond delay="0"/>
+                                  </p:stCondLst>
+                                  <p:childTnLst>
+                                    <p:set>
+                                      <p:cBhvr>
+                                        <p:cTn id="14" dur="1" fill="hold">
+                                          <p:stCondLst>
+                                            <p:cond delay="0"/>
+                                          </p:stCondLst>
+                                        </p:cTn>
+                                        <p:tgtEl>
+                                          <p:spTgt spid="3">
+                                            <p:txEl>
+                                              <p:pRg st="2" end="2"/>
+                                            </p:txEl>
+                                          </p:spTgt>
+                                        </p:tgtEl>
+                                        <p:attrNameLst>
+                                          <p:attrName>style.visibility</p:attrName>
+                                        </p:attrNameLst>
+                                      </p:cBhvr>
+                                      <p:to>
+                                        <p:strVal val="visible"/>
+                                      </p:to>
+                                    </p:set>
+                                  </p:childTnLst>
+                                </p:cTn>
+                              </p:par>
+                            </p:childTnLst>
+                          </p:cTn>
+                        </p:par>
+                      </p:childTnLst>
+                    </p:cTn>
+                  </p:par>
+                </p:childTnLst>
+              </p:cTn>
+              <p:prevCondLst>
+                <p:cond evt="onPrev" delay="0">
+                  <p:tgtEl>
+                    <p:sldTgt/>
+                  </p:tgtEl>
+                </p:cond>
+              </p:prevCondLst>
+              <p:nextCondLst>
+                <p:cond evt="onNext" delay="0">
+                  <p:tgtEl>
+                    <p:sldTgt/>
+                  </p:tgtEl>
+                </p:cond>
+              </p:nextCondLst>
+            </p:seq>
+          </p:childTnLst>
+        </p:cTn>
+      </p:par>
+    </p:tnLst>
+  </p:timing>
 </p:sld>
 </file>
 
@@ -5299,6 +7009,254 @@
   <p:clrMapOvr>
     <a:masterClrMapping/>
   </p:clrMapOvr>
+  <p:timing>
+    <p:tnLst>
+      <p:par>
+        <p:cTn id="1" dur="indefinite" restart="never" nodeType="tmRoot">
+          <p:childTnLst>
+            <p:seq concurrent="1" nextAc="seek">
+              <p:cTn id="2" dur="indefinite" nodeType="mainSeq">
+                <p:childTnLst>
+                  <p:par>
+                    <p:cTn id="3" fill="hold">
+                      <p:stCondLst>
+                        <p:cond delay="indefinite"/>
+                      </p:stCondLst>
+                      <p:childTnLst>
+                        <p:par>
+                          <p:cTn id="4" fill="hold">
+                            <p:stCondLst>
+                              <p:cond delay="0"/>
+                            </p:stCondLst>
+                            <p:childTnLst>
+                              <p:par>
+                                <p:cTn id="5" presetID="10" presetClass="entr" presetSubtype="0" fill="hold" grpId="0" nodeType="clickEffect">
+                                  <p:stCondLst>
+                                    <p:cond delay="0"/>
+                                  </p:stCondLst>
+                                  <p:childTnLst>
+                                    <p:set>
+                                      <p:cBhvr>
+                                        <p:cTn id="6" dur="1" fill="hold">
+                                          <p:stCondLst>
+                                            <p:cond delay="0"/>
+                                          </p:stCondLst>
+                                        </p:cTn>
+                                        <p:tgtEl>
+                                          <p:spTgt spid="8"/>
+                                        </p:tgtEl>
+                                        <p:attrNameLst>
+                                          <p:attrName>style.visibility</p:attrName>
+                                        </p:attrNameLst>
+                                      </p:cBhvr>
+                                      <p:to>
+                                        <p:strVal val="visible"/>
+                                      </p:to>
+                                    </p:set>
+                                    <p:animEffect transition="in" filter="fade">
+                                      <p:cBhvr>
+                                        <p:cTn id="7" dur="500"/>
+                                        <p:tgtEl>
+                                          <p:spTgt spid="8"/>
+                                        </p:tgtEl>
+                                      </p:cBhvr>
+                                    </p:animEffect>
+                                  </p:childTnLst>
+                                </p:cTn>
+                              </p:par>
+                            </p:childTnLst>
+                          </p:cTn>
+                        </p:par>
+                      </p:childTnLst>
+                    </p:cTn>
+                  </p:par>
+                  <p:par>
+                    <p:cTn id="8" fill="hold">
+                      <p:stCondLst>
+                        <p:cond delay="indefinite"/>
+                      </p:stCondLst>
+                      <p:childTnLst>
+                        <p:par>
+                          <p:cTn id="9" fill="hold">
+                            <p:stCondLst>
+                              <p:cond delay="0"/>
+                            </p:stCondLst>
+                            <p:childTnLst>
+                              <p:par>
+                                <p:cTn id="10" presetID="10" presetClass="entr" presetSubtype="0" fill="hold" grpId="0" nodeType="clickEffect">
+                                  <p:stCondLst>
+                                    <p:cond delay="0"/>
+                                  </p:stCondLst>
+                                  <p:childTnLst>
+                                    <p:set>
+                                      <p:cBhvr>
+                                        <p:cTn id="11" dur="1" fill="hold">
+                                          <p:stCondLst>
+                                            <p:cond delay="0"/>
+                                          </p:stCondLst>
+                                        </p:cTn>
+                                        <p:tgtEl>
+                                          <p:spTgt spid="10"/>
+                                        </p:tgtEl>
+                                        <p:attrNameLst>
+                                          <p:attrName>style.visibility</p:attrName>
+                                        </p:attrNameLst>
+                                      </p:cBhvr>
+                                      <p:to>
+                                        <p:strVal val="visible"/>
+                                      </p:to>
+                                    </p:set>
+                                    <p:animEffect transition="in" filter="fade">
+                                      <p:cBhvr>
+                                        <p:cTn id="12" dur="500"/>
+                                        <p:tgtEl>
+                                          <p:spTgt spid="10"/>
+                                        </p:tgtEl>
+                                      </p:cBhvr>
+                                    </p:animEffect>
+                                  </p:childTnLst>
+                                </p:cTn>
+                              </p:par>
+                            </p:childTnLst>
+                          </p:cTn>
+                        </p:par>
+                      </p:childTnLst>
+                    </p:cTn>
+                  </p:par>
+                  <p:par>
+                    <p:cTn id="13" fill="hold">
+                      <p:stCondLst>
+                        <p:cond delay="indefinite"/>
+                      </p:stCondLst>
+                      <p:childTnLst>
+                        <p:par>
+                          <p:cTn id="14" fill="hold">
+                            <p:stCondLst>
+                              <p:cond delay="0"/>
+                            </p:stCondLst>
+                            <p:childTnLst>
+                              <p:par>
+                                <p:cTn id="15" presetID="10" presetClass="entr" presetSubtype="0" fill="hold" grpId="0" nodeType="clickEffect">
+                                  <p:stCondLst>
+                                    <p:cond delay="0"/>
+                                  </p:stCondLst>
+                                  <p:childTnLst>
+                                    <p:set>
+                                      <p:cBhvr>
+                                        <p:cTn id="16" dur="1" fill="hold">
+                                          <p:stCondLst>
+                                            <p:cond delay="0"/>
+                                          </p:stCondLst>
+                                        </p:cTn>
+                                        <p:tgtEl>
+                                          <p:spTgt spid="7"/>
+                                        </p:tgtEl>
+                                        <p:attrNameLst>
+                                          <p:attrName>style.visibility</p:attrName>
+                                        </p:attrNameLst>
+                                      </p:cBhvr>
+                                      <p:to>
+                                        <p:strVal val="visible"/>
+                                      </p:to>
+                                    </p:set>
+                                    <p:animEffect transition="in" filter="fade">
+                                      <p:cBhvr>
+                                        <p:cTn id="17" dur="500"/>
+                                        <p:tgtEl>
+                                          <p:spTgt spid="7"/>
+                                        </p:tgtEl>
+                                      </p:cBhvr>
+                                    </p:animEffect>
+                                  </p:childTnLst>
+                                </p:cTn>
+                              </p:par>
+                            </p:childTnLst>
+                          </p:cTn>
+                        </p:par>
+                      </p:childTnLst>
+                    </p:cTn>
+                  </p:par>
+                  <p:par>
+                    <p:cTn id="18" fill="hold">
+                      <p:stCondLst>
+                        <p:cond delay="indefinite"/>
+                      </p:stCondLst>
+                      <p:childTnLst>
+                        <p:par>
+                          <p:cTn id="19" fill="hold">
+                            <p:stCondLst>
+                              <p:cond delay="0"/>
+                            </p:stCondLst>
+                            <p:childTnLst>
+                              <p:par>
+                                <p:cTn id="20" presetID="10" presetClass="entr" presetSubtype="0" fill="hold" grpId="0" nodeType="clickEffect">
+                                  <p:stCondLst>
+                                    <p:cond delay="0"/>
+                                  </p:stCondLst>
+                                  <p:childTnLst>
+                                    <p:set>
+                                      <p:cBhvr>
+                                        <p:cTn id="21" dur="1" fill="hold">
+                                          <p:stCondLst>
+                                            <p:cond delay="0"/>
+                                          </p:stCondLst>
+                                        </p:cTn>
+                                        <p:tgtEl>
+                                          <p:spTgt spid="9"/>
+                                        </p:tgtEl>
+                                        <p:attrNameLst>
+                                          <p:attrName>style.visibility</p:attrName>
+                                        </p:attrNameLst>
+                                      </p:cBhvr>
+                                      <p:to>
+                                        <p:strVal val="visible"/>
+                                      </p:to>
+                                    </p:set>
+                                    <p:animEffect transition="in" filter="fade">
+                                      <p:cBhvr>
+                                        <p:cTn id="22" dur="500"/>
+                                        <p:tgtEl>
+                                          <p:spTgt spid="9"/>
+                                        </p:tgtEl>
+                                      </p:cBhvr>
+                                    </p:animEffect>
+                                  </p:childTnLst>
+                                </p:cTn>
+                              </p:par>
+                            </p:childTnLst>
+                          </p:cTn>
+                        </p:par>
+                      </p:childTnLst>
+                    </p:cTn>
+                  </p:par>
+                </p:childTnLst>
+              </p:cTn>
+              <p:prevCondLst>
+                <p:cond evt="onPrev" delay="0">
+                  <p:tgtEl>
+                    <p:sldTgt/>
+                  </p:tgtEl>
+                </p:cond>
+              </p:prevCondLst>
+              <p:nextCondLst>
+                <p:cond evt="onNext" delay="0">
+                  <p:tgtEl>
+                    <p:sldTgt/>
+                  </p:tgtEl>
+                </p:cond>
+              </p:nextCondLst>
+            </p:seq>
+          </p:childTnLst>
+        </p:cTn>
+      </p:par>
+    </p:tnLst>
+    <p:bldLst>
+      <p:bldP spid="7" grpId="0" animBg="1"/>
+      <p:bldP spid="8" grpId="0" animBg="1"/>
+      <p:bldP spid="9" grpId="0" animBg="1"/>
+      <p:bldP spid="10" grpId="0" animBg="1"/>
+    </p:bldLst>
+  </p:timing>
 </p:sld>
 </file>
 
@@ -5529,6 +7487,235 @@
   <p:clrMapOvr>
     <a:masterClrMapping/>
   </p:clrMapOvr>
+  <p:timing>
+    <p:tnLst>
+      <p:par>
+        <p:cTn id="1" dur="indefinite" restart="never" nodeType="tmRoot">
+          <p:childTnLst>
+            <p:seq concurrent="1" nextAc="seek">
+              <p:cTn id="2" dur="indefinite" nodeType="mainSeq">
+                <p:childTnLst>
+                  <p:par>
+                    <p:cTn id="3" fill="hold">
+                      <p:stCondLst>
+                        <p:cond delay="indefinite"/>
+                      </p:stCondLst>
+                      <p:childTnLst>
+                        <p:par>
+                          <p:cTn id="4" fill="hold">
+                            <p:stCondLst>
+                              <p:cond delay="0"/>
+                            </p:stCondLst>
+                            <p:childTnLst>
+                              <p:par>
+                                <p:cTn id="5" presetID="1" presetClass="entr" presetSubtype="0" fill="hold" grpId="0" nodeType="clickEffect">
+                                  <p:stCondLst>
+                                    <p:cond delay="0"/>
+                                  </p:stCondLst>
+                                  <p:childTnLst>
+                                    <p:set>
+                                      <p:cBhvr>
+                                        <p:cTn id="6" dur="1" fill="hold">
+                                          <p:stCondLst>
+                                            <p:cond delay="0"/>
+                                          </p:stCondLst>
+                                        </p:cTn>
+                                        <p:tgtEl>
+                                          <p:spTgt spid="8">
+                                            <p:txEl>
+                                              <p:pRg st="0" end="0"/>
+                                            </p:txEl>
+                                          </p:spTgt>
+                                        </p:tgtEl>
+                                        <p:attrNameLst>
+                                          <p:attrName>style.visibility</p:attrName>
+                                        </p:attrNameLst>
+                                      </p:cBhvr>
+                                      <p:to>
+                                        <p:strVal val="visible"/>
+                                      </p:to>
+                                    </p:set>
+                                  </p:childTnLst>
+                                </p:cTn>
+                              </p:par>
+                            </p:childTnLst>
+                          </p:cTn>
+                        </p:par>
+                      </p:childTnLst>
+                    </p:cTn>
+                  </p:par>
+                  <p:par>
+                    <p:cTn id="7" fill="hold">
+                      <p:stCondLst>
+                        <p:cond delay="indefinite"/>
+                      </p:stCondLst>
+                      <p:childTnLst>
+                        <p:par>
+                          <p:cTn id="8" fill="hold">
+                            <p:stCondLst>
+                              <p:cond delay="0"/>
+                            </p:stCondLst>
+                            <p:childTnLst>
+                              <p:par>
+                                <p:cTn id="9" presetID="1" presetClass="entr" presetSubtype="0" fill="hold" grpId="0" nodeType="clickEffect">
+                                  <p:stCondLst>
+                                    <p:cond delay="0"/>
+                                  </p:stCondLst>
+                                  <p:childTnLst>
+                                    <p:set>
+                                      <p:cBhvr>
+                                        <p:cTn id="10" dur="1" fill="hold">
+                                          <p:stCondLst>
+                                            <p:cond delay="0"/>
+                                          </p:stCondLst>
+                                        </p:cTn>
+                                        <p:tgtEl>
+                                          <p:spTgt spid="8">
+                                            <p:txEl>
+                                              <p:pRg st="1" end="1"/>
+                                            </p:txEl>
+                                          </p:spTgt>
+                                        </p:tgtEl>
+                                        <p:attrNameLst>
+                                          <p:attrName>style.visibility</p:attrName>
+                                        </p:attrNameLst>
+                                      </p:cBhvr>
+                                      <p:to>
+                                        <p:strVal val="visible"/>
+                                      </p:to>
+                                    </p:set>
+                                  </p:childTnLst>
+                                </p:cTn>
+                              </p:par>
+                            </p:childTnLst>
+                          </p:cTn>
+                        </p:par>
+                      </p:childTnLst>
+                    </p:cTn>
+                  </p:par>
+                  <p:par>
+                    <p:cTn id="11" fill="hold">
+                      <p:stCondLst>
+                        <p:cond delay="indefinite"/>
+                      </p:stCondLst>
+                      <p:childTnLst>
+                        <p:par>
+                          <p:cTn id="12" fill="hold">
+                            <p:stCondLst>
+                              <p:cond delay="0"/>
+                            </p:stCondLst>
+                            <p:childTnLst>
+                              <p:par>
+                                <p:cTn id="13" presetID="1" presetClass="entr" presetSubtype="0" fill="hold" nodeType="clickEffect">
+                                  <p:stCondLst>
+                                    <p:cond delay="0"/>
+                                  </p:stCondLst>
+                                  <p:childTnLst>
+                                    <p:set>
+                                      <p:cBhvr>
+                                        <p:cTn id="14" dur="1" fill="hold">
+                                          <p:stCondLst>
+                                            <p:cond delay="0"/>
+                                          </p:stCondLst>
+                                        </p:cTn>
+                                        <p:tgtEl>
+                                          <p:spTgt spid="8">
+                                            <p:txEl>
+                                              <p:pRg st="2" end="2"/>
+                                            </p:txEl>
+                                          </p:spTgt>
+                                        </p:tgtEl>
+                                        <p:attrNameLst>
+                                          <p:attrName>style.visibility</p:attrName>
+                                        </p:attrNameLst>
+                                      </p:cBhvr>
+                                      <p:to>
+                                        <p:strVal val="visible"/>
+                                      </p:to>
+                                    </p:set>
+                                  </p:childTnLst>
+                                </p:cTn>
+                              </p:par>
+                            </p:childTnLst>
+                          </p:cTn>
+                        </p:par>
+                      </p:childTnLst>
+                    </p:cTn>
+                  </p:par>
+                  <p:par>
+                    <p:cTn id="15" fill="hold">
+                      <p:stCondLst>
+                        <p:cond delay="indefinite"/>
+                      </p:stCondLst>
+                      <p:childTnLst>
+                        <p:par>
+                          <p:cTn id="16" fill="hold">
+                            <p:stCondLst>
+                              <p:cond delay="0"/>
+                            </p:stCondLst>
+                            <p:childTnLst>
+                              <p:par>
+                                <p:cTn id="17" presetID="1" presetClass="entr" presetSubtype="0" fill="hold" nodeType="clickEffect">
+                                  <p:stCondLst>
+                                    <p:cond delay="0"/>
+                                  </p:stCondLst>
+                                  <p:childTnLst>
+                                    <p:set>
+                                      <p:cBhvr>
+                                        <p:cTn id="18" dur="1" fill="hold">
+                                          <p:stCondLst>
+                                            <p:cond delay="0"/>
+                                          </p:stCondLst>
+                                        </p:cTn>
+                                        <p:tgtEl>
+                                          <p:spTgt spid="8">
+                                            <p:txEl>
+                                              <p:pRg st="3" end="3"/>
+                                            </p:txEl>
+                                          </p:spTgt>
+                                        </p:tgtEl>
+                                        <p:attrNameLst>
+                                          <p:attrName>style.visibility</p:attrName>
+                                        </p:attrNameLst>
+                                      </p:cBhvr>
+                                      <p:to>
+                                        <p:strVal val="visible"/>
+                                      </p:to>
+                                    </p:set>
+                                  </p:childTnLst>
+                                </p:cTn>
+                              </p:par>
+                            </p:childTnLst>
+                          </p:cTn>
+                        </p:par>
+                      </p:childTnLst>
+                    </p:cTn>
+                  </p:par>
+                </p:childTnLst>
+              </p:cTn>
+              <p:prevCondLst>
+                <p:cond evt="onPrev" delay="0">
+                  <p:tgtEl>
+                    <p:sldTgt/>
+                  </p:tgtEl>
+                </p:cond>
+              </p:prevCondLst>
+              <p:nextCondLst>
+                <p:cond evt="onNext" delay="0">
+                  <p:tgtEl>
+                    <p:sldTgt/>
+                  </p:tgtEl>
+                </p:cond>
+              </p:nextCondLst>
+            </p:seq>
+          </p:childTnLst>
+        </p:cTn>
+      </p:par>
+    </p:tnLst>
+    <p:bldLst>
+      <p:bldP spid="8" grpId="0" uiExpand="1" build="p"/>
+    </p:bldLst>
+  </p:timing>
 </p:sld>
 </file>
 
@@ -5549,6 +7736,53 @@
           <a:chExt cx="0" cy="0"/>
         </a:xfrm>
       </p:grpSpPr>
+      <p:pic>
+        <p:nvPicPr>
+          <p:cNvPr id="1026" name="Picture 2" descr="http://i0.kym-cdn.com/photos/images/original/001/285/460/8b6.jpg">
+            <a:extLst>
+              <a:ext uri="{FF2B5EF4-FFF2-40B4-BE49-F238E27FC236}">
+                <a16:creationId xmlns:a16="http://schemas.microsoft.com/office/drawing/2014/main" id="{555D06FB-EE22-4908-BFF2-F6522422BAD9}"/>
+              </a:ext>
+            </a:extLst>
+          </p:cNvPr>
+          <p:cNvPicPr>
+            <a:picLocks noChangeAspect="1" noChangeArrowheads="1"/>
+          </p:cNvPicPr>
+          <p:nvPr/>
+        </p:nvPicPr>
+        <p:blipFill>
+          <a:blip r:embed="rId2" cstate="print">
+            <a:extLst>
+              <a:ext uri="{28A0092B-C50C-407E-A947-70E740481C1C}">
+                <a14:useLocalDpi xmlns:a14="http://schemas.microsoft.com/office/drawing/2010/main" val="0"/>
+              </a:ext>
+            </a:extLst>
+          </a:blip>
+          <a:srcRect/>
+          <a:stretch>
+            <a:fillRect/>
+          </a:stretch>
+        </p:blipFill>
+        <p:spPr bwMode="auto">
+          <a:xfrm rot="2104313">
+            <a:off x="4869624" y="3733800"/>
+            <a:ext cx="3738033" cy="3048000"/>
+          </a:xfrm>
+          <a:prstGeom prst="rect">
+            <a:avLst/>
+          </a:prstGeom>
+          <a:noFill/>
+          <a:extLst>
+            <a:ext uri="{909E8E84-426E-40DD-AFC4-6F175D3DCCD1}">
+              <a14:hiddenFill xmlns:a14="http://schemas.microsoft.com/office/drawing/2010/main">
+                <a:solidFill>
+                  <a:srgbClr val="FFFFFF"/>
+                </a:solidFill>
+              </a14:hiddenFill>
+            </a:ext>
+          </a:extLst>
+        </p:spPr>
+      </p:pic>
       <p:sp>
         <p:nvSpPr>
           <p:cNvPr id="2" name="Title 1"/>
@@ -5601,8 +7835,54 @@
                   <a:srgbClr val="002060"/>
                 </a:solidFill>
               </a:rPr>
-              <a:t>No singularity using random electrodes selection.</a:t>
+              <a:t>Electrodes are linearly dependent due to proximity</a:t>
             </a:r>
+          </a:p>
+          <a:p>
+            <a:r>
+              <a:rPr lang="en-US" dirty="0">
+                <a:solidFill>
+                  <a:srgbClr val="002060"/>
+                </a:solidFill>
+              </a:rPr>
+              <a:t>No singularity using random electrodes selection</a:t>
+            </a:r>
+          </a:p>
+          <a:p>
+            <a:r>
+              <a:rPr lang="en-US" dirty="0">
+                <a:solidFill>
+                  <a:srgbClr val="002060"/>
+                </a:solidFill>
+              </a:rPr>
+              <a:t>To this point, no correlation between the EEG data and the HDRS has been found (using Diffusion Maps and </a:t>
+            </a:r>
+            <a:r>
+              <a:rPr lang="en-US" dirty="0" err="1">
+                <a:solidFill>
+                  <a:srgbClr val="002060"/>
+                </a:solidFill>
+              </a:rPr>
+              <a:t>tSNE</a:t>
+            </a:r>
+            <a:r>
+              <a:rPr lang="en-US" dirty="0">
+                <a:solidFill>
+                  <a:srgbClr val="002060"/>
+                </a:solidFill>
+              </a:rPr>
+              <a:t>)</a:t>
+            </a:r>
+          </a:p>
+          <a:p>
+            <a:pPr marL="0" indent="0">
+              <a:buNone/>
+            </a:pPr>
+            <a:endParaRPr lang="en-US" dirty="0">
+              <a:solidFill>
+                <a:srgbClr val="002060"/>
+              </a:solidFill>
+            </a:endParaRPr>
           </a:p>
           <a:p>
             <a:endParaRPr lang="he-IL" dirty="0">
@@ -5633,7 +7913,7 @@
               <a:pPr/>
               <a:t>23</a:t>
             </a:fld>
-            <a:endParaRPr lang="en-US"/>
+            <a:endParaRPr lang="en-US" dirty="0"/>
           </a:p>
         </p:txBody>
       </p:sp>
@@ -5647,6 +7927,231 @@
   <p:clrMapOvr>
     <a:masterClrMapping/>
   </p:clrMapOvr>
+  <p:timing>
+    <p:tnLst>
+      <p:par>
+        <p:cTn id="1" dur="indefinite" restart="never" nodeType="tmRoot">
+          <p:childTnLst>
+            <p:seq concurrent="1" nextAc="seek">
+              <p:cTn id="2" dur="indefinite" nodeType="mainSeq">
+                <p:childTnLst>
+                  <p:par>
+                    <p:cTn id="3" fill="hold">
+                      <p:stCondLst>
+                        <p:cond delay="indefinite"/>
+                      </p:stCondLst>
+                      <p:childTnLst>
+                        <p:par>
+                          <p:cTn id="4" fill="hold">
+                            <p:stCondLst>
+                              <p:cond delay="0"/>
+                            </p:stCondLst>
+                            <p:childTnLst>
+                              <p:par>
+                                <p:cTn id="5" presetID="1" presetClass="entr" presetSubtype="0" fill="hold" grpId="0" nodeType="clickEffect">
+                                  <p:stCondLst>
+                                    <p:cond delay="0"/>
+                                  </p:stCondLst>
+                                  <p:childTnLst>
+                                    <p:set>
+                                      <p:cBhvr>
+                                        <p:cTn id="6" dur="1" fill="hold">
+                                          <p:stCondLst>
+                                            <p:cond delay="0"/>
+                                          </p:stCondLst>
+                                        </p:cTn>
+                                        <p:tgtEl>
+                                          <p:spTgt spid="3">
+                                            <p:txEl>
+                                              <p:pRg st="0" end="0"/>
+                                            </p:txEl>
+                                          </p:spTgt>
+                                        </p:tgtEl>
+                                        <p:attrNameLst>
+                                          <p:attrName>style.visibility</p:attrName>
+                                        </p:attrNameLst>
+                                      </p:cBhvr>
+                                      <p:to>
+                                        <p:strVal val="visible"/>
+                                      </p:to>
+                                    </p:set>
+                                  </p:childTnLst>
+                                </p:cTn>
+                              </p:par>
+                            </p:childTnLst>
+                          </p:cTn>
+                        </p:par>
+                      </p:childTnLst>
+                    </p:cTn>
+                  </p:par>
+                  <p:par>
+                    <p:cTn id="7" fill="hold">
+                      <p:stCondLst>
+                        <p:cond delay="indefinite"/>
+                      </p:stCondLst>
+                      <p:childTnLst>
+                        <p:par>
+                          <p:cTn id="8" fill="hold">
+                            <p:stCondLst>
+                              <p:cond delay="0"/>
+                            </p:stCondLst>
+                            <p:childTnLst>
+                              <p:par>
+                                <p:cTn id="9" presetID="1" presetClass="entr" presetSubtype="0" fill="hold" grpId="0" nodeType="clickEffect">
+                                  <p:stCondLst>
+                                    <p:cond delay="0"/>
+                                  </p:stCondLst>
+                                  <p:childTnLst>
+                                    <p:set>
+                                      <p:cBhvr>
+                                        <p:cTn id="10" dur="1" fill="hold">
+                                          <p:stCondLst>
+                                            <p:cond delay="0"/>
+                                          </p:stCondLst>
+                                        </p:cTn>
+                                        <p:tgtEl>
+                                          <p:spTgt spid="3">
+                                            <p:txEl>
+                                              <p:pRg st="1" end="1"/>
+                                            </p:txEl>
+                                          </p:spTgt>
+                                        </p:tgtEl>
+                                        <p:attrNameLst>
+                                          <p:attrName>style.visibility</p:attrName>
+                                        </p:attrNameLst>
+                                      </p:cBhvr>
+                                      <p:to>
+                                        <p:strVal val="visible"/>
+                                      </p:to>
+                                    </p:set>
+                                  </p:childTnLst>
+                                </p:cTn>
+                              </p:par>
+                            </p:childTnLst>
+                          </p:cTn>
+                        </p:par>
+                      </p:childTnLst>
+                    </p:cTn>
+                  </p:par>
+                  <p:par>
+                    <p:cTn id="11" fill="hold">
+                      <p:stCondLst>
+                        <p:cond delay="indefinite"/>
+                      </p:stCondLst>
+                      <p:childTnLst>
+                        <p:par>
+                          <p:cTn id="12" fill="hold">
+                            <p:stCondLst>
+                              <p:cond delay="0"/>
+                            </p:stCondLst>
+                            <p:childTnLst>
+                              <p:par>
+                                <p:cTn id="13" presetID="1" presetClass="entr" presetSubtype="0" fill="hold" grpId="0" nodeType="clickEffect">
+                                  <p:stCondLst>
+                                    <p:cond delay="0"/>
+                                  </p:stCondLst>
+                                  <p:childTnLst>
+                                    <p:set>
+                                      <p:cBhvr>
+                                        <p:cTn id="14" dur="1" fill="hold">
+                                          <p:stCondLst>
+                                            <p:cond delay="0"/>
+                                          </p:stCondLst>
+                                        </p:cTn>
+                                        <p:tgtEl>
+                                          <p:spTgt spid="3">
+                                            <p:txEl>
+                                              <p:pRg st="2" end="2"/>
+                                            </p:txEl>
+                                          </p:spTgt>
+                                        </p:tgtEl>
+                                        <p:attrNameLst>
+                                          <p:attrName>style.visibility</p:attrName>
+                                        </p:attrNameLst>
+                                      </p:cBhvr>
+                                      <p:to>
+                                        <p:strVal val="visible"/>
+                                      </p:to>
+                                    </p:set>
+                                  </p:childTnLst>
+                                </p:cTn>
+                              </p:par>
+                            </p:childTnLst>
+                          </p:cTn>
+                        </p:par>
+                      </p:childTnLst>
+                    </p:cTn>
+                  </p:par>
+                  <p:par>
+                    <p:cTn id="15" fill="hold">
+                      <p:stCondLst>
+                        <p:cond delay="indefinite"/>
+                      </p:stCondLst>
+                      <p:childTnLst>
+                        <p:par>
+                          <p:cTn id="16" fill="hold">
+                            <p:stCondLst>
+                              <p:cond delay="0"/>
+                            </p:stCondLst>
+                            <p:childTnLst>
+                              <p:par>
+                                <p:cTn id="17" presetID="1" presetClass="entr" presetSubtype="0" fill="hold" nodeType="clickEffect">
+                                  <p:stCondLst>
+                                    <p:cond delay="0"/>
+                                  </p:stCondLst>
+                                  <p:childTnLst>
+                                    <p:set>
+                                      <p:cBhvr>
+                                        <p:cTn id="18" dur="1" fill="hold">
+                                          <p:stCondLst>
+                                            <p:cond delay="0"/>
+                                          </p:stCondLst>
+                                        </p:cTn>
+                                        <p:tgtEl>
+                                          <p:spTgt spid="1026"/>
+                                        </p:tgtEl>
+                                        <p:attrNameLst>
+                                          <p:attrName>style.visibility</p:attrName>
+                                        </p:attrNameLst>
+                                      </p:cBhvr>
+                                      <p:to>
+                                        <p:strVal val="visible"/>
+                                      </p:to>
+                                    </p:set>
+                                  </p:childTnLst>
+                                </p:cTn>
+                              </p:par>
+                            </p:childTnLst>
+                          </p:cTn>
+                        </p:par>
+                      </p:childTnLst>
+                    </p:cTn>
+                  </p:par>
+                </p:childTnLst>
+              </p:cTn>
+              <p:prevCondLst>
+                <p:cond evt="onPrev" delay="0">
+                  <p:tgtEl>
+                    <p:sldTgt/>
+                  </p:tgtEl>
+                </p:cond>
+              </p:prevCondLst>
+              <p:nextCondLst>
+                <p:cond evt="onNext" delay="0">
+                  <p:tgtEl>
+                    <p:sldTgt/>
+                  </p:tgtEl>
+                </p:cond>
+              </p:nextCondLst>
+            </p:seq>
+          </p:childTnLst>
+        </p:cTn>
+      </p:par>
+    </p:tnLst>
+    <p:bldLst>
+      <p:bldP spid="3" grpId="0" build="p"/>
+    </p:bldLst>
+  </p:timing>
 </p:sld>
 </file>
 
@@ -5798,6 +8303,235 @@
   <p:clrMapOvr>
     <a:masterClrMapping/>
   </p:clrMapOvr>
+  <p:timing>
+    <p:tnLst>
+      <p:par>
+        <p:cTn id="1" dur="indefinite" restart="never" nodeType="tmRoot">
+          <p:childTnLst>
+            <p:seq concurrent="1" nextAc="seek">
+              <p:cTn id="2" dur="indefinite" nodeType="mainSeq">
+                <p:childTnLst>
+                  <p:par>
+                    <p:cTn id="3" fill="hold">
+                      <p:stCondLst>
+                        <p:cond delay="indefinite"/>
+                      </p:stCondLst>
+                      <p:childTnLst>
+                        <p:par>
+                          <p:cTn id="4" fill="hold">
+                            <p:stCondLst>
+                              <p:cond delay="0"/>
+                            </p:stCondLst>
+                            <p:childTnLst>
+                              <p:par>
+                                <p:cTn id="5" presetID="1" presetClass="entr" presetSubtype="0" fill="hold" grpId="0" nodeType="clickEffect">
+                                  <p:stCondLst>
+                                    <p:cond delay="0"/>
+                                  </p:stCondLst>
+                                  <p:childTnLst>
+                                    <p:set>
+                                      <p:cBhvr>
+                                        <p:cTn id="6" dur="1" fill="hold">
+                                          <p:stCondLst>
+                                            <p:cond delay="0"/>
+                                          </p:stCondLst>
+                                        </p:cTn>
+                                        <p:tgtEl>
+                                          <p:spTgt spid="3">
+                                            <p:txEl>
+                                              <p:pRg st="0" end="0"/>
+                                            </p:txEl>
+                                          </p:spTgt>
+                                        </p:tgtEl>
+                                        <p:attrNameLst>
+                                          <p:attrName>style.visibility</p:attrName>
+                                        </p:attrNameLst>
+                                      </p:cBhvr>
+                                      <p:to>
+                                        <p:strVal val="visible"/>
+                                      </p:to>
+                                    </p:set>
+                                  </p:childTnLst>
+                                </p:cTn>
+                              </p:par>
+                            </p:childTnLst>
+                          </p:cTn>
+                        </p:par>
+                      </p:childTnLst>
+                    </p:cTn>
+                  </p:par>
+                  <p:par>
+                    <p:cTn id="7" fill="hold">
+                      <p:stCondLst>
+                        <p:cond delay="indefinite"/>
+                      </p:stCondLst>
+                      <p:childTnLst>
+                        <p:par>
+                          <p:cTn id="8" fill="hold">
+                            <p:stCondLst>
+                              <p:cond delay="0"/>
+                            </p:stCondLst>
+                            <p:childTnLst>
+                              <p:par>
+                                <p:cTn id="9" presetID="1" presetClass="entr" presetSubtype="0" fill="hold" grpId="0" nodeType="clickEffect">
+                                  <p:stCondLst>
+                                    <p:cond delay="0"/>
+                                  </p:stCondLst>
+                                  <p:childTnLst>
+                                    <p:set>
+                                      <p:cBhvr>
+                                        <p:cTn id="10" dur="1" fill="hold">
+                                          <p:stCondLst>
+                                            <p:cond delay="0"/>
+                                          </p:stCondLst>
+                                        </p:cTn>
+                                        <p:tgtEl>
+                                          <p:spTgt spid="3">
+                                            <p:txEl>
+                                              <p:pRg st="1" end="1"/>
+                                            </p:txEl>
+                                          </p:spTgt>
+                                        </p:tgtEl>
+                                        <p:attrNameLst>
+                                          <p:attrName>style.visibility</p:attrName>
+                                        </p:attrNameLst>
+                                      </p:cBhvr>
+                                      <p:to>
+                                        <p:strVal val="visible"/>
+                                      </p:to>
+                                    </p:set>
+                                  </p:childTnLst>
+                                </p:cTn>
+                              </p:par>
+                            </p:childTnLst>
+                          </p:cTn>
+                        </p:par>
+                      </p:childTnLst>
+                    </p:cTn>
+                  </p:par>
+                  <p:par>
+                    <p:cTn id="11" fill="hold">
+                      <p:stCondLst>
+                        <p:cond delay="indefinite"/>
+                      </p:stCondLst>
+                      <p:childTnLst>
+                        <p:par>
+                          <p:cTn id="12" fill="hold">
+                            <p:stCondLst>
+                              <p:cond delay="0"/>
+                            </p:stCondLst>
+                            <p:childTnLst>
+                              <p:par>
+                                <p:cTn id="13" presetID="1" presetClass="entr" presetSubtype="0" fill="hold" grpId="0" nodeType="clickEffect">
+                                  <p:stCondLst>
+                                    <p:cond delay="0"/>
+                                  </p:stCondLst>
+                                  <p:childTnLst>
+                                    <p:set>
+                                      <p:cBhvr>
+                                        <p:cTn id="14" dur="1" fill="hold">
+                                          <p:stCondLst>
+                                            <p:cond delay="0"/>
+                                          </p:stCondLst>
+                                        </p:cTn>
+                                        <p:tgtEl>
+                                          <p:spTgt spid="3">
+                                            <p:txEl>
+                                              <p:pRg st="2" end="2"/>
+                                            </p:txEl>
+                                          </p:spTgt>
+                                        </p:tgtEl>
+                                        <p:attrNameLst>
+                                          <p:attrName>style.visibility</p:attrName>
+                                        </p:attrNameLst>
+                                      </p:cBhvr>
+                                      <p:to>
+                                        <p:strVal val="visible"/>
+                                      </p:to>
+                                    </p:set>
+                                  </p:childTnLst>
+                                </p:cTn>
+                              </p:par>
+                            </p:childTnLst>
+                          </p:cTn>
+                        </p:par>
+                      </p:childTnLst>
+                    </p:cTn>
+                  </p:par>
+                  <p:par>
+                    <p:cTn id="15" fill="hold">
+                      <p:stCondLst>
+                        <p:cond delay="indefinite"/>
+                      </p:stCondLst>
+                      <p:childTnLst>
+                        <p:par>
+                          <p:cTn id="16" fill="hold">
+                            <p:stCondLst>
+                              <p:cond delay="0"/>
+                            </p:stCondLst>
+                            <p:childTnLst>
+                              <p:par>
+                                <p:cTn id="17" presetID="1" presetClass="entr" presetSubtype="0" fill="hold" grpId="0" nodeType="clickEffect">
+                                  <p:stCondLst>
+                                    <p:cond delay="0"/>
+                                  </p:stCondLst>
+                                  <p:childTnLst>
+                                    <p:set>
+                                      <p:cBhvr>
+                                        <p:cTn id="18" dur="1" fill="hold">
+                                          <p:stCondLst>
+                                            <p:cond delay="0"/>
+                                          </p:stCondLst>
+                                        </p:cTn>
+                                        <p:tgtEl>
+                                          <p:spTgt spid="3">
+                                            <p:txEl>
+                                              <p:pRg st="3" end="3"/>
+                                            </p:txEl>
+                                          </p:spTgt>
+                                        </p:tgtEl>
+                                        <p:attrNameLst>
+                                          <p:attrName>style.visibility</p:attrName>
+                                        </p:attrNameLst>
+                                      </p:cBhvr>
+                                      <p:to>
+                                        <p:strVal val="visible"/>
+                                      </p:to>
+                                    </p:set>
+                                  </p:childTnLst>
+                                </p:cTn>
+                              </p:par>
+                            </p:childTnLst>
+                          </p:cTn>
+                        </p:par>
+                      </p:childTnLst>
+                    </p:cTn>
+                  </p:par>
+                </p:childTnLst>
+              </p:cTn>
+              <p:prevCondLst>
+                <p:cond evt="onPrev" delay="0">
+                  <p:tgtEl>
+                    <p:sldTgt/>
+                  </p:tgtEl>
+                </p:cond>
+              </p:prevCondLst>
+              <p:nextCondLst>
+                <p:cond evt="onNext" delay="0">
+                  <p:tgtEl>
+                    <p:sldTgt/>
+                  </p:tgtEl>
+                </p:cond>
+              </p:nextCondLst>
+            </p:seq>
+          </p:childTnLst>
+        </p:cTn>
+      </p:par>
+    </p:tnLst>
+    <p:bldLst>
+      <p:bldP spid="3" grpId="0" build="p"/>
+    </p:bldLst>
+  </p:timing>
 </p:sld>
 </file>
 
@@ -5965,6 +8699,231 @@
   <p:clrMapOvr>
     <a:masterClrMapping/>
   </p:clrMapOvr>
+  <p:timing>
+    <p:tnLst>
+      <p:par>
+        <p:cTn id="1" dur="indefinite" restart="never" nodeType="tmRoot">
+          <p:childTnLst>
+            <p:seq concurrent="1" nextAc="seek">
+              <p:cTn id="2" dur="indefinite" nodeType="mainSeq">
+                <p:childTnLst>
+                  <p:par>
+                    <p:cTn id="3" fill="hold">
+                      <p:stCondLst>
+                        <p:cond delay="indefinite"/>
+                      </p:stCondLst>
+                      <p:childTnLst>
+                        <p:par>
+                          <p:cTn id="4" fill="hold">
+                            <p:stCondLst>
+                              <p:cond delay="0"/>
+                            </p:stCondLst>
+                            <p:childTnLst>
+                              <p:par>
+                                <p:cTn id="5" presetID="1" presetClass="entr" presetSubtype="0" fill="hold" grpId="0" nodeType="clickEffect">
+                                  <p:stCondLst>
+                                    <p:cond delay="0"/>
+                                  </p:stCondLst>
+                                  <p:childTnLst>
+                                    <p:set>
+                                      <p:cBhvr>
+                                        <p:cTn id="6" dur="1" fill="hold">
+                                          <p:stCondLst>
+                                            <p:cond delay="0"/>
+                                          </p:stCondLst>
+                                        </p:cTn>
+                                        <p:tgtEl>
+                                          <p:spTgt spid="3">
+                                            <p:txEl>
+                                              <p:pRg st="0" end="0"/>
+                                            </p:txEl>
+                                          </p:spTgt>
+                                        </p:tgtEl>
+                                        <p:attrNameLst>
+                                          <p:attrName>style.visibility</p:attrName>
+                                        </p:attrNameLst>
+                                      </p:cBhvr>
+                                      <p:to>
+                                        <p:strVal val="visible"/>
+                                      </p:to>
+                                    </p:set>
+                                  </p:childTnLst>
+                                </p:cTn>
+                              </p:par>
+                            </p:childTnLst>
+                          </p:cTn>
+                        </p:par>
+                      </p:childTnLst>
+                    </p:cTn>
+                  </p:par>
+                  <p:par>
+                    <p:cTn id="7" fill="hold">
+                      <p:stCondLst>
+                        <p:cond delay="indefinite"/>
+                      </p:stCondLst>
+                      <p:childTnLst>
+                        <p:par>
+                          <p:cTn id="8" fill="hold">
+                            <p:stCondLst>
+                              <p:cond delay="0"/>
+                            </p:stCondLst>
+                            <p:childTnLst>
+                              <p:par>
+                                <p:cTn id="9" presetID="1" presetClass="entr" presetSubtype="0" fill="hold" grpId="0" nodeType="clickEffect">
+                                  <p:stCondLst>
+                                    <p:cond delay="0"/>
+                                  </p:stCondLst>
+                                  <p:childTnLst>
+                                    <p:set>
+                                      <p:cBhvr>
+                                        <p:cTn id="10" dur="1" fill="hold">
+                                          <p:stCondLst>
+                                            <p:cond delay="0"/>
+                                          </p:stCondLst>
+                                        </p:cTn>
+                                        <p:tgtEl>
+                                          <p:spTgt spid="3">
+                                            <p:txEl>
+                                              <p:pRg st="1" end="1"/>
+                                            </p:txEl>
+                                          </p:spTgt>
+                                        </p:tgtEl>
+                                        <p:attrNameLst>
+                                          <p:attrName>style.visibility</p:attrName>
+                                        </p:attrNameLst>
+                                      </p:cBhvr>
+                                      <p:to>
+                                        <p:strVal val="visible"/>
+                                      </p:to>
+                                    </p:set>
+                                  </p:childTnLst>
+                                </p:cTn>
+                              </p:par>
+                            </p:childTnLst>
+                          </p:cTn>
+                        </p:par>
+                      </p:childTnLst>
+                    </p:cTn>
+                  </p:par>
+                  <p:par>
+                    <p:cTn id="11" fill="hold">
+                      <p:stCondLst>
+                        <p:cond delay="indefinite"/>
+                      </p:stCondLst>
+                      <p:childTnLst>
+                        <p:par>
+                          <p:cTn id="12" fill="hold">
+                            <p:stCondLst>
+                              <p:cond delay="0"/>
+                            </p:stCondLst>
+                            <p:childTnLst>
+                              <p:par>
+                                <p:cTn id="13" presetID="1" presetClass="entr" presetSubtype="0" fill="hold" grpId="0" nodeType="clickEffect">
+                                  <p:stCondLst>
+                                    <p:cond delay="0"/>
+                                  </p:stCondLst>
+                                  <p:childTnLst>
+                                    <p:set>
+                                      <p:cBhvr>
+                                        <p:cTn id="14" dur="1" fill="hold">
+                                          <p:stCondLst>
+                                            <p:cond delay="0"/>
+                                          </p:stCondLst>
+                                        </p:cTn>
+                                        <p:tgtEl>
+                                          <p:spTgt spid="3">
+                                            <p:txEl>
+                                              <p:pRg st="2" end="2"/>
+                                            </p:txEl>
+                                          </p:spTgt>
+                                        </p:tgtEl>
+                                        <p:attrNameLst>
+                                          <p:attrName>style.visibility</p:attrName>
+                                        </p:attrNameLst>
+                                      </p:cBhvr>
+                                      <p:to>
+                                        <p:strVal val="visible"/>
+                                      </p:to>
+                                    </p:set>
+                                  </p:childTnLst>
+                                </p:cTn>
+                              </p:par>
+                            </p:childTnLst>
+                          </p:cTn>
+                        </p:par>
+                      </p:childTnLst>
+                    </p:cTn>
+                  </p:par>
+                  <p:par>
+                    <p:cTn id="15" fill="hold">
+                      <p:stCondLst>
+                        <p:cond delay="indefinite"/>
+                      </p:stCondLst>
+                      <p:childTnLst>
+                        <p:par>
+                          <p:cTn id="16" fill="hold">
+                            <p:stCondLst>
+                              <p:cond delay="0"/>
+                            </p:stCondLst>
+                            <p:childTnLst>
+                              <p:par>
+                                <p:cTn id="17" presetID="1" presetClass="entr" presetSubtype="0" fill="hold" nodeType="clickEffect">
+                                  <p:stCondLst>
+                                    <p:cond delay="0"/>
+                                  </p:stCondLst>
+                                  <p:childTnLst>
+                                    <p:set>
+                                      <p:cBhvr>
+                                        <p:cTn id="18" dur="1" fill="hold">
+                                          <p:stCondLst>
+                                            <p:cond delay="0"/>
+                                          </p:stCondLst>
+                                        </p:cTn>
+                                        <p:tgtEl>
+                                          <p:spTgt spid="6"/>
+                                        </p:tgtEl>
+                                        <p:attrNameLst>
+                                          <p:attrName>style.visibility</p:attrName>
+                                        </p:attrNameLst>
+                                      </p:cBhvr>
+                                      <p:to>
+                                        <p:strVal val="visible"/>
+                                      </p:to>
+                                    </p:set>
+                                  </p:childTnLst>
+                                </p:cTn>
+                              </p:par>
+                            </p:childTnLst>
+                          </p:cTn>
+                        </p:par>
+                      </p:childTnLst>
+                    </p:cTn>
+                  </p:par>
+                </p:childTnLst>
+              </p:cTn>
+              <p:prevCondLst>
+                <p:cond evt="onPrev" delay="0">
+                  <p:tgtEl>
+                    <p:sldTgt/>
+                  </p:tgtEl>
+                </p:cond>
+              </p:prevCondLst>
+              <p:nextCondLst>
+                <p:cond evt="onNext" delay="0">
+                  <p:tgtEl>
+                    <p:sldTgt/>
+                  </p:tgtEl>
+                </p:cond>
+              </p:nextCondLst>
+            </p:seq>
+          </p:childTnLst>
+        </p:cTn>
+      </p:par>
+    </p:tnLst>
+    <p:bldLst>
+      <p:bldP spid="3" grpId="0" build="p"/>
+    </p:bldLst>
+  </p:timing>
 </p:sld>
 </file>
 
@@ -6104,6 +9063,186 @@
   <p:clrMapOvr>
     <a:masterClrMapping/>
   </p:clrMapOvr>
+  <p:timing>
+    <p:tnLst>
+      <p:par>
+        <p:cTn id="1" dur="indefinite" restart="never" nodeType="tmRoot">
+          <p:childTnLst>
+            <p:seq concurrent="1" nextAc="seek">
+              <p:cTn id="2" dur="indefinite" nodeType="mainSeq">
+                <p:childTnLst>
+                  <p:par>
+                    <p:cTn id="3" fill="hold">
+                      <p:stCondLst>
+                        <p:cond delay="indefinite"/>
+                      </p:stCondLst>
+                      <p:childTnLst>
+                        <p:par>
+                          <p:cTn id="4" fill="hold">
+                            <p:stCondLst>
+                              <p:cond delay="0"/>
+                            </p:stCondLst>
+                            <p:childTnLst>
+                              <p:par>
+                                <p:cTn id="5" presetID="1" presetClass="entr" presetSubtype="0" fill="hold" grpId="0" nodeType="clickEffect">
+                                  <p:stCondLst>
+                                    <p:cond delay="0"/>
+                                  </p:stCondLst>
+                                  <p:childTnLst>
+                                    <p:set>
+                                      <p:cBhvr>
+                                        <p:cTn id="6" dur="1" fill="hold">
+                                          <p:stCondLst>
+                                            <p:cond delay="0"/>
+                                          </p:stCondLst>
+                                        </p:cTn>
+                                        <p:tgtEl>
+                                          <p:spTgt spid="3">
+                                            <p:txEl>
+                                              <p:pRg st="0" end="0"/>
+                                            </p:txEl>
+                                          </p:spTgt>
+                                        </p:tgtEl>
+                                        <p:attrNameLst>
+                                          <p:attrName>style.visibility</p:attrName>
+                                        </p:attrNameLst>
+                                      </p:cBhvr>
+                                      <p:to>
+                                        <p:strVal val="visible"/>
+                                      </p:to>
+                                    </p:set>
+                                  </p:childTnLst>
+                                </p:cTn>
+                              </p:par>
+                            </p:childTnLst>
+                          </p:cTn>
+                        </p:par>
+                      </p:childTnLst>
+                    </p:cTn>
+                  </p:par>
+                  <p:par>
+                    <p:cTn id="7" fill="hold">
+                      <p:stCondLst>
+                        <p:cond delay="indefinite"/>
+                      </p:stCondLst>
+                      <p:childTnLst>
+                        <p:par>
+                          <p:cTn id="8" fill="hold">
+                            <p:stCondLst>
+                              <p:cond delay="0"/>
+                            </p:stCondLst>
+                            <p:childTnLst>
+                              <p:par>
+                                <p:cTn id="9" presetID="1" presetClass="entr" presetSubtype="0" fill="hold" grpId="0" nodeType="clickEffect">
+                                  <p:stCondLst>
+                                    <p:cond delay="0"/>
+                                  </p:stCondLst>
+                                  <p:childTnLst>
+                                    <p:set>
+                                      <p:cBhvr>
+                                        <p:cTn id="10" dur="1" fill="hold">
+                                          <p:stCondLst>
+                                            <p:cond delay="0"/>
+                                          </p:stCondLst>
+                                        </p:cTn>
+                                        <p:tgtEl>
+                                          <p:spTgt spid="3">
+                                            <p:txEl>
+                                              <p:pRg st="1" end="1"/>
+                                            </p:txEl>
+                                          </p:spTgt>
+                                        </p:tgtEl>
+                                        <p:attrNameLst>
+                                          <p:attrName>style.visibility</p:attrName>
+                                        </p:attrNameLst>
+                                      </p:cBhvr>
+                                      <p:to>
+                                        <p:strVal val="visible"/>
+                                      </p:to>
+                                    </p:set>
+                                  </p:childTnLst>
+                                </p:cTn>
+                              </p:par>
+                            </p:childTnLst>
+                          </p:cTn>
+                        </p:par>
+                      </p:childTnLst>
+                    </p:cTn>
+                  </p:par>
+                  <p:par>
+                    <p:cTn id="11" fill="hold">
+                      <p:stCondLst>
+                        <p:cond delay="indefinite"/>
+                      </p:stCondLst>
+                      <p:childTnLst>
+                        <p:par>
+                          <p:cTn id="12" fill="hold">
+                            <p:stCondLst>
+                              <p:cond delay="0"/>
+                            </p:stCondLst>
+                            <p:childTnLst>
+                              <p:par>
+                                <p:cTn id="13" presetID="1" presetClass="entr" presetSubtype="0" fill="hold" grpId="0" nodeType="clickEffect">
+                                  <p:stCondLst>
+                                    <p:cond delay="0"/>
+                                  </p:stCondLst>
+                                  <p:childTnLst>
+                                    <p:set>
+                                      <p:cBhvr>
+                                        <p:cTn id="14" dur="1" fill="hold">
+                                          <p:stCondLst>
+                                            <p:cond delay="0"/>
+                                          </p:stCondLst>
+                                        </p:cTn>
+                                        <p:tgtEl>
+                                          <p:spTgt spid="3">
+                                            <p:txEl>
+                                              <p:pRg st="2" end="2"/>
+                                            </p:txEl>
+                                          </p:spTgt>
+                                        </p:tgtEl>
+                                        <p:attrNameLst>
+                                          <p:attrName>style.visibility</p:attrName>
+                                        </p:attrNameLst>
+                                      </p:cBhvr>
+                                      <p:to>
+                                        <p:strVal val="visible"/>
+                                      </p:to>
+                                    </p:set>
+                                  </p:childTnLst>
+                                </p:cTn>
+                              </p:par>
+                            </p:childTnLst>
+                          </p:cTn>
+                        </p:par>
+                      </p:childTnLst>
+                    </p:cTn>
+                  </p:par>
+                </p:childTnLst>
+              </p:cTn>
+              <p:prevCondLst>
+                <p:cond evt="onPrev" delay="0">
+                  <p:tgtEl>
+                    <p:sldTgt/>
+                  </p:tgtEl>
+                </p:cond>
+              </p:prevCondLst>
+              <p:nextCondLst>
+                <p:cond evt="onNext" delay="0">
+                  <p:tgtEl>
+                    <p:sldTgt/>
+                  </p:tgtEl>
+                </p:cond>
+              </p:nextCondLst>
+            </p:seq>
+          </p:childTnLst>
+        </p:cTn>
+      </p:par>
+    </p:tnLst>
+    <p:bldLst>
+      <p:bldP spid="3" grpId="0" build="p"/>
+    </p:bldLst>
+  </p:timing>
 </p:sld>
 </file>
 
@@ -6860,6 +9999,182 @@
   <p:clrMapOvr>
     <a:masterClrMapping/>
   </p:clrMapOvr>
+  <p:timing>
+    <p:tnLst>
+      <p:par>
+        <p:cTn id="1" dur="indefinite" restart="never" nodeType="tmRoot">
+          <p:childTnLst>
+            <p:seq concurrent="1" nextAc="seek">
+              <p:cTn id="2" dur="indefinite" nodeType="mainSeq">
+                <p:childTnLst>
+                  <p:par>
+                    <p:cTn id="3" fill="hold">
+                      <p:stCondLst>
+                        <p:cond delay="indefinite"/>
+                      </p:stCondLst>
+                      <p:childTnLst>
+                        <p:par>
+                          <p:cTn id="4" fill="hold">
+                            <p:stCondLst>
+                              <p:cond delay="0"/>
+                            </p:stCondLst>
+                            <p:childTnLst>
+                              <p:par>
+                                <p:cTn id="5" presetID="1" presetClass="entr" presetSubtype="0" fill="hold" grpId="0" nodeType="clickEffect">
+                                  <p:stCondLst>
+                                    <p:cond delay="0"/>
+                                  </p:stCondLst>
+                                  <p:childTnLst>
+                                    <p:set>
+                                      <p:cBhvr>
+                                        <p:cTn id="6" dur="1" fill="hold">
+                                          <p:stCondLst>
+                                            <p:cond delay="0"/>
+                                          </p:stCondLst>
+                                        </p:cTn>
+                                        <p:tgtEl>
+                                          <p:spTgt spid="3">
+                                            <p:txEl>
+                                              <p:pRg st="0" end="0"/>
+                                            </p:txEl>
+                                          </p:spTgt>
+                                        </p:tgtEl>
+                                        <p:attrNameLst>
+                                          <p:attrName>style.visibility</p:attrName>
+                                        </p:attrNameLst>
+                                      </p:cBhvr>
+                                      <p:to>
+                                        <p:strVal val="visible"/>
+                                      </p:to>
+                                    </p:set>
+                                  </p:childTnLst>
+                                </p:cTn>
+                              </p:par>
+                            </p:childTnLst>
+                          </p:cTn>
+                        </p:par>
+                      </p:childTnLst>
+                    </p:cTn>
+                  </p:par>
+                  <p:par>
+                    <p:cTn id="7" fill="hold">
+                      <p:stCondLst>
+                        <p:cond delay="indefinite"/>
+                      </p:stCondLst>
+                      <p:childTnLst>
+                        <p:par>
+                          <p:cTn id="8" fill="hold">
+                            <p:stCondLst>
+                              <p:cond delay="0"/>
+                            </p:stCondLst>
+                            <p:childTnLst>
+                              <p:par>
+                                <p:cTn id="9" presetID="1" presetClass="entr" presetSubtype="0" fill="hold" grpId="0" nodeType="clickEffect">
+                                  <p:stCondLst>
+                                    <p:cond delay="0"/>
+                                  </p:stCondLst>
+                                  <p:childTnLst>
+                                    <p:set>
+                                      <p:cBhvr>
+                                        <p:cTn id="10" dur="1" fill="hold">
+                                          <p:stCondLst>
+                                            <p:cond delay="0"/>
+                                          </p:stCondLst>
+                                        </p:cTn>
+                                        <p:tgtEl>
+                                          <p:spTgt spid="3">
+                                            <p:txEl>
+                                              <p:pRg st="1" end="1"/>
+                                            </p:txEl>
+                                          </p:spTgt>
+                                        </p:tgtEl>
+                                        <p:attrNameLst>
+                                          <p:attrName>style.visibility</p:attrName>
+                                        </p:attrNameLst>
+                                      </p:cBhvr>
+                                      <p:to>
+                                        <p:strVal val="visible"/>
+                                      </p:to>
+                                    </p:set>
+                                  </p:childTnLst>
+                                </p:cTn>
+                              </p:par>
+                            </p:childTnLst>
+                          </p:cTn>
+                        </p:par>
+                      </p:childTnLst>
+                    </p:cTn>
+                  </p:par>
+                  <p:par>
+                    <p:cTn id="11" fill="hold">
+                      <p:stCondLst>
+                        <p:cond delay="indefinite"/>
+                      </p:stCondLst>
+                      <p:childTnLst>
+                        <p:par>
+                          <p:cTn id="12" fill="hold">
+                            <p:stCondLst>
+                              <p:cond delay="0"/>
+                            </p:stCondLst>
+                            <p:childTnLst>
+                              <p:par>
+                                <p:cTn id="13" presetID="1" presetClass="entr" presetSubtype="0" fill="hold" nodeType="clickEffect">
+                                  <p:stCondLst>
+                                    <p:cond delay="0"/>
+                                  </p:stCondLst>
+                                  <p:childTnLst>
+                                    <p:set>
+                                      <p:cBhvr>
+                                        <p:cTn id="14" dur="1" fill="hold">
+                                          <p:stCondLst>
+                                            <p:cond delay="0"/>
+                                          </p:stCondLst>
+                                        </p:cTn>
+                                        <p:tgtEl>
+                                          <p:spTgt spid="4"/>
+                                        </p:tgtEl>
+                                        <p:attrNameLst>
+                                          <p:attrName>style.visibility</p:attrName>
+                                        </p:attrNameLst>
+                                      </p:cBhvr>
+                                      <p:to>
+                                        <p:strVal val="visible"/>
+                                      </p:to>
+                                    </p:set>
+                                  </p:childTnLst>
+                                </p:cTn>
+                              </p:par>
+                            </p:childTnLst>
+                          </p:cTn>
+                        </p:par>
+                      </p:childTnLst>
+                    </p:cTn>
+                  </p:par>
+                </p:childTnLst>
+              </p:cTn>
+              <p:prevCondLst>
+                <p:cond evt="onPrev" delay="0">
+                  <p:tgtEl>
+                    <p:sldTgt/>
+                  </p:tgtEl>
+                </p:cond>
+              </p:prevCondLst>
+              <p:nextCondLst>
+                <p:cond evt="onNext" delay="0">
+                  <p:tgtEl>
+                    <p:sldTgt/>
+                  </p:tgtEl>
+                </p:cond>
+              </p:nextCondLst>
+            </p:seq>
+          </p:childTnLst>
+        </p:cTn>
+      </p:par>
+    </p:tnLst>
+    <p:bldLst>
+      <p:bldP spid="3" grpId="0" build="p"/>
+    </p:bldLst>
+  </p:timing>
 </p:sld>
 </file>
 
@@ -6981,6 +10296,137 @@
   <p:clrMapOvr>
     <a:masterClrMapping/>
   </p:clrMapOvr>
+  <p:timing>
+    <p:tnLst>
+      <p:par>
+        <p:cTn id="1" dur="indefinite" restart="never" nodeType="tmRoot">
+          <p:childTnLst>
+            <p:seq concurrent="1" nextAc="seek">
+              <p:cTn id="2" dur="indefinite" nodeType="mainSeq">
+                <p:childTnLst>
+                  <p:par>
+                    <p:cTn id="3" fill="hold">
+                      <p:stCondLst>
+                        <p:cond delay="indefinite"/>
+                      </p:stCondLst>
+                      <p:childTnLst>
+                        <p:par>
+                          <p:cTn id="4" fill="hold">
+                            <p:stCondLst>
+                              <p:cond delay="0"/>
+                            </p:stCondLst>
+                            <p:childTnLst>
+                              <p:par>
+                                <p:cTn id="5" presetID="1" presetClass="entr" presetSubtype="0" fill="hold" grpId="0" nodeType="clickEffect">
+                                  <p:stCondLst>
+                                    <p:cond delay="0"/>
+                                  </p:stCondLst>
+                                  <p:childTnLst>
+                                    <p:set>
+                                      <p:cBhvr>
+                                        <p:cTn id="6" dur="1" fill="hold">
+                                          <p:stCondLst>
+                                            <p:cond delay="0"/>
+                                          </p:stCondLst>
+                                        </p:cTn>
+                                        <p:tgtEl>
+                                          <p:spTgt spid="3">
+                                            <p:txEl>
+                                              <p:pRg st="0" end="0"/>
+                                            </p:txEl>
+                                          </p:spTgt>
+                                        </p:tgtEl>
+                                        <p:attrNameLst>
+                                          <p:attrName>style.visibility</p:attrName>
+                                        </p:attrNameLst>
+                                      </p:cBhvr>
+                                      <p:to>
+                                        <p:strVal val="visible"/>
+                                      </p:to>
+                                    </p:set>
+                                  </p:childTnLst>
+                                </p:cTn>
+                              </p:par>
+                            </p:childTnLst>
+                          </p:cTn>
+                        </p:par>
+                      </p:childTnLst>
+                    </p:cTn>
+                  </p:par>
+                  <p:par>
+                    <p:cTn id="7" fill="hold">
+                      <p:stCondLst>
+                        <p:cond delay="indefinite"/>
+                      </p:stCondLst>
+                      <p:childTnLst>
+                        <p:par>
+                          <p:cTn id="8" fill="hold">
+                            <p:stCondLst>
+                              <p:cond delay="0"/>
+                            </p:stCondLst>
+                            <p:childTnLst>
+                              <p:par>
+                                <p:cTn id="9" presetID="1" presetClass="entr" presetSubtype="0" fill="hold" grpId="0" nodeType="clickEffect">
+                                  <p:stCondLst>
+                                    <p:cond delay="0"/>
+                                  </p:stCondLst>
+                                  <p:childTnLst>
+                                    <p:set>
+                                      <p:cBhvr>
+                                        <p:cTn id="10" dur="1" fill="hold">
+                                          <p:stCondLst>
+                                            <p:cond delay="0"/>
+                                          </p:stCondLst>
+                                        </p:cTn>
+                                        <p:tgtEl>
+                                          <p:spTgt spid="3">
+                                            <p:txEl>
+                                              <p:pRg st="1" end="1"/>
+                                            </p:txEl>
+                                          </p:spTgt>
+                                        </p:tgtEl>
+                                        <p:attrNameLst>
+                                          <p:attrName>style.visibility</p:attrName>
+                                        </p:attrNameLst>
+                                      </p:cBhvr>
+                                      <p:to>
+                                        <p:strVal val="visible"/>
+                                      </p:to>
+                                    </p:set>
+                                  </p:childTnLst>
+                                </p:cTn>
+                              </p:par>
+                            </p:childTnLst>
+                          </p:cTn>
+                        </p:par>
+                      </p:childTnLst>
+                    </p:cTn>
+                  </p:par>
+                </p:childTnLst>
+              </p:cTn>
+              <p:prevCondLst>
+                <p:cond evt="onPrev" delay="0">
+                  <p:tgtEl>
+                    <p:sldTgt/>
+                  </p:tgtEl>
+                </p:cond>
+              </p:prevCondLst>
+              <p:nextCondLst>
+                <p:cond evt="onNext" delay="0">
+                  <p:tgtEl>
+                    <p:sldTgt/>
+                  </p:tgtEl>
+                </p:cond>
+              </p:nextCondLst>
+            </p:seq>
+          </p:childTnLst>
+        </p:cTn>
+      </p:par>
+    </p:tnLst>
+    <p:bldLst>
+      <p:bldP spid="3" grpId="0" build="p"/>
+    </p:bldLst>
+  </p:timing>
 </p:sld>
 </file>
 
@@ -7110,6 +10556,88 @@
   <p:clrMapOvr>
     <a:masterClrMapping/>
   </p:clrMapOvr>
+  <p:timing>
+    <p:tnLst>
+      <p:par>
+        <p:cTn id="1" dur="indefinite" restart="never" nodeType="tmRoot">
+          <p:childTnLst>
+            <p:seq concurrent="1" nextAc="seek">
+              <p:cTn id="2" dur="indefinite" nodeType="mainSeq">
+                <p:childTnLst>
+                  <p:par>
+                    <p:cTn id="3" fill="hold">
+                      <p:stCondLst>
+                        <p:cond delay="indefinite"/>
+                      </p:stCondLst>
+                      <p:childTnLst>
+                        <p:par>
+                          <p:cTn id="4" fill="hold">
+                            <p:stCondLst>
+                              <p:cond delay="0"/>
+                            </p:stCondLst>
+                            <p:childTnLst>
+                              <p:par>
+                                <p:cTn id="5" presetID="1" presetClass="entr" presetSubtype="0" fill="hold" grpId="0" nodeType="clickEffect">
+                                  <p:stCondLst>
+                                    <p:cond delay="0"/>
+                                  </p:stCondLst>
+                                  <p:childTnLst>
+                                    <p:set>
+                                      <p:cBhvr>
+                                        <p:cTn id="6" dur="1" fill="hold">
+                                          <p:stCondLst>
+                                            <p:cond delay="0"/>
+                                          </p:stCondLst>
+                                        </p:cTn>
+                                        <p:tgtEl>
+                                          <p:spTgt spid="3">
+                                            <p:txEl>
+                                              <p:pRg st="0" end="0"/>
+                                            </p:txEl>
+                                          </p:spTgt>
+                                        </p:tgtEl>
+                                        <p:attrNameLst>
+                                          <p:attrName>style.visibility</p:attrName>
+                                        </p:attrNameLst>
+                                      </p:cBhvr>
+                                      <p:to>
+                                        <p:strVal val="visible"/>
+                                      </p:to>
+                                    </p:set>
+                                  </p:childTnLst>
+                                </p:cTn>
+                              </p:par>
+                            </p:childTnLst>
+                          </p:cTn>
+                        </p:par>
+                      </p:childTnLst>
+                    </p:cTn>
+                  </p:par>
+                </p:childTnLst>
+              </p:cTn>
+              <p:prevCondLst>
+                <p:cond evt="onPrev" delay="0">
+                  <p:tgtEl>
+                    <p:sldTgt/>
+                  </p:tgtEl>
+                </p:cond>
+              </p:prevCondLst>
+              <p:nextCondLst>
+                <p:cond evt="onNext" delay="0">
+                  <p:tgtEl>
+                    <p:sldTgt/>
+                  </p:tgtEl>
+                </p:cond>
+              </p:nextCondLst>
+            </p:seq>
+          </p:childTnLst>
+        </p:cTn>
+      </p:par>
+    </p:tnLst>
+    <p:bldLst>
+      <p:bldP spid="3" grpId="0" build="p"/>
+    </p:bldLst>
+  </p:timing>
 </p:sld>
 </file>
 
@@ -7219,6 +10747,88 @@
   <p:clrMapOvr>
     <a:masterClrMapping/>
   </p:clrMapOvr>
+  <p:timing>
+    <p:tnLst>
+      <p:par>
+        <p:cTn id="1" dur="indefinite" restart="never" nodeType="tmRoot">
+          <p:childTnLst>
+            <p:seq concurrent="1" nextAc="seek">
+              <p:cTn id="2" dur="indefinite" nodeType="mainSeq">
+                <p:childTnLst>
+                  <p:par>
+                    <p:cTn id="3" fill="hold">
+                      <p:stCondLst>
+                        <p:cond delay="indefinite"/>
+                      </p:stCondLst>
+                      <p:childTnLst>
+                        <p:par>
+                          <p:cTn id="4" fill="hold">
+                            <p:stCondLst>
+                              <p:cond delay="0"/>
+                            </p:stCondLst>
+                            <p:childTnLst>
+                              <p:par>
+                                <p:cTn id="5" presetID="1" presetClass="entr" presetSubtype="0" fill="hold" grpId="0" nodeType="clickEffect">
+                                  <p:stCondLst>
+                                    <p:cond delay="0"/>
+                                  </p:stCondLst>
+                                  <p:childTnLst>
+                                    <p:set>
+                                      <p:cBhvr>
+                                        <p:cTn id="6" dur="1" fill="hold">
+                                          <p:stCondLst>
+                                            <p:cond delay="0"/>
+                                          </p:stCondLst>
+                                        </p:cTn>
+                                        <p:tgtEl>
+                                          <p:spTgt spid="3">
+                                            <p:txEl>
+                                              <p:pRg st="0" end="0"/>
+                                            </p:txEl>
+                                          </p:spTgt>
+                                        </p:tgtEl>
+                                        <p:attrNameLst>
+                                          <p:attrName>style.visibility</p:attrName>
+                                        </p:attrNameLst>
+                                      </p:cBhvr>
+                                      <p:to>
+                                        <p:strVal val="visible"/>
+                                      </p:to>
+                                    </p:set>
+                                  </p:childTnLst>
+                                </p:cTn>
+                              </p:par>
+                            </p:childTnLst>
+                          </p:cTn>
+                        </p:par>
+                      </p:childTnLst>
+                    </p:cTn>
+                  </p:par>
+                </p:childTnLst>
+              </p:cTn>
+              <p:prevCondLst>
+                <p:cond evt="onPrev" delay="0">
+                  <p:tgtEl>
+                    <p:sldTgt/>
+                  </p:tgtEl>
+                </p:cond>
+              </p:prevCondLst>
+              <p:nextCondLst>
+                <p:cond evt="onNext" delay="0">
+                  <p:tgtEl>
+                    <p:sldTgt/>
+                  </p:tgtEl>
+                </p:cond>
+              </p:nextCondLst>
+            </p:seq>
+          </p:childTnLst>
+        </p:cTn>
+      </p:par>
+    </p:tnLst>
+    <p:bldLst>
+      <p:bldP spid="3" grpId="0" build="p"/>
+    </p:bldLst>
+  </p:timing>
 </p:sld>
 </file>
 
@@ -7923,6 +11533,231 @@
   <p:clrMapOvr>
     <a:masterClrMapping/>
   </p:clrMapOvr>
+  <p:timing>
+    <p:tnLst>
+      <p:par>
+        <p:cTn id="1" dur="indefinite" restart="never" nodeType="tmRoot">
+          <p:childTnLst>
+            <p:seq concurrent="1" nextAc="seek">
+              <p:cTn id="2" dur="indefinite" nodeType="mainSeq">
+                <p:childTnLst>
+                  <p:par>
+                    <p:cTn id="3" fill="hold">
+                      <p:stCondLst>
+                        <p:cond delay="indefinite"/>
+                      </p:stCondLst>
+                      <p:childTnLst>
+                        <p:par>
+                          <p:cTn id="4" fill="hold">
+                            <p:stCondLst>
+                              <p:cond delay="0"/>
+                            </p:stCondLst>
+                            <p:childTnLst>
+                              <p:par>
+                                <p:cTn id="5" presetID="1" presetClass="entr" presetSubtype="0" fill="hold" grpId="0" nodeType="clickEffect">
+                                  <p:stCondLst>
+                                    <p:cond delay="0"/>
+                                  </p:stCondLst>
+                                  <p:childTnLst>
+                                    <p:set>
+                                      <p:cBhvr>
+                                        <p:cTn id="6" dur="1" fill="hold">
+                                          <p:stCondLst>
+                                            <p:cond delay="0"/>
+                                          </p:stCondLst>
+                                        </p:cTn>
+                                        <p:tgtEl>
+                                          <p:spTgt spid="3">
+                                            <p:txEl>
+                                              <p:pRg st="0" end="0"/>
+                                            </p:txEl>
+                                          </p:spTgt>
+                                        </p:tgtEl>
+                                        <p:attrNameLst>
+                                          <p:attrName>style.visibility</p:attrName>
+                                        </p:attrNameLst>
+                                      </p:cBhvr>
+                                      <p:to>
+                                        <p:strVal val="visible"/>
+                                      </p:to>
+                                    </p:set>
+                                  </p:childTnLst>
+                                </p:cTn>
+                              </p:par>
+                            </p:childTnLst>
+                          </p:cTn>
+                        </p:par>
+                      </p:childTnLst>
+                    </p:cTn>
+                  </p:par>
+                  <p:par>
+                    <p:cTn id="7" fill="hold">
+                      <p:stCondLst>
+                        <p:cond delay="indefinite"/>
+                      </p:stCondLst>
+                      <p:childTnLst>
+                        <p:par>
+                          <p:cTn id="8" fill="hold">
+                            <p:stCondLst>
+                              <p:cond delay="0"/>
+                            </p:stCondLst>
+                            <p:childTnLst>
+                              <p:par>
+                                <p:cTn id="9" presetID="1" presetClass="entr" presetSubtype="0" fill="hold" grpId="0" nodeType="clickEffect">
+                                  <p:stCondLst>
+                                    <p:cond delay="0"/>
+                                  </p:stCondLst>
+                                  <p:childTnLst>
+                                    <p:set>
+                                      <p:cBhvr>
+                                        <p:cTn id="10" dur="1" fill="hold">
+                                          <p:stCondLst>
+                                            <p:cond delay="0"/>
+                                          </p:stCondLst>
+                                        </p:cTn>
+                                        <p:tgtEl>
+                                          <p:spTgt spid="3">
+                                            <p:txEl>
+                                              <p:pRg st="1" end="1"/>
+                                            </p:txEl>
+                                          </p:spTgt>
+                                        </p:tgtEl>
+                                        <p:attrNameLst>
+                                          <p:attrName>style.visibility</p:attrName>
+                                        </p:attrNameLst>
+                                      </p:cBhvr>
+                                      <p:to>
+                                        <p:strVal val="visible"/>
+                                      </p:to>
+                                    </p:set>
+                                  </p:childTnLst>
+                                </p:cTn>
+                              </p:par>
+                            </p:childTnLst>
+                          </p:cTn>
+                        </p:par>
+                      </p:childTnLst>
+                    </p:cTn>
+                  </p:par>
+                  <p:par>
+                    <p:cTn id="11" fill="hold">
+                      <p:stCondLst>
+                        <p:cond delay="indefinite"/>
+                      </p:stCondLst>
+                      <p:childTnLst>
+                        <p:par>
+                          <p:cTn id="12" fill="hold">
+                            <p:stCondLst>
+                              <p:cond delay="0"/>
+                            </p:stCondLst>
+                            <p:childTnLst>
+                              <p:par>
+                                <p:cTn id="13" presetID="1" presetClass="entr" presetSubtype="0" fill="hold" grpId="0" nodeType="clickEffect">
+                                  <p:stCondLst>
+                                    <p:cond delay="0"/>
+                                  </p:stCondLst>
+                                  <p:childTnLst>
+                                    <p:set>
+                                      <p:cBhvr>
+                                        <p:cTn id="14" dur="1" fill="hold">
+                                          <p:stCondLst>
+                                            <p:cond delay="0"/>
+                                          </p:stCondLst>
+                                        </p:cTn>
+                                        <p:tgtEl>
+                                          <p:spTgt spid="3">
+                                            <p:txEl>
+                                              <p:pRg st="2" end="2"/>
+                                            </p:txEl>
+                                          </p:spTgt>
+                                        </p:tgtEl>
+                                        <p:attrNameLst>
+                                          <p:attrName>style.visibility</p:attrName>
+                                        </p:attrNameLst>
+                                      </p:cBhvr>
+                                      <p:to>
+                                        <p:strVal val="visible"/>
+                                      </p:to>
+                                    </p:set>
+                                  </p:childTnLst>
+                                </p:cTn>
+                              </p:par>
+                            </p:childTnLst>
+                          </p:cTn>
+                        </p:par>
+                      </p:childTnLst>
+                    </p:cTn>
+                  </p:par>
+                  <p:par>
+                    <p:cTn id="15" fill="hold">
+                      <p:stCondLst>
+                        <p:cond delay="indefinite"/>
+                      </p:stCondLst>
+                      <p:childTnLst>
+                        <p:par>
+                          <p:cTn id="16" fill="hold">
+                            <p:stCondLst>
+                              <p:cond delay="0"/>
+                            </p:stCondLst>
+                            <p:childTnLst>
+                              <p:par>
+                                <p:cTn id="17" presetID="1" presetClass="entr" presetSubtype="0" fill="hold" nodeType="clickEffect">
+                                  <p:stCondLst>
+                                    <p:cond delay="0"/>
+                                  </p:stCondLst>
+                                  <p:childTnLst>
+                                    <p:set>
+                                      <p:cBhvr>
+                                        <p:cTn id="18" dur="1" fill="hold">
+                                          <p:stCondLst>
+                                            <p:cond delay="0"/>
+                                          </p:stCondLst>
+                                        </p:cTn>
+                                        <p:tgtEl>
+                                          <p:spTgt spid="5"/>
+                                        </p:tgtEl>
+                                        <p:attrNameLst>
+                                          <p:attrName>style.visibility</p:attrName>
+                                        </p:attrNameLst>
+                                      </p:cBhvr>
+                                      <p:to>
+                                        <p:strVal val="visible"/>
+                                      </p:to>
+                                    </p:set>
+                                  </p:childTnLst>
+                                </p:cTn>
+                              </p:par>
+                            </p:childTnLst>
+                          </p:cTn>
+                        </p:par>
+                      </p:childTnLst>
+                    </p:cTn>
+                  </p:par>
+                </p:childTnLst>
+              </p:cTn>
+              <p:prevCondLst>
+                <p:cond evt="onPrev" delay="0">
+                  <p:tgtEl>
+                    <p:sldTgt/>
+                  </p:tgtEl>
+                </p:cond>
+              </p:prevCondLst>
+              <p:nextCondLst>
+                <p:cond evt="onNext" delay="0">
+                  <p:tgtEl>
+                    <p:sldTgt/>
+                  </p:tgtEl>
+                </p:cond>
+              </p:nextCondLst>
+            </p:seq>
+          </p:childTnLst>
+        </p:cTn>
+      </p:par>
+    </p:tnLst>
+    <p:bldLst>
+      <p:bldP spid="3" grpId="0" build="p"/>
+    </p:bldLst>
+  </p:timing>
 </p:sld>
 </file>
 

</xml_diff>

<commit_message>
More updates - another push
</commit_message>
<xml_diff>
--- a/Project_Midterm_Presentation.pptx
+++ b/Project_Midterm_Presentation.pptx
@@ -2907,13 +2907,13 @@
   <p:clrMapOvr>
     <a:masterClrMapping/>
   </p:clrMapOvr>
-  <mc:AlternateContent xmlns:mc="http://schemas.openxmlformats.org/markup-compatibility/2006">
-    <mc:Choice xmlns:p14="http://schemas.microsoft.com/office/powerpoint/2010/main" Requires="p14">
+  <mc:AlternateContent xmlns:mc="http://schemas.openxmlformats.org/markup-compatibility/2006" xmlns:p14="http://schemas.microsoft.com/office/powerpoint/2010/main">
+    <mc:Choice Requires="p14">
       <p:transition spd="slow" p14:dur="2000">
         <p14:ferris dir="l"/>
       </p:transition>
     </mc:Choice>
-    <mc:Fallback>
+    <mc:Fallback xmlns="">
       <p:transition spd="slow">
         <p:fade/>
       </p:transition>
@@ -8239,7 +8239,23 @@
                   <a:srgbClr val="002060"/>
                 </a:solidFill>
               </a:rPr>
-              <a:t>Using localization methods to research for a specific area</a:t>
+              <a:t>Using localization methods </a:t>
+            </a:r>
+            <a:r>
+              <a:rPr lang="en-US">
+                <a:solidFill>
+                  <a:srgbClr val="002060"/>
+                </a:solidFill>
+              </a:rPr>
+              <a:t>to research a </a:t>
+            </a:r>
+            <a:r>
+              <a:rPr lang="en-US" dirty="0">
+                <a:solidFill>
+                  <a:srgbClr val="002060"/>
+                </a:solidFill>
+              </a:rPr>
+              <a:t>specific area</a:t>
             </a:r>
           </a:p>
           <a:p>

</xml_diff>

<commit_message>
Few articles in order to find new directions - Future reading. Some changes in the presentation to make it more logical.
</commit_message>
<xml_diff>
--- a/Project_Midterm_Presentation.pptx
+++ b/Project_Midterm_Presentation.pptx
@@ -5,10 +5,10 @@
     <p:sldMasterId id="2147483708" r:id="rId1"/>
   </p:sldMasterIdLst>
   <p:notesMasterIdLst>
-    <p:notesMasterId r:id="rId26"/>
+    <p:notesMasterId r:id="rId28"/>
   </p:notesMasterIdLst>
   <p:handoutMasterIdLst>
-    <p:handoutMasterId r:id="rId27"/>
+    <p:handoutMasterId r:id="rId29"/>
   </p:handoutMasterIdLst>
   <p:sldIdLst>
     <p:sldId id="288" r:id="rId2"/>
@@ -21,20 +21,22 @@
     <p:sldId id="318" r:id="rId9"/>
     <p:sldId id="308" r:id="rId10"/>
     <p:sldId id="293" r:id="rId11"/>
-    <p:sldId id="309" r:id="rId12"/>
-    <p:sldId id="310" r:id="rId13"/>
-    <p:sldId id="307" r:id="rId14"/>
-    <p:sldId id="303" r:id="rId15"/>
-    <p:sldId id="302" r:id="rId16"/>
-    <p:sldId id="314" r:id="rId17"/>
-    <p:sldId id="311" r:id="rId18"/>
-    <p:sldId id="317" r:id="rId19"/>
-    <p:sldId id="313" r:id="rId20"/>
-    <p:sldId id="312" r:id="rId21"/>
-    <p:sldId id="315" r:id="rId22"/>
-    <p:sldId id="316" r:id="rId23"/>
-    <p:sldId id="295" r:id="rId24"/>
-    <p:sldId id="299" r:id="rId25"/>
+    <p:sldId id="322" r:id="rId12"/>
+    <p:sldId id="309" r:id="rId13"/>
+    <p:sldId id="323" r:id="rId14"/>
+    <p:sldId id="307" r:id="rId15"/>
+    <p:sldId id="314" r:id="rId16"/>
+    <p:sldId id="303" r:id="rId17"/>
+    <p:sldId id="302" r:id="rId18"/>
+    <p:sldId id="311" r:id="rId19"/>
+    <p:sldId id="317" r:id="rId20"/>
+    <p:sldId id="313" r:id="rId21"/>
+    <p:sldId id="312" r:id="rId22"/>
+    <p:sldId id="315" r:id="rId23"/>
+    <p:sldId id="319" r:id="rId24"/>
+    <p:sldId id="295" r:id="rId25"/>
+    <p:sldId id="316" r:id="rId26"/>
+    <p:sldId id="299" r:id="rId27"/>
   </p:sldIdLst>
   <p:sldSz cx="9144000" cy="6858000" type="screen4x3"/>
   <p:notesSz cx="7010400" cy="9296400"/>
@@ -162,10 +164,6 @@
     </p:extLst>
   </p:cmAuthor>
 </p:cmAuthorLst>
-</file>
-
-<file path=ppt/revisionInfo.xml><?xml version="1.0" encoding="utf-8"?>
-<p1510:revInfo xmlns:a="http://schemas.openxmlformats.org/drawingml/2006/main" xmlns:r="http://schemas.openxmlformats.org/officeDocument/2006/relationships" xmlns:p1510="http://schemas.microsoft.com/office/powerpoint/2015/10/main"/>
 </file>
 
 <file path=ppt/comments/comment1.xml><?xml version="1.0" encoding="utf-8"?>
@@ -349,7 +347,7 @@
             <a:fld id="{C9B6F397-9295-4C9F-B4B0-31BF9D08FE68}" type="datetimeFigureOut">
               <a:rPr lang="he-IL" smtClean="0"/>
               <a:pPr/>
-              <a:t>ה'/שבט/תשע"ח</a:t>
+              <a:t>ו'/שבט/תשע"ח</a:t>
             </a:fld>
             <a:endParaRPr lang="he-IL"/>
           </a:p>
@@ -516,7 +514,7 @@
             <a:fld id="{543B7BDA-9DDC-4E4C-973D-E4A3E66645CD}" type="datetimeFigureOut">
               <a:rPr lang="he-IL" smtClean="0"/>
               <a:pPr/>
-              <a:t>ה'/שבט/תשע"ח</a:t>
+              <a:t>ו'/שבט/תשע"ח</a:t>
             </a:fld>
             <a:endParaRPr lang="he-IL"/>
           </a:p>
@@ -914,6 +912,91 @@
           <a:bodyPr/>
           <a:lstStyle/>
           <a:p>
+            <a:endParaRPr lang="en-US" dirty="0"/>
+          </a:p>
+        </p:txBody>
+      </p:sp>
+      <p:sp>
+        <p:nvSpPr>
+          <p:cNvPr id="4" name="Slide Number Placeholder 3"/>
+          <p:cNvSpPr>
+            <a:spLocks noGrp="1"/>
+          </p:cNvSpPr>
+          <p:nvPr>
+            <p:ph type="sldNum" sz="quarter" idx="10"/>
+          </p:nvPr>
+        </p:nvSpPr>
+        <p:spPr/>
+        <p:txBody>
+          <a:bodyPr/>
+          <a:lstStyle/>
+          <a:p>
+            <a:fld id="{C8C92D0D-AF30-4211-86C4-A3B87597F349}" type="slidenum">
+              <a:rPr lang="he-IL" smtClean="0"/>
+              <a:pPr/>
+              <a:t>2</a:t>
+            </a:fld>
+            <a:endParaRPr lang="he-IL"/>
+          </a:p>
+        </p:txBody>
+      </p:sp>
+    </p:spTree>
+    <p:extLst>
+      <p:ext uri="{BB962C8B-B14F-4D97-AF65-F5344CB8AC3E}">
+        <p14:creationId xmlns:p14="http://schemas.microsoft.com/office/powerpoint/2010/main" val="3063155852"/>
+      </p:ext>
+    </p:extLst>
+  </p:cSld>
+  <p:clrMapOvr>
+    <a:masterClrMapping/>
+  </p:clrMapOvr>
+</p:notes>
+</file>
+
+<file path=ppt/notesSlides/notesSlide3.xml><?xml version="1.0" encoding="utf-8"?>
+<p:notes xmlns:a="http://schemas.openxmlformats.org/drawingml/2006/main" xmlns:r="http://schemas.openxmlformats.org/officeDocument/2006/relationships" xmlns:p="http://schemas.openxmlformats.org/presentationml/2006/main">
+  <p:cSld>
+    <p:spTree>
+      <p:nvGrpSpPr>
+        <p:cNvPr id="1" name=""/>
+        <p:cNvGrpSpPr/>
+        <p:nvPr/>
+      </p:nvGrpSpPr>
+      <p:grpSpPr>
+        <a:xfrm>
+          <a:off x="0" y="0"/>
+          <a:ext cx="0" cy="0"/>
+          <a:chOff x="0" y="0"/>
+          <a:chExt cx="0" cy="0"/>
+        </a:xfrm>
+      </p:grpSpPr>
+      <p:sp>
+        <p:nvSpPr>
+          <p:cNvPr id="2" name="Slide Image Placeholder 1"/>
+          <p:cNvSpPr>
+            <a:spLocks noGrp="1" noRot="1" noChangeAspect="1"/>
+          </p:cNvSpPr>
+          <p:nvPr>
+            <p:ph type="sldImg"/>
+          </p:nvPr>
+        </p:nvSpPr>
+        <p:spPr/>
+      </p:sp>
+      <p:sp>
+        <p:nvSpPr>
+          <p:cNvPr id="3" name="Notes Placeholder 2"/>
+          <p:cNvSpPr>
+            <a:spLocks noGrp="1"/>
+          </p:cNvSpPr>
+          <p:nvPr>
+            <p:ph type="body" idx="1"/>
+          </p:nvPr>
+        </p:nvSpPr>
+        <p:spPr/>
+        <p:txBody>
+          <a:bodyPr/>
+          <a:lstStyle/>
+          <a:p>
             <a:pPr marL="0" marR="0" lvl="0" indent="0" algn="r" defTabSz="914400" rtl="1" eaLnBrk="1" fontAlgn="auto" latinLnBrk="0" hangingPunct="1">
               <a:lnSpc>
                 <a:spcPct val="100000"/>
@@ -1051,91 +1134,6 @@
 </p:notes>
 </file>
 
-<file path=ppt/notesSlides/notesSlide3.xml><?xml version="1.0" encoding="utf-8"?>
-<p:notes xmlns:a="http://schemas.openxmlformats.org/drawingml/2006/main" xmlns:r="http://schemas.openxmlformats.org/officeDocument/2006/relationships" xmlns:p="http://schemas.openxmlformats.org/presentationml/2006/main">
-  <p:cSld>
-    <p:spTree>
-      <p:nvGrpSpPr>
-        <p:cNvPr id="1" name=""/>
-        <p:cNvGrpSpPr/>
-        <p:nvPr/>
-      </p:nvGrpSpPr>
-      <p:grpSpPr>
-        <a:xfrm>
-          <a:off x="0" y="0"/>
-          <a:ext cx="0" cy="0"/>
-          <a:chOff x="0" y="0"/>
-          <a:chExt cx="0" cy="0"/>
-        </a:xfrm>
-      </p:grpSpPr>
-      <p:sp>
-        <p:nvSpPr>
-          <p:cNvPr id="2" name="Slide Image Placeholder 1"/>
-          <p:cNvSpPr>
-            <a:spLocks noGrp="1" noRot="1" noChangeAspect="1"/>
-          </p:cNvSpPr>
-          <p:nvPr>
-            <p:ph type="sldImg"/>
-          </p:nvPr>
-        </p:nvSpPr>
-        <p:spPr/>
-      </p:sp>
-      <p:sp>
-        <p:nvSpPr>
-          <p:cNvPr id="3" name="Notes Placeholder 2"/>
-          <p:cNvSpPr>
-            <a:spLocks noGrp="1"/>
-          </p:cNvSpPr>
-          <p:nvPr>
-            <p:ph type="body" idx="1"/>
-          </p:nvPr>
-        </p:nvSpPr>
-        <p:spPr/>
-        <p:txBody>
-          <a:bodyPr/>
-          <a:lstStyle/>
-          <a:p>
-            <a:endParaRPr lang="en-IL" dirty="0"/>
-          </a:p>
-        </p:txBody>
-      </p:sp>
-      <p:sp>
-        <p:nvSpPr>
-          <p:cNvPr id="4" name="Slide Number Placeholder 3"/>
-          <p:cNvSpPr>
-            <a:spLocks noGrp="1"/>
-          </p:cNvSpPr>
-          <p:nvPr>
-            <p:ph type="sldNum" sz="quarter" idx="10"/>
-          </p:nvPr>
-        </p:nvSpPr>
-        <p:spPr/>
-        <p:txBody>
-          <a:bodyPr/>
-          <a:lstStyle/>
-          <a:p>
-            <a:fld id="{C8C92D0D-AF30-4211-86C4-A3B87597F349}" type="slidenum">
-              <a:rPr lang="he-IL" smtClean="0"/>
-              <a:pPr/>
-              <a:t>21</a:t>
-            </a:fld>
-            <a:endParaRPr lang="he-IL"/>
-          </a:p>
-        </p:txBody>
-      </p:sp>
-    </p:spTree>
-    <p:extLst>
-      <p:ext uri="{BB962C8B-B14F-4D97-AF65-F5344CB8AC3E}">
-        <p14:creationId xmlns:p14="http://schemas.microsoft.com/office/powerpoint/2010/main" val="3672709046"/>
-      </p:ext>
-    </p:extLst>
-  </p:cSld>
-  <p:clrMapOvr>
-    <a:masterClrMapping/>
-  </p:clrMapOvr>
-</p:notes>
-</file>
-
 <file path=ppt/notesSlides/notesSlide4.xml><?xml version="1.0" encoding="utf-8"?>
 <p:notes xmlns:a="http://schemas.openxmlformats.org/drawingml/2006/main" xmlns:r="http://schemas.openxmlformats.org/officeDocument/2006/relationships" xmlns:p="http://schemas.openxmlformats.org/presentationml/2006/main">
   <p:cSld>
@@ -1202,7 +1200,262 @@
             <a:fld id="{C8C92D0D-AF30-4211-86C4-A3B87597F349}" type="slidenum">
               <a:rPr lang="he-IL" smtClean="0"/>
               <a:pPr/>
+              <a:t>13</a:t>
+            </a:fld>
+            <a:endParaRPr lang="he-IL"/>
+          </a:p>
+        </p:txBody>
+      </p:sp>
+    </p:spTree>
+    <p:extLst>
+      <p:ext uri="{BB962C8B-B14F-4D97-AF65-F5344CB8AC3E}">
+        <p14:creationId xmlns:p14="http://schemas.microsoft.com/office/powerpoint/2010/main" val="1263040368"/>
+      </p:ext>
+    </p:extLst>
+  </p:cSld>
+  <p:clrMapOvr>
+    <a:masterClrMapping/>
+  </p:clrMapOvr>
+</p:notes>
+</file>
+
+<file path=ppt/notesSlides/notesSlide5.xml><?xml version="1.0" encoding="utf-8"?>
+<p:notes xmlns:a="http://schemas.openxmlformats.org/drawingml/2006/main" xmlns:r="http://schemas.openxmlformats.org/officeDocument/2006/relationships" xmlns:p="http://schemas.openxmlformats.org/presentationml/2006/main">
+  <p:cSld>
+    <p:spTree>
+      <p:nvGrpSpPr>
+        <p:cNvPr id="1" name=""/>
+        <p:cNvGrpSpPr/>
+        <p:nvPr/>
+      </p:nvGrpSpPr>
+      <p:grpSpPr>
+        <a:xfrm>
+          <a:off x="0" y="0"/>
+          <a:ext cx="0" cy="0"/>
+          <a:chOff x="0" y="0"/>
+          <a:chExt cx="0" cy="0"/>
+        </a:xfrm>
+      </p:grpSpPr>
+      <p:sp>
+        <p:nvSpPr>
+          <p:cNvPr id="2" name="Slide Image Placeholder 1"/>
+          <p:cNvSpPr>
+            <a:spLocks noGrp="1" noRot="1" noChangeAspect="1"/>
+          </p:cNvSpPr>
+          <p:nvPr>
+            <p:ph type="sldImg"/>
+          </p:nvPr>
+        </p:nvSpPr>
+        <p:spPr/>
+      </p:sp>
+      <p:sp>
+        <p:nvSpPr>
+          <p:cNvPr id="3" name="Notes Placeholder 2"/>
+          <p:cNvSpPr>
+            <a:spLocks noGrp="1"/>
+          </p:cNvSpPr>
+          <p:nvPr>
+            <p:ph type="body" idx="1"/>
+          </p:nvPr>
+        </p:nvSpPr>
+        <p:spPr/>
+        <p:txBody>
+          <a:bodyPr/>
+          <a:lstStyle/>
+          <a:p>
+            <a:endParaRPr lang="en-IL" dirty="0"/>
+          </a:p>
+        </p:txBody>
+      </p:sp>
+      <p:sp>
+        <p:nvSpPr>
+          <p:cNvPr id="4" name="Slide Number Placeholder 3"/>
+          <p:cNvSpPr>
+            <a:spLocks noGrp="1"/>
+          </p:cNvSpPr>
+          <p:nvPr>
+            <p:ph type="sldNum" sz="quarter" idx="10"/>
+          </p:nvPr>
+        </p:nvSpPr>
+        <p:spPr/>
+        <p:txBody>
+          <a:bodyPr/>
+          <a:lstStyle/>
+          <a:p>
+            <a:fld id="{C8C92D0D-AF30-4211-86C4-A3B87597F349}" type="slidenum">
+              <a:rPr lang="he-IL" smtClean="0"/>
+              <a:pPr/>
+              <a:t>22</a:t>
+            </a:fld>
+            <a:endParaRPr lang="he-IL"/>
+          </a:p>
+        </p:txBody>
+      </p:sp>
+    </p:spTree>
+    <p:extLst>
+      <p:ext uri="{BB962C8B-B14F-4D97-AF65-F5344CB8AC3E}">
+        <p14:creationId xmlns:p14="http://schemas.microsoft.com/office/powerpoint/2010/main" val="3672709046"/>
+      </p:ext>
+    </p:extLst>
+  </p:cSld>
+  <p:clrMapOvr>
+    <a:masterClrMapping/>
+  </p:clrMapOvr>
+</p:notes>
+</file>
+
+<file path=ppt/notesSlides/notesSlide6.xml><?xml version="1.0" encoding="utf-8"?>
+<p:notes xmlns:a="http://schemas.openxmlformats.org/drawingml/2006/main" xmlns:r="http://schemas.openxmlformats.org/officeDocument/2006/relationships" xmlns:p="http://schemas.openxmlformats.org/presentationml/2006/main">
+  <p:cSld>
+    <p:spTree>
+      <p:nvGrpSpPr>
+        <p:cNvPr id="1" name=""/>
+        <p:cNvGrpSpPr/>
+        <p:nvPr/>
+      </p:nvGrpSpPr>
+      <p:grpSpPr>
+        <a:xfrm>
+          <a:off x="0" y="0"/>
+          <a:ext cx="0" cy="0"/>
+          <a:chOff x="0" y="0"/>
+          <a:chExt cx="0" cy="0"/>
+        </a:xfrm>
+      </p:grpSpPr>
+      <p:sp>
+        <p:nvSpPr>
+          <p:cNvPr id="2" name="Slide Image Placeholder 1"/>
+          <p:cNvSpPr>
+            <a:spLocks noGrp="1" noRot="1" noChangeAspect="1"/>
+          </p:cNvSpPr>
+          <p:nvPr>
+            <p:ph type="sldImg"/>
+          </p:nvPr>
+        </p:nvSpPr>
+        <p:spPr/>
+      </p:sp>
+      <p:sp>
+        <p:nvSpPr>
+          <p:cNvPr id="3" name="Notes Placeholder 2"/>
+          <p:cNvSpPr>
+            <a:spLocks noGrp="1"/>
+          </p:cNvSpPr>
+          <p:nvPr>
+            <p:ph type="body" idx="1"/>
+          </p:nvPr>
+        </p:nvSpPr>
+        <p:spPr/>
+        <p:txBody>
+          <a:bodyPr/>
+          <a:lstStyle/>
+          <a:p>
+            <a:endParaRPr lang="en-US" dirty="0"/>
+          </a:p>
+        </p:txBody>
+      </p:sp>
+      <p:sp>
+        <p:nvSpPr>
+          <p:cNvPr id="4" name="Slide Number Placeholder 3"/>
+          <p:cNvSpPr>
+            <a:spLocks noGrp="1"/>
+          </p:cNvSpPr>
+          <p:nvPr>
+            <p:ph type="sldNum" sz="quarter" idx="10"/>
+          </p:nvPr>
+        </p:nvSpPr>
+        <p:spPr/>
+        <p:txBody>
+          <a:bodyPr/>
+          <a:lstStyle/>
+          <a:p>
+            <a:fld id="{C8C92D0D-AF30-4211-86C4-A3B87597F349}" type="slidenum">
+              <a:rPr lang="he-IL" smtClean="0"/>
+              <a:pPr/>
               <a:t>24</a:t>
+            </a:fld>
+            <a:endParaRPr lang="he-IL"/>
+          </a:p>
+        </p:txBody>
+      </p:sp>
+    </p:spTree>
+    <p:extLst>
+      <p:ext uri="{BB962C8B-B14F-4D97-AF65-F5344CB8AC3E}">
+        <p14:creationId xmlns:p14="http://schemas.microsoft.com/office/powerpoint/2010/main" val="933217585"/>
+      </p:ext>
+    </p:extLst>
+  </p:cSld>
+  <p:clrMapOvr>
+    <a:masterClrMapping/>
+  </p:clrMapOvr>
+</p:notes>
+</file>
+
+<file path=ppt/notesSlides/notesSlide7.xml><?xml version="1.0" encoding="utf-8"?>
+<p:notes xmlns:a="http://schemas.openxmlformats.org/drawingml/2006/main" xmlns:r="http://schemas.openxmlformats.org/officeDocument/2006/relationships" xmlns:p="http://schemas.openxmlformats.org/presentationml/2006/main">
+  <p:cSld>
+    <p:spTree>
+      <p:nvGrpSpPr>
+        <p:cNvPr id="1" name=""/>
+        <p:cNvGrpSpPr/>
+        <p:nvPr/>
+      </p:nvGrpSpPr>
+      <p:grpSpPr>
+        <a:xfrm>
+          <a:off x="0" y="0"/>
+          <a:ext cx="0" cy="0"/>
+          <a:chOff x="0" y="0"/>
+          <a:chExt cx="0" cy="0"/>
+        </a:xfrm>
+      </p:grpSpPr>
+      <p:sp>
+        <p:nvSpPr>
+          <p:cNvPr id="2" name="Slide Image Placeholder 1"/>
+          <p:cNvSpPr>
+            <a:spLocks noGrp="1" noRot="1" noChangeAspect="1"/>
+          </p:cNvSpPr>
+          <p:nvPr>
+            <p:ph type="sldImg"/>
+          </p:nvPr>
+        </p:nvSpPr>
+        <p:spPr/>
+      </p:sp>
+      <p:sp>
+        <p:nvSpPr>
+          <p:cNvPr id="3" name="Notes Placeholder 2"/>
+          <p:cNvSpPr>
+            <a:spLocks noGrp="1"/>
+          </p:cNvSpPr>
+          <p:nvPr>
+            <p:ph type="body" idx="1"/>
+          </p:nvPr>
+        </p:nvSpPr>
+        <p:spPr/>
+        <p:txBody>
+          <a:bodyPr/>
+          <a:lstStyle/>
+          <a:p>
+            <a:endParaRPr lang="en-US" dirty="0"/>
+          </a:p>
+        </p:txBody>
+      </p:sp>
+      <p:sp>
+        <p:nvSpPr>
+          <p:cNvPr id="4" name="Slide Number Placeholder 3"/>
+          <p:cNvSpPr>
+            <a:spLocks noGrp="1"/>
+          </p:cNvSpPr>
+          <p:nvPr>
+            <p:ph type="sldNum" sz="quarter" idx="10"/>
+          </p:nvPr>
+        </p:nvSpPr>
+        <p:spPr/>
+        <p:txBody>
+          <a:bodyPr/>
+          <a:lstStyle/>
+          <a:p>
+            <a:fld id="{C8C92D0D-AF30-4211-86C4-A3B87597F349}" type="slidenum">
+              <a:rPr lang="he-IL" smtClean="0"/>
+              <a:pPr/>
+              <a:t>26</a:t>
             </a:fld>
             <a:endParaRPr lang="he-IL"/>
           </a:p>
@@ -2014,7 +2267,7 @@
           <a:p>
             <a:fld id="{D7E1C0B7-AB0D-4AF9-9C80-529313F012B2}" type="datetime1">
               <a:rPr lang="en-US" smtClean="0"/>
-              <a:t>1/21/2018</a:t>
+              <a:t>1/22/2018</a:t>
             </a:fld>
             <a:endParaRPr lang="en-US"/>
           </a:p>
@@ -2258,7 +2511,7 @@
           <a:p>
             <a:fld id="{2A982F35-29BF-4127-A4F3-CE8B20D358F7}" type="datetime1">
               <a:rPr lang="en-US" smtClean="0"/>
-              <a:t>1/21/2018</a:t>
+              <a:t>1/22/2018</a:t>
             </a:fld>
             <a:endParaRPr lang="en-US"/>
           </a:p>
@@ -3026,7 +3279,7 @@
                   <a:srgbClr val="002060"/>
                 </a:solidFill>
               </a:rPr>
-              <a:t>Riemannian tools for dimension reduction</a:t>
+              <a:t>Riemannian tools for dimensionality reduction</a:t>
             </a:r>
           </a:p>
           <a:p>
@@ -3373,6 +3626,508 @@
           <a:chExt cx="0" cy="0"/>
         </a:xfrm>
       </p:grpSpPr>
+      <p:sp>
+        <p:nvSpPr>
+          <p:cNvPr id="2" name="Title 1"/>
+          <p:cNvSpPr>
+            <a:spLocks noGrp="1"/>
+          </p:cNvSpPr>
+          <p:nvPr>
+            <p:ph type="title"/>
+          </p:nvPr>
+        </p:nvSpPr>
+        <p:spPr/>
+        <p:txBody>
+          <a:bodyPr/>
+          <a:lstStyle/>
+          <a:p>
+            <a:r>
+              <a:rPr lang="en-US" dirty="0">
+                <a:solidFill>
+                  <a:srgbClr val="002060"/>
+                </a:solidFill>
+              </a:rPr>
+              <a:t>Preprocess</a:t>
+            </a:r>
+            <a:endParaRPr lang="he-IL" dirty="0">
+              <a:solidFill>
+                <a:srgbClr val="002060"/>
+              </a:solidFill>
+            </a:endParaRPr>
+          </a:p>
+        </p:txBody>
+      </p:sp>
+      <p:sp>
+        <p:nvSpPr>
+          <p:cNvPr id="3" name="Content Placeholder 2"/>
+          <p:cNvSpPr>
+            <a:spLocks noGrp="1"/>
+          </p:cNvSpPr>
+          <p:nvPr>
+            <p:ph idx="1"/>
+          </p:nvPr>
+        </p:nvSpPr>
+        <p:spPr>
+          <a:xfrm>
+            <a:off x="457200" y="1600200"/>
+            <a:ext cx="8229600" cy="4525963"/>
+          </a:xfrm>
+        </p:spPr>
+        <p:txBody>
+          <a:bodyPr>
+            <a:normAutofit fontScale="92500"/>
+          </a:bodyPr>
+          <a:lstStyle/>
+          <a:p>
+            <a:r>
+              <a:rPr lang="en-US" dirty="0">
+                <a:solidFill>
+                  <a:srgbClr val="002060"/>
+                </a:solidFill>
+              </a:rPr>
+              <a:t>The pulse (1.5 T) removed and replaced by interpolation</a:t>
+            </a:r>
+          </a:p>
+          <a:p>
+            <a:r>
+              <a:rPr lang="en-US" dirty="0">
+                <a:solidFill>
+                  <a:srgbClr val="002060"/>
+                </a:solidFill>
+              </a:rPr>
+              <a:t>Band Pass Filter – 1Hz-100Hz</a:t>
+            </a:r>
+          </a:p>
+          <a:p>
+            <a:r>
+              <a:rPr lang="en-US" dirty="0">
+                <a:solidFill>
+                  <a:srgbClr val="002060"/>
+                </a:solidFill>
+              </a:rPr>
+              <a:t>Downsampled to 1kHz</a:t>
+            </a:r>
+          </a:p>
+          <a:p>
+            <a:r>
+              <a:rPr lang="en-US" dirty="0">
+                <a:solidFill>
+                  <a:srgbClr val="002060"/>
+                </a:solidFill>
+              </a:rPr>
+              <a:t>Division to trials (2 sec each)</a:t>
+            </a:r>
+          </a:p>
+          <a:p>
+            <a:r>
+              <a:rPr lang="en-US" dirty="0">
+                <a:solidFill>
+                  <a:srgbClr val="002060"/>
+                </a:solidFill>
+              </a:rPr>
+              <a:t>Double ICA to separate artifacts (blinks, movements, etc.)</a:t>
+            </a:r>
+          </a:p>
+          <a:p>
+            <a:r>
+              <a:rPr lang="en-US" dirty="0">
+                <a:solidFill>
+                  <a:srgbClr val="002060"/>
+                </a:solidFill>
+              </a:rPr>
+              <a:t> CSD to cancel signal leakage between electrodes</a:t>
+            </a:r>
+          </a:p>
+          <a:p>
+            <a:endParaRPr lang="en-US" dirty="0">
+              <a:solidFill>
+                <a:srgbClr val="002060"/>
+              </a:solidFill>
+            </a:endParaRPr>
+          </a:p>
+        </p:txBody>
+      </p:sp>
+      <p:sp>
+        <p:nvSpPr>
+          <p:cNvPr id="5" name="Slide Number Placeholder 4"/>
+          <p:cNvSpPr>
+            <a:spLocks noGrp="1"/>
+          </p:cNvSpPr>
+          <p:nvPr>
+            <p:ph type="sldNum" sz="quarter" idx="12"/>
+          </p:nvPr>
+        </p:nvSpPr>
+        <p:spPr/>
+        <p:txBody>
+          <a:bodyPr/>
+          <a:lstStyle/>
+          <a:p>
+            <a:fld id="{B01D9778-10B4-40FB-B4E4-44FA89A86639}" type="slidenum">
+              <a:rPr lang="en-US" smtClean="0"/>
+              <a:pPr/>
+              <a:t>11</a:t>
+            </a:fld>
+            <a:endParaRPr lang="en-US"/>
+          </a:p>
+        </p:txBody>
+      </p:sp>
+    </p:spTree>
+    <p:extLst>
+      <p:ext uri="{BB962C8B-B14F-4D97-AF65-F5344CB8AC3E}">
+        <p14:creationId xmlns:p14="http://schemas.microsoft.com/office/powerpoint/2010/main" val="1389072239"/>
+      </p:ext>
+    </p:extLst>
+  </p:cSld>
+  <p:clrMapOvr>
+    <a:masterClrMapping/>
+  </p:clrMapOvr>
+  <p:timing>
+    <p:tnLst>
+      <p:par>
+        <p:cTn id="1" dur="indefinite" restart="never" nodeType="tmRoot">
+          <p:childTnLst>
+            <p:seq concurrent="1" nextAc="seek">
+              <p:cTn id="2" dur="indefinite" nodeType="mainSeq">
+                <p:childTnLst>
+                  <p:par>
+                    <p:cTn id="3" fill="hold">
+                      <p:stCondLst>
+                        <p:cond delay="indefinite"/>
+                      </p:stCondLst>
+                      <p:childTnLst>
+                        <p:par>
+                          <p:cTn id="4" fill="hold">
+                            <p:stCondLst>
+                              <p:cond delay="0"/>
+                            </p:stCondLst>
+                            <p:childTnLst>
+                              <p:par>
+                                <p:cTn id="5" presetID="1" presetClass="entr" presetSubtype="0" fill="hold" grpId="0" nodeType="clickEffect">
+                                  <p:stCondLst>
+                                    <p:cond delay="0"/>
+                                  </p:stCondLst>
+                                  <p:childTnLst>
+                                    <p:set>
+                                      <p:cBhvr>
+                                        <p:cTn id="6" dur="1" fill="hold">
+                                          <p:stCondLst>
+                                            <p:cond delay="0"/>
+                                          </p:stCondLst>
+                                        </p:cTn>
+                                        <p:tgtEl>
+                                          <p:spTgt spid="3">
+                                            <p:txEl>
+                                              <p:pRg st="0" end="0"/>
+                                            </p:txEl>
+                                          </p:spTgt>
+                                        </p:tgtEl>
+                                        <p:attrNameLst>
+                                          <p:attrName>style.visibility</p:attrName>
+                                        </p:attrNameLst>
+                                      </p:cBhvr>
+                                      <p:to>
+                                        <p:strVal val="visible"/>
+                                      </p:to>
+                                    </p:set>
+                                  </p:childTnLst>
+                                </p:cTn>
+                              </p:par>
+                            </p:childTnLst>
+                          </p:cTn>
+                        </p:par>
+                      </p:childTnLst>
+                    </p:cTn>
+                  </p:par>
+                  <p:par>
+                    <p:cTn id="7" fill="hold">
+                      <p:stCondLst>
+                        <p:cond delay="indefinite"/>
+                      </p:stCondLst>
+                      <p:childTnLst>
+                        <p:par>
+                          <p:cTn id="8" fill="hold">
+                            <p:stCondLst>
+                              <p:cond delay="0"/>
+                            </p:stCondLst>
+                            <p:childTnLst>
+                              <p:par>
+                                <p:cTn id="9" presetID="1" presetClass="entr" presetSubtype="0" fill="hold" grpId="0" nodeType="clickEffect">
+                                  <p:stCondLst>
+                                    <p:cond delay="0"/>
+                                  </p:stCondLst>
+                                  <p:childTnLst>
+                                    <p:set>
+                                      <p:cBhvr>
+                                        <p:cTn id="10" dur="1" fill="hold">
+                                          <p:stCondLst>
+                                            <p:cond delay="0"/>
+                                          </p:stCondLst>
+                                        </p:cTn>
+                                        <p:tgtEl>
+                                          <p:spTgt spid="3">
+                                            <p:txEl>
+                                              <p:pRg st="1" end="1"/>
+                                            </p:txEl>
+                                          </p:spTgt>
+                                        </p:tgtEl>
+                                        <p:attrNameLst>
+                                          <p:attrName>style.visibility</p:attrName>
+                                        </p:attrNameLst>
+                                      </p:cBhvr>
+                                      <p:to>
+                                        <p:strVal val="visible"/>
+                                      </p:to>
+                                    </p:set>
+                                  </p:childTnLst>
+                                </p:cTn>
+                              </p:par>
+                            </p:childTnLst>
+                          </p:cTn>
+                        </p:par>
+                      </p:childTnLst>
+                    </p:cTn>
+                  </p:par>
+                  <p:par>
+                    <p:cTn id="11" fill="hold">
+                      <p:stCondLst>
+                        <p:cond delay="indefinite"/>
+                      </p:stCondLst>
+                      <p:childTnLst>
+                        <p:par>
+                          <p:cTn id="12" fill="hold">
+                            <p:stCondLst>
+                              <p:cond delay="0"/>
+                            </p:stCondLst>
+                            <p:childTnLst>
+                              <p:par>
+                                <p:cTn id="13" presetID="1" presetClass="entr" presetSubtype="0" fill="hold" grpId="0" nodeType="clickEffect">
+                                  <p:stCondLst>
+                                    <p:cond delay="0"/>
+                                  </p:stCondLst>
+                                  <p:childTnLst>
+                                    <p:set>
+                                      <p:cBhvr>
+                                        <p:cTn id="14" dur="1" fill="hold">
+                                          <p:stCondLst>
+                                            <p:cond delay="0"/>
+                                          </p:stCondLst>
+                                        </p:cTn>
+                                        <p:tgtEl>
+                                          <p:spTgt spid="3">
+                                            <p:txEl>
+                                              <p:pRg st="2" end="2"/>
+                                            </p:txEl>
+                                          </p:spTgt>
+                                        </p:tgtEl>
+                                        <p:attrNameLst>
+                                          <p:attrName>style.visibility</p:attrName>
+                                        </p:attrNameLst>
+                                      </p:cBhvr>
+                                      <p:to>
+                                        <p:strVal val="visible"/>
+                                      </p:to>
+                                    </p:set>
+                                  </p:childTnLst>
+                                </p:cTn>
+                              </p:par>
+                            </p:childTnLst>
+                          </p:cTn>
+                        </p:par>
+                      </p:childTnLst>
+                    </p:cTn>
+                  </p:par>
+                  <p:par>
+                    <p:cTn id="15" fill="hold">
+                      <p:stCondLst>
+                        <p:cond delay="indefinite"/>
+                      </p:stCondLst>
+                      <p:childTnLst>
+                        <p:par>
+                          <p:cTn id="16" fill="hold">
+                            <p:stCondLst>
+                              <p:cond delay="0"/>
+                            </p:stCondLst>
+                            <p:childTnLst>
+                              <p:par>
+                                <p:cTn id="17" presetID="1" presetClass="entr" presetSubtype="0" fill="hold" grpId="0" nodeType="clickEffect">
+                                  <p:stCondLst>
+                                    <p:cond delay="0"/>
+                                  </p:stCondLst>
+                                  <p:childTnLst>
+                                    <p:set>
+                                      <p:cBhvr>
+                                        <p:cTn id="18" dur="1" fill="hold">
+                                          <p:stCondLst>
+                                            <p:cond delay="0"/>
+                                          </p:stCondLst>
+                                        </p:cTn>
+                                        <p:tgtEl>
+                                          <p:spTgt spid="3">
+                                            <p:txEl>
+                                              <p:pRg st="3" end="3"/>
+                                            </p:txEl>
+                                          </p:spTgt>
+                                        </p:tgtEl>
+                                        <p:attrNameLst>
+                                          <p:attrName>style.visibility</p:attrName>
+                                        </p:attrNameLst>
+                                      </p:cBhvr>
+                                      <p:to>
+                                        <p:strVal val="visible"/>
+                                      </p:to>
+                                    </p:set>
+                                  </p:childTnLst>
+                                </p:cTn>
+                              </p:par>
+                            </p:childTnLst>
+                          </p:cTn>
+                        </p:par>
+                      </p:childTnLst>
+                    </p:cTn>
+                  </p:par>
+                  <p:par>
+                    <p:cTn id="19" fill="hold">
+                      <p:stCondLst>
+                        <p:cond delay="indefinite"/>
+                      </p:stCondLst>
+                      <p:childTnLst>
+                        <p:par>
+                          <p:cTn id="20" fill="hold">
+                            <p:stCondLst>
+                              <p:cond delay="0"/>
+                            </p:stCondLst>
+                            <p:childTnLst>
+                              <p:par>
+                                <p:cTn id="21" presetID="1" presetClass="entr" presetSubtype="0" fill="hold" grpId="0" nodeType="clickEffect">
+                                  <p:stCondLst>
+                                    <p:cond delay="0"/>
+                                  </p:stCondLst>
+                                  <p:childTnLst>
+                                    <p:set>
+                                      <p:cBhvr>
+                                        <p:cTn id="22" dur="1" fill="hold">
+                                          <p:stCondLst>
+                                            <p:cond delay="0"/>
+                                          </p:stCondLst>
+                                        </p:cTn>
+                                        <p:tgtEl>
+                                          <p:spTgt spid="3">
+                                            <p:txEl>
+                                              <p:pRg st="4" end="4"/>
+                                            </p:txEl>
+                                          </p:spTgt>
+                                        </p:tgtEl>
+                                        <p:attrNameLst>
+                                          <p:attrName>style.visibility</p:attrName>
+                                        </p:attrNameLst>
+                                      </p:cBhvr>
+                                      <p:to>
+                                        <p:strVal val="visible"/>
+                                      </p:to>
+                                    </p:set>
+                                  </p:childTnLst>
+                                </p:cTn>
+                              </p:par>
+                            </p:childTnLst>
+                          </p:cTn>
+                        </p:par>
+                      </p:childTnLst>
+                    </p:cTn>
+                  </p:par>
+                  <p:par>
+                    <p:cTn id="23" fill="hold">
+                      <p:stCondLst>
+                        <p:cond delay="indefinite"/>
+                      </p:stCondLst>
+                      <p:childTnLst>
+                        <p:par>
+                          <p:cTn id="24" fill="hold">
+                            <p:stCondLst>
+                              <p:cond delay="0"/>
+                            </p:stCondLst>
+                            <p:childTnLst>
+                              <p:par>
+                                <p:cTn id="25" presetID="1" presetClass="entr" presetSubtype="0" fill="hold" grpId="0" nodeType="clickEffect">
+                                  <p:stCondLst>
+                                    <p:cond delay="0"/>
+                                  </p:stCondLst>
+                                  <p:childTnLst>
+                                    <p:set>
+                                      <p:cBhvr>
+                                        <p:cTn id="26" dur="1" fill="hold">
+                                          <p:stCondLst>
+                                            <p:cond delay="0"/>
+                                          </p:stCondLst>
+                                        </p:cTn>
+                                        <p:tgtEl>
+                                          <p:spTgt spid="3">
+                                            <p:txEl>
+                                              <p:pRg st="5" end="5"/>
+                                            </p:txEl>
+                                          </p:spTgt>
+                                        </p:tgtEl>
+                                        <p:attrNameLst>
+                                          <p:attrName>style.visibility</p:attrName>
+                                        </p:attrNameLst>
+                                      </p:cBhvr>
+                                      <p:to>
+                                        <p:strVal val="visible"/>
+                                      </p:to>
+                                    </p:set>
+                                  </p:childTnLst>
+                                </p:cTn>
+                              </p:par>
+                            </p:childTnLst>
+                          </p:cTn>
+                        </p:par>
+                      </p:childTnLst>
+                    </p:cTn>
+                  </p:par>
+                </p:childTnLst>
+              </p:cTn>
+              <p:prevCondLst>
+                <p:cond evt="onPrev" delay="0">
+                  <p:tgtEl>
+                    <p:sldTgt/>
+                  </p:tgtEl>
+                </p:cond>
+              </p:prevCondLst>
+              <p:nextCondLst>
+                <p:cond evt="onNext" delay="0">
+                  <p:tgtEl>
+                    <p:sldTgt/>
+                  </p:tgtEl>
+                </p:cond>
+              </p:nextCondLst>
+            </p:seq>
+          </p:childTnLst>
+        </p:cTn>
+      </p:par>
+    </p:tnLst>
+    <p:bldLst>
+      <p:bldP spid="3" grpId="0" build="p"/>
+    </p:bldLst>
+  </p:timing>
+</p:sld>
+</file>
+
+<file path=ppt/slides/slide12.xml><?xml version="1.0" encoding="utf-8"?>
+<p:sld xmlns:a="http://schemas.openxmlformats.org/drawingml/2006/main" xmlns:r="http://schemas.openxmlformats.org/officeDocument/2006/relationships" xmlns:p="http://schemas.openxmlformats.org/presentationml/2006/main">
+  <p:cSld>
+    <p:spTree>
+      <p:nvGrpSpPr>
+        <p:cNvPr id="1" name=""/>
+        <p:cNvGrpSpPr/>
+        <p:nvPr/>
+      </p:nvGrpSpPr>
+      <p:grpSpPr>
+        <a:xfrm>
+          <a:off x="0" y="0"/>
+          <a:ext cx="0" cy="0"/>
+          <a:chOff x="0" y="0"/>
+          <a:chExt cx="0" cy="0"/>
+        </a:xfrm>
+      </p:grpSpPr>
       <p:pic>
         <p:nvPicPr>
           <p:cNvPr id="6" name="Content Placeholder 5">
@@ -3430,7 +4185,7 @@
                   <a:srgbClr val="002060"/>
                 </a:solidFill>
               </a:rPr>
-              <a:t>Raw Data</a:t>
+              <a:t>Given Data</a:t>
             </a:r>
             <a:endParaRPr lang="he-IL" dirty="0">
               <a:solidFill>
@@ -3458,7 +4213,7 @@
             <a:fld id="{B01D9778-10B4-40FB-B4E4-44FA89A86639}" type="slidenum">
               <a:rPr lang="en-US" smtClean="0"/>
               <a:pPr/>
-              <a:t>11</a:t>
+              <a:t>12</a:t>
             </a:fld>
             <a:endParaRPr lang="en-US"/>
           </a:p>
@@ -3921,7 +4676,7 @@
 </p:sld>
 </file>
 
-<file path=ppt/slides/slide12.xml><?xml version="1.0" encoding="utf-8"?>
+<file path=ppt/slides/slide13.xml><?xml version="1.0" encoding="utf-8"?>
 <p:sld xmlns:a="http://schemas.openxmlformats.org/drawingml/2006/main" xmlns:r="http://schemas.openxmlformats.org/officeDocument/2006/relationships" xmlns:p="http://schemas.openxmlformats.org/presentationml/2006/main">
   <p:cSld>
     <p:spTree>
@@ -3940,73 +4695,10 @@
       </p:grpSpPr>
       <p:sp>
         <p:nvSpPr>
-          <p:cNvPr id="2" name="Title 1">
-            <a:extLst>
-              <a:ext uri="{FF2B5EF4-FFF2-40B4-BE49-F238E27FC236}">
-                <a16:creationId xmlns:a16="http://schemas.microsoft.com/office/drawing/2014/main" id="{75A57020-0481-4123-BEAD-19EE0B2E99A4}"/>
-              </a:ext>
-            </a:extLst>
-          </p:cNvPr>
-          <p:cNvSpPr>
-            <a:spLocks noGrp="1"/>
-          </p:cNvSpPr>
-          <p:nvPr>
-            <p:ph type="title"/>
-          </p:nvPr>
-        </p:nvSpPr>
-        <p:spPr/>
-        <p:txBody>
-          <a:bodyPr/>
-          <a:lstStyle/>
-          <a:p>
-            <a:r>
-              <a:rPr lang="en-US" dirty="0"/>
-              <a:t>Raw Data - Example</a:t>
-            </a:r>
-          </a:p>
-        </p:txBody>
-      </p:sp>
-      <p:pic>
-        <p:nvPicPr>
-          <p:cNvPr id="6" name="Content Placeholder 5">
-            <a:extLst>
-              <a:ext uri="{FF2B5EF4-FFF2-40B4-BE49-F238E27FC236}">
-                <a16:creationId xmlns:a16="http://schemas.microsoft.com/office/drawing/2014/main" id="{099F51A8-156D-46BA-9085-4A9555F63053}"/>
-              </a:ext>
-            </a:extLst>
-          </p:cNvPr>
-          <p:cNvPicPr>
-            <a:picLocks noGrp="1" noChangeAspect="1"/>
-          </p:cNvPicPr>
-          <p:nvPr>
-            <p:ph idx="1"/>
-          </p:nvPr>
-        </p:nvPicPr>
-        <p:blipFill>
-          <a:blip r:embed="rId2">
-            <a:extLst>
-              <a:ext uri="{28A0092B-C50C-407E-A947-70E740481C1C}">
-                <a14:useLocalDpi xmlns:a14="http://schemas.microsoft.com/office/drawing/2010/main" val="0"/>
-              </a:ext>
-            </a:extLst>
-          </a:blip>
-          <a:stretch>
-            <a:fillRect/>
-          </a:stretch>
-        </p:blipFill>
-        <p:spPr>
-          <a:xfrm>
-            <a:off x="1524000" y="1077314"/>
-            <a:ext cx="5867400" cy="5506048"/>
-          </a:xfrm>
-        </p:spPr>
-      </p:pic>
-      <p:sp>
-        <p:nvSpPr>
           <p:cNvPr id="4" name="Slide Number Placeholder 3">
             <a:extLst>
               <a:ext uri="{FF2B5EF4-FFF2-40B4-BE49-F238E27FC236}">
-                <a16:creationId xmlns:a16="http://schemas.microsoft.com/office/drawing/2014/main" id="{39624FD9-40AE-4894-B926-CFA090752F9D}"/>
+                <a16:creationId xmlns:a16="http://schemas.microsoft.com/office/drawing/2014/main" id="{39107ADE-205E-4BEC-A035-3DEF7289803D}"/>
               </a:ext>
             </a:extLst>
           </p:cNvPr>
@@ -4025,16 +4717,952 @@
             <a:fld id="{B01D9778-10B4-40FB-B4E4-44FA89A86639}" type="slidenum">
               <a:rPr lang="en-US" smtClean="0"/>
               <a:pPr/>
-              <a:t>12</a:t>
+              <a:t>13</a:t>
             </a:fld>
             <a:endParaRPr lang="en-US"/>
+          </a:p>
+        </p:txBody>
+      </p:sp>
+      <p:grpSp>
+        <p:nvGrpSpPr>
+          <p:cNvPr id="48" name="Group 47">
+            <a:extLst>
+              <a:ext uri="{FF2B5EF4-FFF2-40B4-BE49-F238E27FC236}">
+                <a16:creationId xmlns:a16="http://schemas.microsoft.com/office/drawing/2014/main" id="{09625E30-A375-4D1D-9760-BF6EE8E7B516}"/>
+              </a:ext>
+            </a:extLst>
+          </p:cNvPr>
+          <p:cNvGrpSpPr/>
+          <p:nvPr/>
+        </p:nvGrpSpPr>
+        <p:grpSpPr>
+          <a:xfrm>
+            <a:off x="2057400" y="685800"/>
+            <a:ext cx="5562600" cy="5257800"/>
+            <a:chOff x="1600200" y="1219200"/>
+            <a:chExt cx="5562600" cy="5257800"/>
+          </a:xfrm>
+        </p:grpSpPr>
+        <p:grpSp>
+          <p:nvGrpSpPr>
+            <p:cNvPr id="10" name="Group 9">
+              <a:extLst>
+                <a:ext uri="{FF2B5EF4-FFF2-40B4-BE49-F238E27FC236}">
+                  <a16:creationId xmlns:a16="http://schemas.microsoft.com/office/drawing/2014/main" id="{0784DAF9-0744-42DB-BBC0-166B9A2C8B50}"/>
+                </a:ext>
+              </a:extLst>
+            </p:cNvPr>
+            <p:cNvGrpSpPr/>
+            <p:nvPr/>
+          </p:nvGrpSpPr>
+          <p:grpSpPr>
+            <a:xfrm>
+              <a:off x="2362200" y="1219200"/>
+              <a:ext cx="4800600" cy="4637088"/>
+              <a:chOff x="2558143" y="2460624"/>
+              <a:chExt cx="3886200" cy="3482977"/>
+            </a:xfrm>
+          </p:grpSpPr>
+          <p:pic>
+            <p:nvPicPr>
+              <p:cNvPr id="5" name="Content Placeholder 5">
+                <a:extLst>
+                  <a:ext uri="{FF2B5EF4-FFF2-40B4-BE49-F238E27FC236}">
+                    <a16:creationId xmlns:a16="http://schemas.microsoft.com/office/drawing/2014/main" id="{C4123715-2F1E-429E-BBDE-4698D7319AB1}"/>
+                  </a:ext>
+                </a:extLst>
+              </p:cNvPr>
+              <p:cNvPicPr>
+                <a:picLocks noChangeAspect="1"/>
+              </p:cNvPicPr>
+              <p:nvPr/>
+            </p:nvPicPr>
+            <p:blipFill rotWithShape="1">
+              <a:blip r:embed="rId3">
+                <a:extLst>
+                  <a:ext uri="{28A0092B-C50C-407E-A947-70E740481C1C}">
+                    <a14:useLocalDpi xmlns:a14="http://schemas.microsoft.com/office/drawing/2010/main" val="0"/>
+                  </a:ext>
+                </a:extLst>
+              </a:blip>
+              <a:srcRect l="3506" t="50432" r="7098" b="2870"/>
+              <a:stretch/>
+            </p:blipFill>
+            <p:spPr>
+              <a:xfrm>
+                <a:off x="2558143" y="4038600"/>
+                <a:ext cx="3886200" cy="1905001"/>
+              </a:xfrm>
+              <a:prstGeom prst="rect">
+                <a:avLst/>
+              </a:prstGeom>
+            </p:spPr>
+          </p:pic>
+          <p:pic>
+            <p:nvPicPr>
+              <p:cNvPr id="6" name="Content Placeholder 5">
+                <a:extLst>
+                  <a:ext uri="{FF2B5EF4-FFF2-40B4-BE49-F238E27FC236}">
+                    <a16:creationId xmlns:a16="http://schemas.microsoft.com/office/drawing/2014/main" id="{749496E1-E676-4624-AA4C-46F05B2898D1}"/>
+                  </a:ext>
+                </a:extLst>
+              </p:cNvPr>
+              <p:cNvPicPr>
+                <a:picLocks noChangeAspect="1"/>
+              </p:cNvPicPr>
+              <p:nvPr/>
+            </p:nvPicPr>
+            <p:blipFill rotWithShape="1">
+              <a:blip r:embed="rId3">
+                <a:extLst>
+                  <a:ext uri="{28A0092B-C50C-407E-A947-70E740481C1C}">
+                    <a14:useLocalDpi xmlns:a14="http://schemas.microsoft.com/office/drawing/2010/main" val="0"/>
+                  </a:ext>
+                </a:extLst>
+              </a:blip>
+              <a:srcRect l="3674" t="27040" r="6930" b="50545"/>
+              <a:stretch/>
+            </p:blipFill>
+            <p:spPr>
+              <a:xfrm>
+                <a:off x="2558143" y="2460624"/>
+                <a:ext cx="3886200" cy="914401"/>
+              </a:xfrm>
+              <a:prstGeom prst="rect">
+                <a:avLst/>
+              </a:prstGeom>
+            </p:spPr>
+          </p:pic>
+          <p:cxnSp>
+            <p:nvCxnSpPr>
+              <p:cNvPr id="9" name="Straight Arrow Connector 8">
+                <a:extLst>
+                  <a:ext uri="{FF2B5EF4-FFF2-40B4-BE49-F238E27FC236}">
+                    <a16:creationId xmlns:a16="http://schemas.microsoft.com/office/drawing/2014/main" id="{5AA9CAA4-B67D-4669-9B17-4CFF8C8FA11F}"/>
+                  </a:ext>
+                </a:extLst>
+              </p:cNvPr>
+              <p:cNvCxnSpPr/>
+              <p:nvPr/>
+            </p:nvCxnSpPr>
+            <p:spPr>
+              <a:xfrm>
+                <a:off x="4749916" y="3376381"/>
+                <a:ext cx="0" cy="663575"/>
+              </a:xfrm>
+              <a:prstGeom prst="straightConnector1">
+                <a:avLst/>
+              </a:prstGeom>
+              <a:ln w="28575">
+                <a:prstDash val="sysDot"/>
+                <a:tailEnd type="triangle"/>
+              </a:ln>
+            </p:spPr>
+            <p:style>
+              <a:lnRef idx="1">
+                <a:schemeClr val="dk1"/>
+              </a:lnRef>
+              <a:fillRef idx="0">
+                <a:schemeClr val="dk1"/>
+              </a:fillRef>
+              <a:effectRef idx="0">
+                <a:schemeClr val="dk1"/>
+              </a:effectRef>
+              <a:fontRef idx="minor">
+                <a:schemeClr val="tx1"/>
+              </a:fontRef>
+            </p:style>
+          </p:cxnSp>
+        </p:grpSp>
+        <p:grpSp>
+          <p:nvGrpSpPr>
+            <p:cNvPr id="11" name="Group 10">
+              <a:extLst>
+                <a:ext uri="{FF2B5EF4-FFF2-40B4-BE49-F238E27FC236}">
+                  <a16:creationId xmlns:a16="http://schemas.microsoft.com/office/drawing/2014/main" id="{05D4AC89-276B-4B10-8E51-E2BAAB6D3D37}"/>
+                </a:ext>
+              </a:extLst>
+            </p:cNvPr>
+            <p:cNvGrpSpPr/>
+            <p:nvPr/>
+          </p:nvGrpSpPr>
+          <p:grpSpPr>
+            <a:xfrm>
+              <a:off x="2209800" y="1371600"/>
+              <a:ext cx="4800600" cy="4637088"/>
+              <a:chOff x="2558143" y="2460624"/>
+              <a:chExt cx="3886200" cy="3482977"/>
+            </a:xfrm>
+          </p:grpSpPr>
+          <p:pic>
+            <p:nvPicPr>
+              <p:cNvPr id="12" name="Content Placeholder 5">
+                <a:extLst>
+                  <a:ext uri="{FF2B5EF4-FFF2-40B4-BE49-F238E27FC236}">
+                    <a16:creationId xmlns:a16="http://schemas.microsoft.com/office/drawing/2014/main" id="{31895C9F-DB3A-4441-93DA-3A1CE04440CF}"/>
+                  </a:ext>
+                </a:extLst>
+              </p:cNvPr>
+              <p:cNvPicPr>
+                <a:picLocks noChangeAspect="1"/>
+              </p:cNvPicPr>
+              <p:nvPr/>
+            </p:nvPicPr>
+            <p:blipFill rotWithShape="1">
+              <a:blip r:embed="rId3">
+                <a:extLst>
+                  <a:ext uri="{28A0092B-C50C-407E-A947-70E740481C1C}">
+                    <a14:useLocalDpi xmlns:a14="http://schemas.microsoft.com/office/drawing/2010/main" val="0"/>
+                  </a:ext>
+                </a:extLst>
+              </a:blip>
+              <a:srcRect l="3506" t="50432" r="7098" b="2870"/>
+              <a:stretch/>
+            </p:blipFill>
+            <p:spPr>
+              <a:xfrm>
+                <a:off x="2558143" y="4038600"/>
+                <a:ext cx="3886200" cy="1905001"/>
+              </a:xfrm>
+              <a:prstGeom prst="rect">
+                <a:avLst/>
+              </a:prstGeom>
+            </p:spPr>
+          </p:pic>
+          <p:pic>
+            <p:nvPicPr>
+              <p:cNvPr id="13" name="Content Placeholder 5">
+                <a:extLst>
+                  <a:ext uri="{FF2B5EF4-FFF2-40B4-BE49-F238E27FC236}">
+                    <a16:creationId xmlns:a16="http://schemas.microsoft.com/office/drawing/2014/main" id="{5F1B22D6-7C16-47A9-A838-B5E97E627DFF}"/>
+                  </a:ext>
+                </a:extLst>
+              </p:cNvPr>
+              <p:cNvPicPr>
+                <a:picLocks noChangeAspect="1"/>
+              </p:cNvPicPr>
+              <p:nvPr/>
+            </p:nvPicPr>
+            <p:blipFill rotWithShape="1">
+              <a:blip r:embed="rId3">
+                <a:extLst>
+                  <a:ext uri="{28A0092B-C50C-407E-A947-70E740481C1C}">
+                    <a14:useLocalDpi xmlns:a14="http://schemas.microsoft.com/office/drawing/2010/main" val="0"/>
+                  </a:ext>
+                </a:extLst>
+              </a:blip>
+              <a:srcRect l="3674" t="27040" r="6930" b="50545"/>
+              <a:stretch/>
+            </p:blipFill>
+            <p:spPr>
+              <a:xfrm>
+                <a:off x="2558143" y="2460624"/>
+                <a:ext cx="3886200" cy="914401"/>
+              </a:xfrm>
+              <a:prstGeom prst="rect">
+                <a:avLst/>
+              </a:prstGeom>
+            </p:spPr>
+          </p:pic>
+          <p:cxnSp>
+            <p:nvCxnSpPr>
+              <p:cNvPr id="15" name="Straight Arrow Connector 14">
+                <a:extLst>
+                  <a:ext uri="{FF2B5EF4-FFF2-40B4-BE49-F238E27FC236}">
+                    <a16:creationId xmlns:a16="http://schemas.microsoft.com/office/drawing/2014/main" id="{8A4EB231-046C-4C7F-B482-74B02174B82B}"/>
+                  </a:ext>
+                </a:extLst>
+              </p:cNvPr>
+              <p:cNvCxnSpPr>
+                <a:cxnSpLocks/>
+              </p:cNvCxnSpPr>
+              <p:nvPr/>
+            </p:nvCxnSpPr>
+            <p:spPr>
+              <a:xfrm>
+                <a:off x="4729559" y="3375025"/>
+                <a:ext cx="0" cy="663576"/>
+              </a:xfrm>
+              <a:prstGeom prst="straightConnector1">
+                <a:avLst/>
+              </a:prstGeom>
+              <a:ln w="28575">
+                <a:prstDash val="sysDot"/>
+                <a:tailEnd type="triangle"/>
+              </a:ln>
+            </p:spPr>
+            <p:style>
+              <a:lnRef idx="1">
+                <a:schemeClr val="dk1"/>
+              </a:lnRef>
+              <a:fillRef idx="0">
+                <a:schemeClr val="dk1"/>
+              </a:fillRef>
+              <a:effectRef idx="0">
+                <a:schemeClr val="dk1"/>
+              </a:effectRef>
+              <a:fontRef idx="minor">
+                <a:schemeClr val="tx1"/>
+              </a:fontRef>
+            </p:style>
+          </p:cxnSp>
+        </p:grpSp>
+        <p:grpSp>
+          <p:nvGrpSpPr>
+            <p:cNvPr id="23" name="Group 22">
+              <a:extLst>
+                <a:ext uri="{FF2B5EF4-FFF2-40B4-BE49-F238E27FC236}">
+                  <a16:creationId xmlns:a16="http://schemas.microsoft.com/office/drawing/2014/main" id="{D787138C-98A6-451B-B104-ED10CEEBF52D}"/>
+                </a:ext>
+              </a:extLst>
+            </p:cNvPr>
+            <p:cNvGrpSpPr/>
+            <p:nvPr/>
+          </p:nvGrpSpPr>
+          <p:grpSpPr>
+            <a:xfrm>
+              <a:off x="2023096" y="1492821"/>
+              <a:ext cx="4800600" cy="4637088"/>
+              <a:chOff x="2558143" y="2460624"/>
+              <a:chExt cx="3886200" cy="3482977"/>
+            </a:xfrm>
+          </p:grpSpPr>
+          <p:pic>
+            <p:nvPicPr>
+              <p:cNvPr id="24" name="Content Placeholder 5">
+                <a:extLst>
+                  <a:ext uri="{FF2B5EF4-FFF2-40B4-BE49-F238E27FC236}">
+                    <a16:creationId xmlns:a16="http://schemas.microsoft.com/office/drawing/2014/main" id="{FAD372DD-070A-45C7-8678-C368EFA1F6B8}"/>
+                  </a:ext>
+                </a:extLst>
+              </p:cNvPr>
+              <p:cNvPicPr>
+                <a:picLocks noChangeAspect="1"/>
+              </p:cNvPicPr>
+              <p:nvPr/>
+            </p:nvPicPr>
+            <p:blipFill rotWithShape="1">
+              <a:blip r:embed="rId3">
+                <a:extLst>
+                  <a:ext uri="{28A0092B-C50C-407E-A947-70E740481C1C}">
+                    <a14:useLocalDpi xmlns:a14="http://schemas.microsoft.com/office/drawing/2010/main" val="0"/>
+                  </a:ext>
+                </a:extLst>
+              </a:blip>
+              <a:srcRect l="3506" t="50432" r="7098" b="2870"/>
+              <a:stretch/>
+            </p:blipFill>
+            <p:spPr>
+              <a:xfrm>
+                <a:off x="2558143" y="4038600"/>
+                <a:ext cx="3886200" cy="1905001"/>
+              </a:xfrm>
+              <a:prstGeom prst="rect">
+                <a:avLst/>
+              </a:prstGeom>
+            </p:spPr>
+          </p:pic>
+          <p:pic>
+            <p:nvPicPr>
+              <p:cNvPr id="25" name="Content Placeholder 5">
+                <a:extLst>
+                  <a:ext uri="{FF2B5EF4-FFF2-40B4-BE49-F238E27FC236}">
+                    <a16:creationId xmlns:a16="http://schemas.microsoft.com/office/drawing/2014/main" id="{3A3185FE-DE4C-4820-A8F1-E08431BBCC03}"/>
+                  </a:ext>
+                </a:extLst>
+              </p:cNvPr>
+              <p:cNvPicPr>
+                <a:picLocks noChangeAspect="1"/>
+              </p:cNvPicPr>
+              <p:nvPr/>
+            </p:nvPicPr>
+            <p:blipFill rotWithShape="1">
+              <a:blip r:embed="rId3">
+                <a:extLst>
+                  <a:ext uri="{28A0092B-C50C-407E-A947-70E740481C1C}">
+                    <a14:useLocalDpi xmlns:a14="http://schemas.microsoft.com/office/drawing/2010/main" val="0"/>
+                  </a:ext>
+                </a:extLst>
+              </a:blip>
+              <a:srcRect l="3674" t="27040" r="6930" b="50545"/>
+              <a:stretch/>
+            </p:blipFill>
+            <p:spPr>
+              <a:xfrm>
+                <a:off x="2558143" y="2460624"/>
+                <a:ext cx="3886200" cy="914401"/>
+              </a:xfrm>
+              <a:prstGeom prst="rect">
+                <a:avLst/>
+              </a:prstGeom>
+            </p:spPr>
+          </p:pic>
+          <p:cxnSp>
+            <p:nvCxnSpPr>
+              <p:cNvPr id="27" name="Straight Arrow Connector 26">
+                <a:extLst>
+                  <a:ext uri="{FF2B5EF4-FFF2-40B4-BE49-F238E27FC236}">
+                    <a16:creationId xmlns:a16="http://schemas.microsoft.com/office/drawing/2014/main" id="{CB16348A-7899-4D19-81A7-E04D9386C594}"/>
+                  </a:ext>
+                </a:extLst>
+              </p:cNvPr>
+              <p:cNvCxnSpPr>
+                <a:cxnSpLocks/>
+              </p:cNvCxnSpPr>
+              <p:nvPr/>
+            </p:nvCxnSpPr>
+            <p:spPr>
+              <a:xfrm>
+                <a:off x="4729559" y="3375025"/>
+                <a:ext cx="0" cy="663576"/>
+              </a:xfrm>
+              <a:prstGeom prst="straightConnector1">
+                <a:avLst/>
+              </a:prstGeom>
+              <a:ln w="28575">
+                <a:prstDash val="sysDot"/>
+                <a:tailEnd type="triangle"/>
+              </a:ln>
+            </p:spPr>
+            <p:style>
+              <a:lnRef idx="1">
+                <a:schemeClr val="dk1"/>
+              </a:lnRef>
+              <a:fillRef idx="0">
+                <a:schemeClr val="dk1"/>
+              </a:fillRef>
+              <a:effectRef idx="0">
+                <a:schemeClr val="dk1"/>
+              </a:effectRef>
+              <a:fontRef idx="minor">
+                <a:schemeClr val="tx1"/>
+              </a:fontRef>
+            </p:style>
+          </p:cxnSp>
+        </p:grpSp>
+        <p:grpSp>
+          <p:nvGrpSpPr>
+            <p:cNvPr id="38" name="Group 37">
+              <a:extLst>
+                <a:ext uri="{FF2B5EF4-FFF2-40B4-BE49-F238E27FC236}">
+                  <a16:creationId xmlns:a16="http://schemas.microsoft.com/office/drawing/2014/main" id="{96717B63-D3C8-4DAC-B9AF-91F13CBB61E4}"/>
+                </a:ext>
+              </a:extLst>
+            </p:cNvPr>
+            <p:cNvGrpSpPr/>
+            <p:nvPr/>
+          </p:nvGrpSpPr>
+          <p:grpSpPr>
+            <a:xfrm>
+              <a:off x="1828800" y="1673896"/>
+              <a:ext cx="4800600" cy="4637088"/>
+              <a:chOff x="2558143" y="2460624"/>
+              <a:chExt cx="3886200" cy="3482977"/>
+            </a:xfrm>
+          </p:grpSpPr>
+          <p:pic>
+            <p:nvPicPr>
+              <p:cNvPr id="39" name="Content Placeholder 5">
+                <a:extLst>
+                  <a:ext uri="{FF2B5EF4-FFF2-40B4-BE49-F238E27FC236}">
+                    <a16:creationId xmlns:a16="http://schemas.microsoft.com/office/drawing/2014/main" id="{304A394D-AF57-4C85-BC14-DE66DD2195D0}"/>
+                  </a:ext>
+                </a:extLst>
+              </p:cNvPr>
+              <p:cNvPicPr>
+                <a:picLocks noChangeAspect="1"/>
+              </p:cNvPicPr>
+              <p:nvPr/>
+            </p:nvPicPr>
+            <p:blipFill rotWithShape="1">
+              <a:blip r:embed="rId3">
+                <a:extLst>
+                  <a:ext uri="{28A0092B-C50C-407E-A947-70E740481C1C}">
+                    <a14:useLocalDpi xmlns:a14="http://schemas.microsoft.com/office/drawing/2010/main" val="0"/>
+                  </a:ext>
+                </a:extLst>
+              </a:blip>
+              <a:srcRect l="3506" t="50432" r="7098" b="2870"/>
+              <a:stretch/>
+            </p:blipFill>
+            <p:spPr>
+              <a:xfrm>
+                <a:off x="2558143" y="4038600"/>
+                <a:ext cx="3886200" cy="1905001"/>
+              </a:xfrm>
+              <a:prstGeom prst="rect">
+                <a:avLst/>
+              </a:prstGeom>
+            </p:spPr>
+          </p:pic>
+          <p:pic>
+            <p:nvPicPr>
+              <p:cNvPr id="40" name="Content Placeholder 5">
+                <a:extLst>
+                  <a:ext uri="{FF2B5EF4-FFF2-40B4-BE49-F238E27FC236}">
+                    <a16:creationId xmlns:a16="http://schemas.microsoft.com/office/drawing/2014/main" id="{B7E53273-9052-4A0C-851B-F471A44D3ED3}"/>
+                  </a:ext>
+                </a:extLst>
+              </p:cNvPr>
+              <p:cNvPicPr>
+                <a:picLocks noChangeAspect="1"/>
+              </p:cNvPicPr>
+              <p:nvPr/>
+            </p:nvPicPr>
+            <p:blipFill rotWithShape="1">
+              <a:blip r:embed="rId3">
+                <a:extLst>
+                  <a:ext uri="{28A0092B-C50C-407E-A947-70E740481C1C}">
+                    <a14:useLocalDpi xmlns:a14="http://schemas.microsoft.com/office/drawing/2010/main" val="0"/>
+                  </a:ext>
+                </a:extLst>
+              </a:blip>
+              <a:srcRect l="3674" t="27040" r="6930" b="50545"/>
+              <a:stretch/>
+            </p:blipFill>
+            <p:spPr>
+              <a:xfrm>
+                <a:off x="2558143" y="2460624"/>
+                <a:ext cx="3886200" cy="914401"/>
+              </a:xfrm>
+              <a:prstGeom prst="rect">
+                <a:avLst/>
+              </a:prstGeom>
+            </p:spPr>
+          </p:pic>
+          <p:cxnSp>
+            <p:nvCxnSpPr>
+              <p:cNvPr id="42" name="Straight Arrow Connector 41">
+                <a:extLst>
+                  <a:ext uri="{FF2B5EF4-FFF2-40B4-BE49-F238E27FC236}">
+                    <a16:creationId xmlns:a16="http://schemas.microsoft.com/office/drawing/2014/main" id="{E7CD6D03-E589-4B0D-ACEF-FA871681546A}"/>
+                  </a:ext>
+                </a:extLst>
+              </p:cNvPr>
+              <p:cNvCxnSpPr>
+                <a:cxnSpLocks/>
+              </p:cNvCxnSpPr>
+              <p:nvPr/>
+            </p:nvCxnSpPr>
+            <p:spPr>
+              <a:xfrm>
+                <a:off x="4729559" y="3375025"/>
+                <a:ext cx="0" cy="663576"/>
+              </a:xfrm>
+              <a:prstGeom prst="straightConnector1">
+                <a:avLst/>
+              </a:prstGeom>
+              <a:ln w="28575">
+                <a:prstDash val="sysDot"/>
+                <a:tailEnd type="triangle"/>
+              </a:ln>
+            </p:spPr>
+            <p:style>
+              <a:lnRef idx="1">
+                <a:schemeClr val="dk1"/>
+              </a:lnRef>
+              <a:fillRef idx="0">
+                <a:schemeClr val="dk1"/>
+              </a:fillRef>
+              <a:effectRef idx="0">
+                <a:schemeClr val="dk1"/>
+              </a:effectRef>
+              <a:fontRef idx="minor">
+                <a:schemeClr val="tx1"/>
+              </a:fontRef>
+            </p:style>
+          </p:cxnSp>
+        </p:grpSp>
+        <p:grpSp>
+          <p:nvGrpSpPr>
+            <p:cNvPr id="43" name="Group 42">
+              <a:extLst>
+                <a:ext uri="{FF2B5EF4-FFF2-40B4-BE49-F238E27FC236}">
+                  <a16:creationId xmlns:a16="http://schemas.microsoft.com/office/drawing/2014/main" id="{F0641E62-B34E-490B-85FB-ACC8B97A92EB}"/>
+                </a:ext>
+              </a:extLst>
+            </p:cNvPr>
+            <p:cNvGrpSpPr/>
+            <p:nvPr/>
+          </p:nvGrpSpPr>
+          <p:grpSpPr>
+            <a:xfrm>
+              <a:off x="1600200" y="1839912"/>
+              <a:ext cx="4800600" cy="4637088"/>
+              <a:chOff x="2558143" y="2460624"/>
+              <a:chExt cx="3886200" cy="3482977"/>
+            </a:xfrm>
+          </p:grpSpPr>
+          <p:pic>
+            <p:nvPicPr>
+              <p:cNvPr id="44" name="Content Placeholder 5">
+                <a:extLst>
+                  <a:ext uri="{FF2B5EF4-FFF2-40B4-BE49-F238E27FC236}">
+                    <a16:creationId xmlns:a16="http://schemas.microsoft.com/office/drawing/2014/main" id="{27A031DA-EC20-4699-B812-CE877056C44A}"/>
+                  </a:ext>
+                </a:extLst>
+              </p:cNvPr>
+              <p:cNvPicPr>
+                <a:picLocks noChangeAspect="1"/>
+              </p:cNvPicPr>
+              <p:nvPr/>
+            </p:nvPicPr>
+            <p:blipFill rotWithShape="1">
+              <a:blip r:embed="rId3">
+                <a:extLst>
+                  <a:ext uri="{28A0092B-C50C-407E-A947-70E740481C1C}">
+                    <a14:useLocalDpi xmlns:a14="http://schemas.microsoft.com/office/drawing/2010/main" val="0"/>
+                  </a:ext>
+                </a:extLst>
+              </a:blip>
+              <a:srcRect l="3506" t="50432" r="7098" b="2870"/>
+              <a:stretch/>
+            </p:blipFill>
+            <p:spPr>
+              <a:xfrm>
+                <a:off x="2558143" y="4038600"/>
+                <a:ext cx="3886200" cy="1905001"/>
+              </a:xfrm>
+              <a:prstGeom prst="rect">
+                <a:avLst/>
+              </a:prstGeom>
+            </p:spPr>
+          </p:pic>
+          <p:pic>
+            <p:nvPicPr>
+              <p:cNvPr id="45" name="Content Placeholder 5">
+                <a:extLst>
+                  <a:ext uri="{FF2B5EF4-FFF2-40B4-BE49-F238E27FC236}">
+                    <a16:creationId xmlns:a16="http://schemas.microsoft.com/office/drawing/2014/main" id="{B03BF5D4-CCC2-4C71-A747-FD2953F2BD55}"/>
+                  </a:ext>
+                </a:extLst>
+              </p:cNvPr>
+              <p:cNvPicPr>
+                <a:picLocks noChangeAspect="1"/>
+              </p:cNvPicPr>
+              <p:nvPr/>
+            </p:nvPicPr>
+            <p:blipFill rotWithShape="1">
+              <a:blip r:embed="rId3">
+                <a:extLst>
+                  <a:ext uri="{28A0092B-C50C-407E-A947-70E740481C1C}">
+                    <a14:useLocalDpi xmlns:a14="http://schemas.microsoft.com/office/drawing/2010/main" val="0"/>
+                  </a:ext>
+                </a:extLst>
+              </a:blip>
+              <a:srcRect l="3674" t="27040" r="6930" b="50545"/>
+              <a:stretch/>
+            </p:blipFill>
+            <p:spPr>
+              <a:xfrm>
+                <a:off x="2558143" y="2460624"/>
+                <a:ext cx="3886200" cy="914401"/>
+              </a:xfrm>
+              <a:prstGeom prst="rect">
+                <a:avLst/>
+              </a:prstGeom>
+            </p:spPr>
+          </p:pic>
+          <p:cxnSp>
+            <p:nvCxnSpPr>
+              <p:cNvPr id="47" name="Straight Arrow Connector 46">
+                <a:extLst>
+                  <a:ext uri="{FF2B5EF4-FFF2-40B4-BE49-F238E27FC236}">
+                    <a16:creationId xmlns:a16="http://schemas.microsoft.com/office/drawing/2014/main" id="{348857D6-368A-4BAF-B4FC-E229C834B98C}"/>
+                  </a:ext>
+                </a:extLst>
+              </p:cNvPr>
+              <p:cNvCxnSpPr>
+                <a:cxnSpLocks/>
+              </p:cNvCxnSpPr>
+              <p:nvPr/>
+            </p:nvCxnSpPr>
+            <p:spPr>
+              <a:xfrm>
+                <a:off x="4729559" y="3375025"/>
+                <a:ext cx="0" cy="663576"/>
+              </a:xfrm>
+              <a:prstGeom prst="straightConnector1">
+                <a:avLst/>
+              </a:prstGeom>
+              <a:ln w="28575">
+                <a:prstDash val="sysDot"/>
+                <a:tailEnd type="triangle"/>
+              </a:ln>
+            </p:spPr>
+            <p:style>
+              <a:lnRef idx="1">
+                <a:schemeClr val="dk1"/>
+              </a:lnRef>
+              <a:fillRef idx="0">
+                <a:schemeClr val="dk1"/>
+              </a:fillRef>
+              <a:effectRef idx="0">
+                <a:schemeClr val="dk1"/>
+              </a:effectRef>
+              <a:fontRef idx="minor">
+                <a:schemeClr val="tx1"/>
+              </a:fontRef>
+            </p:style>
+          </p:cxnSp>
+        </p:grpSp>
+      </p:grpSp>
+      <p:sp>
+        <p:nvSpPr>
+          <p:cNvPr id="49" name="Left Brace 48">
+            <a:extLst>
+              <a:ext uri="{FF2B5EF4-FFF2-40B4-BE49-F238E27FC236}">
+                <a16:creationId xmlns:a16="http://schemas.microsoft.com/office/drawing/2014/main" id="{6B2EDD7A-8B46-45D8-B9BB-483F40500F74}"/>
+              </a:ext>
+            </a:extLst>
+          </p:cNvPr>
+          <p:cNvSpPr/>
+          <p:nvPr/>
+        </p:nvSpPr>
+        <p:spPr>
+          <a:xfrm flipH="1">
+            <a:off x="7619676" y="609600"/>
+            <a:ext cx="402840" cy="4986909"/>
+          </a:xfrm>
+          <a:prstGeom prst="leftBrace">
+            <a:avLst>
+              <a:gd name="adj1" fmla="val 124980"/>
+              <a:gd name="adj2" fmla="val 50000"/>
+            </a:avLst>
+          </a:prstGeom>
+          <a:ln w="28575"/>
+        </p:spPr>
+        <p:style>
+          <a:lnRef idx="1">
+            <a:schemeClr val="dk1"/>
+          </a:lnRef>
+          <a:fillRef idx="0">
+            <a:schemeClr val="dk1"/>
+          </a:fillRef>
+          <a:effectRef idx="0">
+            <a:schemeClr val="dk1"/>
+          </a:effectRef>
+          <a:fontRef idx="minor">
+            <a:schemeClr val="tx1"/>
+          </a:fontRef>
+        </p:style>
+        <p:txBody>
+          <a:bodyPr rtlCol="0" anchor="ctr"/>
+          <a:lstStyle/>
+          <a:p>
+            <a:pPr algn="ctr"/>
+            <a:endParaRPr lang="en-US"/>
+          </a:p>
+        </p:txBody>
+      </p:sp>
+      <p:sp>
+        <p:nvSpPr>
+          <p:cNvPr id="50" name="Left Brace 49">
+            <a:extLst>
+              <a:ext uri="{FF2B5EF4-FFF2-40B4-BE49-F238E27FC236}">
+                <a16:creationId xmlns:a16="http://schemas.microsoft.com/office/drawing/2014/main" id="{A4BE03BE-19D2-47D5-959C-6E0FF504A104}"/>
+              </a:ext>
+            </a:extLst>
+          </p:cNvPr>
+          <p:cNvSpPr/>
+          <p:nvPr/>
+        </p:nvSpPr>
+        <p:spPr>
+          <a:xfrm rot="2621817">
+            <a:off x="2261874" y="54869"/>
+            <a:ext cx="284444" cy="1691548"/>
+          </a:xfrm>
+          <a:prstGeom prst="leftBrace">
+            <a:avLst>
+              <a:gd name="adj1" fmla="val 76445"/>
+              <a:gd name="adj2" fmla="val 50000"/>
+            </a:avLst>
+          </a:prstGeom>
+          <a:ln w="28575"/>
+        </p:spPr>
+        <p:style>
+          <a:lnRef idx="1">
+            <a:schemeClr val="dk1"/>
+          </a:lnRef>
+          <a:fillRef idx="0">
+            <a:schemeClr val="dk1"/>
+          </a:fillRef>
+          <a:effectRef idx="0">
+            <a:schemeClr val="dk1"/>
+          </a:effectRef>
+          <a:fontRef idx="minor">
+            <a:schemeClr val="tx1"/>
+          </a:fontRef>
+        </p:style>
+        <p:txBody>
+          <a:bodyPr rtlCol="0" anchor="ctr"/>
+          <a:lstStyle/>
+          <a:p>
+            <a:pPr algn="ctr"/>
+            <a:endParaRPr lang="en-US"/>
+          </a:p>
+        </p:txBody>
+      </p:sp>
+      <p:sp>
+        <p:nvSpPr>
+          <p:cNvPr id="51" name="Left Brace 50">
+            <a:extLst>
+              <a:ext uri="{FF2B5EF4-FFF2-40B4-BE49-F238E27FC236}">
+                <a16:creationId xmlns:a16="http://schemas.microsoft.com/office/drawing/2014/main" id="{6F001943-19E7-4CF6-A4F0-CF9A11817568}"/>
+              </a:ext>
+            </a:extLst>
+          </p:cNvPr>
+          <p:cNvSpPr/>
+          <p:nvPr/>
+        </p:nvSpPr>
+        <p:spPr>
+          <a:xfrm rot="5400000" flipH="1">
+            <a:off x="4402611" y="3482306"/>
+            <a:ext cx="402840" cy="4986909"/>
+          </a:xfrm>
+          <a:prstGeom prst="leftBrace">
+            <a:avLst>
+              <a:gd name="adj1" fmla="val 124980"/>
+              <a:gd name="adj2" fmla="val 50000"/>
+            </a:avLst>
+          </a:prstGeom>
+          <a:ln w="28575"/>
+        </p:spPr>
+        <p:style>
+          <a:lnRef idx="1">
+            <a:schemeClr val="dk1"/>
+          </a:lnRef>
+          <a:fillRef idx="0">
+            <a:schemeClr val="dk1"/>
+          </a:fillRef>
+          <a:effectRef idx="0">
+            <a:schemeClr val="dk1"/>
+          </a:effectRef>
+          <a:fontRef idx="minor">
+            <a:schemeClr val="tx1"/>
+          </a:fontRef>
+        </p:style>
+        <p:txBody>
+          <a:bodyPr rtlCol="0" anchor="ctr"/>
+          <a:lstStyle/>
+          <a:p>
+            <a:pPr algn="ctr"/>
+            <a:endParaRPr lang="en-US"/>
+          </a:p>
+        </p:txBody>
+      </p:sp>
+      <p:sp>
+        <p:nvSpPr>
+          <p:cNvPr id="52" name="TextBox 51">
+            <a:extLst>
+              <a:ext uri="{FF2B5EF4-FFF2-40B4-BE49-F238E27FC236}">
+                <a16:creationId xmlns:a16="http://schemas.microsoft.com/office/drawing/2014/main" id="{34BD6065-64DB-46EF-90D8-F25E3B9E1C70}"/>
+              </a:ext>
+            </a:extLst>
+          </p:cNvPr>
+          <p:cNvSpPr txBox="1"/>
+          <p:nvPr/>
+        </p:nvSpPr>
+        <p:spPr>
+          <a:xfrm>
+            <a:off x="3505200" y="6177181"/>
+            <a:ext cx="2209800" cy="369332"/>
+          </a:xfrm>
+          <a:prstGeom prst="rect">
+            <a:avLst/>
+          </a:prstGeom>
+          <a:noFill/>
+        </p:spPr>
+        <p:txBody>
+          <a:bodyPr wrap="square" rtlCol="0">
+            <a:spAutoFit/>
+          </a:bodyPr>
+          <a:lstStyle/>
+          <a:p>
+            <a:pPr algn="ctr"/>
+            <a:r>
+              <a:rPr lang="en-US" dirty="0"/>
+              <a:t>2000 samples</a:t>
+            </a:r>
+          </a:p>
+        </p:txBody>
+      </p:sp>
+      <p:sp>
+        <p:nvSpPr>
+          <p:cNvPr id="53" name="TextBox 52">
+            <a:extLst>
+              <a:ext uri="{FF2B5EF4-FFF2-40B4-BE49-F238E27FC236}">
+                <a16:creationId xmlns:a16="http://schemas.microsoft.com/office/drawing/2014/main" id="{3884E6C4-ACEF-4F27-AF58-8E3B02894967}"/>
+              </a:ext>
+            </a:extLst>
+          </p:cNvPr>
+          <p:cNvSpPr txBox="1"/>
+          <p:nvPr/>
+        </p:nvSpPr>
+        <p:spPr>
+          <a:xfrm rot="5400000">
+            <a:off x="7092434" y="2901434"/>
+            <a:ext cx="2209800" cy="369332"/>
+          </a:xfrm>
+          <a:prstGeom prst="rect">
+            <a:avLst/>
+          </a:prstGeom>
+          <a:noFill/>
+        </p:spPr>
+        <p:txBody>
+          <a:bodyPr wrap="square" rtlCol="0">
+            <a:spAutoFit/>
+          </a:bodyPr>
+          <a:lstStyle/>
+          <a:p>
+            <a:pPr algn="ctr"/>
+            <a:r>
+              <a:rPr lang="en-US" dirty="0"/>
+              <a:t>62 Electrodes</a:t>
+            </a:r>
+          </a:p>
+        </p:txBody>
+      </p:sp>
+      <p:sp>
+        <p:nvSpPr>
+          <p:cNvPr id="54" name="TextBox 53">
+            <a:extLst>
+              <a:ext uri="{FF2B5EF4-FFF2-40B4-BE49-F238E27FC236}">
+                <a16:creationId xmlns:a16="http://schemas.microsoft.com/office/drawing/2014/main" id="{6EF7AD66-55AF-41FD-B922-C9ABDEC39DEB}"/>
+              </a:ext>
+            </a:extLst>
+          </p:cNvPr>
+          <p:cNvSpPr txBox="1"/>
+          <p:nvPr/>
+        </p:nvSpPr>
+        <p:spPr>
+          <a:xfrm rot="18676704">
+            <a:off x="983392" y="502628"/>
+            <a:ext cx="2209800" cy="369332"/>
+          </a:xfrm>
+          <a:prstGeom prst="rect">
+            <a:avLst/>
+          </a:prstGeom>
+          <a:noFill/>
+        </p:spPr>
+        <p:txBody>
+          <a:bodyPr wrap="square" rtlCol="0">
+            <a:spAutoFit/>
+          </a:bodyPr>
+          <a:lstStyle/>
+          <a:p>
+            <a:pPr algn="ctr"/>
+            <a:r>
+              <a:rPr lang="en-US" dirty="0"/>
+              <a:t>30-50 Trials</a:t>
+            </a:r>
           </a:p>
         </p:txBody>
       </p:sp>
     </p:spTree>
     <p:extLst>
       <p:ext uri="{BB962C8B-B14F-4D97-AF65-F5344CB8AC3E}">
-        <p14:creationId xmlns:p14="http://schemas.microsoft.com/office/powerpoint/2010/main" val="3160121546"/>
+        <p14:creationId xmlns:p14="http://schemas.microsoft.com/office/powerpoint/2010/main" val="2271803400"/>
       </p:ext>
     </p:extLst>
   </p:cSld>
@@ -4044,7 +5672,7 @@
 </p:sld>
 </file>
 
-<file path=ppt/slides/slide13.xml><?xml version="1.0" encoding="utf-8"?>
+<file path=ppt/slides/slide14.xml><?xml version="1.0" encoding="utf-8"?>
 <p:sld xmlns:a="http://schemas.openxmlformats.org/drawingml/2006/main" xmlns:r="http://schemas.openxmlformats.org/officeDocument/2006/relationships" xmlns:p="http://schemas.openxmlformats.org/presentationml/2006/main">
   <p:cSld>
     <p:spTree>
@@ -4203,7 +5831,7 @@
                   <a:srgbClr val="002060"/>
                 </a:solidFill>
               </a:rPr>
-              <a:t>High dimension data </a:t>
+              <a:t>High dimensional data </a:t>
             </a:r>
           </a:p>
           <a:p>
@@ -4213,7 +5841,7 @@
                   <a:srgbClr val="002060"/>
                 </a:solidFill>
               </a:rPr>
-              <a:t>No spatial information</a:t>
+              <a:t>Poor spatial information</a:t>
             </a:r>
           </a:p>
           <a:p>
@@ -4278,7 +5906,7 @@
             <a:fld id="{B01D9778-10B4-40FB-B4E4-44FA89A86639}" type="slidenum">
               <a:rPr lang="en-US" smtClean="0"/>
               <a:pPr/>
-              <a:t>13</a:t>
+              <a:t>14</a:t>
             </a:fld>
             <a:endParaRPr lang="en-US"/>
           </a:p>
@@ -4665,129 +6293,6 @@
 </p:sld>
 </file>
 
-<file path=ppt/slides/slide14.xml><?xml version="1.0" encoding="utf-8"?>
-<p:sld xmlns:a="http://schemas.openxmlformats.org/drawingml/2006/main" xmlns:r="http://schemas.openxmlformats.org/officeDocument/2006/relationships" xmlns:p="http://schemas.openxmlformats.org/presentationml/2006/main">
-  <p:cSld>
-    <p:spTree>
-      <p:nvGrpSpPr>
-        <p:cNvPr id="1" name=""/>
-        <p:cNvGrpSpPr/>
-        <p:nvPr/>
-      </p:nvGrpSpPr>
-      <p:grpSpPr>
-        <a:xfrm>
-          <a:off x="0" y="0"/>
-          <a:ext cx="0" cy="0"/>
-          <a:chOff x="0" y="0"/>
-          <a:chExt cx="0" cy="0"/>
-        </a:xfrm>
-      </p:grpSpPr>
-      <p:sp>
-        <p:nvSpPr>
-          <p:cNvPr id="2" name="Title 1">
-            <a:extLst>
-              <a:ext uri="{FF2B5EF4-FFF2-40B4-BE49-F238E27FC236}">
-                <a16:creationId xmlns:a16="http://schemas.microsoft.com/office/drawing/2014/main" id="{28E279F3-6F7E-4341-B58F-24B906414911}"/>
-              </a:ext>
-            </a:extLst>
-          </p:cNvPr>
-          <p:cNvSpPr>
-            <a:spLocks noGrp="1"/>
-          </p:cNvSpPr>
-          <p:nvPr>
-            <p:ph type="title"/>
-          </p:nvPr>
-        </p:nvSpPr>
-        <p:spPr/>
-        <p:txBody>
-          <a:bodyPr/>
-          <a:lstStyle/>
-          <a:p>
-            <a:r>
-              <a:rPr lang="en-US" dirty="0"/>
-              <a:t>Stimulation Noise</a:t>
-            </a:r>
-          </a:p>
-        </p:txBody>
-      </p:sp>
-      <p:sp>
-        <p:nvSpPr>
-          <p:cNvPr id="4" name="Slide Number Placeholder 3">
-            <a:extLst>
-              <a:ext uri="{FF2B5EF4-FFF2-40B4-BE49-F238E27FC236}">
-                <a16:creationId xmlns:a16="http://schemas.microsoft.com/office/drawing/2014/main" id="{470A9B96-D26C-4C54-B5BE-7E65E9F5454C}"/>
-              </a:ext>
-            </a:extLst>
-          </p:cNvPr>
-          <p:cNvSpPr>
-            <a:spLocks noGrp="1"/>
-          </p:cNvSpPr>
-          <p:nvPr>
-            <p:ph type="sldNum" sz="quarter" idx="12"/>
-          </p:nvPr>
-        </p:nvSpPr>
-        <p:spPr/>
-        <p:txBody>
-          <a:bodyPr/>
-          <a:lstStyle/>
-          <a:p>
-            <a:fld id="{B01D9778-10B4-40FB-B4E4-44FA89A86639}" type="slidenum">
-              <a:rPr lang="en-US" smtClean="0"/>
-              <a:pPr/>
-              <a:t>14</a:t>
-            </a:fld>
-            <a:endParaRPr lang="en-US"/>
-          </a:p>
-        </p:txBody>
-      </p:sp>
-      <p:pic>
-        <p:nvPicPr>
-          <p:cNvPr id="9" name="Content Placeholder 8" descr="A close up of a map&#10;&#10;Description generated with high confidence">
-            <a:extLst>
-              <a:ext uri="{FF2B5EF4-FFF2-40B4-BE49-F238E27FC236}">
-                <a16:creationId xmlns:a16="http://schemas.microsoft.com/office/drawing/2014/main" id="{EE6FF860-D88F-428B-8786-C4B0BB12B3A7}"/>
-              </a:ext>
-            </a:extLst>
-          </p:cNvPr>
-          <p:cNvPicPr>
-            <a:picLocks noGrp="1" noChangeAspect="1"/>
-          </p:cNvPicPr>
-          <p:nvPr>
-            <p:ph idx="1"/>
-          </p:nvPr>
-        </p:nvPicPr>
-        <p:blipFill>
-          <a:blip r:embed="rId2">
-            <a:extLst>
-              <a:ext uri="{28A0092B-C50C-407E-A947-70E740481C1C}">
-                <a14:useLocalDpi xmlns:a14="http://schemas.microsoft.com/office/drawing/2010/main" val="0"/>
-              </a:ext>
-            </a:extLst>
-          </a:blip>
-          <a:stretch>
-            <a:fillRect/>
-          </a:stretch>
-        </p:blipFill>
-        <p:spPr>
-          <a:xfrm>
-            <a:off x="152400" y="1295400"/>
-            <a:ext cx="8723511" cy="4952999"/>
-          </a:xfrm>
-        </p:spPr>
-      </p:pic>
-    </p:spTree>
-    <p:extLst>
-      <p:ext uri="{BB962C8B-B14F-4D97-AF65-F5344CB8AC3E}">
-        <p14:creationId xmlns:p14="http://schemas.microsoft.com/office/powerpoint/2010/main" val="1533726632"/>
-      </p:ext>
-    </p:extLst>
-  </p:cSld>
-  <p:clrMapOvr>
-    <a:masterClrMapping/>
-  </p:clrMapOvr>
-</p:sld>
-</file>
-
 <file path=ppt/slides/slide15.xml><?xml version="1.0" encoding="utf-8"?>
 <p:sld xmlns:a="http://schemas.openxmlformats.org/drawingml/2006/main" xmlns:r="http://schemas.openxmlformats.org/officeDocument/2006/relationships" xmlns:p="http://schemas.openxmlformats.org/presentationml/2006/main">
   <p:cSld>
@@ -4827,9 +6332,10 @@
           <a:lstStyle/>
           <a:p>
             <a:r>
-              <a:rPr lang="en-US" dirty="0"/>
+              <a:rPr lang="en-US"/>
               <a:t>Dominant Electrodes</a:t>
             </a:r>
+            <a:endParaRPr lang="en-US" dirty="0"/>
           </a:p>
         </p:txBody>
       </p:sp>
@@ -4858,129 +6364,6 @@
               <a:rPr lang="en-US" smtClean="0"/>
               <a:pPr/>
               <a:t>15</a:t>
-            </a:fld>
-            <a:endParaRPr lang="en-US"/>
-          </a:p>
-        </p:txBody>
-      </p:sp>
-      <p:pic>
-        <p:nvPicPr>
-          <p:cNvPr id="9" name="Content Placeholder 5" descr="A screenshot of a computer&#10;&#10;Description generated with high confidence">
-            <a:extLst>
-              <a:ext uri="{FF2B5EF4-FFF2-40B4-BE49-F238E27FC236}">
-                <a16:creationId xmlns:a16="http://schemas.microsoft.com/office/drawing/2014/main" id="{F6C78D37-6813-445B-88F4-A721F763BAB2}"/>
-              </a:ext>
-            </a:extLst>
-          </p:cNvPr>
-          <p:cNvPicPr>
-            <a:picLocks noGrp="1" noChangeAspect="1"/>
-          </p:cNvPicPr>
-          <p:nvPr>
-            <p:ph idx="1"/>
-          </p:nvPr>
-        </p:nvPicPr>
-        <p:blipFill rotWithShape="1">
-          <a:blip r:embed="rId2">
-            <a:extLst>
-              <a:ext uri="{28A0092B-C50C-407E-A947-70E740481C1C}">
-                <a14:useLocalDpi xmlns:a14="http://schemas.microsoft.com/office/drawing/2010/main" val="0"/>
-              </a:ext>
-            </a:extLst>
-          </a:blip>
-          <a:srcRect l="6739" t="4254" r="7328" b="3416"/>
-          <a:stretch/>
-        </p:blipFill>
-        <p:spPr>
-          <a:xfrm>
-            <a:off x="87923" y="1371600"/>
-            <a:ext cx="8968154" cy="4572000"/>
-          </a:xfrm>
-        </p:spPr>
-      </p:pic>
-    </p:spTree>
-    <p:extLst>
-      <p:ext uri="{BB962C8B-B14F-4D97-AF65-F5344CB8AC3E}">
-        <p14:creationId xmlns:p14="http://schemas.microsoft.com/office/powerpoint/2010/main" val="2719028190"/>
-      </p:ext>
-    </p:extLst>
-  </p:cSld>
-  <p:clrMapOvr>
-    <a:masterClrMapping/>
-  </p:clrMapOvr>
-</p:sld>
-</file>
-
-<file path=ppt/slides/slide16.xml><?xml version="1.0" encoding="utf-8"?>
-<p:sld xmlns:a="http://schemas.openxmlformats.org/drawingml/2006/main" xmlns:r="http://schemas.openxmlformats.org/officeDocument/2006/relationships" xmlns:p="http://schemas.openxmlformats.org/presentationml/2006/main">
-  <p:cSld>
-    <p:spTree>
-      <p:nvGrpSpPr>
-        <p:cNvPr id="1" name=""/>
-        <p:cNvGrpSpPr/>
-        <p:nvPr/>
-      </p:nvGrpSpPr>
-      <p:grpSpPr>
-        <a:xfrm>
-          <a:off x="0" y="0"/>
-          <a:ext cx="0" cy="0"/>
-          <a:chOff x="0" y="0"/>
-          <a:chExt cx="0" cy="0"/>
-        </a:xfrm>
-      </p:grpSpPr>
-      <p:sp>
-        <p:nvSpPr>
-          <p:cNvPr id="2" name="Title 1">
-            <a:extLst>
-              <a:ext uri="{FF2B5EF4-FFF2-40B4-BE49-F238E27FC236}">
-                <a16:creationId xmlns:a16="http://schemas.microsoft.com/office/drawing/2014/main" id="{6F847B57-CB94-4091-8771-B55DFD5F71FF}"/>
-              </a:ext>
-            </a:extLst>
-          </p:cNvPr>
-          <p:cNvSpPr>
-            <a:spLocks noGrp="1"/>
-          </p:cNvSpPr>
-          <p:nvPr>
-            <p:ph type="title"/>
-          </p:nvPr>
-        </p:nvSpPr>
-        <p:spPr/>
-        <p:txBody>
-          <a:bodyPr/>
-          <a:lstStyle/>
-          <a:p>
-            <a:r>
-              <a:rPr lang="en-US"/>
-              <a:t>Dominant Electrodes</a:t>
-            </a:r>
-            <a:endParaRPr lang="en-US" dirty="0"/>
-          </a:p>
-        </p:txBody>
-      </p:sp>
-      <p:sp>
-        <p:nvSpPr>
-          <p:cNvPr id="4" name="Slide Number Placeholder 3">
-            <a:extLst>
-              <a:ext uri="{FF2B5EF4-FFF2-40B4-BE49-F238E27FC236}">
-                <a16:creationId xmlns:a16="http://schemas.microsoft.com/office/drawing/2014/main" id="{2588F7C1-5C39-4DA7-89C2-5ADD824897FE}"/>
-              </a:ext>
-            </a:extLst>
-          </p:cNvPr>
-          <p:cNvSpPr>
-            <a:spLocks noGrp="1"/>
-          </p:cNvSpPr>
-          <p:nvPr>
-            <p:ph type="sldNum" sz="quarter" idx="12"/>
-          </p:nvPr>
-        </p:nvSpPr>
-        <p:spPr/>
-        <p:txBody>
-          <a:bodyPr/>
-          <a:lstStyle/>
-          <a:p>
-            <a:fld id="{B01D9778-10B4-40FB-B4E4-44FA89A86639}" type="slidenum">
-              <a:rPr lang="en-US" smtClean="0"/>
-              <a:pPr/>
-              <a:t>16</a:t>
             </a:fld>
             <a:endParaRPr lang="en-US"/>
           </a:p>
@@ -5337,6 +6720,129 @@
 </p:sld>
 </file>
 
+<file path=ppt/slides/slide16.xml><?xml version="1.0" encoding="utf-8"?>
+<p:sld xmlns:a="http://schemas.openxmlformats.org/drawingml/2006/main" xmlns:r="http://schemas.openxmlformats.org/officeDocument/2006/relationships" xmlns:p="http://schemas.openxmlformats.org/presentationml/2006/main">
+  <p:cSld>
+    <p:spTree>
+      <p:nvGrpSpPr>
+        <p:cNvPr id="1" name=""/>
+        <p:cNvGrpSpPr/>
+        <p:nvPr/>
+      </p:nvGrpSpPr>
+      <p:grpSpPr>
+        <a:xfrm>
+          <a:off x="0" y="0"/>
+          <a:ext cx="0" cy="0"/>
+          <a:chOff x="0" y="0"/>
+          <a:chExt cx="0" cy="0"/>
+        </a:xfrm>
+      </p:grpSpPr>
+      <p:sp>
+        <p:nvSpPr>
+          <p:cNvPr id="2" name="Title 1">
+            <a:extLst>
+              <a:ext uri="{FF2B5EF4-FFF2-40B4-BE49-F238E27FC236}">
+                <a16:creationId xmlns:a16="http://schemas.microsoft.com/office/drawing/2014/main" id="{28E279F3-6F7E-4341-B58F-24B906414911}"/>
+              </a:ext>
+            </a:extLst>
+          </p:cNvPr>
+          <p:cNvSpPr>
+            <a:spLocks noGrp="1"/>
+          </p:cNvSpPr>
+          <p:nvPr>
+            <p:ph type="title"/>
+          </p:nvPr>
+        </p:nvSpPr>
+        <p:spPr/>
+        <p:txBody>
+          <a:bodyPr/>
+          <a:lstStyle/>
+          <a:p>
+            <a:r>
+              <a:rPr lang="en-US" dirty="0"/>
+              <a:t>Stimulation Noise</a:t>
+            </a:r>
+          </a:p>
+        </p:txBody>
+      </p:sp>
+      <p:sp>
+        <p:nvSpPr>
+          <p:cNvPr id="4" name="Slide Number Placeholder 3">
+            <a:extLst>
+              <a:ext uri="{FF2B5EF4-FFF2-40B4-BE49-F238E27FC236}">
+                <a16:creationId xmlns:a16="http://schemas.microsoft.com/office/drawing/2014/main" id="{470A9B96-D26C-4C54-B5BE-7E65E9F5454C}"/>
+              </a:ext>
+            </a:extLst>
+          </p:cNvPr>
+          <p:cNvSpPr>
+            <a:spLocks noGrp="1"/>
+          </p:cNvSpPr>
+          <p:nvPr>
+            <p:ph type="sldNum" sz="quarter" idx="12"/>
+          </p:nvPr>
+        </p:nvSpPr>
+        <p:spPr/>
+        <p:txBody>
+          <a:bodyPr/>
+          <a:lstStyle/>
+          <a:p>
+            <a:fld id="{B01D9778-10B4-40FB-B4E4-44FA89A86639}" type="slidenum">
+              <a:rPr lang="en-US" smtClean="0"/>
+              <a:pPr/>
+              <a:t>16</a:t>
+            </a:fld>
+            <a:endParaRPr lang="en-US"/>
+          </a:p>
+        </p:txBody>
+      </p:sp>
+      <p:pic>
+        <p:nvPicPr>
+          <p:cNvPr id="9" name="Content Placeholder 8" descr="A close up of a map&#10;&#10;Description generated with high confidence">
+            <a:extLst>
+              <a:ext uri="{FF2B5EF4-FFF2-40B4-BE49-F238E27FC236}">
+                <a16:creationId xmlns:a16="http://schemas.microsoft.com/office/drawing/2014/main" id="{EE6FF860-D88F-428B-8786-C4B0BB12B3A7}"/>
+              </a:ext>
+            </a:extLst>
+          </p:cNvPr>
+          <p:cNvPicPr>
+            <a:picLocks noGrp="1" noChangeAspect="1"/>
+          </p:cNvPicPr>
+          <p:nvPr>
+            <p:ph idx="1"/>
+          </p:nvPr>
+        </p:nvPicPr>
+        <p:blipFill>
+          <a:blip r:embed="rId2">
+            <a:extLst>
+              <a:ext uri="{28A0092B-C50C-407E-A947-70E740481C1C}">
+                <a14:useLocalDpi xmlns:a14="http://schemas.microsoft.com/office/drawing/2010/main" val="0"/>
+              </a:ext>
+            </a:extLst>
+          </a:blip>
+          <a:stretch>
+            <a:fillRect/>
+          </a:stretch>
+        </p:blipFill>
+        <p:spPr>
+          <a:xfrm>
+            <a:off x="152400" y="1295400"/>
+            <a:ext cx="8723511" cy="4952999"/>
+          </a:xfrm>
+        </p:spPr>
+      </p:pic>
+    </p:spTree>
+    <p:extLst>
+      <p:ext uri="{BB962C8B-B14F-4D97-AF65-F5344CB8AC3E}">
+        <p14:creationId xmlns:p14="http://schemas.microsoft.com/office/powerpoint/2010/main" val="1533726632"/>
+      </p:ext>
+    </p:extLst>
+  </p:cSld>
+  <p:clrMapOvr>
+    <a:masterClrMapping/>
+  </p:clrMapOvr>
+</p:sld>
+</file>
+
 <file path=ppt/slides/slide17.xml><?xml version="1.0" encoding="utf-8"?>
 <p:sld xmlns:a="http://schemas.openxmlformats.org/drawingml/2006/main" xmlns:r="http://schemas.openxmlformats.org/officeDocument/2006/relationships" xmlns:p="http://schemas.openxmlformats.org/presentationml/2006/main">
   <p:cSld>
@@ -5377,7 +6883,7 @@
           <a:p>
             <a:r>
               <a:rPr lang="en-US" dirty="0"/>
-              <a:t>Covariance as Features</a:t>
+              <a:t>Dominant Electrodes</a:t>
             </a:r>
           </a:p>
         </p:txBody>
@@ -5407,6 +6913,128 @@
               <a:rPr lang="en-US" smtClean="0"/>
               <a:pPr/>
               <a:t>17</a:t>
+            </a:fld>
+            <a:endParaRPr lang="en-US"/>
+          </a:p>
+        </p:txBody>
+      </p:sp>
+      <p:pic>
+        <p:nvPicPr>
+          <p:cNvPr id="9" name="Content Placeholder 5" descr="A screenshot of a computer&#10;&#10;Description generated with high confidence">
+            <a:extLst>
+              <a:ext uri="{FF2B5EF4-FFF2-40B4-BE49-F238E27FC236}">
+                <a16:creationId xmlns:a16="http://schemas.microsoft.com/office/drawing/2014/main" id="{F6C78D37-6813-445B-88F4-A721F763BAB2}"/>
+              </a:ext>
+            </a:extLst>
+          </p:cNvPr>
+          <p:cNvPicPr>
+            <a:picLocks noGrp="1" noChangeAspect="1"/>
+          </p:cNvPicPr>
+          <p:nvPr>
+            <p:ph idx="1"/>
+          </p:nvPr>
+        </p:nvPicPr>
+        <p:blipFill rotWithShape="1">
+          <a:blip r:embed="rId2">
+            <a:extLst>
+              <a:ext uri="{28A0092B-C50C-407E-A947-70E740481C1C}">
+                <a14:useLocalDpi xmlns:a14="http://schemas.microsoft.com/office/drawing/2010/main" val="0"/>
+              </a:ext>
+            </a:extLst>
+          </a:blip>
+          <a:srcRect l="6739" t="4254" r="7328" b="3416"/>
+          <a:stretch/>
+        </p:blipFill>
+        <p:spPr>
+          <a:xfrm>
+            <a:off x="87923" y="1371600"/>
+            <a:ext cx="8968154" cy="4572000"/>
+          </a:xfrm>
+        </p:spPr>
+      </p:pic>
+    </p:spTree>
+    <p:extLst>
+      <p:ext uri="{BB962C8B-B14F-4D97-AF65-F5344CB8AC3E}">
+        <p14:creationId xmlns:p14="http://schemas.microsoft.com/office/powerpoint/2010/main" val="2719028190"/>
+      </p:ext>
+    </p:extLst>
+  </p:cSld>
+  <p:clrMapOvr>
+    <a:masterClrMapping/>
+  </p:clrMapOvr>
+</p:sld>
+</file>
+
+<file path=ppt/slides/slide18.xml><?xml version="1.0" encoding="utf-8"?>
+<p:sld xmlns:a="http://schemas.openxmlformats.org/drawingml/2006/main" xmlns:r="http://schemas.openxmlformats.org/officeDocument/2006/relationships" xmlns:p="http://schemas.openxmlformats.org/presentationml/2006/main">
+  <p:cSld>
+    <p:spTree>
+      <p:nvGrpSpPr>
+        <p:cNvPr id="1" name=""/>
+        <p:cNvGrpSpPr/>
+        <p:nvPr/>
+      </p:nvGrpSpPr>
+      <p:grpSpPr>
+        <a:xfrm>
+          <a:off x="0" y="0"/>
+          <a:ext cx="0" cy="0"/>
+          <a:chOff x="0" y="0"/>
+          <a:chExt cx="0" cy="0"/>
+        </a:xfrm>
+      </p:grpSpPr>
+      <p:sp>
+        <p:nvSpPr>
+          <p:cNvPr id="2" name="Title 1">
+            <a:extLst>
+              <a:ext uri="{FF2B5EF4-FFF2-40B4-BE49-F238E27FC236}">
+                <a16:creationId xmlns:a16="http://schemas.microsoft.com/office/drawing/2014/main" id="{6F847B57-CB94-4091-8771-B55DFD5F71FF}"/>
+              </a:ext>
+            </a:extLst>
+          </p:cNvPr>
+          <p:cNvSpPr>
+            <a:spLocks noGrp="1"/>
+          </p:cNvSpPr>
+          <p:nvPr>
+            <p:ph type="title"/>
+          </p:nvPr>
+        </p:nvSpPr>
+        <p:spPr/>
+        <p:txBody>
+          <a:bodyPr/>
+          <a:lstStyle/>
+          <a:p>
+            <a:r>
+              <a:rPr lang="en-US" dirty="0"/>
+              <a:t>Covariance as Features</a:t>
+            </a:r>
+          </a:p>
+        </p:txBody>
+      </p:sp>
+      <p:sp>
+        <p:nvSpPr>
+          <p:cNvPr id="4" name="Slide Number Placeholder 3">
+            <a:extLst>
+              <a:ext uri="{FF2B5EF4-FFF2-40B4-BE49-F238E27FC236}">
+                <a16:creationId xmlns:a16="http://schemas.microsoft.com/office/drawing/2014/main" id="{2588F7C1-5C39-4DA7-89C2-5ADD824897FE}"/>
+              </a:ext>
+            </a:extLst>
+          </p:cNvPr>
+          <p:cNvSpPr>
+            <a:spLocks noGrp="1"/>
+          </p:cNvSpPr>
+          <p:nvPr>
+            <p:ph type="sldNum" sz="quarter" idx="12"/>
+          </p:nvPr>
+        </p:nvSpPr>
+        <p:spPr/>
+        <p:txBody>
+          <a:bodyPr/>
+          <a:lstStyle/>
+          <a:p>
+            <a:fld id="{B01D9778-10B4-40FB-B4E4-44FA89A86639}" type="slidenum">
+              <a:rPr lang="en-US" smtClean="0"/>
+              <a:pPr/>
+              <a:t>18</a:t>
             </a:fld>
             <a:endParaRPr lang="en-US"/>
           </a:p>
@@ -5727,7 +7355,7 @@
 </p:sld>
 </file>
 
-<file path=ppt/slides/slide18.xml><?xml version="1.0" encoding="utf-8"?>
+<file path=ppt/slides/slide19.xml><?xml version="1.0" encoding="utf-8"?>
 <p:sld xmlns:a="http://schemas.openxmlformats.org/drawingml/2006/main" xmlns:r="http://schemas.openxmlformats.org/officeDocument/2006/relationships" xmlns:p="http://schemas.openxmlformats.org/presentationml/2006/main">
   <p:cSld>
     <p:spTree>
@@ -5796,7 +7424,7 @@
             <a:fld id="{B01D9778-10B4-40FB-B4E4-44FA89A86639}" type="slidenum">
               <a:rPr lang="en-US" smtClean="0"/>
               <a:pPr/>
-              <a:t>18</a:t>
+              <a:t>19</a:t>
             </a:fld>
             <a:endParaRPr lang="en-US"/>
           </a:p>
@@ -5850,129 +7478,6 @@
 </p:sld>
 </file>
 
-<file path=ppt/slides/slide19.xml><?xml version="1.0" encoding="utf-8"?>
-<p:sld xmlns:a="http://schemas.openxmlformats.org/drawingml/2006/main" xmlns:r="http://schemas.openxmlformats.org/officeDocument/2006/relationships" xmlns:p="http://schemas.openxmlformats.org/presentationml/2006/main">
-  <p:cSld>
-    <p:spTree>
-      <p:nvGrpSpPr>
-        <p:cNvPr id="1" name=""/>
-        <p:cNvGrpSpPr/>
-        <p:nvPr/>
-      </p:nvGrpSpPr>
-      <p:grpSpPr>
-        <a:xfrm>
-          <a:off x="0" y="0"/>
-          <a:ext cx="0" cy="0"/>
-          <a:chOff x="0" y="0"/>
-          <a:chExt cx="0" cy="0"/>
-        </a:xfrm>
-      </p:grpSpPr>
-      <p:sp>
-        <p:nvSpPr>
-          <p:cNvPr id="2" name="Title 1">
-            <a:extLst>
-              <a:ext uri="{FF2B5EF4-FFF2-40B4-BE49-F238E27FC236}">
-                <a16:creationId xmlns:a16="http://schemas.microsoft.com/office/drawing/2014/main" id="{6F847B57-CB94-4091-8771-B55DFD5F71FF}"/>
-              </a:ext>
-            </a:extLst>
-          </p:cNvPr>
-          <p:cNvSpPr>
-            <a:spLocks noGrp="1"/>
-          </p:cNvSpPr>
-          <p:nvPr>
-            <p:ph type="title"/>
-          </p:nvPr>
-        </p:nvSpPr>
-        <p:spPr/>
-        <p:txBody>
-          <a:bodyPr/>
-          <a:lstStyle/>
-          <a:p>
-            <a:r>
-              <a:rPr lang="en-US" dirty="0"/>
-              <a:t>Singularity of Covariance</a:t>
-            </a:r>
-          </a:p>
-        </p:txBody>
-      </p:sp>
-      <p:sp>
-        <p:nvSpPr>
-          <p:cNvPr id="4" name="Slide Number Placeholder 3">
-            <a:extLst>
-              <a:ext uri="{FF2B5EF4-FFF2-40B4-BE49-F238E27FC236}">
-                <a16:creationId xmlns:a16="http://schemas.microsoft.com/office/drawing/2014/main" id="{2588F7C1-5C39-4DA7-89C2-5ADD824897FE}"/>
-              </a:ext>
-            </a:extLst>
-          </p:cNvPr>
-          <p:cNvSpPr>
-            <a:spLocks noGrp="1"/>
-          </p:cNvSpPr>
-          <p:nvPr>
-            <p:ph type="sldNum" sz="quarter" idx="12"/>
-          </p:nvPr>
-        </p:nvSpPr>
-        <p:spPr/>
-        <p:txBody>
-          <a:bodyPr/>
-          <a:lstStyle/>
-          <a:p>
-            <a:fld id="{B01D9778-10B4-40FB-B4E4-44FA89A86639}" type="slidenum">
-              <a:rPr lang="en-US" smtClean="0"/>
-              <a:pPr/>
-              <a:t>19</a:t>
-            </a:fld>
-            <a:endParaRPr lang="en-US"/>
-          </a:p>
-        </p:txBody>
-      </p:sp>
-      <p:pic>
-        <p:nvPicPr>
-          <p:cNvPr id="7" name="Content Placeholder 6">
-            <a:extLst>
-              <a:ext uri="{FF2B5EF4-FFF2-40B4-BE49-F238E27FC236}">
-                <a16:creationId xmlns:a16="http://schemas.microsoft.com/office/drawing/2014/main" id="{EBF35731-A29D-493F-97B3-724A9BE10DAE}"/>
-              </a:ext>
-            </a:extLst>
-          </p:cNvPr>
-          <p:cNvPicPr>
-            <a:picLocks noGrp="1" noChangeAspect="1"/>
-          </p:cNvPicPr>
-          <p:nvPr>
-            <p:ph idx="1"/>
-          </p:nvPr>
-        </p:nvPicPr>
-        <p:blipFill>
-          <a:blip r:embed="rId2">
-            <a:extLst>
-              <a:ext uri="{28A0092B-C50C-407E-A947-70E740481C1C}">
-                <a14:useLocalDpi xmlns:a14="http://schemas.microsoft.com/office/drawing/2010/main" val="0"/>
-              </a:ext>
-            </a:extLst>
-          </a:blip>
-          <a:stretch>
-            <a:fillRect/>
-          </a:stretch>
-        </p:blipFill>
-        <p:spPr>
-          <a:xfrm>
-            <a:off x="690880" y="1092200"/>
-            <a:ext cx="7710170" cy="5782628"/>
-          </a:xfrm>
-        </p:spPr>
-      </p:pic>
-    </p:spTree>
-    <p:extLst>
-      <p:ext uri="{BB962C8B-B14F-4D97-AF65-F5344CB8AC3E}">
-        <p14:creationId xmlns:p14="http://schemas.microsoft.com/office/powerpoint/2010/main" val="3765988232"/>
-      </p:ext>
-    </p:extLst>
-  </p:cSld>
-  <p:clrMapOvr>
-    <a:masterClrMapping/>
-  </p:clrMapOvr>
-</p:sld>
-</file>
-
 <file path=ppt/slides/slide2.xml><?xml version="1.0" encoding="utf-8"?>
 <p:sld xmlns:a="http://schemas.openxmlformats.org/drawingml/2006/main" xmlns:r="http://schemas.openxmlformats.org/officeDocument/2006/relationships" xmlns:p="http://schemas.openxmlformats.org/presentationml/2006/main">
   <p:cSld>
@@ -6057,25 +7562,7 @@
                         </a:solidFill>
                         <a:latin typeface="Cambria Math" panose="02040503050406030204" pitchFamily="18" charset="0"/>
                       </a:rPr>
-                      <m:t>~</m:t>
-                    </m:r>
-                    <m:r>
-                      <a:rPr lang="en-US" i="1" dirty="0" smtClean="0">
-                        <a:solidFill>
-                          <a:srgbClr val="002060"/>
-                        </a:solidFill>
-                        <a:latin typeface="Cambria Math" panose="02040503050406030204" pitchFamily="18" charset="0"/>
-                      </a:rPr>
-                      <m:t>3</m:t>
-                    </m:r>
-                    <m:r>
-                      <a:rPr lang="en-US" i="1" dirty="0" smtClean="0">
-                        <a:solidFill>
-                          <a:srgbClr val="002060"/>
-                        </a:solidFill>
-                        <a:latin typeface="Cambria Math" panose="02040503050406030204" pitchFamily="18" charset="0"/>
-                      </a:rPr>
-                      <m:t>%</m:t>
+                      <m:t>~3%</m:t>
                     </m:r>
                   </m:oMath>
                 </a14:m>
@@ -6131,7 +7618,7 @@
             </p:nvSpPr>
             <p:spPr>
               <a:blipFill>
-                <a:blip r:embed="rId2"/>
+                <a:blip r:embed="rId3"/>
                 <a:stretch>
                   <a:fillRect l="-1704" t="-1752" r="-963"/>
                 </a:stretch>
@@ -6176,6 +7663,78 @@
           </a:p>
         </p:txBody>
       </p:sp>
+      <p:pic>
+        <p:nvPicPr>
+          <p:cNvPr id="7" name="Picture 6" descr="A picture containing indoor&#10;&#10;Description generated with very high confidence">
+            <a:extLst>
+              <a:ext uri="{FF2B5EF4-FFF2-40B4-BE49-F238E27FC236}">
+                <a16:creationId xmlns:a16="http://schemas.microsoft.com/office/drawing/2014/main" id="{0EC3B197-CF7E-474F-9778-CF395DF06BB2}"/>
+              </a:ext>
+            </a:extLst>
+          </p:cNvPr>
+          <p:cNvPicPr>
+            <a:picLocks noChangeAspect="1"/>
+          </p:cNvPicPr>
+          <p:nvPr/>
+        </p:nvPicPr>
+        <p:blipFill>
+          <a:blip r:embed="rId4" cstate="print">
+            <a:extLst>
+              <a:ext uri="{28A0092B-C50C-407E-A947-70E740481C1C}">
+                <a14:useLocalDpi xmlns:a14="http://schemas.microsoft.com/office/drawing/2010/main" val="0"/>
+              </a:ext>
+            </a:extLst>
+          </a:blip>
+          <a:stretch>
+            <a:fillRect/>
+          </a:stretch>
+        </p:blipFill>
+        <p:spPr>
+          <a:xfrm>
+            <a:off x="6708321" y="5020354"/>
+            <a:ext cx="2435679" cy="1826760"/>
+          </a:xfrm>
+          <a:prstGeom prst="rect">
+            <a:avLst/>
+          </a:prstGeom>
+        </p:spPr>
+      </p:pic>
+      <p:pic>
+        <p:nvPicPr>
+          <p:cNvPr id="9" name="Picture 8" descr="A person reading a book&#10;&#10;Description generated with high confidence">
+            <a:extLst>
+              <a:ext uri="{FF2B5EF4-FFF2-40B4-BE49-F238E27FC236}">
+                <a16:creationId xmlns:a16="http://schemas.microsoft.com/office/drawing/2014/main" id="{48FBF84B-0EF5-48C7-B99C-BDFB4D44E218}"/>
+              </a:ext>
+            </a:extLst>
+          </p:cNvPr>
+          <p:cNvPicPr>
+            <a:picLocks noChangeAspect="1"/>
+          </p:cNvPicPr>
+          <p:nvPr/>
+        </p:nvPicPr>
+        <p:blipFill>
+          <a:blip r:embed="rId5" cstate="print">
+            <a:extLst>
+              <a:ext uri="{28A0092B-C50C-407E-A947-70E740481C1C}">
+                <a14:useLocalDpi xmlns:a14="http://schemas.microsoft.com/office/drawing/2010/main" val="0"/>
+              </a:ext>
+            </a:extLst>
+          </a:blip>
+          <a:stretch>
+            <a:fillRect/>
+          </a:stretch>
+        </p:blipFill>
+        <p:spPr>
+          <a:xfrm>
+            <a:off x="3733800" y="5020354"/>
+            <a:ext cx="2740479" cy="1827878"/>
+          </a:xfrm>
+          <a:prstGeom prst="rect">
+            <a:avLst/>
+          </a:prstGeom>
+        </p:spPr>
+      </p:pic>
     </p:spTree>
     <p:extLst>
       <p:ext uri="{BB962C8B-B14F-4D97-AF65-F5344CB8AC3E}">
@@ -6341,6 +7900,94 @@
                       </p:childTnLst>
                     </p:cTn>
                   </p:par>
+                  <p:par>
+                    <p:cTn id="15" fill="hold">
+                      <p:stCondLst>
+                        <p:cond delay="indefinite"/>
+                      </p:stCondLst>
+                      <p:childTnLst>
+                        <p:par>
+                          <p:cTn id="16" fill="hold">
+                            <p:stCondLst>
+                              <p:cond delay="0"/>
+                            </p:stCondLst>
+                            <p:childTnLst>
+                              <p:par>
+                                <p:cTn id="17" presetID="16" presetClass="entr" presetSubtype="21" fill="hold" nodeType="clickEffect">
+                                  <p:stCondLst>
+                                    <p:cond delay="0"/>
+                                  </p:stCondLst>
+                                  <p:childTnLst>
+                                    <p:set>
+                                      <p:cBhvr>
+                                        <p:cTn id="18" dur="1" fill="hold">
+                                          <p:stCondLst>
+                                            <p:cond delay="0"/>
+                                          </p:stCondLst>
+                                        </p:cTn>
+                                        <p:tgtEl>
+                                          <p:spTgt spid="9"/>
+                                        </p:tgtEl>
+                                        <p:attrNameLst>
+                                          <p:attrName>style.visibility</p:attrName>
+                                        </p:attrNameLst>
+                                      </p:cBhvr>
+                                      <p:to>
+                                        <p:strVal val="visible"/>
+                                      </p:to>
+                                    </p:set>
+                                    <p:animEffect transition="in" filter="barn(inVertical)">
+                                      <p:cBhvr>
+                                        <p:cTn id="19" dur="500"/>
+                                        <p:tgtEl>
+                                          <p:spTgt spid="9"/>
+                                        </p:tgtEl>
+                                      </p:cBhvr>
+                                    </p:animEffect>
+                                  </p:childTnLst>
+                                </p:cTn>
+                              </p:par>
+                              <p:par>
+                                <p:cTn id="20" presetID="16" presetClass="entr" presetSubtype="21" fill="hold" nodeType="withEffect">
+                                  <p:stCondLst>
+                                    <p:cond delay="0"/>
+                                  </p:stCondLst>
+                                  <p:childTnLst>
+                                    <p:set>
+                                      <p:cBhvr>
+                                        <p:cTn id="21" dur="1" fill="hold">
+                                          <p:stCondLst>
+                                            <p:cond delay="0"/>
+                                          </p:stCondLst>
+                                        </p:cTn>
+                                        <p:tgtEl>
+                                          <p:spTgt spid="7"/>
+                                        </p:tgtEl>
+                                        <p:attrNameLst>
+                                          <p:attrName>style.visibility</p:attrName>
+                                        </p:attrNameLst>
+                                      </p:cBhvr>
+                                      <p:to>
+                                        <p:strVal val="visible"/>
+                                      </p:to>
+                                    </p:set>
+                                    <p:animEffect transition="in" filter="barn(inVertical)">
+                                      <p:cBhvr>
+                                        <p:cTn id="22" dur="500"/>
+                                        <p:tgtEl>
+                                          <p:spTgt spid="7"/>
+                                        </p:tgtEl>
+                                      </p:cBhvr>
+                                    </p:animEffect>
+                                  </p:childTnLst>
+                                </p:cTn>
+                              </p:par>
+                            </p:childTnLst>
+                          </p:cTn>
+                        </p:par>
+                      </p:childTnLst>
+                    </p:cTn>
+                  </p:par>
                 </p:childTnLst>
               </p:cTn>
               <p:prevCondLst>
@@ -6436,6 +8083,129 @@
               <a:rPr lang="en-US" smtClean="0"/>
               <a:pPr/>
               <a:t>20</a:t>
+            </a:fld>
+            <a:endParaRPr lang="en-US"/>
+          </a:p>
+        </p:txBody>
+      </p:sp>
+      <p:pic>
+        <p:nvPicPr>
+          <p:cNvPr id="7" name="Content Placeholder 6">
+            <a:extLst>
+              <a:ext uri="{FF2B5EF4-FFF2-40B4-BE49-F238E27FC236}">
+                <a16:creationId xmlns:a16="http://schemas.microsoft.com/office/drawing/2014/main" id="{EBF35731-A29D-493F-97B3-724A9BE10DAE}"/>
+              </a:ext>
+            </a:extLst>
+          </p:cNvPr>
+          <p:cNvPicPr>
+            <a:picLocks noGrp="1" noChangeAspect="1"/>
+          </p:cNvPicPr>
+          <p:nvPr>
+            <p:ph idx="1"/>
+          </p:nvPr>
+        </p:nvPicPr>
+        <p:blipFill>
+          <a:blip r:embed="rId2">
+            <a:extLst>
+              <a:ext uri="{28A0092B-C50C-407E-A947-70E740481C1C}">
+                <a14:useLocalDpi xmlns:a14="http://schemas.microsoft.com/office/drawing/2010/main" val="0"/>
+              </a:ext>
+            </a:extLst>
+          </a:blip>
+          <a:stretch>
+            <a:fillRect/>
+          </a:stretch>
+        </p:blipFill>
+        <p:spPr>
+          <a:xfrm>
+            <a:off x="690880" y="1092200"/>
+            <a:ext cx="7710170" cy="5782628"/>
+          </a:xfrm>
+        </p:spPr>
+      </p:pic>
+    </p:spTree>
+    <p:extLst>
+      <p:ext uri="{BB962C8B-B14F-4D97-AF65-F5344CB8AC3E}">
+        <p14:creationId xmlns:p14="http://schemas.microsoft.com/office/powerpoint/2010/main" val="3765988232"/>
+      </p:ext>
+    </p:extLst>
+  </p:cSld>
+  <p:clrMapOvr>
+    <a:masterClrMapping/>
+  </p:clrMapOvr>
+</p:sld>
+</file>
+
+<file path=ppt/slides/slide21.xml><?xml version="1.0" encoding="utf-8"?>
+<p:sld xmlns:a="http://schemas.openxmlformats.org/drawingml/2006/main" xmlns:r="http://schemas.openxmlformats.org/officeDocument/2006/relationships" xmlns:p="http://schemas.openxmlformats.org/presentationml/2006/main">
+  <p:cSld>
+    <p:spTree>
+      <p:nvGrpSpPr>
+        <p:cNvPr id="1" name=""/>
+        <p:cNvGrpSpPr/>
+        <p:nvPr/>
+      </p:nvGrpSpPr>
+      <p:grpSpPr>
+        <a:xfrm>
+          <a:off x="0" y="0"/>
+          <a:ext cx="0" cy="0"/>
+          <a:chOff x="0" y="0"/>
+          <a:chExt cx="0" cy="0"/>
+        </a:xfrm>
+      </p:grpSpPr>
+      <p:sp>
+        <p:nvSpPr>
+          <p:cNvPr id="2" name="Title 1">
+            <a:extLst>
+              <a:ext uri="{FF2B5EF4-FFF2-40B4-BE49-F238E27FC236}">
+                <a16:creationId xmlns:a16="http://schemas.microsoft.com/office/drawing/2014/main" id="{6F847B57-CB94-4091-8771-B55DFD5F71FF}"/>
+              </a:ext>
+            </a:extLst>
+          </p:cNvPr>
+          <p:cNvSpPr>
+            <a:spLocks noGrp="1"/>
+          </p:cNvSpPr>
+          <p:nvPr>
+            <p:ph type="title"/>
+          </p:nvPr>
+        </p:nvSpPr>
+        <p:spPr/>
+        <p:txBody>
+          <a:bodyPr/>
+          <a:lstStyle/>
+          <a:p>
+            <a:r>
+              <a:rPr lang="en-US" dirty="0"/>
+              <a:t>Singularity of Covariance</a:t>
+            </a:r>
+          </a:p>
+        </p:txBody>
+      </p:sp>
+      <p:sp>
+        <p:nvSpPr>
+          <p:cNvPr id="4" name="Slide Number Placeholder 3">
+            <a:extLst>
+              <a:ext uri="{FF2B5EF4-FFF2-40B4-BE49-F238E27FC236}">
+                <a16:creationId xmlns:a16="http://schemas.microsoft.com/office/drawing/2014/main" id="{2588F7C1-5C39-4DA7-89C2-5ADD824897FE}"/>
+              </a:ext>
+            </a:extLst>
+          </p:cNvPr>
+          <p:cNvSpPr>
+            <a:spLocks noGrp="1"/>
+          </p:cNvSpPr>
+          <p:nvPr>
+            <p:ph type="sldNum" sz="quarter" idx="12"/>
+          </p:nvPr>
+        </p:nvSpPr>
+        <p:spPr/>
+        <p:txBody>
+          <a:bodyPr/>
+          <a:lstStyle/>
+          <a:p>
+            <a:fld id="{B01D9778-10B4-40FB-B4E4-44FA89A86639}" type="slidenum">
+              <a:rPr lang="en-US" smtClean="0"/>
+              <a:pPr/>
+              <a:t>21</a:t>
             </a:fld>
             <a:endParaRPr lang="en-US"/>
           </a:p>
@@ -6601,7 +8371,7 @@
 </p:sld>
 </file>
 
-<file path=ppt/slides/slide21.xml><?xml version="1.0" encoding="utf-8"?>
+<file path=ppt/slides/slide22.xml><?xml version="1.0" encoding="utf-8"?>
 <p:sld xmlns:a="http://schemas.openxmlformats.org/drawingml/2006/main" xmlns:r="http://schemas.openxmlformats.org/officeDocument/2006/relationships" xmlns:p="http://schemas.openxmlformats.org/presentationml/2006/main">
   <p:cSld>
     <p:spTree>
@@ -6678,7 +8448,7 @@
             <a:fld id="{B01D9778-10B4-40FB-B4E4-44FA89A86639}" type="slidenum">
               <a:rPr lang="en-US" smtClean="0"/>
               <a:pPr/>
-              <a:t>21</a:t>
+              <a:t>22</a:t>
             </a:fld>
             <a:endParaRPr lang="en-US" dirty="0"/>
           </a:p>
@@ -7260,7 +9030,7 @@
 </p:sld>
 </file>
 
-<file path=ppt/slides/slide22.xml><?xml version="1.0" encoding="utf-8"?>
+<file path=ppt/slides/slide23.xml><?xml version="1.0" encoding="utf-8"?>
 <p:sld xmlns:a="http://schemas.openxmlformats.org/drawingml/2006/main" xmlns:r="http://schemas.openxmlformats.org/officeDocument/2006/relationships" xmlns:p="http://schemas.openxmlformats.org/presentationml/2006/main">
   <p:cSld>
     <p:spTree>
@@ -7365,7 +9135,7 @@
             <a:fld id="{B01D9778-10B4-40FB-B4E4-44FA89A86639}" type="slidenum">
               <a:rPr lang="en-US" smtClean="0"/>
               <a:pPr/>
-              <a:t>22</a:t>
+              <a:t>23</a:t>
             </a:fld>
             <a:endParaRPr lang="en-US"/>
           </a:p>
@@ -7480,7 +9250,7 @@
     </p:spTree>
     <p:extLst>
       <p:ext uri="{BB962C8B-B14F-4D97-AF65-F5344CB8AC3E}">
-        <p14:creationId xmlns:p14="http://schemas.microsoft.com/office/powerpoint/2010/main" val="3541771356"/>
+        <p14:creationId xmlns:p14="http://schemas.microsoft.com/office/powerpoint/2010/main" val="3525466219"/>
       </p:ext>
     </p:extLst>
   </p:cSld>
@@ -7719,7 +9489,7 @@
 </p:sld>
 </file>
 
-<file path=ppt/slides/slide23.xml><?xml version="1.0" encoding="utf-8"?>
+<file path=ppt/slides/slide24.xml><?xml version="1.0" encoding="utf-8"?>
 <p:sld xmlns:a="http://schemas.openxmlformats.org/drawingml/2006/main" xmlns:r="http://schemas.openxmlformats.org/officeDocument/2006/relationships" xmlns:p="http://schemas.openxmlformats.org/presentationml/2006/main">
   <p:cSld>
     <p:spTree>
@@ -7738,49 +9508,38 @@
       </p:grpSpPr>
       <p:pic>
         <p:nvPicPr>
-          <p:cNvPr id="1026" name="Picture 2" descr="http://i0.kym-cdn.com/photos/images/original/001/285/460/8b6.jpg">
+          <p:cNvPr id="7" name="Picture 6" descr="A person in a red shirt&#10;&#10;Description generated with high confidence">
             <a:extLst>
               <a:ext uri="{FF2B5EF4-FFF2-40B4-BE49-F238E27FC236}">
-                <a16:creationId xmlns:a16="http://schemas.microsoft.com/office/drawing/2014/main" id="{555D06FB-EE22-4908-BFF2-F6522422BAD9}"/>
+                <a16:creationId xmlns:a16="http://schemas.microsoft.com/office/drawing/2014/main" id="{63C1BE1B-5AB0-48D3-95EA-8995E4EBD3B0}"/>
               </a:ext>
             </a:extLst>
           </p:cNvPr>
           <p:cNvPicPr>
-            <a:picLocks noChangeAspect="1" noChangeArrowheads="1"/>
+            <a:picLocks noChangeAspect="1"/>
           </p:cNvPicPr>
           <p:nvPr/>
         </p:nvPicPr>
         <p:blipFill>
-          <a:blip r:embed="rId2" cstate="print">
+          <a:blip r:embed="rId3" cstate="print">
             <a:extLst>
               <a:ext uri="{28A0092B-C50C-407E-A947-70E740481C1C}">
                 <a14:useLocalDpi xmlns:a14="http://schemas.microsoft.com/office/drawing/2010/main" val="0"/>
               </a:ext>
             </a:extLst>
           </a:blip>
-          <a:srcRect/>
           <a:stretch>
             <a:fillRect/>
           </a:stretch>
         </p:blipFill>
-        <p:spPr bwMode="auto">
-          <a:xfrm rot="2104313">
-            <a:off x="4869624" y="3733800"/>
-            <a:ext cx="3738033" cy="3048000"/>
+        <p:spPr>
+          <a:xfrm rot="1581716">
+            <a:off x="5674143" y="4229652"/>
+            <a:ext cx="3831978" cy="2429474"/>
           </a:xfrm>
           <a:prstGeom prst="rect">
             <a:avLst/>
           </a:prstGeom>
-          <a:noFill/>
-          <a:extLst>
-            <a:ext uri="{909E8E84-426E-40DD-AFC4-6F175D3DCCD1}">
-              <a14:hiddenFill xmlns:a14="http://schemas.microsoft.com/office/drawing/2010/main">
-                <a:solidFill>
-                  <a:srgbClr val="FFFFFF"/>
-                </a:solidFill>
-              </a14:hiddenFill>
-            </a:ext>
-          </a:extLst>
         </p:spPr>
       </p:pic>
       <p:sp>
@@ -7911,7 +9670,7 @@
             <a:fld id="{B01D9778-10B4-40FB-B4E4-44FA89A86639}" type="slidenum">
               <a:rPr lang="en-US" smtClean="0"/>
               <a:pPr/>
-              <a:t>23</a:t>
+              <a:t>24</a:t>
             </a:fld>
             <a:endParaRPr lang="en-US" dirty="0"/>
           </a:p>
@@ -8095,7 +9854,7 @@
                             </p:stCondLst>
                             <p:childTnLst>
                               <p:par>
-                                <p:cTn id="17" presetID="1" presetClass="entr" presetSubtype="0" fill="hold" nodeType="clickEffect">
+                                <p:cTn id="17" presetID="42" presetClass="entr" presetSubtype="0" fill="hold" nodeType="clickEffect">
                                   <p:stCondLst>
                                     <p:cond delay="0"/>
                                   </p:stCondLst>
@@ -8108,7 +9867,7 @@
                                           </p:stCondLst>
                                         </p:cTn>
                                         <p:tgtEl>
-                                          <p:spTgt spid="1026"/>
+                                          <p:spTgt spid="7"/>
                                         </p:tgtEl>
                                         <p:attrNameLst>
                                           <p:attrName>style.visibility</p:attrName>
@@ -8118,6 +9877,60 @@
                                         <p:strVal val="visible"/>
                                       </p:to>
                                     </p:set>
+                                    <p:animEffect transition="in" filter="fade">
+                                      <p:cBhvr>
+                                        <p:cTn id="19" dur="1000"/>
+                                        <p:tgtEl>
+                                          <p:spTgt spid="7"/>
+                                        </p:tgtEl>
+                                      </p:cBhvr>
+                                    </p:animEffect>
+                                    <p:anim calcmode="lin" valueType="num">
+                                      <p:cBhvr>
+                                        <p:cTn id="20" dur="1000" fill="hold"/>
+                                        <p:tgtEl>
+                                          <p:spTgt spid="7"/>
+                                        </p:tgtEl>
+                                        <p:attrNameLst>
+                                          <p:attrName>ppt_x</p:attrName>
+                                        </p:attrNameLst>
+                                      </p:cBhvr>
+                                      <p:tavLst>
+                                        <p:tav tm="0">
+                                          <p:val>
+                                            <p:strVal val="#ppt_x"/>
+                                          </p:val>
+                                        </p:tav>
+                                        <p:tav tm="100000">
+                                          <p:val>
+                                            <p:strVal val="#ppt_x"/>
+                                          </p:val>
+                                        </p:tav>
+                                      </p:tavLst>
+                                    </p:anim>
+                                    <p:anim calcmode="lin" valueType="num">
+                                      <p:cBhvr>
+                                        <p:cTn id="21" dur="1000" fill="hold"/>
+                                        <p:tgtEl>
+                                          <p:spTgt spid="7"/>
+                                        </p:tgtEl>
+                                        <p:attrNameLst>
+                                          <p:attrName>ppt_y</p:attrName>
+                                        </p:attrNameLst>
+                                      </p:cBhvr>
+                                      <p:tavLst>
+                                        <p:tav tm="0">
+                                          <p:val>
+                                            <p:strVal val="#ppt_y+.1"/>
+                                          </p:val>
+                                        </p:tav>
+                                        <p:tav tm="100000">
+                                          <p:val>
+                                            <p:strVal val="#ppt_y"/>
+                                          </p:val>
+                                        </p:tav>
+                                      </p:tavLst>
+                                    </p:anim>
                                   </p:childTnLst>
                                 </p:cTn>
                               </p:par>
@@ -8155,7 +9968,205 @@
 </p:sld>
 </file>
 
-<file path=ppt/slides/slide24.xml><?xml version="1.0" encoding="utf-8"?>
+<file path=ppt/slides/slide25.xml><?xml version="1.0" encoding="utf-8"?>
+<p:sld xmlns:a="http://schemas.openxmlformats.org/drawingml/2006/main" xmlns:r="http://schemas.openxmlformats.org/officeDocument/2006/relationships" xmlns:p="http://schemas.openxmlformats.org/presentationml/2006/main">
+  <p:cSld>
+    <p:spTree>
+      <p:nvGrpSpPr>
+        <p:cNvPr id="1" name=""/>
+        <p:cNvGrpSpPr/>
+        <p:nvPr/>
+      </p:nvGrpSpPr>
+      <p:grpSpPr>
+        <a:xfrm>
+          <a:off x="0" y="0"/>
+          <a:ext cx="0" cy="0"/>
+          <a:chOff x="0" y="0"/>
+          <a:chExt cx="0" cy="0"/>
+        </a:xfrm>
+      </p:grpSpPr>
+      <p:sp>
+        <p:nvSpPr>
+          <p:cNvPr id="2" name="Title 1">
+            <a:extLst>
+              <a:ext uri="{FF2B5EF4-FFF2-40B4-BE49-F238E27FC236}">
+                <a16:creationId xmlns:a16="http://schemas.microsoft.com/office/drawing/2014/main" id="{6F847B57-CB94-4091-8771-B55DFD5F71FF}"/>
+              </a:ext>
+            </a:extLst>
+          </p:cNvPr>
+          <p:cNvSpPr>
+            <a:spLocks noGrp="1"/>
+          </p:cNvSpPr>
+          <p:nvPr>
+            <p:ph type="title"/>
+          </p:nvPr>
+        </p:nvSpPr>
+        <p:spPr/>
+        <p:txBody>
+          <a:bodyPr/>
+          <a:lstStyle/>
+          <a:p>
+            <a:r>
+              <a:rPr lang="en-US" dirty="0">
+                <a:solidFill>
+                  <a:srgbClr val="002060"/>
+                </a:solidFill>
+              </a:rPr>
+              <a:t>Intermediate Results</a:t>
+            </a:r>
+            <a:endParaRPr lang="en-US" dirty="0"/>
+          </a:p>
+        </p:txBody>
+      </p:sp>
+      <p:sp>
+        <p:nvSpPr>
+          <p:cNvPr id="4" name="Slide Number Placeholder 3">
+            <a:extLst>
+              <a:ext uri="{FF2B5EF4-FFF2-40B4-BE49-F238E27FC236}">
+                <a16:creationId xmlns:a16="http://schemas.microsoft.com/office/drawing/2014/main" id="{2588F7C1-5C39-4DA7-89C2-5ADD824897FE}"/>
+              </a:ext>
+            </a:extLst>
+          </p:cNvPr>
+          <p:cNvSpPr>
+            <a:spLocks noGrp="1"/>
+          </p:cNvSpPr>
+          <p:nvPr>
+            <p:ph type="sldNum" sz="quarter" idx="12"/>
+          </p:nvPr>
+        </p:nvSpPr>
+        <p:spPr/>
+        <p:txBody>
+          <a:bodyPr/>
+          <a:lstStyle/>
+          <a:p>
+            <a:fld id="{B01D9778-10B4-40FB-B4E4-44FA89A86639}" type="slidenum">
+              <a:rPr lang="en-US" smtClean="0"/>
+              <a:pPr/>
+              <a:t>25</a:t>
+            </a:fld>
+            <a:endParaRPr lang="en-US"/>
+          </a:p>
+        </p:txBody>
+      </p:sp>
+      <p:pic>
+        <p:nvPicPr>
+          <p:cNvPr id="10" name="Picture 9">
+            <a:extLst>
+              <a:ext uri="{FF2B5EF4-FFF2-40B4-BE49-F238E27FC236}">
+                <a16:creationId xmlns:a16="http://schemas.microsoft.com/office/drawing/2014/main" id="{D19AF5D8-9460-4EB6-9561-F00B91864C2D}"/>
+              </a:ext>
+            </a:extLst>
+          </p:cNvPr>
+          <p:cNvPicPr>
+            <a:picLocks noChangeAspect="1"/>
+          </p:cNvPicPr>
+          <p:nvPr/>
+        </p:nvPicPr>
+        <p:blipFill>
+          <a:blip r:embed="rId2"/>
+          <a:stretch>
+            <a:fillRect/>
+          </a:stretch>
+        </p:blipFill>
+        <p:spPr>
+          <a:xfrm>
+            <a:off x="1524000" y="1741714"/>
+            <a:ext cx="5861576" cy="4403073"/>
+          </a:xfrm>
+          <a:prstGeom prst="rect">
+            <a:avLst/>
+          </a:prstGeom>
+        </p:spPr>
+      </p:pic>
+      <p:sp>
+        <p:nvSpPr>
+          <p:cNvPr id="11" name="TextBox 10">
+            <a:extLst>
+              <a:ext uri="{FF2B5EF4-FFF2-40B4-BE49-F238E27FC236}">
+                <a16:creationId xmlns:a16="http://schemas.microsoft.com/office/drawing/2014/main" id="{792DC779-1F88-4A52-935D-C2FDA42EA7AD}"/>
+              </a:ext>
+            </a:extLst>
+          </p:cNvPr>
+          <p:cNvSpPr txBox="1"/>
+          <p:nvPr/>
+        </p:nvSpPr>
+        <p:spPr>
+          <a:xfrm>
+            <a:off x="3124200" y="1567934"/>
+            <a:ext cx="2895600" cy="369332"/>
+          </a:xfrm>
+          <a:prstGeom prst="rect">
+            <a:avLst/>
+          </a:prstGeom>
+          <a:noFill/>
+        </p:spPr>
+        <p:txBody>
+          <a:bodyPr wrap="square" rtlCol="0">
+            <a:spAutoFit/>
+          </a:bodyPr>
+          <a:lstStyle/>
+          <a:p>
+            <a:r>
+              <a:rPr lang="en-US" b="1" dirty="0" err="1"/>
+              <a:t>tSNE</a:t>
+            </a:r>
+            <a:r>
+              <a:rPr lang="en-US" b="1" dirty="0"/>
+              <a:t> after diffusion map</a:t>
+            </a:r>
+          </a:p>
+        </p:txBody>
+      </p:sp>
+      <p:sp>
+        <p:nvSpPr>
+          <p:cNvPr id="12" name="TextBox 11">
+            <a:extLst>
+              <a:ext uri="{FF2B5EF4-FFF2-40B4-BE49-F238E27FC236}">
+                <a16:creationId xmlns:a16="http://schemas.microsoft.com/office/drawing/2014/main" id="{C92E2A1D-B54E-4160-8001-4F9A6395D0DF}"/>
+              </a:ext>
+            </a:extLst>
+          </p:cNvPr>
+          <p:cNvSpPr txBox="1"/>
+          <p:nvPr/>
+        </p:nvSpPr>
+        <p:spPr>
+          <a:xfrm>
+            <a:off x="1524000" y="5775455"/>
+            <a:ext cx="5861576" cy="369332"/>
+          </a:xfrm>
+          <a:prstGeom prst="rect">
+            <a:avLst/>
+          </a:prstGeom>
+          <a:noFill/>
+        </p:spPr>
+        <p:txBody>
+          <a:bodyPr wrap="square" rtlCol="0">
+            <a:spAutoFit/>
+          </a:bodyPr>
+          <a:lstStyle/>
+          <a:p>
+            <a:pPr algn="ctr"/>
+            <a:r>
+              <a:rPr lang="en-US" dirty="0"/>
+              <a:t>No pattern is observed…</a:t>
+            </a:r>
+          </a:p>
+        </p:txBody>
+      </p:sp>
+    </p:spTree>
+    <p:extLst>
+      <p:ext uri="{BB962C8B-B14F-4D97-AF65-F5344CB8AC3E}">
+        <p14:creationId xmlns:p14="http://schemas.microsoft.com/office/powerpoint/2010/main" val="3541771356"/>
+      </p:ext>
+    </p:extLst>
+  </p:cSld>
+  <p:clrMapOvr>
+    <a:masterClrMapping/>
+  </p:clrMapOvr>
+</p:sld>
+</file>
+
+<file path=ppt/slides/slide26.xml><?xml version="1.0" encoding="utf-8"?>
 <p:sld xmlns:a="http://schemas.openxmlformats.org/drawingml/2006/main" xmlns:r="http://schemas.openxmlformats.org/officeDocument/2006/relationships" xmlns:p="http://schemas.openxmlformats.org/presentationml/2006/main">
   <p:cSld>
     <p:spTree>
@@ -8239,23 +10250,7 @@
                   <a:srgbClr val="002060"/>
                 </a:solidFill>
               </a:rPr>
-              <a:t>Using localization methods </a:t>
-            </a:r>
-            <a:r>
-              <a:rPr lang="en-US">
-                <a:solidFill>
-                  <a:srgbClr val="002060"/>
-                </a:solidFill>
-              </a:rPr>
-              <a:t>to research a </a:t>
-            </a:r>
-            <a:r>
-              <a:rPr lang="en-US" dirty="0">
-                <a:solidFill>
-                  <a:srgbClr val="002060"/>
-                </a:solidFill>
-              </a:rPr>
-              <a:t>specific area</a:t>
+              <a:t>Using localization methods to research a specific area</a:t>
             </a:r>
           </a:p>
           <a:p>
@@ -8303,7 +10298,7 @@
             <a:fld id="{B01D9778-10B4-40FB-B4E4-44FA89A86639}" type="slidenum">
               <a:rPr lang="en-US" smtClean="0"/>
               <a:pPr/>
-              <a:t>24</a:t>
+              <a:t>26</a:t>
             </a:fld>
             <a:endParaRPr lang="en-US"/>
           </a:p>
@@ -9020,7 +11015,7 @@
                   <a:srgbClr val="002060"/>
                 </a:solidFill>
               </a:rPr>
-              <a:t>® treats patients by TMS</a:t>
+              <a:t>® treats patients by TMS </a:t>
             </a:r>
           </a:p>
           <a:p>
@@ -9069,6 +11064,68 @@
           </a:p>
         </p:txBody>
       </p:sp>
+      <p:pic>
+        <p:nvPicPr>
+          <p:cNvPr id="4" name="Picture 3">
+            <a:extLst>
+              <a:ext uri="{FF2B5EF4-FFF2-40B4-BE49-F238E27FC236}">
+                <a16:creationId xmlns:a16="http://schemas.microsoft.com/office/drawing/2014/main" id="{F106686F-FD2A-400F-BE62-B63C29264C6F}"/>
+              </a:ext>
+            </a:extLst>
+          </p:cNvPr>
+          <p:cNvPicPr>
+            <a:picLocks noChangeAspect="1"/>
+          </p:cNvPicPr>
+          <p:nvPr/>
+        </p:nvPicPr>
+        <p:blipFill>
+          <a:blip r:embed="rId2"/>
+          <a:stretch>
+            <a:fillRect/>
+          </a:stretch>
+        </p:blipFill>
+        <p:spPr>
+          <a:xfrm rot="21042277">
+            <a:off x="1990724" y="4998992"/>
+            <a:ext cx="5162550" cy="3168738"/>
+          </a:xfrm>
+          <a:prstGeom prst="rect">
+            <a:avLst/>
+          </a:prstGeom>
+          <a:solidFill>
+            <a:srgbClr val="FFFFFF">
+              <a:shade val="85000"/>
+            </a:srgbClr>
+          </a:solidFill>
+          <a:ln w="101600" cap="sq">
+            <a:solidFill>
+              <a:srgbClr val="FDFDFD"/>
+            </a:solidFill>
+            <a:miter lim="800000"/>
+          </a:ln>
+          <a:effectLst>
+            <a:outerShdw blurRad="57150" dist="37500" dir="7560000" sy="98000" kx="110000" ky="200000" algn="tl" rotWithShape="0">
+              <a:srgbClr val="000000">
+                <a:alpha val="20000"/>
+              </a:srgbClr>
+            </a:outerShdw>
+          </a:effectLst>
+          <a:scene3d>
+            <a:camera prst="perspectiveRelaxed">
+              <a:rot lat="18960000" lon="0" rev="0"/>
+            </a:camera>
+            <a:lightRig rig="twoPt" dir="t">
+              <a:rot lat="0" lon="0" rev="7200000"/>
+            </a:lightRig>
+          </a:scene3d>
+          <a:sp3d prstMaterial="matte">
+            <a:bevelT w="22860" h="12700"/>
+            <a:contourClr>
+              <a:srgbClr val="FFFFFF"/>
+            </a:contourClr>
+          </a:sp3d>
+        </p:spPr>
+      </p:pic>
     </p:spTree>
     <p:extLst>
       <p:ext uri="{BB962C8B-B14F-4D97-AF65-F5344CB8AC3E}">
@@ -9234,6 +11291,97 @@
                       </p:childTnLst>
                     </p:cTn>
                   </p:par>
+                  <p:par>
+                    <p:cTn id="15" fill="hold">
+                      <p:stCondLst>
+                        <p:cond delay="indefinite"/>
+                      </p:stCondLst>
+                      <p:childTnLst>
+                        <p:par>
+                          <p:cTn id="16" fill="hold">
+                            <p:stCondLst>
+                              <p:cond delay="0"/>
+                            </p:stCondLst>
+                            <p:childTnLst>
+                              <p:par>
+                                <p:cTn id="17" presetID="2" presetClass="entr" presetSubtype="4" fill="hold" nodeType="clickEffect">
+                                  <p:stCondLst>
+                                    <p:cond delay="0"/>
+                                  </p:stCondLst>
+                                  <p:childTnLst>
+                                    <p:set>
+                                      <p:cBhvr>
+                                        <p:cTn id="18" dur="1" fill="hold">
+                                          <p:stCondLst>
+                                            <p:cond delay="0"/>
+                                          </p:stCondLst>
+                                        </p:cTn>
+                                        <p:tgtEl>
+                                          <p:spTgt spid="4"/>
+                                        </p:tgtEl>
+                                        <p:attrNameLst>
+                                          <p:attrName>style.visibility</p:attrName>
+                                        </p:attrNameLst>
+                                      </p:cBhvr>
+                                      <p:to>
+                                        <p:strVal val="visible"/>
+                                      </p:to>
+                                    </p:set>
+                                    <p:anim calcmode="lin" valueType="num">
+                                      <p:cBhvr additive="base">
+                                        <p:cTn id="19" dur="750" fill="hold"/>
+                                        <p:tgtEl>
+                                          <p:spTgt spid="4"/>
+                                        </p:tgtEl>
+                                        <p:attrNameLst>
+                                          <p:attrName>ppt_x</p:attrName>
+                                        </p:attrNameLst>
+                                      </p:cBhvr>
+                                      <p:tavLst>
+                                        <p:tav tm="0">
+                                          <p:val>
+                                            <p:strVal val="#ppt_x"/>
+                                          </p:val>
+                                        </p:tav>
+                                        <p:tav tm="100000">
+                                          <p:val>
+                                            <p:strVal val="#ppt_x"/>
+                                          </p:val>
+                                        </p:tav>
+                                      </p:tavLst>
+                                    </p:anim>
+                                    <p:anim calcmode="lin" valueType="num">
+                                      <p:cBhvr additive="base">
+                                        <p:cTn id="20" dur="750" fill="hold"/>
+                                        <p:tgtEl>
+                                          <p:spTgt spid="4"/>
+                                        </p:tgtEl>
+                                        <p:attrNameLst>
+                                          <p:attrName>ppt_y</p:attrName>
+                                        </p:attrNameLst>
+                                      </p:cBhvr>
+                                      <p:tavLst>
+                                        <p:tav tm="0">
+                                          <p:val>
+                                            <p:strVal val="1+#ppt_h/2"/>
+                                          </p:val>
+                                        </p:tav>
+                                        <p:tav tm="100000">
+                                          <p:val>
+                                            <p:strVal val="#ppt_y"/>
+                                          </p:val>
+                                        </p:tav>
+                                      </p:tavLst>
+                                    </p:anim>
+                                  </p:childTnLst>
+                                </p:cTn>
+                              </p:par>
+                            </p:childTnLst>
+                          </p:cTn>
+                        </p:par>
+                      </p:childTnLst>
+                    </p:cTn>
+                  </p:par>
                 </p:childTnLst>
               </p:cTn>
               <p:prevCondLst>
@@ -9543,19 +11691,7 @@
                                   <a:rPr lang="en-US" b="0" i="1" smtClean="0">
                                     <a:latin typeface="Cambria Math" panose="02040503050406030204" pitchFamily="18" charset="0"/>
                                   </a:rPr>
-                                  <m:t>0</m:t>
-                                </m:r>
-                                <m:r>
-                                  <a:rPr lang="en-US" b="0" i="1" smtClean="0">
-                                    <a:latin typeface="Cambria Math" panose="02040503050406030204" pitchFamily="18" charset="0"/>
-                                  </a:rPr>
-                                  <m:t>−</m:t>
-                                </m:r>
-                                <m:r>
-                                  <a:rPr lang="en-US" b="0" i="1" smtClean="0">
-                                    <a:latin typeface="Cambria Math" panose="02040503050406030204" pitchFamily="18" charset="0"/>
-                                  </a:rPr>
-                                  <m:t>7</m:t>
+                                  <m:t>0−7</m:t>
                                 </m:r>
                               </m:oMath>
                             </m:oMathPara>
@@ -9581,19 +11717,7 @@
                                   <a:rPr lang="en-US" b="0" i="1" smtClean="0">
                                     <a:latin typeface="Cambria Math" panose="02040503050406030204" pitchFamily="18" charset="0"/>
                                   </a:rPr>
-                                  <m:t>8</m:t>
-                                </m:r>
-                                <m:r>
-                                  <a:rPr lang="en-US" b="0" i="1" smtClean="0">
-                                    <a:latin typeface="Cambria Math" panose="02040503050406030204" pitchFamily="18" charset="0"/>
-                                  </a:rPr>
-                                  <m:t>−</m:t>
-                                </m:r>
-                                <m:r>
-                                  <a:rPr lang="en-US" b="0" i="1" smtClean="0">
-                                    <a:latin typeface="Cambria Math" panose="02040503050406030204" pitchFamily="18" charset="0"/>
-                                  </a:rPr>
-                                  <m:t>13</m:t>
+                                  <m:t>8−13</m:t>
                                 </m:r>
                               </m:oMath>
                             </m:oMathPara>
@@ -9619,19 +11743,7 @@
                                   <a:rPr lang="en-US" b="0" i="1" smtClean="0">
                                     <a:latin typeface="Cambria Math" panose="02040503050406030204" pitchFamily="18" charset="0"/>
                                   </a:rPr>
-                                  <m:t>14</m:t>
-                                </m:r>
-                                <m:r>
-                                  <a:rPr lang="en-US" b="0" i="1" smtClean="0">
-                                    <a:latin typeface="Cambria Math" panose="02040503050406030204" pitchFamily="18" charset="0"/>
-                                  </a:rPr>
-                                  <m:t>−</m:t>
-                                </m:r>
-                                <m:r>
-                                  <a:rPr lang="en-US" b="0" i="1" smtClean="0">
-                                    <a:latin typeface="Cambria Math" panose="02040503050406030204" pitchFamily="18" charset="0"/>
-                                  </a:rPr>
-                                  <m:t>18</m:t>
+                                  <m:t>14−18</m:t>
                                 </m:r>
                               </m:oMath>
                             </m:oMathPara>
@@ -9657,19 +11769,7 @@
                                   <a:rPr lang="en-US" b="0" i="1" smtClean="0">
                                     <a:latin typeface="Cambria Math" panose="02040503050406030204" pitchFamily="18" charset="0"/>
                                   </a:rPr>
-                                  <m:t>19</m:t>
-                                </m:r>
-                                <m:r>
-                                  <a:rPr lang="en-US" b="0" i="1" smtClean="0">
-                                    <a:latin typeface="Cambria Math" panose="02040503050406030204" pitchFamily="18" charset="0"/>
-                                  </a:rPr>
-                                  <m:t>−</m:t>
-                                </m:r>
-                                <m:r>
-                                  <a:rPr lang="en-US" b="0" i="1" smtClean="0">
-                                    <a:latin typeface="Cambria Math" panose="02040503050406030204" pitchFamily="18" charset="0"/>
-                                  </a:rPr>
-                                  <m:t>22</m:t>
+                                  <m:t>19−22</m:t>
                                 </m:r>
                               </m:oMath>
                             </m:oMathPara>
@@ -9695,13 +11795,7 @@
                                   <a:rPr lang="en-US" b="0" i="1" smtClean="0">
                                     <a:latin typeface="Cambria Math" panose="02040503050406030204" pitchFamily="18" charset="0"/>
                                   </a:rPr>
-                                  <m:t>≥</m:t>
-                                </m:r>
-                                <m:r>
-                                  <a:rPr lang="en-US" b="0" i="1" smtClean="0">
-                                    <a:latin typeface="Cambria Math" panose="02040503050406030204" pitchFamily="18" charset="0"/>
-                                  </a:rPr>
-                                  <m:t>23</m:t>
+                                  <m:t>≥23</m:t>
                                 </m:r>
                               </m:oMath>
                             </m:oMathPara>
@@ -10511,8 +12605,11 @@
           </a:bodyPr>
           <a:lstStyle/>
           <a:p>
+            <a:pPr marL="0" indent="0">
+              <a:buNone/>
+            </a:pPr>
             <a:r>
-              <a:rPr lang="en-US" dirty="0">
+              <a:rPr lang="en-US" b="1" i="1" dirty="0">
                 <a:solidFill>
                   <a:srgbClr val="002060"/>
                 </a:solidFill>
@@ -10520,7 +12617,7 @@
               <a:t>To help </a:t>
             </a:r>
             <a:r>
-              <a:rPr lang="en-US" dirty="0" err="1">
+              <a:rPr lang="en-US" b="1" i="1" dirty="0" err="1">
                 <a:solidFill>
                   <a:srgbClr val="002060"/>
                 </a:solidFill>
@@ -10528,7 +12625,7 @@
               <a:t>BrainSway</a:t>
             </a:r>
             <a:r>
-              <a:rPr lang="en-US" dirty="0">
+              <a:rPr lang="en-US" b="1" i="1" dirty="0">
                 <a:solidFill>
                   <a:srgbClr val="002060"/>
                 </a:solidFill>
@@ -10928,7 +13025,7 @@
           <a:p>
             <a:r>
               <a:rPr lang="en-US" dirty="0"/>
-              <a:t>Non linear dimension reduction</a:t>
+              <a:t>Non linear dimensionality reduction</a:t>
             </a:r>
           </a:p>
           <a:p>

</xml_diff>

<commit_message>
Final Final Midterm presentation
</commit_message>
<xml_diff>
--- a/Project_Midterm_Presentation.pptx
+++ b/Project_Midterm_Presentation.pptx
@@ -4245,9 +4245,10 @@
           <a:lstStyle/>
           <a:p>
             <a:r>
-              <a:rPr lang="en-US" dirty="0"/>
-              <a:t>~23 subjects</a:t>
+              <a:rPr lang="en-US"/>
+              <a:t>27 subjects</a:t>
             </a:r>
+            <a:endParaRPr lang="en-US" dirty="0"/>
           </a:p>
           <a:p>
             <a:r>
@@ -6410,27 +6411,6 @@
               <a:t>Muscle movements affect measurement</a:t>
             </a:r>
           </a:p>
-          <a:p>
-            <a:r>
-              <a:rPr lang="en-US" dirty="0"/>
-              <a:t>Possible Solutions: </a:t>
-            </a:r>
-          </a:p>
-          <a:p>
-            <a:pPr lvl="1"/>
-            <a:r>
-              <a:rPr lang="en-US" dirty="0"/>
-              <a:t>Remove the peak from data completely</a:t>
-            </a:r>
-          </a:p>
-          <a:p>
-            <a:pPr lvl="1"/>
-            <a:r>
-              <a:rPr lang="en-US" dirty="0"/>
-              <a:t>Ignore “loud” electrodes</a:t>
-            </a:r>
-            <a:endParaRPr lang="en-IL" dirty="0"/>
-          </a:p>
         </p:txBody>
       </p:sp>
     </p:spTree>
@@ -6549,153 +6529,6 @@
                       </p:childTnLst>
                     </p:cTn>
                   </p:par>
-                  <p:par>
-                    <p:cTn id="11" fill="hold">
-                      <p:stCondLst>
-                        <p:cond delay="indefinite"/>
-                      </p:stCondLst>
-                      <p:childTnLst>
-                        <p:par>
-                          <p:cTn id="12" fill="hold">
-                            <p:stCondLst>
-                              <p:cond delay="0"/>
-                            </p:stCondLst>
-                            <p:childTnLst>
-                              <p:par>
-                                <p:cTn id="13" presetID="1" presetClass="entr" presetSubtype="0" fill="hold" grpId="0" nodeType="clickEffect">
-                                  <p:stCondLst>
-                                    <p:cond delay="0"/>
-                                  </p:stCondLst>
-                                  <p:childTnLst>
-                                    <p:set>
-                                      <p:cBhvr>
-                                        <p:cTn id="14" dur="1" fill="hold">
-                                          <p:stCondLst>
-                                            <p:cond delay="0"/>
-                                          </p:stCondLst>
-                                        </p:cTn>
-                                        <p:tgtEl>
-                                          <p:spTgt spid="8">
-                                            <p:txEl>
-                                              <p:pRg st="2" end="2"/>
-                                            </p:txEl>
-                                          </p:spTgt>
-                                        </p:tgtEl>
-                                        <p:attrNameLst>
-                                          <p:attrName>style.visibility</p:attrName>
-                                        </p:attrNameLst>
-                                      </p:cBhvr>
-                                      <p:to>
-                                        <p:strVal val="visible"/>
-                                      </p:to>
-                                    </p:set>
-                                  </p:childTnLst>
-                                </p:cTn>
-                              </p:par>
-                            </p:childTnLst>
-                          </p:cTn>
-                        </p:par>
-                      </p:childTnLst>
-                    </p:cTn>
-                  </p:par>
-                  <p:par>
-                    <p:cTn id="15" fill="hold">
-                      <p:stCondLst>
-                        <p:cond delay="indefinite"/>
-                      </p:stCondLst>
-                      <p:childTnLst>
-                        <p:par>
-                          <p:cTn id="16" fill="hold">
-                            <p:stCondLst>
-                              <p:cond delay="0"/>
-                            </p:stCondLst>
-                            <p:childTnLst>
-                              <p:par>
-                                <p:cTn id="17" presetID="1" presetClass="entr" presetSubtype="0" fill="hold" nodeType="clickEffect">
-                                  <p:stCondLst>
-                                    <p:cond delay="0"/>
-                                  </p:stCondLst>
-                                  <p:childTnLst>
-                                    <p:set>
-                                      <p:cBhvr>
-                                        <p:cTn id="18" dur="1" fill="hold">
-                                          <p:stCondLst>
-                                            <p:cond delay="0"/>
-                                          </p:stCondLst>
-                                        </p:cTn>
-                                        <p:tgtEl>
-                                          <p:spTgt spid="8">
-                                            <p:txEl>
-                                              <p:pRg st="3" end="3"/>
-                                            </p:txEl>
-                                          </p:spTgt>
-                                        </p:tgtEl>
-                                        <p:attrNameLst>
-                                          <p:attrName>style.visibility</p:attrName>
-                                        </p:attrNameLst>
-                                      </p:cBhvr>
-                                      <p:to>
-                                        <p:strVal val="visible"/>
-                                      </p:to>
-                                    </p:set>
-                                  </p:childTnLst>
-                                </p:cTn>
-                              </p:par>
-                            </p:childTnLst>
-                          </p:cTn>
-                        </p:par>
-                      </p:childTnLst>
-                    </p:cTn>
-                  </p:par>
-                  <p:par>
-                    <p:cTn id="19" fill="hold">
-                      <p:stCondLst>
-                        <p:cond delay="indefinite"/>
-                      </p:stCondLst>
-                      <p:childTnLst>
-                        <p:par>
-                          <p:cTn id="20" fill="hold">
-                            <p:stCondLst>
-                              <p:cond delay="0"/>
-                            </p:stCondLst>
-                            <p:childTnLst>
-                              <p:par>
-                                <p:cTn id="21" presetID="1" presetClass="entr" presetSubtype="0" fill="hold" nodeType="clickEffect">
-                                  <p:stCondLst>
-                                    <p:cond delay="0"/>
-                                  </p:stCondLst>
-                                  <p:childTnLst>
-                                    <p:set>
-                                      <p:cBhvr>
-                                        <p:cTn id="22" dur="1" fill="hold">
-                                          <p:stCondLst>
-                                            <p:cond delay="0"/>
-                                          </p:stCondLst>
-                                        </p:cTn>
-                                        <p:tgtEl>
-                                          <p:spTgt spid="8">
-                                            <p:txEl>
-                                              <p:pRg st="4" end="4"/>
-                                            </p:txEl>
-                                          </p:spTgt>
-                                        </p:tgtEl>
-                                        <p:attrNameLst>
-                                          <p:attrName>style.visibility</p:attrName>
-                                        </p:attrNameLst>
-                                      </p:cBhvr>
-                                      <p:to>
-                                        <p:strVal val="visible"/>
-                                      </p:to>
-                                    </p:set>
-                                  </p:childTnLst>
-                                </p:cTn>
-                              </p:par>
-                            </p:childTnLst>
-                          </p:cTn>
-                        </p:par>
-                      </p:childTnLst>
-                    </p:cTn>
-                  </p:par>
                 </p:childTnLst>
               </p:cTn>
               <p:prevCondLst>
@@ -6956,6 +6789,71 @@
           </a:xfrm>
         </p:spPr>
       </p:pic>
+      <p:sp>
+        <p:nvSpPr>
+          <p:cNvPr id="3" name="TextBox 2">
+            <a:extLst>
+              <a:ext uri="{FF2B5EF4-FFF2-40B4-BE49-F238E27FC236}">
+                <a16:creationId xmlns:a16="http://schemas.microsoft.com/office/drawing/2014/main" id="{A0567466-9727-4465-BDED-862C0E4265FE}"/>
+              </a:ext>
+            </a:extLst>
+          </p:cNvPr>
+          <p:cNvSpPr txBox="1"/>
+          <p:nvPr/>
+        </p:nvSpPr>
+        <p:spPr>
+          <a:xfrm>
+            <a:off x="876300" y="1600200"/>
+            <a:ext cx="7391400" cy="2554545"/>
+          </a:xfrm>
+          <a:prstGeom prst="rect">
+            <a:avLst/>
+          </a:prstGeom>
+          <a:solidFill>
+            <a:schemeClr val="bg1"/>
+          </a:solidFill>
+        </p:spPr>
+        <p:txBody>
+          <a:bodyPr wrap="square" rtlCol="0">
+            <a:spAutoFit/>
+          </a:bodyPr>
+          <a:lstStyle/>
+          <a:p>
+            <a:r>
+              <a:rPr lang="en-US" sz="3200" dirty="0"/>
+              <a:t>Possible Solutions: </a:t>
+            </a:r>
+          </a:p>
+          <a:p>
+            <a:pPr marL="742950" lvl="1" indent="-285750">
+              <a:buFont typeface="Arial" panose="020B0604020202020204" pitchFamily="34" charset="0"/>
+              <a:buChar char="•"/>
+            </a:pPr>
+            <a:r>
+              <a:rPr lang="en-US" sz="3200" dirty="0"/>
+              <a:t>Remove the peak from data completely</a:t>
+            </a:r>
+          </a:p>
+          <a:p>
+            <a:pPr marL="742950" lvl="1" indent="-285750">
+              <a:buFont typeface="Arial" panose="020B0604020202020204" pitchFamily="34" charset="0"/>
+              <a:buChar char="•"/>
+            </a:pPr>
+            <a:r>
+              <a:rPr lang="en-US" sz="3200" dirty="0"/>
+              <a:t>Ignore “loud” electrodes</a:t>
+            </a:r>
+            <a:endParaRPr lang="en-IL" sz="3200" dirty="0"/>
+          </a:p>
+          <a:p>
+            <a:pPr marL="285750" indent="-285750">
+              <a:buFont typeface="Arial" panose="020B0604020202020204" pitchFamily="34" charset="0"/>
+              <a:buChar char="•"/>
+            </a:pPr>
+            <a:endParaRPr lang="en-IL" sz="3200" dirty="0"/>
+          </a:p>
+        </p:txBody>
+      </p:sp>
     </p:spTree>
     <p:extLst>
       <p:ext uri="{BB962C8B-B14F-4D97-AF65-F5344CB8AC3E}">
@@ -6966,6 +6864,84 @@
   <p:clrMapOvr>
     <a:masterClrMapping/>
   </p:clrMapOvr>
+  <p:timing>
+    <p:tnLst>
+      <p:par>
+        <p:cTn id="1" dur="indefinite" restart="never" nodeType="tmRoot">
+          <p:childTnLst>
+            <p:seq concurrent="1" nextAc="seek">
+              <p:cTn id="2" dur="indefinite" nodeType="mainSeq">
+                <p:childTnLst>
+                  <p:par>
+                    <p:cTn id="3" fill="hold">
+                      <p:stCondLst>
+                        <p:cond delay="indefinite"/>
+                      </p:stCondLst>
+                      <p:childTnLst>
+                        <p:par>
+                          <p:cTn id="4" fill="hold">
+                            <p:stCondLst>
+                              <p:cond delay="0"/>
+                            </p:stCondLst>
+                            <p:childTnLst>
+                              <p:par>
+                                <p:cTn id="5" presetID="1" presetClass="entr" presetSubtype="0" fill="hold" grpId="0" nodeType="clickEffect">
+                                  <p:stCondLst>
+                                    <p:cond delay="0"/>
+                                  </p:stCondLst>
+                                  <p:childTnLst>
+                                    <p:set>
+                                      <p:cBhvr>
+                                        <p:cTn id="6" dur="1" fill="hold">
+                                          <p:stCondLst>
+                                            <p:cond delay="0"/>
+                                          </p:stCondLst>
+                                        </p:cTn>
+                                        <p:tgtEl>
+                                          <p:spTgt spid="3"/>
+                                        </p:tgtEl>
+                                        <p:attrNameLst>
+                                          <p:attrName>style.visibility</p:attrName>
+                                        </p:attrNameLst>
+                                      </p:cBhvr>
+                                      <p:to>
+                                        <p:strVal val="visible"/>
+                                      </p:to>
+                                    </p:set>
+                                  </p:childTnLst>
+                                </p:cTn>
+                              </p:par>
+                            </p:childTnLst>
+                          </p:cTn>
+                        </p:par>
+                      </p:childTnLst>
+                    </p:cTn>
+                  </p:par>
+                </p:childTnLst>
+              </p:cTn>
+              <p:prevCondLst>
+                <p:cond evt="onPrev" delay="0">
+                  <p:tgtEl>
+                    <p:sldTgt/>
+                  </p:tgtEl>
+                </p:cond>
+              </p:prevCondLst>
+              <p:nextCondLst>
+                <p:cond evt="onNext" delay="0">
+                  <p:tgtEl>
+                    <p:sldTgt/>
+                  </p:tgtEl>
+                </p:cond>
+              </p:nextCondLst>
+            </p:seq>
+          </p:childTnLst>
+        </p:cTn>
+      </p:par>
+    </p:tnLst>
+    <p:bldLst>
+      <p:bldP spid="3" grpId="0" animBg="1"/>
+    </p:bldLst>
+  </p:timing>
 </p:sld>
 </file>
 
@@ -10272,16 +10248,6 @@
                   <a:srgbClr val="002060"/>
                 </a:solidFill>
               </a:rPr>
-              <a:t>Using localization methods to research a specific area</a:t>
-            </a:r>
-          </a:p>
-          <a:p>
-            <a:r>
-              <a:rPr lang="en-US" dirty="0">
-                <a:solidFill>
-                  <a:srgbClr val="002060"/>
-                </a:solidFill>
-              </a:rPr>
               <a:t>Using only a specific part of each signal</a:t>
             </a:r>
           </a:p>
@@ -10471,55 +10437,6 @@
                                           <p:spTgt spid="3">
                                             <p:txEl>
                                               <p:pRg st="2" end="2"/>
-                                            </p:txEl>
-                                          </p:spTgt>
-                                        </p:tgtEl>
-                                        <p:attrNameLst>
-                                          <p:attrName>style.visibility</p:attrName>
-                                        </p:attrNameLst>
-                                      </p:cBhvr>
-                                      <p:to>
-                                        <p:strVal val="visible"/>
-                                      </p:to>
-                                    </p:set>
-                                  </p:childTnLst>
-                                </p:cTn>
-                              </p:par>
-                            </p:childTnLst>
-                          </p:cTn>
-                        </p:par>
-                      </p:childTnLst>
-                    </p:cTn>
-                  </p:par>
-                  <p:par>
-                    <p:cTn id="15" fill="hold">
-                      <p:stCondLst>
-                        <p:cond delay="indefinite"/>
-                      </p:stCondLst>
-                      <p:childTnLst>
-                        <p:par>
-                          <p:cTn id="16" fill="hold">
-                            <p:stCondLst>
-                              <p:cond delay="0"/>
-                            </p:stCondLst>
-                            <p:childTnLst>
-                              <p:par>
-                                <p:cTn id="17" presetID="1" presetClass="entr" presetSubtype="0" fill="hold" grpId="0" nodeType="clickEffect">
-                                  <p:stCondLst>
-                                    <p:cond delay="0"/>
-                                  </p:stCondLst>
-                                  <p:childTnLst>
-                                    <p:set>
-                                      <p:cBhvr>
-                                        <p:cTn id="18" dur="1" fill="hold">
-                                          <p:stCondLst>
-                                            <p:cond delay="0"/>
-                                          </p:stCondLst>
-                                        </p:cTn>
-                                        <p:tgtEl>
-                                          <p:spTgt spid="3">
-                                            <p:txEl>
-                                              <p:pRg st="3" end="3"/>
                                             </p:txEl>
                                           </p:spTgt>
                                         </p:tgtEl>

</xml_diff>